<commit_message>
Updated the presentation to contain an infographic about the reduce/minimal representation
</commit_message>
<xml_diff>
--- a/presentation.pptx
+++ b/presentation.pptx
@@ -19,6 +19,7 @@
     <p:sldId id="266" r:id="rId13"/>
     <p:sldId id="267" r:id="rId14"/>
     <p:sldId id="268" r:id="rId15"/>
+    <p:sldId id="270" r:id="rId16"/>
   </p:sldIdLst>
   <p:sldSz cx="12192000" cy="6858000"/>
   <p:notesSz cx="6858000" cy="9144000"/>
@@ -128,7 +129,7 @@
 <file path=ppt/revisionInfo.xml><?xml version="1.0" encoding="utf-8"?>
 <p1510:revInfo xmlns:a="http://schemas.openxmlformats.org/drawingml/2006/main" xmlns:r="http://schemas.openxmlformats.org/officeDocument/2006/relationships" xmlns:p1510="http://schemas.microsoft.com/office/powerpoint/2015/10/main">
   <p1510:revLst>
-    <p1510:client id="{92BFB444-7DBC-CA44-A6DD-A4B3F7DBDADB}" v="88" dt="2026-01-02T14:56:51.510"/>
+    <p1510:client id="{92BFB444-7DBC-CA44-A6DD-A4B3F7DBDADB}" v="133" dt="2026-01-20T15:22:39.843"/>
   </p1510:revLst>
 </p1510:revInfo>
 </file>
@@ -137,8 +138,8 @@
 <pc:chgInfo xmlns:a="http://schemas.openxmlformats.org/drawingml/2006/main" xmlns:r="http://schemas.openxmlformats.org/officeDocument/2006/relationships" xmlns:ac="http://schemas.microsoft.com/office/drawing/2013/main/command" xmlns:pc="http://schemas.microsoft.com/office/powerpoint/2013/main/command">
   <pc:docChgLst>
     <pc:chgData name="Bart Wolleswinkel" userId="b168cadc-1825-41ce-b9cc-7c7f06f6f31d" providerId="ADAL" clId="{22248CC1-9068-5BCB-B15B-4353FE48F57D}"/>
-    <pc:docChg chg="custSel modSld">
-      <pc:chgData name="Bart Wolleswinkel" userId="b168cadc-1825-41ce-b9cc-7c7f06f6f31d" providerId="ADAL" clId="{22248CC1-9068-5BCB-B15B-4353FE48F57D}" dt="2026-01-08T13:29:15.403" v="11" actId="5793"/>
+    <pc:docChg chg="undo custSel addSld modSld">
+      <pc:chgData name="Bart Wolleswinkel" userId="b168cadc-1825-41ce-b9cc-7c7f06f6f31d" providerId="ADAL" clId="{22248CC1-9068-5BCB-B15B-4353FE48F57D}" dt="2026-01-20T15:24:20.557" v="631" actId="20577"/>
       <pc:docMkLst>
         <pc:docMk/>
       </pc:docMkLst>
@@ -180,6 +181,573 @@
           </ac:spMkLst>
         </pc:spChg>
       </pc:sldChg>
+      <pc:sldChg chg="addSp delSp modSp add mod">
+        <pc:chgData name="Bart Wolleswinkel" userId="b168cadc-1825-41ce-b9cc-7c7f06f6f31d" providerId="ADAL" clId="{22248CC1-9068-5BCB-B15B-4353FE48F57D}" dt="2026-01-20T15:24:20.557" v="631" actId="20577"/>
+        <pc:sldMkLst>
+          <pc:docMk/>
+          <pc:sldMk cId="256577611" sldId="270"/>
+        </pc:sldMkLst>
+        <pc:spChg chg="del">
+          <ac:chgData name="Bart Wolleswinkel" userId="b168cadc-1825-41ce-b9cc-7c7f06f6f31d" providerId="ADAL" clId="{22248CC1-9068-5BCB-B15B-4353FE48F57D}" dt="2026-01-20T14:55:31.202" v="13" actId="478"/>
+          <ac:spMkLst>
+            <pc:docMk/>
+            <pc:sldMk cId="256577611" sldId="270"/>
+            <ac:spMk id="2" creationId="{A9F52DD2-6334-029F-6513-EA3773107D84}"/>
+          </ac:spMkLst>
+        </pc:spChg>
+        <pc:spChg chg="add mod">
+          <ac:chgData name="Bart Wolleswinkel" userId="b168cadc-1825-41ce-b9cc-7c7f06f6f31d" providerId="ADAL" clId="{22248CC1-9068-5BCB-B15B-4353FE48F57D}" dt="2026-01-20T15:09:41.260" v="404" actId="14100"/>
+          <ac:spMkLst>
+            <pc:docMk/>
+            <pc:sldMk cId="256577611" sldId="270"/>
+            <ac:spMk id="4" creationId="{917348C7-57B9-4E99-AD65-F46BFABB7BDC}"/>
+          </ac:spMkLst>
+        </pc:spChg>
+        <pc:spChg chg="add del mod">
+          <ac:chgData name="Bart Wolleswinkel" userId="b168cadc-1825-41ce-b9cc-7c7f06f6f31d" providerId="ADAL" clId="{22248CC1-9068-5BCB-B15B-4353FE48F57D}" dt="2026-01-20T14:55:49.539" v="29" actId="478"/>
+          <ac:spMkLst>
+            <pc:docMk/>
+            <pc:sldMk cId="256577611" sldId="270"/>
+            <ac:spMk id="6" creationId="{730E3CF9-3180-2298-83B0-D5D46ECE4695}"/>
+          </ac:spMkLst>
+        </pc:spChg>
+        <pc:spChg chg="add mod">
+          <ac:chgData name="Bart Wolleswinkel" userId="b168cadc-1825-41ce-b9cc-7c7f06f6f31d" providerId="ADAL" clId="{22248CC1-9068-5BCB-B15B-4353FE48F57D}" dt="2026-01-20T15:00:07.063" v="188" actId="20577"/>
+          <ac:spMkLst>
+            <pc:docMk/>
+            <pc:sldMk cId="256577611" sldId="270"/>
+            <ac:spMk id="7" creationId="{85BA688B-34B4-32DA-142F-35253A1C999F}"/>
+          </ac:spMkLst>
+        </pc:spChg>
+        <pc:spChg chg="add mod">
+          <ac:chgData name="Bart Wolleswinkel" userId="b168cadc-1825-41ce-b9cc-7c7f06f6f31d" providerId="ADAL" clId="{22248CC1-9068-5BCB-B15B-4353FE48F57D}" dt="2026-01-20T14:57:14.620" v="62" actId="1076"/>
+          <ac:spMkLst>
+            <pc:docMk/>
+            <pc:sldMk cId="256577611" sldId="270"/>
+            <ac:spMk id="8" creationId="{0EA53377-0336-69D4-4C28-8C6B9D672000}"/>
+          </ac:spMkLst>
+        </pc:spChg>
+        <pc:spChg chg="del">
+          <ac:chgData name="Bart Wolleswinkel" userId="b168cadc-1825-41ce-b9cc-7c7f06f6f31d" providerId="ADAL" clId="{22248CC1-9068-5BCB-B15B-4353FE48F57D}" dt="2026-01-20T14:55:31.202" v="13" actId="478"/>
+          <ac:spMkLst>
+            <pc:docMk/>
+            <pc:sldMk cId="256577611" sldId="270"/>
+            <ac:spMk id="9" creationId="{7A081515-89B3-FCA1-F4A9-DB25F489E799}"/>
+          </ac:spMkLst>
+        </pc:spChg>
+        <pc:spChg chg="add del mod">
+          <ac:chgData name="Bart Wolleswinkel" userId="b168cadc-1825-41ce-b9cc-7c7f06f6f31d" providerId="ADAL" clId="{22248CC1-9068-5BCB-B15B-4353FE48F57D}" dt="2026-01-20T14:57:10.416" v="61" actId="478"/>
+          <ac:spMkLst>
+            <pc:docMk/>
+            <pc:sldMk cId="256577611" sldId="270"/>
+            <ac:spMk id="10" creationId="{021DBA5B-5305-F8CE-1A3D-933BA197751A}"/>
+          </ac:spMkLst>
+        </pc:spChg>
+        <pc:spChg chg="add del mod">
+          <ac:chgData name="Bart Wolleswinkel" userId="b168cadc-1825-41ce-b9cc-7c7f06f6f31d" providerId="ADAL" clId="{22248CC1-9068-5BCB-B15B-4353FE48F57D}" dt="2026-01-20T14:57:10.416" v="61" actId="478"/>
+          <ac:spMkLst>
+            <pc:docMk/>
+            <pc:sldMk cId="256577611" sldId="270"/>
+            <ac:spMk id="11" creationId="{1AF747A6-08DB-7564-C36F-31BFCBEA4CFD}"/>
+          </ac:spMkLst>
+        </pc:spChg>
+        <pc:spChg chg="add mod">
+          <ac:chgData name="Bart Wolleswinkel" userId="b168cadc-1825-41ce-b9cc-7c7f06f6f31d" providerId="ADAL" clId="{22248CC1-9068-5BCB-B15B-4353FE48F57D}" dt="2026-01-20T15:00:02.781" v="185" actId="20577"/>
+          <ac:spMkLst>
+            <pc:docMk/>
+            <pc:sldMk cId="256577611" sldId="270"/>
+            <ac:spMk id="12" creationId="{DB83ABB8-1385-0DAA-1310-37D5FCC7751C}"/>
+          </ac:spMkLst>
+        </pc:spChg>
+        <pc:spChg chg="add mod">
+          <ac:chgData name="Bart Wolleswinkel" userId="b168cadc-1825-41ce-b9cc-7c7f06f6f31d" providerId="ADAL" clId="{22248CC1-9068-5BCB-B15B-4353FE48F57D}" dt="2026-01-20T14:57:30.301" v="83" actId="20577"/>
+          <ac:spMkLst>
+            <pc:docMk/>
+            <pc:sldMk cId="256577611" sldId="270"/>
+            <ac:spMk id="13" creationId="{6363C693-8023-7768-E070-3185FE10916E}"/>
+          </ac:spMkLst>
+        </pc:spChg>
+        <pc:spChg chg="add mod">
+          <ac:chgData name="Bart Wolleswinkel" userId="b168cadc-1825-41ce-b9cc-7c7f06f6f31d" providerId="ADAL" clId="{22248CC1-9068-5BCB-B15B-4353FE48F57D}" dt="2026-01-20T14:57:54.187" v="97" actId="14100"/>
+          <ac:spMkLst>
+            <pc:docMk/>
+            <pc:sldMk cId="256577611" sldId="270"/>
+            <ac:spMk id="14" creationId="{FE4B07B8-9A93-F7C9-6355-B93263C3B712}"/>
+          </ac:spMkLst>
+        </pc:spChg>
+        <pc:spChg chg="add mod">
+          <ac:chgData name="Bart Wolleswinkel" userId="b168cadc-1825-41ce-b9cc-7c7f06f6f31d" providerId="ADAL" clId="{22248CC1-9068-5BCB-B15B-4353FE48F57D}" dt="2026-01-20T14:58:03.362" v="109" actId="20577"/>
+          <ac:spMkLst>
+            <pc:docMk/>
+            <pc:sldMk cId="256577611" sldId="270"/>
+            <ac:spMk id="15" creationId="{F1E8F04F-A53F-1A39-7DBC-F3B1B11DAAC6}"/>
+          </ac:spMkLst>
+        </pc:spChg>
+        <pc:spChg chg="add mod">
+          <ac:chgData name="Bart Wolleswinkel" userId="b168cadc-1825-41ce-b9cc-7c7f06f6f31d" providerId="ADAL" clId="{22248CC1-9068-5BCB-B15B-4353FE48F57D}" dt="2026-01-20T14:59:33.194" v="158" actId="14100"/>
+          <ac:spMkLst>
+            <pc:docMk/>
+            <pc:sldMk cId="256577611" sldId="270"/>
+            <ac:spMk id="16" creationId="{B0AE31C4-FF9E-B043-5D9F-DEEBE2EF5BBB}"/>
+          </ac:spMkLst>
+        </pc:spChg>
+        <pc:spChg chg="add mod">
+          <ac:chgData name="Bart Wolleswinkel" userId="b168cadc-1825-41ce-b9cc-7c7f06f6f31d" providerId="ADAL" clId="{22248CC1-9068-5BCB-B15B-4353FE48F57D}" dt="2026-01-20T14:59:31.233" v="157" actId="14100"/>
+          <ac:spMkLst>
+            <pc:docMk/>
+            <pc:sldMk cId="256577611" sldId="270"/>
+            <ac:spMk id="17" creationId="{2396B369-61AE-2B9B-4AEE-595ADDD9EE00}"/>
+          </ac:spMkLst>
+        </pc:spChg>
+        <pc:spChg chg="add del mod">
+          <ac:chgData name="Bart Wolleswinkel" userId="b168cadc-1825-41ce-b9cc-7c7f06f6f31d" providerId="ADAL" clId="{22248CC1-9068-5BCB-B15B-4353FE48F57D}" dt="2026-01-20T14:59:17.049" v="142" actId="478"/>
+          <ac:spMkLst>
+            <pc:docMk/>
+            <pc:sldMk cId="256577611" sldId="270"/>
+            <ac:spMk id="18" creationId="{687E1A7D-D4F7-9FFD-2BF3-C9CF626286C2}"/>
+          </ac:spMkLst>
+        </pc:spChg>
+        <pc:spChg chg="add del mod">
+          <ac:chgData name="Bart Wolleswinkel" userId="b168cadc-1825-41ce-b9cc-7c7f06f6f31d" providerId="ADAL" clId="{22248CC1-9068-5BCB-B15B-4353FE48F57D}" dt="2026-01-20T15:00:12.021" v="191" actId="478"/>
+          <ac:spMkLst>
+            <pc:docMk/>
+            <pc:sldMk cId="256577611" sldId="270"/>
+            <ac:spMk id="19" creationId="{AD0D2F7C-5F75-D862-66E0-4527A320ABB4}"/>
+          </ac:spMkLst>
+        </pc:spChg>
+        <pc:spChg chg="add mod">
+          <ac:chgData name="Bart Wolleswinkel" userId="b168cadc-1825-41ce-b9cc-7c7f06f6f31d" providerId="ADAL" clId="{22248CC1-9068-5BCB-B15B-4353FE48F57D}" dt="2026-01-20T14:59:51.801" v="182" actId="20577"/>
+          <ac:spMkLst>
+            <pc:docMk/>
+            <pc:sldMk cId="256577611" sldId="270"/>
+            <ac:spMk id="20" creationId="{9C50A6D5-D08A-0CA2-4FF2-55A38401369A}"/>
+          </ac:spMkLst>
+        </pc:spChg>
+        <pc:spChg chg="add del mod">
+          <ac:chgData name="Bart Wolleswinkel" userId="b168cadc-1825-41ce-b9cc-7c7f06f6f31d" providerId="ADAL" clId="{22248CC1-9068-5BCB-B15B-4353FE48F57D}" dt="2026-01-20T15:00:05.448" v="186" actId="478"/>
+          <ac:spMkLst>
+            <pc:docMk/>
+            <pc:sldMk cId="256577611" sldId="270"/>
+            <ac:spMk id="21" creationId="{09A1D75A-D481-2C49-6C9F-60CA9B03EF27}"/>
+          </ac:spMkLst>
+        </pc:spChg>
+        <pc:spChg chg="add mod">
+          <ac:chgData name="Bart Wolleswinkel" userId="b168cadc-1825-41ce-b9cc-7c7f06f6f31d" providerId="ADAL" clId="{22248CC1-9068-5BCB-B15B-4353FE48F57D}" dt="2026-01-20T15:00:24.752" v="211" actId="20577"/>
+          <ac:spMkLst>
+            <pc:docMk/>
+            <pc:sldMk cId="256577611" sldId="270"/>
+            <ac:spMk id="22" creationId="{838E808A-387B-0DCB-ED63-3C5644865623}"/>
+          </ac:spMkLst>
+        </pc:spChg>
+        <pc:spChg chg="add mod">
+          <ac:chgData name="Bart Wolleswinkel" userId="b168cadc-1825-41ce-b9cc-7c7f06f6f31d" providerId="ADAL" clId="{22248CC1-9068-5BCB-B15B-4353FE48F57D}" dt="2026-01-20T15:12:40.518" v="490" actId="1036"/>
+          <ac:spMkLst>
+            <pc:docMk/>
+            <pc:sldMk cId="256577611" sldId="270"/>
+            <ac:spMk id="23" creationId="{85F70CB0-92B9-9A17-A77D-C0CCAECAF960}"/>
+          </ac:spMkLst>
+        </pc:spChg>
+        <pc:spChg chg="add del mod">
+          <ac:chgData name="Bart Wolleswinkel" userId="b168cadc-1825-41ce-b9cc-7c7f06f6f31d" providerId="ADAL" clId="{22248CC1-9068-5BCB-B15B-4353FE48F57D}" dt="2026-01-20T15:01:19.751" v="227" actId="478"/>
+          <ac:spMkLst>
+            <pc:docMk/>
+            <pc:sldMk cId="256577611" sldId="270"/>
+            <ac:spMk id="24" creationId="{2817BA75-DE74-5DB9-DF3B-9D97ED4E2509}"/>
+          </ac:spMkLst>
+        </pc:spChg>
+        <pc:spChg chg="add del mod">
+          <ac:chgData name="Bart Wolleswinkel" userId="b168cadc-1825-41ce-b9cc-7c7f06f6f31d" providerId="ADAL" clId="{22248CC1-9068-5BCB-B15B-4353FE48F57D}" dt="2026-01-20T15:01:19.751" v="227" actId="478"/>
+          <ac:spMkLst>
+            <pc:docMk/>
+            <pc:sldMk cId="256577611" sldId="270"/>
+            <ac:spMk id="25" creationId="{D648A48A-D70D-9EC3-60BA-874B51056275}"/>
+          </ac:spMkLst>
+        </pc:spChg>
+        <pc:spChg chg="add mod">
+          <ac:chgData name="Bart Wolleswinkel" userId="b168cadc-1825-41ce-b9cc-7c7f06f6f31d" providerId="ADAL" clId="{22248CC1-9068-5BCB-B15B-4353FE48F57D}" dt="2026-01-20T15:12:40.518" v="490" actId="1036"/>
+          <ac:spMkLst>
+            <pc:docMk/>
+            <pc:sldMk cId="256577611" sldId="270"/>
+            <ac:spMk id="26" creationId="{3CE072B6-8D9D-6B93-A397-15A8EA376CC8}"/>
+          </ac:spMkLst>
+        </pc:spChg>
+        <pc:spChg chg="add mod">
+          <ac:chgData name="Bart Wolleswinkel" userId="b168cadc-1825-41ce-b9cc-7c7f06f6f31d" providerId="ADAL" clId="{22248CC1-9068-5BCB-B15B-4353FE48F57D}" dt="2026-01-20T15:12:40.518" v="490" actId="1036"/>
+          <ac:spMkLst>
+            <pc:docMk/>
+            <pc:sldMk cId="256577611" sldId="270"/>
+            <ac:spMk id="27" creationId="{4325BFC3-4F19-DA11-1782-E83C3B951E2F}"/>
+          </ac:spMkLst>
+        </pc:spChg>
+        <pc:spChg chg="add mod">
+          <ac:chgData name="Bart Wolleswinkel" userId="b168cadc-1825-41ce-b9cc-7c7f06f6f31d" providerId="ADAL" clId="{22248CC1-9068-5BCB-B15B-4353FE48F57D}" dt="2026-01-20T15:12:40.518" v="490" actId="1036"/>
+          <ac:spMkLst>
+            <pc:docMk/>
+            <pc:sldMk cId="256577611" sldId="270"/>
+            <ac:spMk id="28" creationId="{B8D2DD00-F8D2-3DF5-49A4-953293535E7F}"/>
+          </ac:spMkLst>
+        </pc:spChg>
+        <pc:spChg chg="add mod">
+          <ac:chgData name="Bart Wolleswinkel" userId="b168cadc-1825-41ce-b9cc-7c7f06f6f31d" providerId="ADAL" clId="{22248CC1-9068-5BCB-B15B-4353FE48F57D}" dt="2026-01-20T15:06:41.102" v="273" actId="20577"/>
+          <ac:spMkLst>
+            <pc:docMk/>
+            <pc:sldMk cId="256577611" sldId="270"/>
+            <ac:spMk id="29" creationId="{5A1C49CA-87E6-5F5B-47A9-AB5D13E3DB04}"/>
+          </ac:spMkLst>
+        </pc:spChg>
+        <pc:spChg chg="add mod">
+          <ac:chgData name="Bart Wolleswinkel" userId="b168cadc-1825-41ce-b9cc-7c7f06f6f31d" providerId="ADAL" clId="{22248CC1-9068-5BCB-B15B-4353FE48F57D}" dt="2026-01-20T15:12:40.518" v="490" actId="1036"/>
+          <ac:spMkLst>
+            <pc:docMk/>
+            <pc:sldMk cId="256577611" sldId="270"/>
+            <ac:spMk id="30" creationId="{B3468045-8EDB-56D6-845B-9C0F206A8495}"/>
+          </ac:spMkLst>
+        </pc:spChg>
+        <pc:spChg chg="add mod">
+          <ac:chgData name="Bart Wolleswinkel" userId="b168cadc-1825-41ce-b9cc-7c7f06f6f31d" providerId="ADAL" clId="{22248CC1-9068-5BCB-B15B-4353FE48F57D}" dt="2026-01-20T15:07:13.821" v="309" actId="20577"/>
+          <ac:spMkLst>
+            <pc:docMk/>
+            <pc:sldMk cId="256577611" sldId="270"/>
+            <ac:spMk id="31" creationId="{0EF05441-0683-728E-4A34-EF5A24137268}"/>
+          </ac:spMkLst>
+        </pc:spChg>
+        <pc:spChg chg="add del mod">
+          <ac:chgData name="Bart Wolleswinkel" userId="b168cadc-1825-41ce-b9cc-7c7f06f6f31d" providerId="ADAL" clId="{22248CC1-9068-5BCB-B15B-4353FE48F57D}" dt="2026-01-20T15:07:49.412" v="330" actId="478"/>
+          <ac:spMkLst>
+            <pc:docMk/>
+            <pc:sldMk cId="256577611" sldId="270"/>
+            <ac:spMk id="32" creationId="{FAEA34A4-B51B-B671-B2B0-BFB3E0E43680}"/>
+          </ac:spMkLst>
+        </pc:spChg>
+        <pc:spChg chg="add del mod">
+          <ac:chgData name="Bart Wolleswinkel" userId="b168cadc-1825-41ce-b9cc-7c7f06f6f31d" providerId="ADAL" clId="{22248CC1-9068-5BCB-B15B-4353FE48F57D}" dt="2026-01-20T15:07:49.412" v="330" actId="478"/>
+          <ac:spMkLst>
+            <pc:docMk/>
+            <pc:sldMk cId="256577611" sldId="270"/>
+            <ac:spMk id="33" creationId="{89388601-4361-F62E-8E4D-BF3314E48798}"/>
+          </ac:spMkLst>
+        </pc:spChg>
+        <pc:spChg chg="add mod">
+          <ac:chgData name="Bart Wolleswinkel" userId="b168cadc-1825-41ce-b9cc-7c7f06f6f31d" providerId="ADAL" clId="{22248CC1-9068-5BCB-B15B-4353FE48F57D}" dt="2026-01-20T15:07:46.198" v="329"/>
+          <ac:spMkLst>
+            <pc:docMk/>
+            <pc:sldMk cId="256577611" sldId="270"/>
+            <ac:spMk id="34" creationId="{3137E343-9A00-068D-D906-B5FFA93FCB9A}"/>
+          </ac:spMkLst>
+        </pc:spChg>
+        <pc:spChg chg="add mod">
+          <ac:chgData name="Bart Wolleswinkel" userId="b168cadc-1825-41ce-b9cc-7c7f06f6f31d" providerId="ADAL" clId="{22248CC1-9068-5BCB-B15B-4353FE48F57D}" dt="2026-01-20T15:08:09.192" v="348" actId="20577"/>
+          <ac:spMkLst>
+            <pc:docMk/>
+            <pc:sldMk cId="256577611" sldId="270"/>
+            <ac:spMk id="35" creationId="{C7F5BFFE-BCB1-3828-56C9-8B92D2E6618E}"/>
+          </ac:spMkLst>
+        </pc:spChg>
+        <pc:spChg chg="add mod">
+          <ac:chgData name="Bart Wolleswinkel" userId="b168cadc-1825-41ce-b9cc-7c7f06f6f31d" providerId="ADAL" clId="{22248CC1-9068-5BCB-B15B-4353FE48F57D}" dt="2026-01-20T15:12:40.518" v="490" actId="1036"/>
+          <ac:spMkLst>
+            <pc:docMk/>
+            <pc:sldMk cId="256577611" sldId="270"/>
+            <ac:spMk id="36" creationId="{46024753-7B1C-9892-881D-6D08FB44A10F}"/>
+          </ac:spMkLst>
+        </pc:spChg>
+        <pc:spChg chg="add del mod">
+          <ac:chgData name="Bart Wolleswinkel" userId="b168cadc-1825-41ce-b9cc-7c7f06f6f31d" providerId="ADAL" clId="{22248CC1-9068-5BCB-B15B-4353FE48F57D}" dt="2026-01-20T15:08:46.981" v="378" actId="478"/>
+          <ac:spMkLst>
+            <pc:docMk/>
+            <pc:sldMk cId="256577611" sldId="270"/>
+            <ac:spMk id="37" creationId="{7D752475-78A5-A367-50D0-7E44DCCC4F1A}"/>
+          </ac:spMkLst>
+        </pc:spChg>
+        <pc:spChg chg="add del mod">
+          <ac:chgData name="Bart Wolleswinkel" userId="b168cadc-1825-41ce-b9cc-7c7f06f6f31d" providerId="ADAL" clId="{22248CC1-9068-5BCB-B15B-4353FE48F57D}" dt="2026-01-20T15:08:49.972" v="379" actId="478"/>
+          <ac:spMkLst>
+            <pc:docMk/>
+            <pc:sldMk cId="256577611" sldId="270"/>
+            <ac:spMk id="38" creationId="{0EB79B0D-8DF9-72D6-4F56-00B50E4E6268}"/>
+          </ac:spMkLst>
+        </pc:spChg>
+        <pc:spChg chg="add mod">
+          <ac:chgData name="Bart Wolleswinkel" userId="b168cadc-1825-41ce-b9cc-7c7f06f6f31d" providerId="ADAL" clId="{22248CC1-9068-5BCB-B15B-4353FE48F57D}" dt="2026-01-20T15:12:40.518" v="490" actId="1036"/>
+          <ac:spMkLst>
+            <pc:docMk/>
+            <pc:sldMk cId="256577611" sldId="270"/>
+            <ac:spMk id="39" creationId="{5F2FC91F-0C34-291B-5169-494EE138A4B3}"/>
+          </ac:spMkLst>
+        </pc:spChg>
+        <pc:spChg chg="add mod">
+          <ac:chgData name="Bart Wolleswinkel" userId="b168cadc-1825-41ce-b9cc-7c7f06f6f31d" providerId="ADAL" clId="{22248CC1-9068-5BCB-B15B-4353FE48F57D}" dt="2026-01-20T15:09:06.968" v="400" actId="20577"/>
+          <ac:spMkLst>
+            <pc:docMk/>
+            <pc:sldMk cId="256577611" sldId="270"/>
+            <ac:spMk id="40" creationId="{ECB3A796-49DB-D16F-EBBB-99F407AF1271}"/>
+          </ac:spMkLst>
+        </pc:spChg>
+        <pc:spChg chg="add del mod">
+          <ac:chgData name="Bart Wolleswinkel" userId="b168cadc-1825-41ce-b9cc-7c7f06f6f31d" providerId="ADAL" clId="{22248CC1-9068-5BCB-B15B-4353FE48F57D}" dt="2026-01-20T15:10:03.829" v="408" actId="478"/>
+          <ac:spMkLst>
+            <pc:docMk/>
+            <pc:sldMk cId="256577611" sldId="270"/>
+            <ac:spMk id="41" creationId="{E0F7A896-0883-EF4B-3673-103760246A48}"/>
+          </ac:spMkLst>
+        </pc:spChg>
+        <pc:spChg chg="add del mod">
+          <ac:chgData name="Bart Wolleswinkel" userId="b168cadc-1825-41ce-b9cc-7c7f06f6f31d" providerId="ADAL" clId="{22248CC1-9068-5BCB-B15B-4353FE48F57D}" dt="2026-01-20T15:10:03.829" v="408" actId="478"/>
+          <ac:spMkLst>
+            <pc:docMk/>
+            <pc:sldMk cId="256577611" sldId="270"/>
+            <ac:spMk id="42" creationId="{88057461-0F00-3C0E-186F-467C70FA8FFA}"/>
+          </ac:spMkLst>
+        </pc:spChg>
+        <pc:spChg chg="add del mod">
+          <ac:chgData name="Bart Wolleswinkel" userId="b168cadc-1825-41ce-b9cc-7c7f06f6f31d" providerId="ADAL" clId="{22248CC1-9068-5BCB-B15B-4353FE48F57D}" dt="2026-01-20T15:10:00.801" v="407" actId="478"/>
+          <ac:spMkLst>
+            <pc:docMk/>
+            <pc:sldMk cId="256577611" sldId="270"/>
+            <ac:spMk id="43" creationId="{21696953-16BD-D715-A970-0CC4344DAF32}"/>
+          </ac:spMkLst>
+        </pc:spChg>
+        <pc:spChg chg="add mod">
+          <ac:chgData name="Bart Wolleswinkel" userId="b168cadc-1825-41ce-b9cc-7c7f06f6f31d" providerId="ADAL" clId="{22248CC1-9068-5BCB-B15B-4353FE48F57D}" dt="2026-01-20T15:20:18.493" v="546" actId="1036"/>
+          <ac:spMkLst>
+            <pc:docMk/>
+            <pc:sldMk cId="256577611" sldId="270"/>
+            <ac:spMk id="44" creationId="{E1ACBDEE-57A2-4BED-61D9-D434C99CB2C2}"/>
+          </ac:spMkLst>
+        </pc:spChg>
+        <pc:spChg chg="add mod">
+          <ac:chgData name="Bart Wolleswinkel" userId="b168cadc-1825-41ce-b9cc-7c7f06f6f31d" providerId="ADAL" clId="{22248CC1-9068-5BCB-B15B-4353FE48F57D}" dt="2026-01-20T15:20:18.493" v="546" actId="1036"/>
+          <ac:spMkLst>
+            <pc:docMk/>
+            <pc:sldMk cId="256577611" sldId="270"/>
+            <ac:spMk id="45" creationId="{3694A2FE-299B-3F6D-C53F-980E199F0F86}"/>
+          </ac:spMkLst>
+        </pc:spChg>
+        <pc:spChg chg="add del mod">
+          <ac:chgData name="Bart Wolleswinkel" userId="b168cadc-1825-41ce-b9cc-7c7f06f6f31d" providerId="ADAL" clId="{22248CC1-9068-5BCB-B15B-4353FE48F57D}" dt="2026-01-20T15:10:25.488" v="413" actId="478"/>
+          <ac:spMkLst>
+            <pc:docMk/>
+            <pc:sldMk cId="256577611" sldId="270"/>
+            <ac:spMk id="46" creationId="{41F7EC1D-4748-4DA5-538A-AE41B3E3D5B4}"/>
+          </ac:spMkLst>
+        </pc:spChg>
+        <pc:spChg chg="add del mod">
+          <ac:chgData name="Bart Wolleswinkel" userId="b168cadc-1825-41ce-b9cc-7c7f06f6f31d" providerId="ADAL" clId="{22248CC1-9068-5BCB-B15B-4353FE48F57D}" dt="2026-01-20T15:10:25.488" v="413" actId="478"/>
+          <ac:spMkLst>
+            <pc:docMk/>
+            <pc:sldMk cId="256577611" sldId="270"/>
+            <ac:spMk id="47" creationId="{EEADC53B-B3E4-2E04-C451-25C75DDC46B0}"/>
+          </ac:spMkLst>
+        </pc:spChg>
+        <pc:spChg chg="add mod">
+          <ac:chgData name="Bart Wolleswinkel" userId="b168cadc-1825-41ce-b9cc-7c7f06f6f31d" providerId="ADAL" clId="{22248CC1-9068-5BCB-B15B-4353FE48F57D}" dt="2026-01-20T15:24:16.062" v="624" actId="20577"/>
+          <ac:spMkLst>
+            <pc:docMk/>
+            <pc:sldMk cId="256577611" sldId="270"/>
+            <ac:spMk id="48" creationId="{A4516AB3-5FEE-F8FF-E693-9E60B4D026B9}"/>
+          </ac:spMkLst>
+        </pc:spChg>
+        <pc:spChg chg="add mod">
+          <ac:chgData name="Bart Wolleswinkel" userId="b168cadc-1825-41ce-b9cc-7c7f06f6f31d" providerId="ADAL" clId="{22248CC1-9068-5BCB-B15B-4353FE48F57D}" dt="2026-01-20T15:20:18.493" v="546" actId="1036"/>
+          <ac:spMkLst>
+            <pc:docMk/>
+            <pc:sldMk cId="256577611" sldId="270"/>
+            <ac:spMk id="49" creationId="{3391296E-C1A0-5DB5-DE1B-A222A4FB3645}"/>
+          </ac:spMkLst>
+        </pc:spChg>
+        <pc:spChg chg="add del mod">
+          <ac:chgData name="Bart Wolleswinkel" userId="b168cadc-1825-41ce-b9cc-7c7f06f6f31d" providerId="ADAL" clId="{22248CC1-9068-5BCB-B15B-4353FE48F57D}" dt="2026-01-20T15:11:02.062" v="431" actId="478"/>
+          <ac:spMkLst>
+            <pc:docMk/>
+            <pc:sldMk cId="256577611" sldId="270"/>
+            <ac:spMk id="50" creationId="{B779F1C6-531E-A7DA-075D-5334DC277C60}"/>
+          </ac:spMkLst>
+        </pc:spChg>
+        <pc:spChg chg="add mod">
+          <ac:chgData name="Bart Wolleswinkel" userId="b168cadc-1825-41ce-b9cc-7c7f06f6f31d" providerId="ADAL" clId="{22248CC1-9068-5BCB-B15B-4353FE48F57D}" dt="2026-01-20T15:11:19.940" v="435" actId="1076"/>
+          <ac:spMkLst>
+            <pc:docMk/>
+            <pc:sldMk cId="256577611" sldId="270"/>
+            <ac:spMk id="51" creationId="{0BBD33D1-B913-2320-31B9-B257A4722736}"/>
+          </ac:spMkLst>
+        </pc:spChg>
+        <pc:spChg chg="add mod">
+          <ac:chgData name="Bart Wolleswinkel" userId="b168cadc-1825-41ce-b9cc-7c7f06f6f31d" providerId="ADAL" clId="{22248CC1-9068-5BCB-B15B-4353FE48F57D}" dt="2026-01-20T15:16:51.366" v="492" actId="1076"/>
+          <ac:spMkLst>
+            <pc:docMk/>
+            <pc:sldMk cId="256577611" sldId="270"/>
+            <ac:spMk id="52" creationId="{0F9A0B0C-2C01-8E54-06D9-6390DC06D869}"/>
+          </ac:spMkLst>
+        </pc:spChg>
+        <pc:spChg chg="add mod">
+          <ac:chgData name="Bart Wolleswinkel" userId="b168cadc-1825-41ce-b9cc-7c7f06f6f31d" providerId="ADAL" clId="{22248CC1-9068-5BCB-B15B-4353FE48F57D}" dt="2026-01-20T15:16:51.366" v="492" actId="1076"/>
+          <ac:spMkLst>
+            <pc:docMk/>
+            <pc:sldMk cId="256577611" sldId="270"/>
+            <ac:spMk id="53" creationId="{33EEAA37-C2D5-E25D-4BF2-EECAB9E308BE}"/>
+          </ac:spMkLst>
+        </pc:spChg>
+        <pc:spChg chg="add mod">
+          <ac:chgData name="Bart Wolleswinkel" userId="b168cadc-1825-41ce-b9cc-7c7f06f6f31d" providerId="ADAL" clId="{22248CC1-9068-5BCB-B15B-4353FE48F57D}" dt="2026-01-20T15:24:20.557" v="631" actId="20577"/>
+          <ac:spMkLst>
+            <pc:docMk/>
+            <pc:sldMk cId="256577611" sldId="270"/>
+            <ac:spMk id="54" creationId="{E9659A6A-4D07-CA6F-2418-90995BD3741F}"/>
+          </ac:spMkLst>
+        </pc:spChg>
+        <pc:spChg chg="add mod">
+          <ac:chgData name="Bart Wolleswinkel" userId="b168cadc-1825-41ce-b9cc-7c7f06f6f31d" providerId="ADAL" clId="{22248CC1-9068-5BCB-B15B-4353FE48F57D}" dt="2026-01-20T15:16:51.366" v="492" actId="1076"/>
+          <ac:spMkLst>
+            <pc:docMk/>
+            <pc:sldMk cId="256577611" sldId="270"/>
+            <ac:spMk id="55" creationId="{E9F6A74B-AE29-9968-0D2D-26BC509AAFE5}"/>
+          </ac:spMkLst>
+        </pc:spChg>
+        <pc:spChg chg="add mod">
+          <ac:chgData name="Bart Wolleswinkel" userId="b168cadc-1825-41ce-b9cc-7c7f06f6f31d" providerId="ADAL" clId="{22248CC1-9068-5BCB-B15B-4353FE48F57D}" dt="2026-01-20T15:23:51.680" v="605" actId="207"/>
+          <ac:spMkLst>
+            <pc:docMk/>
+            <pc:sldMk cId="256577611" sldId="270"/>
+            <ac:spMk id="56" creationId="{384FB3F3-D105-27DE-B6DF-76E302A90BAB}"/>
+          </ac:spMkLst>
+        </pc:spChg>
+        <pc:spChg chg="add mod">
+          <ac:chgData name="Bart Wolleswinkel" userId="b168cadc-1825-41ce-b9cc-7c7f06f6f31d" providerId="ADAL" clId="{22248CC1-9068-5BCB-B15B-4353FE48F57D}" dt="2026-01-20T15:19:22.903" v="524" actId="1076"/>
+          <ac:spMkLst>
+            <pc:docMk/>
+            <pc:sldMk cId="256577611" sldId="270"/>
+            <ac:spMk id="60" creationId="{0F8E9D19-E8C5-99C9-064F-A92D7783459D}"/>
+          </ac:spMkLst>
+        </pc:spChg>
+        <pc:spChg chg="add mod">
+          <ac:chgData name="Bart Wolleswinkel" userId="b168cadc-1825-41ce-b9cc-7c7f06f6f31d" providerId="ADAL" clId="{22248CC1-9068-5BCB-B15B-4353FE48F57D}" dt="2026-01-20T15:20:18.493" v="546" actId="1036"/>
+          <ac:spMkLst>
+            <pc:docMk/>
+            <pc:sldMk cId="256577611" sldId="270"/>
+            <ac:spMk id="65" creationId="{735B66C2-1214-40ED-D40C-6FFF46C6C788}"/>
+          </ac:spMkLst>
+        </pc:spChg>
+        <pc:spChg chg="add mod">
+          <ac:chgData name="Bart Wolleswinkel" userId="b168cadc-1825-41ce-b9cc-7c7f06f6f31d" providerId="ADAL" clId="{22248CC1-9068-5BCB-B15B-4353FE48F57D}" dt="2026-01-20T15:22:35.629" v="587" actId="1076"/>
+          <ac:spMkLst>
+            <pc:docMk/>
+            <pc:sldMk cId="256577611" sldId="270"/>
+            <ac:spMk id="98" creationId="{0F9B3F62-D90F-03BB-3091-4FEC24DD5285}"/>
+          </ac:spMkLst>
+        </pc:spChg>
+        <pc:spChg chg="add mod">
+          <ac:chgData name="Bart Wolleswinkel" userId="b168cadc-1825-41ce-b9cc-7c7f06f6f31d" providerId="ADAL" clId="{22248CC1-9068-5BCB-B15B-4353FE48F57D}" dt="2026-01-20T15:22:55.376" v="599" actId="1076"/>
+          <ac:spMkLst>
+            <pc:docMk/>
+            <pc:sldMk cId="256577611" sldId="270"/>
+            <ac:spMk id="99" creationId="{0C72E31E-455A-FBD2-4BBA-4CF107DEF489}"/>
+          </ac:spMkLst>
+        </pc:spChg>
+        <pc:cxnChg chg="add mod">
+          <ac:chgData name="Bart Wolleswinkel" userId="b168cadc-1825-41ce-b9cc-7c7f06f6f31d" providerId="ADAL" clId="{22248CC1-9068-5BCB-B15B-4353FE48F57D}" dt="2026-01-20T15:23:41.855" v="602" actId="208"/>
+          <ac:cxnSpMkLst>
+            <pc:docMk/>
+            <pc:sldMk cId="256577611" sldId="270"/>
+            <ac:cxnSpMk id="58" creationId="{CB160640-7D55-E889-FF2C-9E947D055F58}"/>
+          </ac:cxnSpMkLst>
+        </pc:cxnChg>
+        <pc:cxnChg chg="add mod">
+          <ac:chgData name="Bart Wolleswinkel" userId="b168cadc-1825-41ce-b9cc-7c7f06f6f31d" providerId="ADAL" clId="{22248CC1-9068-5BCB-B15B-4353FE48F57D}" dt="2026-01-20T15:23:41.855" v="602" actId="208"/>
+          <ac:cxnSpMkLst>
+            <pc:docMk/>
+            <pc:sldMk cId="256577611" sldId="270"/>
+            <ac:cxnSpMk id="62" creationId="{326EE48B-8553-34D7-207C-24D1CD275171}"/>
+          </ac:cxnSpMkLst>
+        </pc:cxnChg>
+        <pc:cxnChg chg="add mod">
+          <ac:chgData name="Bart Wolleswinkel" userId="b168cadc-1825-41ce-b9cc-7c7f06f6f31d" providerId="ADAL" clId="{22248CC1-9068-5BCB-B15B-4353FE48F57D}" dt="2026-01-20T15:20:53.378" v="550" actId="693"/>
+          <ac:cxnSpMkLst>
+            <pc:docMk/>
+            <pc:sldMk cId="256577611" sldId="270"/>
+            <ac:cxnSpMk id="68" creationId="{A06285C3-E2DD-78A2-324A-36B23C3923D1}"/>
+          </ac:cxnSpMkLst>
+        </pc:cxnChg>
+        <pc:cxnChg chg="add mod">
+          <ac:chgData name="Bart Wolleswinkel" userId="b168cadc-1825-41ce-b9cc-7c7f06f6f31d" providerId="ADAL" clId="{22248CC1-9068-5BCB-B15B-4353FE48F57D}" dt="2026-01-20T15:21:11.853" v="552" actId="208"/>
+          <ac:cxnSpMkLst>
+            <pc:docMk/>
+            <pc:sldMk cId="256577611" sldId="270"/>
+            <ac:cxnSpMk id="70" creationId="{4892971B-8575-8709-D637-9D7F8DC59ACE}"/>
+          </ac:cxnSpMkLst>
+        </pc:cxnChg>
+        <pc:cxnChg chg="add mod">
+          <ac:chgData name="Bart Wolleswinkel" userId="b168cadc-1825-41ce-b9cc-7c7f06f6f31d" providerId="ADAL" clId="{22248CC1-9068-5BCB-B15B-4353FE48F57D}" dt="2026-01-20T15:21:19.820" v="556" actId="14100"/>
+          <ac:cxnSpMkLst>
+            <pc:docMk/>
+            <pc:sldMk cId="256577611" sldId="270"/>
+            <ac:cxnSpMk id="71" creationId="{1E5CE429-681C-5DAF-8D0B-65C0F4417D49}"/>
+          </ac:cxnSpMkLst>
+        </pc:cxnChg>
+        <pc:cxnChg chg="add mod">
+          <ac:chgData name="Bart Wolleswinkel" userId="b168cadc-1825-41ce-b9cc-7c7f06f6f31d" providerId="ADAL" clId="{22248CC1-9068-5BCB-B15B-4353FE48F57D}" dt="2026-01-20T15:21:26.193" v="559" actId="14100"/>
+          <ac:cxnSpMkLst>
+            <pc:docMk/>
+            <pc:sldMk cId="256577611" sldId="270"/>
+            <ac:cxnSpMk id="74" creationId="{81A6DDD5-A169-0B9B-6346-2A49968A14B0}"/>
+          </ac:cxnSpMkLst>
+        </pc:cxnChg>
+        <pc:cxnChg chg="add mod">
+          <ac:chgData name="Bart Wolleswinkel" userId="b168cadc-1825-41ce-b9cc-7c7f06f6f31d" providerId="ADAL" clId="{22248CC1-9068-5BCB-B15B-4353FE48F57D}" dt="2026-01-20T15:21:31.277" v="562" actId="14100"/>
+          <ac:cxnSpMkLst>
+            <pc:docMk/>
+            <pc:sldMk cId="256577611" sldId="270"/>
+            <ac:cxnSpMk id="77" creationId="{D4CDD7AC-D61F-D8DC-2421-10C60C045D22}"/>
+          </ac:cxnSpMkLst>
+        </pc:cxnChg>
+        <pc:cxnChg chg="add mod">
+          <ac:chgData name="Bart Wolleswinkel" userId="b168cadc-1825-41ce-b9cc-7c7f06f6f31d" providerId="ADAL" clId="{22248CC1-9068-5BCB-B15B-4353FE48F57D}" dt="2026-01-20T15:21:36.623" v="565" actId="14100"/>
+          <ac:cxnSpMkLst>
+            <pc:docMk/>
+            <pc:sldMk cId="256577611" sldId="270"/>
+            <ac:cxnSpMk id="80" creationId="{03F03A83-73D1-E740-D3CF-AA7DD0BB29DD}"/>
+          </ac:cxnSpMkLst>
+        </pc:cxnChg>
+        <pc:cxnChg chg="add mod">
+          <ac:chgData name="Bart Wolleswinkel" userId="b168cadc-1825-41ce-b9cc-7c7f06f6f31d" providerId="ADAL" clId="{22248CC1-9068-5BCB-B15B-4353FE48F57D}" dt="2026-01-20T15:21:41.955" v="568" actId="14100"/>
+          <ac:cxnSpMkLst>
+            <pc:docMk/>
+            <pc:sldMk cId="256577611" sldId="270"/>
+            <ac:cxnSpMk id="83" creationId="{9AA9BD13-A229-C27F-1A07-2C1E88FE0314}"/>
+          </ac:cxnSpMkLst>
+        </pc:cxnChg>
+        <pc:cxnChg chg="add mod">
+          <ac:chgData name="Bart Wolleswinkel" userId="b168cadc-1825-41ce-b9cc-7c7f06f6f31d" providerId="ADAL" clId="{22248CC1-9068-5BCB-B15B-4353FE48F57D}" dt="2026-01-20T15:21:48.015" v="571" actId="14100"/>
+          <ac:cxnSpMkLst>
+            <pc:docMk/>
+            <pc:sldMk cId="256577611" sldId="270"/>
+            <ac:cxnSpMk id="86" creationId="{8C50D640-4CCD-044B-77C9-FB954D198064}"/>
+          </ac:cxnSpMkLst>
+        </pc:cxnChg>
+        <pc:cxnChg chg="add mod">
+          <ac:chgData name="Bart Wolleswinkel" userId="b168cadc-1825-41ce-b9cc-7c7f06f6f31d" providerId="ADAL" clId="{22248CC1-9068-5BCB-B15B-4353FE48F57D}" dt="2026-01-20T15:21:54.538" v="574" actId="14100"/>
+          <ac:cxnSpMkLst>
+            <pc:docMk/>
+            <pc:sldMk cId="256577611" sldId="270"/>
+            <ac:cxnSpMk id="89" creationId="{193FDCDF-0D29-D243-5523-E239FB9A90FB}"/>
+          </ac:cxnSpMkLst>
+        </pc:cxnChg>
+        <pc:cxnChg chg="add mod">
+          <ac:chgData name="Bart Wolleswinkel" userId="b168cadc-1825-41ce-b9cc-7c7f06f6f31d" providerId="ADAL" clId="{22248CC1-9068-5BCB-B15B-4353FE48F57D}" dt="2026-01-20T15:22:00.243" v="577" actId="14100"/>
+          <ac:cxnSpMkLst>
+            <pc:docMk/>
+            <pc:sldMk cId="256577611" sldId="270"/>
+            <ac:cxnSpMk id="92" creationId="{AC906DF5-25D2-4741-1F9E-1C7210074890}"/>
+          </ac:cxnSpMkLst>
+        </pc:cxnChg>
+        <pc:cxnChg chg="add mod">
+          <ac:chgData name="Bart Wolleswinkel" userId="b168cadc-1825-41ce-b9cc-7c7f06f6f31d" providerId="ADAL" clId="{22248CC1-9068-5BCB-B15B-4353FE48F57D}" dt="2026-01-20T15:22:06.949" v="580" actId="14100"/>
+          <ac:cxnSpMkLst>
+            <pc:docMk/>
+            <pc:sldMk cId="256577611" sldId="270"/>
+            <ac:cxnSpMk id="95" creationId="{53A879BC-5171-3628-05E5-155C343318DA}"/>
+          </ac:cxnSpMkLst>
+        </pc:cxnChg>
+      </pc:sldChg>
     </pc:docChg>
   </pc:docChgLst>
 </pc:chgInfo>
@@ -334,7 +902,7 @@
           <a:p>
             <a:fld id="{FB8718F5-1E4A-7D42-8173-5979EE6FBC1A}" type="datetimeFigureOut">
               <a:rPr lang="en-US" smtClean="0"/>
-              <a:t>1/8/26</a:t>
+              <a:t>1/20/26</a:t>
             </a:fld>
             <a:endParaRPr lang="en-US"/>
           </a:p>
@@ -534,7 +1102,7 @@
           <a:p>
             <a:fld id="{FB8718F5-1E4A-7D42-8173-5979EE6FBC1A}" type="datetimeFigureOut">
               <a:rPr lang="en-US" smtClean="0"/>
-              <a:t>1/8/26</a:t>
+              <a:t>1/20/26</a:t>
             </a:fld>
             <a:endParaRPr lang="en-US"/>
           </a:p>
@@ -744,7 +1312,7 @@
           <a:p>
             <a:fld id="{FB8718F5-1E4A-7D42-8173-5979EE6FBC1A}" type="datetimeFigureOut">
               <a:rPr lang="en-US" smtClean="0"/>
-              <a:t>1/8/26</a:t>
+              <a:t>1/20/26</a:t>
             </a:fld>
             <a:endParaRPr lang="en-US"/>
           </a:p>
@@ -944,7 +1512,7 @@
           <a:p>
             <a:fld id="{FB8718F5-1E4A-7D42-8173-5979EE6FBC1A}" type="datetimeFigureOut">
               <a:rPr lang="en-US" smtClean="0"/>
-              <a:t>1/8/26</a:t>
+              <a:t>1/20/26</a:t>
             </a:fld>
             <a:endParaRPr lang="en-US"/>
           </a:p>
@@ -1220,7 +1788,7 @@
           <a:p>
             <a:fld id="{FB8718F5-1E4A-7D42-8173-5979EE6FBC1A}" type="datetimeFigureOut">
               <a:rPr lang="en-US" smtClean="0"/>
-              <a:t>1/8/26</a:t>
+              <a:t>1/20/26</a:t>
             </a:fld>
             <a:endParaRPr lang="en-US"/>
           </a:p>
@@ -1488,7 +2056,7 @@
           <a:p>
             <a:fld id="{FB8718F5-1E4A-7D42-8173-5979EE6FBC1A}" type="datetimeFigureOut">
               <a:rPr lang="en-US" smtClean="0"/>
-              <a:t>1/8/26</a:t>
+              <a:t>1/20/26</a:t>
             </a:fld>
             <a:endParaRPr lang="en-US"/>
           </a:p>
@@ -1903,7 +2471,7 @@
           <a:p>
             <a:fld id="{FB8718F5-1E4A-7D42-8173-5979EE6FBC1A}" type="datetimeFigureOut">
               <a:rPr lang="en-US" smtClean="0"/>
-              <a:t>1/8/26</a:t>
+              <a:t>1/20/26</a:t>
             </a:fld>
             <a:endParaRPr lang="en-US"/>
           </a:p>
@@ -2045,7 +2613,7 @@
           <a:p>
             <a:fld id="{FB8718F5-1E4A-7D42-8173-5979EE6FBC1A}" type="datetimeFigureOut">
               <a:rPr lang="en-US" smtClean="0"/>
-              <a:t>1/8/26</a:t>
+              <a:t>1/20/26</a:t>
             </a:fld>
             <a:endParaRPr lang="en-US"/>
           </a:p>
@@ -2158,7 +2726,7 @@
           <a:p>
             <a:fld id="{FB8718F5-1E4A-7D42-8173-5979EE6FBC1A}" type="datetimeFigureOut">
               <a:rPr lang="en-US" smtClean="0"/>
-              <a:t>1/8/26</a:t>
+              <a:t>1/20/26</a:t>
             </a:fld>
             <a:endParaRPr lang="en-US"/>
           </a:p>
@@ -2471,7 +3039,7 @@
           <a:p>
             <a:fld id="{FB8718F5-1E4A-7D42-8173-5979EE6FBC1A}" type="datetimeFigureOut">
               <a:rPr lang="en-US" smtClean="0"/>
-              <a:t>1/8/26</a:t>
+              <a:t>1/20/26</a:t>
             </a:fld>
             <a:endParaRPr lang="en-US"/>
           </a:p>
@@ -2760,7 +3328,7 @@
           <a:p>
             <a:fld id="{FB8718F5-1E4A-7D42-8173-5979EE6FBC1A}" type="datetimeFigureOut">
               <a:rPr lang="en-US" smtClean="0"/>
-              <a:t>1/8/26</a:t>
+              <a:t>1/20/26</a:t>
             </a:fld>
             <a:endParaRPr lang="en-US"/>
           </a:p>
@@ -3003,7 +3571,7 @@
           <a:p>
             <a:fld id="{FB8718F5-1E4A-7D42-8173-5979EE6FBC1A}" type="datetimeFigureOut">
               <a:rPr lang="en-US" smtClean="0"/>
-              <a:t>1/8/26</a:t>
+              <a:t>1/20/26</a:t>
             </a:fld>
             <a:endParaRPr lang="en-US"/>
           </a:p>
@@ -4285,6 +4853,2745 @@
     <p:extLst>
       <p:ext uri="{BB962C8B-B14F-4D97-AF65-F5344CB8AC3E}">
         <p14:creationId xmlns:p14="http://schemas.microsoft.com/office/powerpoint/2010/main" val="2359103675"/>
+      </p:ext>
+    </p:extLst>
+  </p:cSld>
+  <p:clrMapOvr>
+    <a:masterClrMapping/>
+  </p:clrMapOvr>
+</p:sld>
+</file>
+
+<file path=ppt/slides/slide15.xml><?xml version="1.0" encoding="utf-8"?>
+<p:sld xmlns:a="http://schemas.openxmlformats.org/drawingml/2006/main" xmlns:r="http://schemas.openxmlformats.org/officeDocument/2006/relationships" xmlns:p="http://schemas.openxmlformats.org/presentationml/2006/main">
+  <p:cSld>
+    <p:spTree>
+      <p:nvGrpSpPr>
+        <p:cNvPr id="1" name="">
+          <a:extLst>
+            <a:ext uri="{FF2B5EF4-FFF2-40B4-BE49-F238E27FC236}">
+              <a16:creationId xmlns:a16="http://schemas.microsoft.com/office/drawing/2014/main" id="{DCF7EF74-7999-A3AD-B00A-257F36B99F86}"/>
+            </a:ext>
+          </a:extLst>
+        </p:cNvPr>
+        <p:cNvGrpSpPr/>
+        <p:nvPr/>
+      </p:nvGrpSpPr>
+      <p:grpSpPr>
+        <a:xfrm>
+          <a:off x="0" y="0"/>
+          <a:ext cx="0" cy="0"/>
+          <a:chOff x="0" y="0"/>
+          <a:chExt cx="0" cy="0"/>
+        </a:xfrm>
+      </p:grpSpPr>
+      <p:sp>
+        <p:nvSpPr>
+          <p:cNvPr id="4" name="Title 3">
+            <a:extLst>
+              <a:ext uri="{FF2B5EF4-FFF2-40B4-BE49-F238E27FC236}">
+                <a16:creationId xmlns:a16="http://schemas.microsoft.com/office/drawing/2014/main" id="{917348C7-57B9-4E99-AD65-F46BFABB7BDC}"/>
+              </a:ext>
+            </a:extLst>
+          </p:cNvPr>
+          <p:cNvSpPr>
+            <a:spLocks noGrp="1"/>
+          </p:cNvSpPr>
+          <p:nvPr>
+            <p:ph type="title"/>
+          </p:nvPr>
+        </p:nvSpPr>
+        <p:spPr>
+          <a:xfrm>
+            <a:off x="838200" y="365125"/>
+            <a:ext cx="3496339" cy="1325563"/>
+          </a:xfrm>
+        </p:spPr>
+        <p:txBody>
+          <a:bodyPr/>
+          <a:lstStyle/>
+          <a:p>
+            <a:r>
+              <a:rPr lang="en-US" dirty="0"/>
+              <a:t>Initialization</a:t>
+            </a:r>
+          </a:p>
+        </p:txBody>
+      </p:sp>
+      <p:sp>
+        <p:nvSpPr>
+          <p:cNvPr id="7" name="Rectangle 6">
+            <a:extLst>
+              <a:ext uri="{FF2B5EF4-FFF2-40B4-BE49-F238E27FC236}">
+                <a16:creationId xmlns:a16="http://schemas.microsoft.com/office/drawing/2014/main" id="{85BA688B-34B4-32DA-142F-35253A1C999F}"/>
+              </a:ext>
+            </a:extLst>
+          </p:cNvPr>
+          <p:cNvSpPr/>
+          <p:nvPr/>
+        </p:nvSpPr>
+        <p:spPr>
+          <a:xfrm>
+            <a:off x="324092" y="1796903"/>
+            <a:ext cx="1068773" cy="645356"/>
+          </a:xfrm>
+          <a:prstGeom prst="rect">
+            <a:avLst/>
+          </a:prstGeom>
+          <a:noFill/>
+          <a:ln w="28575">
+            <a:solidFill>
+              <a:schemeClr val="tx1"/>
+            </a:solidFill>
+            <a:prstDash val="dash"/>
+          </a:ln>
+        </p:spPr>
+        <p:style>
+          <a:lnRef idx="2">
+            <a:schemeClr val="accent1">
+              <a:shade val="15000"/>
+            </a:schemeClr>
+          </a:lnRef>
+          <a:fillRef idx="1">
+            <a:schemeClr val="accent1"/>
+          </a:fillRef>
+          <a:effectRef idx="0">
+            <a:schemeClr val="accent1"/>
+          </a:effectRef>
+          <a:fontRef idx="minor">
+            <a:schemeClr val="lt1"/>
+          </a:fontRef>
+        </p:style>
+        <p:txBody>
+          <a:bodyPr rtlCol="0" anchor="ctr"/>
+          <a:lstStyle/>
+          <a:p>
+            <a:pPr algn="ctr"/>
+            <a:r>
+              <a:rPr lang="en-US" dirty="0">
+                <a:solidFill>
+                  <a:sysClr val="windowText" lastClr="000000"/>
+                </a:solidFill>
+              </a:rPr>
+              <a:t>user </a:t>
+            </a:r>
+            <a:r>
+              <a:rPr lang="en-US" dirty="0" err="1">
+                <a:solidFill>
+                  <a:sysClr val="windowText" lastClr="000000"/>
+                </a:solidFill>
+              </a:rPr>
+              <a:t>args</a:t>
+            </a:r>
+            <a:endParaRPr lang="en-US" dirty="0">
+              <a:solidFill>
+                <a:sysClr val="windowText" lastClr="000000"/>
+              </a:solidFill>
+            </a:endParaRPr>
+          </a:p>
+        </p:txBody>
+      </p:sp>
+      <p:sp>
+        <p:nvSpPr>
+          <p:cNvPr id="8" name="Rectangle 7">
+            <a:extLst>
+              <a:ext uri="{FF2B5EF4-FFF2-40B4-BE49-F238E27FC236}">
+                <a16:creationId xmlns:a16="http://schemas.microsoft.com/office/drawing/2014/main" id="{0EA53377-0336-69D4-4C28-8C6B9D672000}"/>
+              </a:ext>
+            </a:extLst>
+          </p:cNvPr>
+          <p:cNvSpPr/>
+          <p:nvPr/>
+        </p:nvSpPr>
+        <p:spPr>
+          <a:xfrm>
+            <a:off x="324092" y="2442259"/>
+            <a:ext cx="1068773" cy="335666"/>
+          </a:xfrm>
+          <a:prstGeom prst="rect">
+            <a:avLst/>
+          </a:prstGeom>
+          <a:noFill/>
+          <a:ln>
+            <a:noFill/>
+          </a:ln>
+        </p:spPr>
+        <p:style>
+          <a:lnRef idx="2">
+            <a:schemeClr val="accent1">
+              <a:shade val="15000"/>
+            </a:schemeClr>
+          </a:lnRef>
+          <a:fillRef idx="1">
+            <a:schemeClr val="accent1"/>
+          </a:fillRef>
+          <a:effectRef idx="0">
+            <a:schemeClr val="accent1"/>
+          </a:effectRef>
+          <a:fontRef idx="minor">
+            <a:schemeClr val="lt1"/>
+          </a:fontRef>
+        </p:style>
+        <p:txBody>
+          <a:bodyPr rtlCol="0" anchor="ctr"/>
+          <a:lstStyle/>
+          <a:p>
+            <a:pPr algn="ctr"/>
+            <a:r>
+              <a:rPr lang="en-US" dirty="0">
+                <a:solidFill>
+                  <a:sysClr val="windowText" lastClr="000000"/>
+                </a:solidFill>
+                <a:latin typeface="American Typewriter" panose="02090604020004020304" pitchFamily="18" charset="77"/>
+              </a:rPr>
+              <a:t>A, b</a:t>
+            </a:r>
+          </a:p>
+        </p:txBody>
+      </p:sp>
+      <p:sp>
+        <p:nvSpPr>
+          <p:cNvPr id="12" name="Rectangle 11">
+            <a:extLst>
+              <a:ext uri="{FF2B5EF4-FFF2-40B4-BE49-F238E27FC236}">
+                <a16:creationId xmlns:a16="http://schemas.microsoft.com/office/drawing/2014/main" id="{DB83ABB8-1385-0DAA-1310-37D5FCC7751C}"/>
+              </a:ext>
+            </a:extLst>
+          </p:cNvPr>
+          <p:cNvSpPr/>
+          <p:nvPr/>
+        </p:nvSpPr>
+        <p:spPr>
+          <a:xfrm>
+            <a:off x="1794929" y="1796903"/>
+            <a:ext cx="1068773" cy="645356"/>
+          </a:xfrm>
+          <a:prstGeom prst="rect">
+            <a:avLst/>
+          </a:prstGeom>
+          <a:solidFill>
+            <a:schemeClr val="accent2"/>
+          </a:solidFill>
+          <a:ln>
+            <a:noFill/>
+          </a:ln>
+        </p:spPr>
+        <p:style>
+          <a:lnRef idx="2">
+            <a:schemeClr val="accent1">
+              <a:shade val="15000"/>
+            </a:schemeClr>
+          </a:lnRef>
+          <a:fillRef idx="1">
+            <a:schemeClr val="accent1"/>
+          </a:fillRef>
+          <a:effectRef idx="0">
+            <a:schemeClr val="accent1"/>
+          </a:effectRef>
+          <a:fontRef idx="minor">
+            <a:schemeClr val="lt1"/>
+          </a:fontRef>
+        </p:style>
+        <p:txBody>
+          <a:bodyPr rtlCol="0" anchor="ctr"/>
+          <a:lstStyle/>
+          <a:p>
+            <a:pPr algn="ctr"/>
+            <a:r>
+              <a:rPr lang="en-US" dirty="0" err="1"/>
+              <a:t>init</a:t>
+            </a:r>
+            <a:r>
+              <a:rPr lang="en-US" dirty="0"/>
+              <a:t> method</a:t>
+            </a:r>
+          </a:p>
+        </p:txBody>
+      </p:sp>
+      <p:sp>
+        <p:nvSpPr>
+          <p:cNvPr id="13" name="Rectangle 12">
+            <a:extLst>
+              <a:ext uri="{FF2B5EF4-FFF2-40B4-BE49-F238E27FC236}">
+                <a16:creationId xmlns:a16="http://schemas.microsoft.com/office/drawing/2014/main" id="{6363C693-8023-7768-E070-3185FE10916E}"/>
+              </a:ext>
+            </a:extLst>
+          </p:cNvPr>
+          <p:cNvSpPr/>
+          <p:nvPr/>
+        </p:nvSpPr>
+        <p:spPr>
+          <a:xfrm>
+            <a:off x="1794929" y="2442259"/>
+            <a:ext cx="1068773" cy="335666"/>
+          </a:xfrm>
+          <a:prstGeom prst="rect">
+            <a:avLst/>
+          </a:prstGeom>
+          <a:noFill/>
+          <a:ln>
+            <a:noFill/>
+          </a:ln>
+        </p:spPr>
+        <p:style>
+          <a:lnRef idx="2">
+            <a:schemeClr val="accent1">
+              <a:shade val="15000"/>
+            </a:schemeClr>
+          </a:lnRef>
+          <a:fillRef idx="1">
+            <a:schemeClr val="accent1"/>
+          </a:fillRef>
+          <a:effectRef idx="0">
+            <a:schemeClr val="accent1"/>
+          </a:effectRef>
+          <a:fontRef idx="minor">
+            <a:schemeClr val="lt1"/>
+          </a:fontRef>
+        </p:style>
+        <p:txBody>
+          <a:bodyPr rtlCol="0" anchor="ctr"/>
+          <a:lstStyle/>
+          <a:p>
+            <a:pPr algn="ctr"/>
+            <a:r>
+              <a:rPr lang="en-US" dirty="0">
+                <a:solidFill>
+                  <a:sysClr val="windowText" lastClr="000000"/>
+                </a:solidFill>
+                <a:latin typeface="American Typewriter" panose="02090604020004020304" pitchFamily="18" charset="77"/>
+              </a:rPr>
+              <a:t>__</a:t>
+            </a:r>
+            <a:r>
+              <a:rPr lang="en-US" dirty="0" err="1">
+                <a:solidFill>
+                  <a:sysClr val="windowText" lastClr="000000"/>
+                </a:solidFill>
+                <a:latin typeface="American Typewriter" panose="02090604020004020304" pitchFamily="18" charset="77"/>
+              </a:rPr>
+              <a:t>init</a:t>
+            </a:r>
+            <a:r>
+              <a:rPr lang="en-US" dirty="0">
+                <a:solidFill>
+                  <a:sysClr val="windowText" lastClr="000000"/>
+                </a:solidFill>
+                <a:latin typeface="American Typewriter" panose="02090604020004020304" pitchFamily="18" charset="77"/>
+              </a:rPr>
+              <a:t>__</a:t>
+            </a:r>
+          </a:p>
+        </p:txBody>
+      </p:sp>
+      <p:sp>
+        <p:nvSpPr>
+          <p:cNvPr id="14" name="Rectangle 13">
+            <a:extLst>
+              <a:ext uri="{FF2B5EF4-FFF2-40B4-BE49-F238E27FC236}">
+                <a16:creationId xmlns:a16="http://schemas.microsoft.com/office/drawing/2014/main" id="{FE4B07B8-9A93-F7C9-6355-B93263C3B712}"/>
+              </a:ext>
+            </a:extLst>
+          </p:cNvPr>
+          <p:cNvSpPr/>
+          <p:nvPr/>
+        </p:nvSpPr>
+        <p:spPr>
+          <a:xfrm>
+            <a:off x="3265766" y="1796903"/>
+            <a:ext cx="1423192" cy="645356"/>
+          </a:xfrm>
+          <a:prstGeom prst="rect">
+            <a:avLst/>
+          </a:prstGeom>
+          <a:solidFill>
+            <a:schemeClr val="accent2"/>
+          </a:solidFill>
+          <a:ln>
+            <a:noFill/>
+          </a:ln>
+        </p:spPr>
+        <p:style>
+          <a:lnRef idx="2">
+            <a:schemeClr val="accent1">
+              <a:shade val="15000"/>
+            </a:schemeClr>
+          </a:lnRef>
+          <a:fillRef idx="1">
+            <a:schemeClr val="accent1"/>
+          </a:fillRef>
+          <a:effectRef idx="0">
+            <a:schemeClr val="accent1"/>
+          </a:effectRef>
+          <a:fontRef idx="minor">
+            <a:schemeClr val="lt1"/>
+          </a:fontRef>
+        </p:style>
+        <p:txBody>
+          <a:bodyPr rtlCol="0" anchor="ctr"/>
+          <a:lstStyle/>
+          <a:p>
+            <a:pPr algn="ctr"/>
+            <a:r>
+              <a:rPr lang="en-US" dirty="0"/>
+              <a:t>dispatching</a:t>
+            </a:r>
+          </a:p>
+        </p:txBody>
+      </p:sp>
+      <p:sp>
+        <p:nvSpPr>
+          <p:cNvPr id="15" name="Rectangle 14">
+            <a:extLst>
+              <a:ext uri="{FF2B5EF4-FFF2-40B4-BE49-F238E27FC236}">
+                <a16:creationId xmlns:a16="http://schemas.microsoft.com/office/drawing/2014/main" id="{F1E8F04F-A53F-1A39-7DBC-F3B1B11DAAC6}"/>
+              </a:ext>
+            </a:extLst>
+          </p:cNvPr>
+          <p:cNvSpPr/>
+          <p:nvPr/>
+        </p:nvSpPr>
+        <p:spPr>
+          <a:xfrm>
+            <a:off x="3265766" y="2442259"/>
+            <a:ext cx="1423192" cy="335666"/>
+          </a:xfrm>
+          <a:prstGeom prst="rect">
+            <a:avLst/>
+          </a:prstGeom>
+          <a:noFill/>
+          <a:ln>
+            <a:noFill/>
+          </a:ln>
+        </p:spPr>
+        <p:style>
+          <a:lnRef idx="2">
+            <a:schemeClr val="accent1">
+              <a:shade val="15000"/>
+            </a:schemeClr>
+          </a:lnRef>
+          <a:fillRef idx="1">
+            <a:schemeClr val="accent1"/>
+          </a:fillRef>
+          <a:effectRef idx="0">
+            <a:schemeClr val="accent1"/>
+          </a:effectRef>
+          <a:fontRef idx="minor">
+            <a:schemeClr val="lt1"/>
+          </a:fontRef>
+        </p:style>
+        <p:txBody>
+          <a:bodyPr rtlCol="0" anchor="ctr"/>
+          <a:lstStyle/>
+          <a:p>
+            <a:pPr algn="ctr"/>
+            <a:r>
+              <a:rPr lang="en-US" dirty="0">
+                <a:solidFill>
+                  <a:sysClr val="windowText" lastClr="000000"/>
+                </a:solidFill>
+                <a:latin typeface="American Typewriter" panose="02090604020004020304" pitchFamily="18" charset="77"/>
+              </a:rPr>
+              <a:t>_</a:t>
+            </a:r>
+            <a:r>
+              <a:rPr lang="en-US" dirty="0" err="1">
+                <a:solidFill>
+                  <a:sysClr val="windowText" lastClr="000000"/>
+                </a:solidFill>
+                <a:latin typeface="American Typewriter" panose="02090604020004020304" pitchFamily="18" charset="77"/>
+              </a:rPr>
+              <a:t>init_hrepr</a:t>
+            </a:r>
+            <a:endParaRPr lang="en-US" dirty="0">
+              <a:solidFill>
+                <a:sysClr val="windowText" lastClr="000000"/>
+              </a:solidFill>
+              <a:latin typeface="American Typewriter" panose="02090604020004020304" pitchFamily="18" charset="77"/>
+            </a:endParaRPr>
+          </a:p>
+        </p:txBody>
+      </p:sp>
+      <p:sp>
+        <p:nvSpPr>
+          <p:cNvPr id="16" name="Rectangle 15">
+            <a:extLst>
+              <a:ext uri="{FF2B5EF4-FFF2-40B4-BE49-F238E27FC236}">
+                <a16:creationId xmlns:a16="http://schemas.microsoft.com/office/drawing/2014/main" id="{B0AE31C4-FF9E-B043-5D9F-DEEBE2EF5BBB}"/>
+              </a:ext>
+            </a:extLst>
+          </p:cNvPr>
+          <p:cNvSpPr/>
+          <p:nvPr/>
+        </p:nvSpPr>
+        <p:spPr>
+          <a:xfrm>
+            <a:off x="5091022" y="1796903"/>
+            <a:ext cx="1564958" cy="645356"/>
+          </a:xfrm>
+          <a:prstGeom prst="rect">
+            <a:avLst/>
+          </a:prstGeom>
+          <a:solidFill>
+            <a:schemeClr val="accent1"/>
+          </a:solidFill>
+          <a:ln>
+            <a:noFill/>
+          </a:ln>
+        </p:spPr>
+        <p:style>
+          <a:lnRef idx="0">
+            <a:scrgbClr r="0" g="0" b="0"/>
+          </a:lnRef>
+          <a:fillRef idx="0">
+            <a:scrgbClr r="0" g="0" b="0"/>
+          </a:fillRef>
+          <a:effectRef idx="0">
+            <a:scrgbClr r="0" g="0" b="0"/>
+          </a:effectRef>
+          <a:fontRef idx="minor">
+            <a:schemeClr val="lt1"/>
+          </a:fontRef>
+        </p:style>
+        <p:txBody>
+          <a:bodyPr rtlCol="0" anchor="ctr"/>
+          <a:lstStyle/>
+          <a:p>
+            <a:pPr algn="ctr"/>
+            <a:r>
+              <a:rPr lang="en-US" dirty="0"/>
+              <a:t>setting properties</a:t>
+            </a:r>
+          </a:p>
+        </p:txBody>
+      </p:sp>
+      <p:sp>
+        <p:nvSpPr>
+          <p:cNvPr id="17" name="Rectangle 16">
+            <a:extLst>
+              <a:ext uri="{FF2B5EF4-FFF2-40B4-BE49-F238E27FC236}">
+                <a16:creationId xmlns:a16="http://schemas.microsoft.com/office/drawing/2014/main" id="{2396B369-61AE-2B9B-4AEE-595ADDD9EE00}"/>
+              </a:ext>
+            </a:extLst>
+          </p:cNvPr>
+          <p:cNvSpPr/>
+          <p:nvPr/>
+        </p:nvSpPr>
+        <p:spPr>
+          <a:xfrm>
+            <a:off x="5091021" y="2442259"/>
+            <a:ext cx="1564959" cy="335666"/>
+          </a:xfrm>
+          <a:prstGeom prst="rect">
+            <a:avLst/>
+          </a:prstGeom>
+          <a:noFill/>
+          <a:ln>
+            <a:noFill/>
+          </a:ln>
+        </p:spPr>
+        <p:style>
+          <a:lnRef idx="2">
+            <a:schemeClr val="accent1">
+              <a:shade val="15000"/>
+            </a:schemeClr>
+          </a:lnRef>
+          <a:fillRef idx="1">
+            <a:schemeClr val="accent1"/>
+          </a:fillRef>
+          <a:effectRef idx="0">
+            <a:schemeClr val="accent1"/>
+          </a:effectRef>
+          <a:fontRef idx="minor">
+            <a:schemeClr val="lt1"/>
+          </a:fontRef>
+        </p:style>
+        <p:txBody>
+          <a:bodyPr rtlCol="0" anchor="ctr"/>
+          <a:lstStyle/>
+          <a:p>
+            <a:pPr algn="ctr"/>
+            <a:r>
+              <a:rPr lang="en-US" dirty="0" err="1">
+                <a:solidFill>
+                  <a:sysClr val="windowText" lastClr="000000"/>
+                </a:solidFill>
+                <a:latin typeface="American Typewriter" panose="02090604020004020304" pitchFamily="18" charset="77"/>
+              </a:rPr>
+              <a:t>self.A</a:t>
+            </a:r>
+            <a:r>
+              <a:rPr lang="en-US" dirty="0">
+                <a:solidFill>
+                  <a:sysClr val="windowText" lastClr="000000"/>
+                </a:solidFill>
+                <a:latin typeface="American Typewriter" panose="02090604020004020304" pitchFamily="18" charset="77"/>
+              </a:rPr>
+              <a:t>, </a:t>
+            </a:r>
+            <a:r>
+              <a:rPr lang="en-US" dirty="0" err="1">
+                <a:solidFill>
+                  <a:sysClr val="windowText" lastClr="000000"/>
+                </a:solidFill>
+                <a:latin typeface="American Typewriter" panose="02090604020004020304" pitchFamily="18" charset="77"/>
+              </a:rPr>
+              <a:t>self.b</a:t>
+            </a:r>
+            <a:endParaRPr lang="en-US" dirty="0">
+              <a:solidFill>
+                <a:sysClr val="windowText" lastClr="000000"/>
+              </a:solidFill>
+              <a:latin typeface="American Typewriter" panose="02090604020004020304" pitchFamily="18" charset="77"/>
+            </a:endParaRPr>
+          </a:p>
+        </p:txBody>
+      </p:sp>
+      <p:sp>
+        <p:nvSpPr>
+          <p:cNvPr id="20" name="Rectangle 19">
+            <a:extLst>
+              <a:ext uri="{FF2B5EF4-FFF2-40B4-BE49-F238E27FC236}">
+                <a16:creationId xmlns:a16="http://schemas.microsoft.com/office/drawing/2014/main" id="{9C50A6D5-D08A-0CA2-4FF2-55A38401369A}"/>
+              </a:ext>
+            </a:extLst>
+          </p:cNvPr>
+          <p:cNvSpPr/>
+          <p:nvPr/>
+        </p:nvSpPr>
+        <p:spPr>
+          <a:xfrm>
+            <a:off x="7058043" y="2442259"/>
+            <a:ext cx="1423192" cy="335666"/>
+          </a:xfrm>
+          <a:prstGeom prst="rect">
+            <a:avLst/>
+          </a:prstGeom>
+          <a:noFill/>
+          <a:ln>
+            <a:noFill/>
+          </a:ln>
+        </p:spPr>
+        <p:style>
+          <a:lnRef idx="2">
+            <a:schemeClr val="accent1">
+              <a:shade val="15000"/>
+            </a:schemeClr>
+          </a:lnRef>
+          <a:fillRef idx="1">
+            <a:schemeClr val="accent1"/>
+          </a:fillRef>
+          <a:effectRef idx="0">
+            <a:schemeClr val="accent1"/>
+          </a:effectRef>
+          <a:fontRef idx="minor">
+            <a:schemeClr val="lt1"/>
+          </a:fontRef>
+        </p:style>
+        <p:txBody>
+          <a:bodyPr rtlCol="0" anchor="ctr"/>
+          <a:lstStyle/>
+          <a:p>
+            <a:pPr algn="ctr"/>
+            <a:r>
+              <a:rPr lang="en-US" dirty="0">
+                <a:solidFill>
+                  <a:sysClr val="windowText" lastClr="000000"/>
+                </a:solidFill>
+                <a:latin typeface="American Typewriter" panose="02090604020004020304" pitchFamily="18" charset="77"/>
+              </a:rPr>
+              <a:t>poly</a:t>
+            </a:r>
+          </a:p>
+        </p:txBody>
+      </p:sp>
+      <p:sp>
+        <p:nvSpPr>
+          <p:cNvPr id="22" name="Rectangle 21">
+            <a:extLst>
+              <a:ext uri="{FF2B5EF4-FFF2-40B4-BE49-F238E27FC236}">
+                <a16:creationId xmlns:a16="http://schemas.microsoft.com/office/drawing/2014/main" id="{838E808A-387B-0DCB-ED63-3C5644865623}"/>
+              </a:ext>
+            </a:extLst>
+          </p:cNvPr>
+          <p:cNvSpPr/>
+          <p:nvPr/>
+        </p:nvSpPr>
+        <p:spPr>
+          <a:xfrm>
+            <a:off x="7058043" y="1803364"/>
+            <a:ext cx="1423192" cy="645356"/>
+          </a:xfrm>
+          <a:prstGeom prst="rect">
+            <a:avLst/>
+          </a:prstGeom>
+          <a:noFill/>
+          <a:ln w="28575">
+            <a:solidFill>
+              <a:schemeClr val="tx1"/>
+            </a:solidFill>
+            <a:prstDash val="dash"/>
+          </a:ln>
+        </p:spPr>
+        <p:style>
+          <a:lnRef idx="2">
+            <a:schemeClr val="accent1">
+              <a:shade val="15000"/>
+            </a:schemeClr>
+          </a:lnRef>
+          <a:fillRef idx="1">
+            <a:schemeClr val="accent1"/>
+          </a:fillRef>
+          <a:effectRef idx="0">
+            <a:schemeClr val="accent1"/>
+          </a:effectRef>
+          <a:fontRef idx="minor">
+            <a:schemeClr val="lt1"/>
+          </a:fontRef>
+        </p:style>
+        <p:txBody>
+          <a:bodyPr rtlCol="0" anchor="ctr"/>
+          <a:lstStyle/>
+          <a:p>
+            <a:pPr algn="ctr"/>
+            <a:r>
+              <a:rPr lang="en-US" dirty="0">
+                <a:solidFill>
+                  <a:sysClr val="windowText" lastClr="000000"/>
+                </a:solidFill>
+              </a:rPr>
+              <a:t>returning object</a:t>
+            </a:r>
+          </a:p>
+        </p:txBody>
+      </p:sp>
+      <p:sp>
+        <p:nvSpPr>
+          <p:cNvPr id="23" name="Title 3">
+            <a:extLst>
+              <a:ext uri="{FF2B5EF4-FFF2-40B4-BE49-F238E27FC236}">
+                <a16:creationId xmlns:a16="http://schemas.microsoft.com/office/drawing/2014/main" id="{85F70CB0-92B9-9A17-A77D-C0CCAECAF960}"/>
+              </a:ext>
+            </a:extLst>
+          </p:cNvPr>
+          <p:cNvSpPr txBox="1">
+            <a:spLocks/>
+          </p:cNvSpPr>
+          <p:nvPr/>
+        </p:nvSpPr>
+        <p:spPr>
+          <a:xfrm>
+            <a:off x="838200" y="3385334"/>
+            <a:ext cx="2872565" cy="1325563"/>
+          </a:xfrm>
+          <a:prstGeom prst="rect">
+            <a:avLst/>
+          </a:prstGeom>
+        </p:spPr>
+        <p:txBody>
+          <a:bodyPr vert="horz" lIns="91440" tIns="45720" rIns="91440" bIns="45720" rtlCol="0" anchor="ctr">
+            <a:normAutofit/>
+          </a:bodyPr>
+          <a:lstStyle>
+            <a:lvl1pPr algn="l" defTabSz="914400" rtl="0" eaLnBrk="1" latinLnBrk="0" hangingPunct="1">
+              <a:lnSpc>
+                <a:spcPct val="90000"/>
+              </a:lnSpc>
+              <a:spcBef>
+                <a:spcPct val="0"/>
+              </a:spcBef>
+              <a:buNone/>
+              <a:defRPr sz="4400" kern="1200">
+                <a:solidFill>
+                  <a:schemeClr val="tx1"/>
+                </a:solidFill>
+                <a:latin typeface="+mj-lt"/>
+                <a:ea typeface="+mj-ea"/>
+                <a:cs typeface="+mj-cs"/>
+              </a:defRPr>
+            </a:lvl1pPr>
+          </a:lstStyle>
+          <a:p>
+            <a:r>
+              <a:rPr lang="en-US" dirty="0"/>
+              <a:t>Operation</a:t>
+            </a:r>
+          </a:p>
+        </p:txBody>
+      </p:sp>
+      <p:sp>
+        <p:nvSpPr>
+          <p:cNvPr id="26" name="Rectangle 25">
+            <a:extLst>
+              <a:ext uri="{FF2B5EF4-FFF2-40B4-BE49-F238E27FC236}">
+                <a16:creationId xmlns:a16="http://schemas.microsoft.com/office/drawing/2014/main" id="{3CE072B6-8D9D-6B93-A397-15A8EA376CC8}"/>
+              </a:ext>
+            </a:extLst>
+          </p:cNvPr>
+          <p:cNvSpPr/>
+          <p:nvPr/>
+        </p:nvSpPr>
+        <p:spPr>
+          <a:xfrm>
+            <a:off x="324092" y="4710897"/>
+            <a:ext cx="1068773" cy="645356"/>
+          </a:xfrm>
+          <a:prstGeom prst="rect">
+            <a:avLst/>
+          </a:prstGeom>
+          <a:noFill/>
+          <a:ln w="28575">
+            <a:solidFill>
+              <a:schemeClr val="tx1"/>
+            </a:solidFill>
+            <a:prstDash val="dash"/>
+          </a:ln>
+        </p:spPr>
+        <p:style>
+          <a:lnRef idx="2">
+            <a:schemeClr val="accent1">
+              <a:shade val="15000"/>
+            </a:schemeClr>
+          </a:lnRef>
+          <a:fillRef idx="1">
+            <a:schemeClr val="accent1"/>
+          </a:fillRef>
+          <a:effectRef idx="0">
+            <a:schemeClr val="accent1"/>
+          </a:effectRef>
+          <a:fontRef idx="minor">
+            <a:schemeClr val="lt1"/>
+          </a:fontRef>
+        </p:style>
+        <p:txBody>
+          <a:bodyPr rtlCol="0" anchor="ctr"/>
+          <a:lstStyle/>
+          <a:p>
+            <a:pPr algn="ctr"/>
+            <a:r>
+              <a:rPr lang="en-US" dirty="0">
+                <a:solidFill>
+                  <a:sysClr val="windowText" lastClr="000000"/>
+                </a:solidFill>
+              </a:rPr>
+              <a:t>given poly</a:t>
+            </a:r>
+          </a:p>
+        </p:txBody>
+      </p:sp>
+      <p:sp>
+        <p:nvSpPr>
+          <p:cNvPr id="27" name="Rectangle 26">
+            <a:extLst>
+              <a:ext uri="{FF2B5EF4-FFF2-40B4-BE49-F238E27FC236}">
+                <a16:creationId xmlns:a16="http://schemas.microsoft.com/office/drawing/2014/main" id="{4325BFC3-4F19-DA11-1782-E83C3B951E2F}"/>
+              </a:ext>
+            </a:extLst>
+          </p:cNvPr>
+          <p:cNvSpPr/>
+          <p:nvPr/>
+        </p:nvSpPr>
+        <p:spPr>
+          <a:xfrm>
+            <a:off x="324092" y="5356253"/>
+            <a:ext cx="1068773" cy="335666"/>
+          </a:xfrm>
+          <a:prstGeom prst="rect">
+            <a:avLst/>
+          </a:prstGeom>
+          <a:noFill/>
+          <a:ln>
+            <a:noFill/>
+          </a:ln>
+        </p:spPr>
+        <p:style>
+          <a:lnRef idx="2">
+            <a:schemeClr val="accent1">
+              <a:shade val="15000"/>
+            </a:schemeClr>
+          </a:lnRef>
+          <a:fillRef idx="1">
+            <a:schemeClr val="accent1"/>
+          </a:fillRef>
+          <a:effectRef idx="0">
+            <a:schemeClr val="accent1"/>
+          </a:effectRef>
+          <a:fontRef idx="minor">
+            <a:schemeClr val="lt1"/>
+          </a:fontRef>
+        </p:style>
+        <p:txBody>
+          <a:bodyPr rtlCol="0" anchor="ctr"/>
+          <a:lstStyle/>
+          <a:p>
+            <a:pPr algn="ctr"/>
+            <a:r>
+              <a:rPr lang="en-US" dirty="0">
+                <a:solidFill>
+                  <a:sysClr val="windowText" lastClr="000000"/>
+                </a:solidFill>
+                <a:latin typeface="American Typewriter" panose="02090604020004020304" pitchFamily="18" charset="77"/>
+              </a:rPr>
+              <a:t>poly</a:t>
+            </a:r>
+          </a:p>
+        </p:txBody>
+      </p:sp>
+      <p:sp>
+        <p:nvSpPr>
+          <p:cNvPr id="28" name="Rectangle 27">
+            <a:extLst>
+              <a:ext uri="{FF2B5EF4-FFF2-40B4-BE49-F238E27FC236}">
+                <a16:creationId xmlns:a16="http://schemas.microsoft.com/office/drawing/2014/main" id="{B8D2DD00-F8D2-3DF5-49A4-953293535E7F}"/>
+              </a:ext>
+            </a:extLst>
+          </p:cNvPr>
+          <p:cNvSpPr/>
+          <p:nvPr/>
+        </p:nvSpPr>
+        <p:spPr>
+          <a:xfrm>
+            <a:off x="1794929" y="4710897"/>
+            <a:ext cx="1068773" cy="645356"/>
+          </a:xfrm>
+          <a:prstGeom prst="rect">
+            <a:avLst/>
+          </a:prstGeom>
+          <a:solidFill>
+            <a:schemeClr val="accent2"/>
+          </a:solidFill>
+          <a:ln>
+            <a:noFill/>
+          </a:ln>
+        </p:spPr>
+        <p:style>
+          <a:lnRef idx="2">
+            <a:schemeClr val="accent1">
+              <a:shade val="15000"/>
+            </a:schemeClr>
+          </a:lnRef>
+          <a:fillRef idx="1">
+            <a:schemeClr val="accent1"/>
+          </a:fillRef>
+          <a:effectRef idx="0">
+            <a:schemeClr val="accent1"/>
+          </a:effectRef>
+          <a:fontRef idx="minor">
+            <a:schemeClr val="lt1"/>
+          </a:fontRef>
+        </p:style>
+        <p:txBody>
+          <a:bodyPr rtlCol="0" anchor="ctr"/>
+          <a:lstStyle/>
+          <a:p>
+            <a:pPr algn="ctr"/>
+            <a:r>
+              <a:rPr lang="en-US" dirty="0"/>
+              <a:t>check flags</a:t>
+            </a:r>
+          </a:p>
+        </p:txBody>
+      </p:sp>
+      <p:sp>
+        <p:nvSpPr>
+          <p:cNvPr id="29" name="Rectangle 28">
+            <a:extLst>
+              <a:ext uri="{FF2B5EF4-FFF2-40B4-BE49-F238E27FC236}">
+                <a16:creationId xmlns:a16="http://schemas.microsoft.com/office/drawing/2014/main" id="{5A1C49CA-87E6-5F5B-47A9-AB5D13E3DB04}"/>
+              </a:ext>
+            </a:extLst>
+          </p:cNvPr>
+          <p:cNvSpPr/>
+          <p:nvPr/>
+        </p:nvSpPr>
+        <p:spPr>
+          <a:xfrm>
+            <a:off x="1794929" y="5356253"/>
+            <a:ext cx="1068773" cy="335666"/>
+          </a:xfrm>
+          <a:prstGeom prst="rect">
+            <a:avLst/>
+          </a:prstGeom>
+          <a:noFill/>
+          <a:ln>
+            <a:noFill/>
+          </a:ln>
+        </p:spPr>
+        <p:style>
+          <a:lnRef idx="2">
+            <a:schemeClr val="accent1">
+              <a:shade val="15000"/>
+            </a:schemeClr>
+          </a:lnRef>
+          <a:fillRef idx="1">
+            <a:schemeClr val="accent1"/>
+          </a:fillRef>
+          <a:effectRef idx="0">
+            <a:schemeClr val="accent1"/>
+          </a:effectRef>
+          <a:fontRef idx="minor">
+            <a:schemeClr val="lt1"/>
+          </a:fontRef>
+        </p:style>
+        <p:txBody>
+          <a:bodyPr rtlCol="0" anchor="ctr"/>
+          <a:lstStyle/>
+          <a:p>
+            <a:pPr algn="ctr"/>
+            <a:r>
+              <a:rPr lang="en-US" dirty="0" err="1">
+                <a:solidFill>
+                  <a:sysClr val="windowText" lastClr="000000"/>
+                </a:solidFill>
+                <a:latin typeface="American Typewriter" panose="02090604020004020304" pitchFamily="18" charset="77"/>
+              </a:rPr>
+              <a:t>self.is</a:t>
+            </a:r>
+            <a:r>
+              <a:rPr lang="en-US" dirty="0">
+                <a:solidFill>
+                  <a:sysClr val="windowText" lastClr="000000"/>
+                </a:solidFill>
+                <a:latin typeface="American Typewriter" panose="02090604020004020304" pitchFamily="18" charset="77"/>
+              </a:rPr>
+              <a:t>_</a:t>
+            </a:r>
+          </a:p>
+        </p:txBody>
+      </p:sp>
+      <p:sp>
+        <p:nvSpPr>
+          <p:cNvPr id="30" name="Rectangle 29">
+            <a:extLst>
+              <a:ext uri="{FF2B5EF4-FFF2-40B4-BE49-F238E27FC236}">
+                <a16:creationId xmlns:a16="http://schemas.microsoft.com/office/drawing/2014/main" id="{B3468045-8EDB-56D6-845B-9C0F206A8495}"/>
+              </a:ext>
+            </a:extLst>
+          </p:cNvPr>
+          <p:cNvSpPr/>
+          <p:nvPr/>
+        </p:nvSpPr>
+        <p:spPr>
+          <a:xfrm>
+            <a:off x="3265766" y="4710897"/>
+            <a:ext cx="1068773" cy="645356"/>
+          </a:xfrm>
+          <a:prstGeom prst="rect">
+            <a:avLst/>
+          </a:prstGeom>
+          <a:solidFill>
+            <a:schemeClr val="accent2"/>
+          </a:solidFill>
+          <a:ln>
+            <a:noFill/>
+          </a:ln>
+        </p:spPr>
+        <p:style>
+          <a:lnRef idx="2">
+            <a:schemeClr val="accent1">
+              <a:shade val="15000"/>
+            </a:schemeClr>
+          </a:lnRef>
+          <a:fillRef idx="1">
+            <a:schemeClr val="accent1"/>
+          </a:fillRef>
+          <a:effectRef idx="0">
+            <a:schemeClr val="accent1"/>
+          </a:effectRef>
+          <a:fontRef idx="minor">
+            <a:schemeClr val="lt1"/>
+          </a:fontRef>
+        </p:style>
+        <p:txBody>
+          <a:bodyPr rtlCol="0" anchor="ctr"/>
+          <a:lstStyle/>
+          <a:p>
+            <a:pPr algn="ctr"/>
+            <a:r>
+              <a:rPr lang="en-US" dirty="0"/>
+              <a:t>select algo</a:t>
+            </a:r>
+          </a:p>
+        </p:txBody>
+      </p:sp>
+      <p:sp>
+        <p:nvSpPr>
+          <p:cNvPr id="31" name="Rectangle 30">
+            <a:extLst>
+              <a:ext uri="{FF2B5EF4-FFF2-40B4-BE49-F238E27FC236}">
+                <a16:creationId xmlns:a16="http://schemas.microsoft.com/office/drawing/2014/main" id="{0EF05441-0683-728E-4A34-EF5A24137268}"/>
+              </a:ext>
+            </a:extLst>
+          </p:cNvPr>
+          <p:cNvSpPr/>
+          <p:nvPr/>
+        </p:nvSpPr>
+        <p:spPr>
+          <a:xfrm>
+            <a:off x="3265766" y="5356253"/>
+            <a:ext cx="1068773" cy="335666"/>
+          </a:xfrm>
+          <a:prstGeom prst="rect">
+            <a:avLst/>
+          </a:prstGeom>
+          <a:noFill/>
+          <a:ln>
+            <a:noFill/>
+          </a:ln>
+        </p:spPr>
+        <p:style>
+          <a:lnRef idx="2">
+            <a:schemeClr val="accent1">
+              <a:shade val="15000"/>
+            </a:schemeClr>
+          </a:lnRef>
+          <a:fillRef idx="1">
+            <a:schemeClr val="accent1"/>
+          </a:fillRef>
+          <a:effectRef idx="0">
+            <a:schemeClr val="accent1"/>
+          </a:effectRef>
+          <a:fontRef idx="minor">
+            <a:schemeClr val="lt1"/>
+          </a:fontRef>
+        </p:style>
+        <p:txBody>
+          <a:bodyPr rtlCol="0" anchor="ctr"/>
+          <a:lstStyle/>
+          <a:p>
+            <a:pPr algn="ctr"/>
+            <a:r>
+              <a:rPr lang="en-US" dirty="0">
+                <a:solidFill>
+                  <a:sysClr val="windowText" lastClr="000000"/>
+                </a:solidFill>
+                <a:latin typeface="American Typewriter" panose="02090604020004020304" pitchFamily="18" charset="77"/>
+              </a:rPr>
+              <a:t>if … else</a:t>
+            </a:r>
+          </a:p>
+        </p:txBody>
+      </p:sp>
+      <p:sp>
+        <p:nvSpPr>
+          <p:cNvPr id="35" name="Rectangle 34">
+            <a:extLst>
+              <a:ext uri="{FF2B5EF4-FFF2-40B4-BE49-F238E27FC236}">
+                <a16:creationId xmlns:a16="http://schemas.microsoft.com/office/drawing/2014/main" id="{C7F5BFFE-BCB1-3828-56C9-8B92D2E6618E}"/>
+              </a:ext>
+            </a:extLst>
+          </p:cNvPr>
+          <p:cNvSpPr/>
+          <p:nvPr/>
+        </p:nvSpPr>
+        <p:spPr>
+          <a:xfrm>
+            <a:off x="4736603" y="4710897"/>
+            <a:ext cx="1423192" cy="645356"/>
+          </a:xfrm>
+          <a:prstGeom prst="rect">
+            <a:avLst/>
+          </a:prstGeom>
+          <a:solidFill>
+            <a:schemeClr val="accent2"/>
+          </a:solidFill>
+          <a:ln>
+            <a:noFill/>
+          </a:ln>
+        </p:spPr>
+        <p:style>
+          <a:lnRef idx="2">
+            <a:schemeClr val="accent1">
+              <a:shade val="15000"/>
+            </a:schemeClr>
+          </a:lnRef>
+          <a:fillRef idx="1">
+            <a:schemeClr val="accent1"/>
+          </a:fillRef>
+          <a:effectRef idx="0">
+            <a:schemeClr val="accent1"/>
+          </a:effectRef>
+          <a:fontRef idx="minor">
+            <a:schemeClr val="lt1"/>
+          </a:fontRef>
+        </p:style>
+        <p:txBody>
+          <a:bodyPr rtlCol="0" anchor="ctr"/>
+          <a:lstStyle/>
+          <a:p>
+            <a:pPr algn="ctr"/>
+            <a:r>
+              <a:rPr lang="en-US" dirty="0"/>
+              <a:t>compute function</a:t>
+            </a:r>
+          </a:p>
+        </p:txBody>
+      </p:sp>
+      <p:sp>
+        <p:nvSpPr>
+          <p:cNvPr id="36" name="Rectangle 35">
+            <a:extLst>
+              <a:ext uri="{FF2B5EF4-FFF2-40B4-BE49-F238E27FC236}">
+                <a16:creationId xmlns:a16="http://schemas.microsoft.com/office/drawing/2014/main" id="{46024753-7B1C-9892-881D-6D08FB44A10F}"/>
+              </a:ext>
+            </a:extLst>
+          </p:cNvPr>
+          <p:cNvSpPr/>
+          <p:nvPr/>
+        </p:nvSpPr>
+        <p:spPr>
+          <a:xfrm>
+            <a:off x="4736603" y="5356253"/>
+            <a:ext cx="1423192" cy="335666"/>
+          </a:xfrm>
+          <a:prstGeom prst="rect">
+            <a:avLst/>
+          </a:prstGeom>
+          <a:noFill/>
+          <a:ln>
+            <a:noFill/>
+          </a:ln>
+        </p:spPr>
+        <p:style>
+          <a:lnRef idx="2">
+            <a:schemeClr val="accent1">
+              <a:shade val="15000"/>
+            </a:schemeClr>
+          </a:lnRef>
+          <a:fillRef idx="1">
+            <a:schemeClr val="accent1"/>
+          </a:fillRef>
+          <a:effectRef idx="0">
+            <a:schemeClr val="accent1"/>
+          </a:effectRef>
+          <a:fontRef idx="minor">
+            <a:schemeClr val="lt1"/>
+          </a:fontRef>
+        </p:style>
+        <p:txBody>
+          <a:bodyPr rtlCol="0" anchor="ctr"/>
+          <a:lstStyle/>
+          <a:p>
+            <a:pPr algn="ctr"/>
+            <a:r>
+              <a:rPr lang="en-US" dirty="0" err="1">
+                <a:solidFill>
+                  <a:sysClr val="windowText" lastClr="000000"/>
+                </a:solidFill>
+                <a:latin typeface="American Typewriter" panose="02090604020004020304" pitchFamily="18" charset="77"/>
+              </a:rPr>
+              <a:t>mink_sum</a:t>
+            </a:r>
+            <a:endParaRPr lang="en-US" dirty="0">
+              <a:solidFill>
+                <a:sysClr val="windowText" lastClr="000000"/>
+              </a:solidFill>
+              <a:latin typeface="American Typewriter" panose="02090604020004020304" pitchFamily="18" charset="77"/>
+            </a:endParaRPr>
+          </a:p>
+        </p:txBody>
+      </p:sp>
+      <p:sp>
+        <p:nvSpPr>
+          <p:cNvPr id="39" name="Rectangle 38">
+            <a:extLst>
+              <a:ext uri="{FF2B5EF4-FFF2-40B4-BE49-F238E27FC236}">
+                <a16:creationId xmlns:a16="http://schemas.microsoft.com/office/drawing/2014/main" id="{5F2FC91F-0C34-291B-5169-494EE138A4B3}"/>
+              </a:ext>
+            </a:extLst>
+          </p:cNvPr>
+          <p:cNvSpPr/>
+          <p:nvPr/>
+        </p:nvSpPr>
+        <p:spPr>
+          <a:xfrm>
+            <a:off x="6561859" y="4710897"/>
+            <a:ext cx="1068773" cy="645356"/>
+          </a:xfrm>
+          <a:prstGeom prst="rect">
+            <a:avLst/>
+          </a:prstGeom>
+          <a:solidFill>
+            <a:schemeClr val="accent2"/>
+          </a:solidFill>
+          <a:ln>
+            <a:noFill/>
+          </a:ln>
+        </p:spPr>
+        <p:style>
+          <a:lnRef idx="2">
+            <a:schemeClr val="accent1">
+              <a:shade val="15000"/>
+            </a:schemeClr>
+          </a:lnRef>
+          <a:fillRef idx="1">
+            <a:schemeClr val="accent1"/>
+          </a:fillRef>
+          <a:effectRef idx="0">
+            <a:schemeClr val="accent1"/>
+          </a:effectRef>
+          <a:fontRef idx="minor">
+            <a:schemeClr val="lt1"/>
+          </a:fontRef>
+        </p:style>
+        <p:txBody>
+          <a:bodyPr rtlCol="0" anchor="ctr"/>
+          <a:lstStyle/>
+          <a:p>
+            <a:pPr algn="ctr"/>
+            <a:r>
+              <a:rPr lang="en-US" dirty="0"/>
+              <a:t>return results</a:t>
+            </a:r>
+          </a:p>
+        </p:txBody>
+      </p:sp>
+      <p:sp>
+        <p:nvSpPr>
+          <p:cNvPr id="40" name="Rectangle 39">
+            <a:extLst>
+              <a:ext uri="{FF2B5EF4-FFF2-40B4-BE49-F238E27FC236}">
+                <a16:creationId xmlns:a16="http://schemas.microsoft.com/office/drawing/2014/main" id="{ECB3A796-49DB-D16F-EBBB-99F407AF1271}"/>
+              </a:ext>
+            </a:extLst>
+          </p:cNvPr>
+          <p:cNvSpPr/>
+          <p:nvPr/>
+        </p:nvSpPr>
+        <p:spPr>
+          <a:xfrm>
+            <a:off x="6561859" y="5356253"/>
+            <a:ext cx="1068773" cy="335666"/>
+          </a:xfrm>
+          <a:prstGeom prst="rect">
+            <a:avLst/>
+          </a:prstGeom>
+          <a:noFill/>
+          <a:ln>
+            <a:noFill/>
+          </a:ln>
+        </p:spPr>
+        <p:style>
+          <a:lnRef idx="2">
+            <a:schemeClr val="accent1">
+              <a:shade val="15000"/>
+            </a:schemeClr>
+          </a:lnRef>
+          <a:fillRef idx="1">
+            <a:schemeClr val="accent1"/>
+          </a:fillRef>
+          <a:effectRef idx="0">
+            <a:schemeClr val="accent1"/>
+          </a:effectRef>
+          <a:fontRef idx="minor">
+            <a:schemeClr val="lt1"/>
+          </a:fontRef>
+        </p:style>
+        <p:txBody>
+          <a:bodyPr rtlCol="0" anchor="ctr"/>
+          <a:lstStyle/>
+          <a:p>
+            <a:pPr algn="ctr"/>
+            <a:r>
+              <a:rPr lang="en-US" dirty="0">
+                <a:solidFill>
+                  <a:sysClr val="windowText" lastClr="000000"/>
+                </a:solidFill>
+                <a:latin typeface="American Typewriter" panose="02090604020004020304" pitchFamily="18" charset="77"/>
+              </a:rPr>
+              <a:t>verts</a:t>
+            </a:r>
+          </a:p>
+        </p:txBody>
+      </p:sp>
+      <p:sp>
+        <p:nvSpPr>
+          <p:cNvPr id="44" name="Rectangle 43">
+            <a:extLst>
+              <a:ext uri="{FF2B5EF4-FFF2-40B4-BE49-F238E27FC236}">
+                <a16:creationId xmlns:a16="http://schemas.microsoft.com/office/drawing/2014/main" id="{E1ACBDEE-57A2-4BED-61D9-D434C99CB2C2}"/>
+              </a:ext>
+            </a:extLst>
+          </p:cNvPr>
+          <p:cNvSpPr/>
+          <p:nvPr/>
+        </p:nvSpPr>
+        <p:spPr>
+          <a:xfrm>
+            <a:off x="8814191" y="5617545"/>
+            <a:ext cx="1564958" cy="645356"/>
+          </a:xfrm>
+          <a:prstGeom prst="rect">
+            <a:avLst/>
+          </a:prstGeom>
+          <a:solidFill>
+            <a:schemeClr val="accent1"/>
+          </a:solidFill>
+          <a:ln>
+            <a:noFill/>
+          </a:ln>
+        </p:spPr>
+        <p:style>
+          <a:lnRef idx="0">
+            <a:scrgbClr r="0" g="0" b="0"/>
+          </a:lnRef>
+          <a:fillRef idx="0">
+            <a:scrgbClr r="0" g="0" b="0"/>
+          </a:fillRef>
+          <a:effectRef idx="0">
+            <a:scrgbClr r="0" g="0" b="0"/>
+          </a:effectRef>
+          <a:fontRef idx="minor">
+            <a:schemeClr val="lt1"/>
+          </a:fontRef>
+        </p:style>
+        <p:txBody>
+          <a:bodyPr rtlCol="0" anchor="ctr"/>
+          <a:lstStyle/>
+          <a:p>
+            <a:pPr algn="ctr"/>
+            <a:r>
+              <a:rPr lang="en-US" dirty="0"/>
+              <a:t>setting properties</a:t>
+            </a:r>
+          </a:p>
+        </p:txBody>
+      </p:sp>
+      <p:sp>
+        <p:nvSpPr>
+          <p:cNvPr id="45" name="Rectangle 44">
+            <a:extLst>
+              <a:ext uri="{FF2B5EF4-FFF2-40B4-BE49-F238E27FC236}">
+                <a16:creationId xmlns:a16="http://schemas.microsoft.com/office/drawing/2014/main" id="{3694A2FE-299B-3F6D-C53F-980E199F0F86}"/>
+              </a:ext>
+            </a:extLst>
+          </p:cNvPr>
+          <p:cNvSpPr/>
+          <p:nvPr/>
+        </p:nvSpPr>
+        <p:spPr>
+          <a:xfrm>
+            <a:off x="8814190" y="6262901"/>
+            <a:ext cx="1564959" cy="335666"/>
+          </a:xfrm>
+          <a:prstGeom prst="rect">
+            <a:avLst/>
+          </a:prstGeom>
+          <a:noFill/>
+          <a:ln>
+            <a:noFill/>
+          </a:ln>
+        </p:spPr>
+        <p:style>
+          <a:lnRef idx="2">
+            <a:schemeClr val="accent1">
+              <a:shade val="15000"/>
+            </a:schemeClr>
+          </a:lnRef>
+          <a:fillRef idx="1">
+            <a:schemeClr val="accent1"/>
+          </a:fillRef>
+          <a:effectRef idx="0">
+            <a:schemeClr val="accent1"/>
+          </a:effectRef>
+          <a:fontRef idx="minor">
+            <a:schemeClr val="lt1"/>
+          </a:fontRef>
+        </p:style>
+        <p:txBody>
+          <a:bodyPr rtlCol="0" anchor="ctr"/>
+          <a:lstStyle/>
+          <a:p>
+            <a:pPr algn="ctr"/>
+            <a:r>
+              <a:rPr lang="en-US" dirty="0" err="1">
+                <a:solidFill>
+                  <a:sysClr val="windowText" lastClr="000000"/>
+                </a:solidFill>
+                <a:latin typeface="American Typewriter" panose="02090604020004020304" pitchFamily="18" charset="77"/>
+              </a:rPr>
+              <a:t>self.A</a:t>
+            </a:r>
+            <a:r>
+              <a:rPr lang="en-US" dirty="0">
+                <a:solidFill>
+                  <a:sysClr val="windowText" lastClr="000000"/>
+                </a:solidFill>
+                <a:latin typeface="American Typewriter" panose="02090604020004020304" pitchFamily="18" charset="77"/>
+              </a:rPr>
+              <a:t>, </a:t>
+            </a:r>
+            <a:r>
+              <a:rPr lang="en-US" dirty="0" err="1">
+                <a:solidFill>
+                  <a:sysClr val="windowText" lastClr="000000"/>
+                </a:solidFill>
+                <a:latin typeface="American Typewriter" panose="02090604020004020304" pitchFamily="18" charset="77"/>
+              </a:rPr>
+              <a:t>self.b</a:t>
+            </a:r>
+            <a:endParaRPr lang="en-US" dirty="0">
+              <a:solidFill>
+                <a:sysClr val="windowText" lastClr="000000"/>
+              </a:solidFill>
+              <a:latin typeface="American Typewriter" panose="02090604020004020304" pitchFamily="18" charset="77"/>
+            </a:endParaRPr>
+          </a:p>
+        </p:txBody>
+      </p:sp>
+      <p:sp>
+        <p:nvSpPr>
+          <p:cNvPr id="48" name="Rectangle 47">
+            <a:extLst>
+              <a:ext uri="{FF2B5EF4-FFF2-40B4-BE49-F238E27FC236}">
+                <a16:creationId xmlns:a16="http://schemas.microsoft.com/office/drawing/2014/main" id="{A4516AB3-5FEE-F8FF-E693-9E60B4D026B9}"/>
+              </a:ext>
+            </a:extLst>
+          </p:cNvPr>
+          <p:cNvSpPr/>
+          <p:nvPr/>
+        </p:nvSpPr>
+        <p:spPr>
+          <a:xfrm>
+            <a:off x="10781212" y="5617545"/>
+            <a:ext cx="1068773" cy="645356"/>
+          </a:xfrm>
+          <a:prstGeom prst="rect">
+            <a:avLst/>
+          </a:prstGeom>
+          <a:noFill/>
+          <a:ln w="28575">
+            <a:solidFill>
+              <a:schemeClr val="tx1"/>
+            </a:solidFill>
+            <a:prstDash val="dash"/>
+          </a:ln>
+        </p:spPr>
+        <p:style>
+          <a:lnRef idx="2">
+            <a:schemeClr val="accent1">
+              <a:shade val="15000"/>
+            </a:schemeClr>
+          </a:lnRef>
+          <a:fillRef idx="1">
+            <a:schemeClr val="accent1"/>
+          </a:fillRef>
+          <a:effectRef idx="0">
+            <a:schemeClr val="accent1"/>
+          </a:effectRef>
+          <a:fontRef idx="minor">
+            <a:schemeClr val="lt1"/>
+          </a:fontRef>
+        </p:style>
+        <p:txBody>
+          <a:bodyPr rtlCol="0" anchor="ctr"/>
+          <a:lstStyle/>
+          <a:p>
+            <a:pPr algn="ctr"/>
+            <a:r>
+              <a:rPr lang="en-US" dirty="0">
+                <a:solidFill>
+                  <a:sysClr val="windowText" lastClr="000000"/>
+                </a:solidFill>
+              </a:rPr>
+              <a:t>return</a:t>
+            </a:r>
+          </a:p>
+          <a:p>
+            <a:pPr algn="ctr"/>
+            <a:r>
+              <a:rPr lang="en-US" dirty="0">
+                <a:solidFill>
+                  <a:sysClr val="windowText" lastClr="000000"/>
+                </a:solidFill>
+              </a:rPr>
+              <a:t>object</a:t>
+            </a:r>
+          </a:p>
+        </p:txBody>
+      </p:sp>
+      <p:sp>
+        <p:nvSpPr>
+          <p:cNvPr id="49" name="Rectangle 48">
+            <a:extLst>
+              <a:ext uri="{FF2B5EF4-FFF2-40B4-BE49-F238E27FC236}">
+                <a16:creationId xmlns:a16="http://schemas.microsoft.com/office/drawing/2014/main" id="{3391296E-C1A0-5DB5-DE1B-A222A4FB3645}"/>
+              </a:ext>
+            </a:extLst>
+          </p:cNvPr>
+          <p:cNvSpPr/>
+          <p:nvPr/>
+        </p:nvSpPr>
+        <p:spPr>
+          <a:xfrm>
+            <a:off x="10781212" y="6262901"/>
+            <a:ext cx="1068773" cy="335666"/>
+          </a:xfrm>
+          <a:prstGeom prst="rect">
+            <a:avLst/>
+          </a:prstGeom>
+          <a:noFill/>
+          <a:ln>
+            <a:noFill/>
+          </a:ln>
+        </p:spPr>
+        <p:style>
+          <a:lnRef idx="2">
+            <a:schemeClr val="accent1">
+              <a:shade val="15000"/>
+            </a:schemeClr>
+          </a:lnRef>
+          <a:fillRef idx="1">
+            <a:schemeClr val="accent1"/>
+          </a:fillRef>
+          <a:effectRef idx="0">
+            <a:schemeClr val="accent1"/>
+          </a:effectRef>
+          <a:fontRef idx="minor">
+            <a:schemeClr val="lt1"/>
+          </a:fontRef>
+        </p:style>
+        <p:txBody>
+          <a:bodyPr rtlCol="0" anchor="ctr"/>
+          <a:lstStyle/>
+          <a:p>
+            <a:pPr algn="ctr"/>
+            <a:r>
+              <a:rPr lang="en-US" dirty="0">
+                <a:solidFill>
+                  <a:sysClr val="windowText" lastClr="000000"/>
+                </a:solidFill>
+                <a:latin typeface="American Typewriter" panose="02090604020004020304" pitchFamily="18" charset="77"/>
+              </a:rPr>
+              <a:t>None</a:t>
+            </a:r>
+          </a:p>
+        </p:txBody>
+      </p:sp>
+      <p:sp>
+        <p:nvSpPr>
+          <p:cNvPr id="52" name="Rectangle 51">
+            <a:extLst>
+              <a:ext uri="{FF2B5EF4-FFF2-40B4-BE49-F238E27FC236}">
+                <a16:creationId xmlns:a16="http://schemas.microsoft.com/office/drawing/2014/main" id="{0F9A0B0C-2C01-8E54-06D9-6390DC06D869}"/>
+              </a:ext>
+            </a:extLst>
+          </p:cNvPr>
+          <p:cNvSpPr/>
+          <p:nvPr/>
+        </p:nvSpPr>
+        <p:spPr>
+          <a:xfrm>
+            <a:off x="8814190" y="3729875"/>
+            <a:ext cx="1068773" cy="645356"/>
+          </a:xfrm>
+          <a:prstGeom prst="rect">
+            <a:avLst/>
+          </a:prstGeom>
+          <a:solidFill>
+            <a:schemeClr val="accent2"/>
+          </a:solidFill>
+          <a:ln w="38100">
+            <a:solidFill>
+              <a:schemeClr val="accent1"/>
+            </a:solidFill>
+          </a:ln>
+        </p:spPr>
+        <p:style>
+          <a:lnRef idx="2">
+            <a:schemeClr val="accent1">
+              <a:shade val="15000"/>
+            </a:schemeClr>
+          </a:lnRef>
+          <a:fillRef idx="1">
+            <a:schemeClr val="accent1"/>
+          </a:fillRef>
+          <a:effectRef idx="0">
+            <a:schemeClr val="accent1"/>
+          </a:effectRef>
+          <a:fontRef idx="minor">
+            <a:schemeClr val="lt1"/>
+          </a:fontRef>
+        </p:style>
+        <p:txBody>
+          <a:bodyPr rtlCol="0" anchor="ctr"/>
+          <a:lstStyle/>
+          <a:p>
+            <a:pPr algn="ctr"/>
+            <a:r>
+              <a:rPr lang="en-US" dirty="0"/>
+              <a:t>initialize poly</a:t>
+            </a:r>
+          </a:p>
+        </p:txBody>
+      </p:sp>
+      <p:sp>
+        <p:nvSpPr>
+          <p:cNvPr id="53" name="Rectangle 52">
+            <a:extLst>
+              <a:ext uri="{FF2B5EF4-FFF2-40B4-BE49-F238E27FC236}">
+                <a16:creationId xmlns:a16="http://schemas.microsoft.com/office/drawing/2014/main" id="{33EEAA37-C2D5-E25D-4BF2-EECAB9E308BE}"/>
+              </a:ext>
+            </a:extLst>
+          </p:cNvPr>
+          <p:cNvSpPr/>
+          <p:nvPr/>
+        </p:nvSpPr>
+        <p:spPr>
+          <a:xfrm>
+            <a:off x="8814190" y="4375231"/>
+            <a:ext cx="1068773" cy="335666"/>
+          </a:xfrm>
+          <a:prstGeom prst="rect">
+            <a:avLst/>
+          </a:prstGeom>
+          <a:noFill/>
+          <a:ln>
+            <a:noFill/>
+          </a:ln>
+        </p:spPr>
+        <p:style>
+          <a:lnRef idx="2">
+            <a:schemeClr val="accent1">
+              <a:shade val="15000"/>
+            </a:schemeClr>
+          </a:lnRef>
+          <a:fillRef idx="1">
+            <a:schemeClr val="accent1"/>
+          </a:fillRef>
+          <a:effectRef idx="0">
+            <a:schemeClr val="accent1"/>
+          </a:effectRef>
+          <a:fontRef idx="minor">
+            <a:schemeClr val="lt1"/>
+          </a:fontRef>
+        </p:style>
+        <p:txBody>
+          <a:bodyPr rtlCol="0" anchor="ctr"/>
+          <a:lstStyle/>
+          <a:p>
+            <a:pPr algn="ctr"/>
+            <a:r>
+              <a:rPr lang="en-US" dirty="0">
+                <a:solidFill>
+                  <a:sysClr val="windowText" lastClr="000000"/>
+                </a:solidFill>
+                <a:latin typeface="American Typewriter" panose="02090604020004020304" pitchFamily="18" charset="77"/>
+              </a:rPr>
+              <a:t>poly(…)</a:t>
+            </a:r>
+          </a:p>
+        </p:txBody>
+      </p:sp>
+      <p:sp>
+        <p:nvSpPr>
+          <p:cNvPr id="54" name="Rectangle 53">
+            <a:extLst>
+              <a:ext uri="{FF2B5EF4-FFF2-40B4-BE49-F238E27FC236}">
+                <a16:creationId xmlns:a16="http://schemas.microsoft.com/office/drawing/2014/main" id="{E9659A6A-4D07-CA6F-2418-90995BD3741F}"/>
+              </a:ext>
+            </a:extLst>
+          </p:cNvPr>
+          <p:cNvSpPr/>
+          <p:nvPr/>
+        </p:nvSpPr>
+        <p:spPr>
+          <a:xfrm>
+            <a:off x="10285027" y="3729875"/>
+            <a:ext cx="1068773" cy="645356"/>
+          </a:xfrm>
+          <a:prstGeom prst="rect">
+            <a:avLst/>
+          </a:prstGeom>
+          <a:noFill/>
+          <a:ln w="28575">
+            <a:solidFill>
+              <a:schemeClr val="tx1"/>
+            </a:solidFill>
+            <a:prstDash val="dash"/>
+          </a:ln>
+        </p:spPr>
+        <p:style>
+          <a:lnRef idx="2">
+            <a:schemeClr val="accent1">
+              <a:shade val="15000"/>
+            </a:schemeClr>
+          </a:lnRef>
+          <a:fillRef idx="1">
+            <a:schemeClr val="accent1"/>
+          </a:fillRef>
+          <a:effectRef idx="0">
+            <a:schemeClr val="accent1"/>
+          </a:effectRef>
+          <a:fontRef idx="minor">
+            <a:schemeClr val="lt1"/>
+          </a:fontRef>
+        </p:style>
+        <p:txBody>
+          <a:bodyPr rtlCol="0" anchor="ctr"/>
+          <a:lstStyle/>
+          <a:p>
+            <a:pPr algn="ctr"/>
+            <a:r>
+              <a:rPr lang="en-US" dirty="0">
+                <a:solidFill>
+                  <a:sysClr val="windowText" lastClr="000000"/>
+                </a:solidFill>
+              </a:rPr>
+              <a:t>return</a:t>
+            </a:r>
+          </a:p>
+          <a:p>
+            <a:pPr algn="ctr"/>
+            <a:r>
+              <a:rPr lang="en-US" dirty="0">
+                <a:solidFill>
+                  <a:sysClr val="windowText" lastClr="000000"/>
+                </a:solidFill>
+              </a:rPr>
+              <a:t>object</a:t>
+            </a:r>
+          </a:p>
+        </p:txBody>
+      </p:sp>
+      <p:sp>
+        <p:nvSpPr>
+          <p:cNvPr id="55" name="Rectangle 54">
+            <a:extLst>
+              <a:ext uri="{FF2B5EF4-FFF2-40B4-BE49-F238E27FC236}">
+                <a16:creationId xmlns:a16="http://schemas.microsoft.com/office/drawing/2014/main" id="{E9F6A74B-AE29-9968-0D2D-26BC509AAFE5}"/>
+              </a:ext>
+            </a:extLst>
+          </p:cNvPr>
+          <p:cNvSpPr/>
+          <p:nvPr/>
+        </p:nvSpPr>
+        <p:spPr>
+          <a:xfrm>
+            <a:off x="10285027" y="4375231"/>
+            <a:ext cx="1068773" cy="335666"/>
+          </a:xfrm>
+          <a:prstGeom prst="rect">
+            <a:avLst/>
+          </a:prstGeom>
+          <a:noFill/>
+          <a:ln>
+            <a:noFill/>
+          </a:ln>
+        </p:spPr>
+        <p:style>
+          <a:lnRef idx="2">
+            <a:schemeClr val="accent1">
+              <a:shade val="15000"/>
+            </a:schemeClr>
+          </a:lnRef>
+          <a:fillRef idx="1">
+            <a:schemeClr val="accent1"/>
+          </a:fillRef>
+          <a:effectRef idx="0">
+            <a:schemeClr val="accent1"/>
+          </a:effectRef>
+          <a:fontRef idx="minor">
+            <a:schemeClr val="lt1"/>
+          </a:fontRef>
+        </p:style>
+        <p:txBody>
+          <a:bodyPr rtlCol="0" anchor="ctr"/>
+          <a:lstStyle/>
+          <a:p>
+            <a:pPr algn="ctr"/>
+            <a:r>
+              <a:rPr lang="en-US" dirty="0">
+                <a:solidFill>
+                  <a:sysClr val="windowText" lastClr="000000"/>
+                </a:solidFill>
+                <a:latin typeface="American Typewriter" panose="02090604020004020304" pitchFamily="18" charset="77"/>
+              </a:rPr>
+              <a:t>poly</a:t>
+            </a:r>
+          </a:p>
+        </p:txBody>
+      </p:sp>
+      <p:sp>
+        <p:nvSpPr>
+          <p:cNvPr id="56" name="Rectangle 55">
+            <a:extLst>
+              <a:ext uri="{FF2B5EF4-FFF2-40B4-BE49-F238E27FC236}">
+                <a16:creationId xmlns:a16="http://schemas.microsoft.com/office/drawing/2014/main" id="{384FB3F3-D105-27DE-B6DF-76E302A90BAB}"/>
+              </a:ext>
+            </a:extLst>
+          </p:cNvPr>
+          <p:cNvSpPr/>
+          <p:nvPr/>
+        </p:nvSpPr>
+        <p:spPr>
+          <a:xfrm>
+            <a:off x="8032696" y="4865742"/>
+            <a:ext cx="1254944" cy="335666"/>
+          </a:xfrm>
+          <a:prstGeom prst="rect">
+            <a:avLst/>
+          </a:prstGeom>
+          <a:noFill/>
+          <a:ln>
+            <a:noFill/>
+          </a:ln>
+        </p:spPr>
+        <p:style>
+          <a:lnRef idx="2">
+            <a:schemeClr val="accent1">
+              <a:shade val="15000"/>
+            </a:schemeClr>
+          </a:lnRef>
+          <a:fillRef idx="1">
+            <a:schemeClr val="accent1"/>
+          </a:fillRef>
+          <a:effectRef idx="0">
+            <a:schemeClr val="accent1"/>
+          </a:effectRef>
+          <a:fontRef idx="minor">
+            <a:schemeClr val="lt1"/>
+          </a:fontRef>
+        </p:style>
+        <p:txBody>
+          <a:bodyPr rtlCol="0" anchor="ctr"/>
+          <a:lstStyle/>
+          <a:p>
+            <a:pPr algn="ctr"/>
+            <a:r>
+              <a:rPr lang="en-US" dirty="0" err="1">
+                <a:solidFill>
+                  <a:schemeClr val="accent6">
+                    <a:lumMod val="75000"/>
+                  </a:schemeClr>
+                </a:solidFill>
+                <a:latin typeface="American Typewriter" panose="02090604020004020304" pitchFamily="18" charset="77"/>
+              </a:rPr>
+              <a:t>in_place</a:t>
+            </a:r>
+            <a:r>
+              <a:rPr lang="en-US" dirty="0">
+                <a:solidFill>
+                  <a:schemeClr val="accent6">
+                    <a:lumMod val="75000"/>
+                  </a:schemeClr>
+                </a:solidFill>
+              </a:rPr>
+              <a:t>?</a:t>
+            </a:r>
+          </a:p>
+        </p:txBody>
+      </p:sp>
+      <p:cxnSp>
+        <p:nvCxnSpPr>
+          <p:cNvPr id="58" name="Elbow Connector 57">
+            <a:extLst>
+              <a:ext uri="{FF2B5EF4-FFF2-40B4-BE49-F238E27FC236}">
+                <a16:creationId xmlns:a16="http://schemas.microsoft.com/office/drawing/2014/main" id="{CB160640-7D55-E889-FF2C-9E947D055F58}"/>
+              </a:ext>
+            </a:extLst>
+          </p:cNvPr>
+          <p:cNvCxnSpPr>
+            <a:stCxn id="39" idx="3"/>
+            <a:endCxn id="52" idx="1"/>
+          </p:cNvCxnSpPr>
+          <p:nvPr/>
+        </p:nvCxnSpPr>
+        <p:spPr>
+          <a:xfrm flipV="1">
+            <a:off x="7630632" y="4052553"/>
+            <a:ext cx="1183558" cy="981022"/>
+          </a:xfrm>
+          <a:prstGeom prst="bentConnector3">
+            <a:avLst>
+              <a:gd name="adj1" fmla="val 23948"/>
+            </a:avLst>
+          </a:prstGeom>
+          <a:ln>
+            <a:solidFill>
+              <a:schemeClr val="accent6">
+                <a:lumMod val="75000"/>
+              </a:schemeClr>
+            </a:solidFill>
+            <a:tailEnd type="triangle"/>
+          </a:ln>
+        </p:spPr>
+        <p:style>
+          <a:lnRef idx="2">
+            <a:schemeClr val="accent1"/>
+          </a:lnRef>
+          <a:fillRef idx="0">
+            <a:schemeClr val="accent1"/>
+          </a:fillRef>
+          <a:effectRef idx="1">
+            <a:schemeClr val="accent1"/>
+          </a:effectRef>
+          <a:fontRef idx="minor">
+            <a:schemeClr val="tx1"/>
+          </a:fontRef>
+        </p:style>
+      </p:cxnSp>
+      <p:sp>
+        <p:nvSpPr>
+          <p:cNvPr id="60" name="Rectangle 59">
+            <a:extLst>
+              <a:ext uri="{FF2B5EF4-FFF2-40B4-BE49-F238E27FC236}">
+                <a16:creationId xmlns:a16="http://schemas.microsoft.com/office/drawing/2014/main" id="{0F8E9D19-E8C5-99C9-064F-A92D7783459D}"/>
+              </a:ext>
+            </a:extLst>
+          </p:cNvPr>
+          <p:cNvSpPr/>
+          <p:nvPr/>
+        </p:nvSpPr>
+        <p:spPr>
+          <a:xfrm>
+            <a:off x="7949993" y="4060595"/>
+            <a:ext cx="781494" cy="335666"/>
+          </a:xfrm>
+          <a:prstGeom prst="rect">
+            <a:avLst/>
+          </a:prstGeom>
+          <a:noFill/>
+          <a:ln>
+            <a:noFill/>
+          </a:ln>
+        </p:spPr>
+        <p:style>
+          <a:lnRef idx="2">
+            <a:schemeClr val="accent1">
+              <a:shade val="15000"/>
+            </a:schemeClr>
+          </a:lnRef>
+          <a:fillRef idx="1">
+            <a:schemeClr val="accent1"/>
+          </a:fillRef>
+          <a:effectRef idx="0">
+            <a:schemeClr val="accent1"/>
+          </a:effectRef>
+          <a:fontRef idx="minor">
+            <a:schemeClr val="lt1"/>
+          </a:fontRef>
+        </p:style>
+        <p:txBody>
+          <a:bodyPr rtlCol="0" anchor="ctr"/>
+          <a:lstStyle/>
+          <a:p>
+            <a:pPr algn="ctr"/>
+            <a:r>
+              <a:rPr lang="en-US" dirty="0">
+                <a:solidFill>
+                  <a:sysClr val="windowText" lastClr="000000"/>
+                </a:solidFill>
+                <a:latin typeface="American Typewriter" panose="02090604020004020304" pitchFamily="18" charset="77"/>
+              </a:rPr>
+              <a:t>False</a:t>
+            </a:r>
+          </a:p>
+        </p:txBody>
+      </p:sp>
+      <p:cxnSp>
+        <p:nvCxnSpPr>
+          <p:cNvPr id="62" name="Elbow Connector 61">
+            <a:extLst>
+              <a:ext uri="{FF2B5EF4-FFF2-40B4-BE49-F238E27FC236}">
+                <a16:creationId xmlns:a16="http://schemas.microsoft.com/office/drawing/2014/main" id="{326EE48B-8553-34D7-207C-24D1CD275171}"/>
+              </a:ext>
+            </a:extLst>
+          </p:cNvPr>
+          <p:cNvCxnSpPr>
+            <a:stCxn id="39" idx="3"/>
+            <a:endCxn id="44" idx="1"/>
+          </p:cNvCxnSpPr>
+          <p:nvPr/>
+        </p:nvCxnSpPr>
+        <p:spPr>
+          <a:xfrm>
+            <a:off x="7630632" y="5033575"/>
+            <a:ext cx="1183559" cy="906648"/>
+          </a:xfrm>
+          <a:prstGeom prst="bentConnector3">
+            <a:avLst>
+              <a:gd name="adj1" fmla="val 23948"/>
+            </a:avLst>
+          </a:prstGeom>
+          <a:ln>
+            <a:solidFill>
+              <a:schemeClr val="accent6">
+                <a:lumMod val="75000"/>
+              </a:schemeClr>
+            </a:solidFill>
+            <a:tailEnd type="triangle"/>
+          </a:ln>
+        </p:spPr>
+        <p:style>
+          <a:lnRef idx="2">
+            <a:schemeClr val="accent1"/>
+          </a:lnRef>
+          <a:fillRef idx="0">
+            <a:schemeClr val="accent1"/>
+          </a:fillRef>
+          <a:effectRef idx="1">
+            <a:schemeClr val="accent1"/>
+          </a:effectRef>
+          <a:fontRef idx="minor">
+            <a:schemeClr val="tx1"/>
+          </a:fontRef>
+        </p:style>
+      </p:cxnSp>
+      <p:sp>
+        <p:nvSpPr>
+          <p:cNvPr id="65" name="Rectangle 64">
+            <a:extLst>
+              <a:ext uri="{FF2B5EF4-FFF2-40B4-BE49-F238E27FC236}">
+                <a16:creationId xmlns:a16="http://schemas.microsoft.com/office/drawing/2014/main" id="{735B66C2-1214-40ED-D40C-6FFF46C6C788}"/>
+              </a:ext>
+            </a:extLst>
+          </p:cNvPr>
+          <p:cNvSpPr/>
+          <p:nvPr/>
+        </p:nvSpPr>
+        <p:spPr>
+          <a:xfrm>
+            <a:off x="7949993" y="5598063"/>
+            <a:ext cx="781494" cy="335666"/>
+          </a:xfrm>
+          <a:prstGeom prst="rect">
+            <a:avLst/>
+          </a:prstGeom>
+          <a:noFill/>
+          <a:ln>
+            <a:noFill/>
+          </a:ln>
+        </p:spPr>
+        <p:style>
+          <a:lnRef idx="2">
+            <a:schemeClr val="accent1">
+              <a:shade val="15000"/>
+            </a:schemeClr>
+          </a:lnRef>
+          <a:fillRef idx="1">
+            <a:schemeClr val="accent1"/>
+          </a:fillRef>
+          <a:effectRef idx="0">
+            <a:schemeClr val="accent1"/>
+          </a:effectRef>
+          <a:fontRef idx="minor">
+            <a:schemeClr val="lt1"/>
+          </a:fontRef>
+        </p:style>
+        <p:txBody>
+          <a:bodyPr rtlCol="0" anchor="ctr"/>
+          <a:lstStyle/>
+          <a:p>
+            <a:pPr algn="ctr"/>
+            <a:r>
+              <a:rPr lang="en-US" dirty="0">
+                <a:solidFill>
+                  <a:sysClr val="windowText" lastClr="000000"/>
+                </a:solidFill>
+                <a:latin typeface="American Typewriter" panose="02090604020004020304" pitchFamily="18" charset="77"/>
+              </a:rPr>
+              <a:t>True</a:t>
+            </a:r>
+          </a:p>
+        </p:txBody>
+      </p:sp>
+      <p:cxnSp>
+        <p:nvCxnSpPr>
+          <p:cNvPr id="68" name="Elbow Connector 67">
+            <a:extLst>
+              <a:ext uri="{FF2B5EF4-FFF2-40B4-BE49-F238E27FC236}">
+                <a16:creationId xmlns:a16="http://schemas.microsoft.com/office/drawing/2014/main" id="{A06285C3-E2DD-78A2-324A-36B23C3923D1}"/>
+              </a:ext>
+            </a:extLst>
+          </p:cNvPr>
+          <p:cNvCxnSpPr>
+            <a:stCxn id="52" idx="0"/>
+            <a:endCxn id="17" idx="2"/>
+          </p:cNvCxnSpPr>
+          <p:nvPr/>
+        </p:nvCxnSpPr>
+        <p:spPr>
+          <a:xfrm rot="16200000" flipV="1">
+            <a:off x="7135064" y="1516362"/>
+            <a:ext cx="951950" cy="3475076"/>
+          </a:xfrm>
+          <a:prstGeom prst="bentConnector3">
+            <a:avLst/>
+          </a:prstGeom>
+          <a:ln>
+            <a:prstDash val="lgDash"/>
+            <a:tailEnd type="triangle"/>
+          </a:ln>
+        </p:spPr>
+        <p:style>
+          <a:lnRef idx="2">
+            <a:schemeClr val="accent1"/>
+          </a:lnRef>
+          <a:fillRef idx="0">
+            <a:schemeClr val="accent1"/>
+          </a:fillRef>
+          <a:effectRef idx="1">
+            <a:schemeClr val="accent1"/>
+          </a:effectRef>
+          <a:fontRef idx="minor">
+            <a:schemeClr val="tx1"/>
+          </a:fontRef>
+        </p:style>
+      </p:cxnSp>
+      <p:cxnSp>
+        <p:nvCxnSpPr>
+          <p:cNvPr id="70" name="Straight Arrow Connector 69">
+            <a:extLst>
+              <a:ext uri="{FF2B5EF4-FFF2-40B4-BE49-F238E27FC236}">
+                <a16:creationId xmlns:a16="http://schemas.microsoft.com/office/drawing/2014/main" id="{4892971B-8575-8709-D637-9D7F8DC59ACE}"/>
+              </a:ext>
+            </a:extLst>
+          </p:cNvPr>
+          <p:cNvCxnSpPr>
+            <a:stCxn id="52" idx="3"/>
+            <a:endCxn id="54" idx="1"/>
+          </p:cNvCxnSpPr>
+          <p:nvPr/>
+        </p:nvCxnSpPr>
+        <p:spPr>
+          <a:xfrm>
+            <a:off x="9882963" y="4052553"/>
+            <a:ext cx="402064" cy="0"/>
+          </a:xfrm>
+          <a:prstGeom prst="straightConnector1">
+            <a:avLst/>
+          </a:prstGeom>
+          <a:ln>
+            <a:solidFill>
+              <a:schemeClr val="tx1"/>
+            </a:solidFill>
+            <a:tailEnd type="triangle"/>
+          </a:ln>
+        </p:spPr>
+        <p:style>
+          <a:lnRef idx="2">
+            <a:schemeClr val="accent1"/>
+          </a:lnRef>
+          <a:fillRef idx="0">
+            <a:schemeClr val="accent1"/>
+          </a:fillRef>
+          <a:effectRef idx="1">
+            <a:schemeClr val="accent1"/>
+          </a:effectRef>
+          <a:fontRef idx="minor">
+            <a:schemeClr val="tx1"/>
+          </a:fontRef>
+        </p:style>
+      </p:cxnSp>
+      <p:cxnSp>
+        <p:nvCxnSpPr>
+          <p:cNvPr id="71" name="Straight Arrow Connector 70">
+            <a:extLst>
+              <a:ext uri="{FF2B5EF4-FFF2-40B4-BE49-F238E27FC236}">
+                <a16:creationId xmlns:a16="http://schemas.microsoft.com/office/drawing/2014/main" id="{1E5CE429-681C-5DAF-8D0B-65C0F4417D49}"/>
+              </a:ext>
+            </a:extLst>
+          </p:cNvPr>
+          <p:cNvCxnSpPr>
+            <a:cxnSpLocks/>
+            <a:stCxn id="44" idx="3"/>
+            <a:endCxn id="48" idx="1"/>
+          </p:cNvCxnSpPr>
+          <p:nvPr/>
+        </p:nvCxnSpPr>
+        <p:spPr>
+          <a:xfrm>
+            <a:off x="10379149" y="5940223"/>
+            <a:ext cx="402063" cy="0"/>
+          </a:xfrm>
+          <a:prstGeom prst="straightConnector1">
+            <a:avLst/>
+          </a:prstGeom>
+          <a:ln>
+            <a:solidFill>
+              <a:schemeClr val="tx1"/>
+            </a:solidFill>
+            <a:tailEnd type="triangle"/>
+          </a:ln>
+        </p:spPr>
+        <p:style>
+          <a:lnRef idx="2">
+            <a:schemeClr val="accent1"/>
+          </a:lnRef>
+          <a:fillRef idx="0">
+            <a:schemeClr val="accent1"/>
+          </a:fillRef>
+          <a:effectRef idx="1">
+            <a:schemeClr val="accent1"/>
+          </a:effectRef>
+          <a:fontRef idx="minor">
+            <a:schemeClr val="tx1"/>
+          </a:fontRef>
+        </p:style>
+      </p:cxnSp>
+      <p:cxnSp>
+        <p:nvCxnSpPr>
+          <p:cNvPr id="74" name="Straight Arrow Connector 73">
+            <a:extLst>
+              <a:ext uri="{FF2B5EF4-FFF2-40B4-BE49-F238E27FC236}">
+                <a16:creationId xmlns:a16="http://schemas.microsoft.com/office/drawing/2014/main" id="{81A6DDD5-A169-0B9B-6346-2A49968A14B0}"/>
+              </a:ext>
+            </a:extLst>
+          </p:cNvPr>
+          <p:cNvCxnSpPr>
+            <a:cxnSpLocks/>
+            <a:stCxn id="35" idx="3"/>
+            <a:endCxn id="39" idx="1"/>
+          </p:cNvCxnSpPr>
+          <p:nvPr/>
+        </p:nvCxnSpPr>
+        <p:spPr>
+          <a:xfrm>
+            <a:off x="6159795" y="5033575"/>
+            <a:ext cx="402064" cy="0"/>
+          </a:xfrm>
+          <a:prstGeom prst="straightConnector1">
+            <a:avLst/>
+          </a:prstGeom>
+          <a:ln>
+            <a:solidFill>
+              <a:schemeClr val="tx1"/>
+            </a:solidFill>
+            <a:tailEnd type="triangle"/>
+          </a:ln>
+        </p:spPr>
+        <p:style>
+          <a:lnRef idx="2">
+            <a:schemeClr val="accent1"/>
+          </a:lnRef>
+          <a:fillRef idx="0">
+            <a:schemeClr val="accent1"/>
+          </a:fillRef>
+          <a:effectRef idx="1">
+            <a:schemeClr val="accent1"/>
+          </a:effectRef>
+          <a:fontRef idx="minor">
+            <a:schemeClr val="tx1"/>
+          </a:fontRef>
+        </p:style>
+      </p:cxnSp>
+      <p:cxnSp>
+        <p:nvCxnSpPr>
+          <p:cNvPr id="77" name="Straight Arrow Connector 76">
+            <a:extLst>
+              <a:ext uri="{FF2B5EF4-FFF2-40B4-BE49-F238E27FC236}">
+                <a16:creationId xmlns:a16="http://schemas.microsoft.com/office/drawing/2014/main" id="{D4CDD7AC-D61F-D8DC-2421-10C60C045D22}"/>
+              </a:ext>
+            </a:extLst>
+          </p:cNvPr>
+          <p:cNvCxnSpPr>
+            <a:cxnSpLocks/>
+            <a:stCxn id="30" idx="3"/>
+            <a:endCxn id="35" idx="1"/>
+          </p:cNvCxnSpPr>
+          <p:nvPr/>
+        </p:nvCxnSpPr>
+        <p:spPr>
+          <a:xfrm>
+            <a:off x="4334539" y="5033575"/>
+            <a:ext cx="402064" cy="0"/>
+          </a:xfrm>
+          <a:prstGeom prst="straightConnector1">
+            <a:avLst/>
+          </a:prstGeom>
+          <a:ln>
+            <a:solidFill>
+              <a:schemeClr val="tx1"/>
+            </a:solidFill>
+            <a:tailEnd type="triangle"/>
+          </a:ln>
+        </p:spPr>
+        <p:style>
+          <a:lnRef idx="2">
+            <a:schemeClr val="accent1"/>
+          </a:lnRef>
+          <a:fillRef idx="0">
+            <a:schemeClr val="accent1"/>
+          </a:fillRef>
+          <a:effectRef idx="1">
+            <a:schemeClr val="accent1"/>
+          </a:effectRef>
+          <a:fontRef idx="minor">
+            <a:schemeClr val="tx1"/>
+          </a:fontRef>
+        </p:style>
+      </p:cxnSp>
+      <p:cxnSp>
+        <p:nvCxnSpPr>
+          <p:cNvPr id="80" name="Straight Arrow Connector 79">
+            <a:extLst>
+              <a:ext uri="{FF2B5EF4-FFF2-40B4-BE49-F238E27FC236}">
+                <a16:creationId xmlns:a16="http://schemas.microsoft.com/office/drawing/2014/main" id="{03F03A83-73D1-E740-D3CF-AA7DD0BB29DD}"/>
+              </a:ext>
+            </a:extLst>
+          </p:cNvPr>
+          <p:cNvCxnSpPr>
+            <a:cxnSpLocks/>
+            <a:stCxn id="28" idx="3"/>
+            <a:endCxn id="30" idx="1"/>
+          </p:cNvCxnSpPr>
+          <p:nvPr/>
+        </p:nvCxnSpPr>
+        <p:spPr>
+          <a:xfrm>
+            <a:off x="2863702" y="5033575"/>
+            <a:ext cx="402064" cy="0"/>
+          </a:xfrm>
+          <a:prstGeom prst="straightConnector1">
+            <a:avLst/>
+          </a:prstGeom>
+          <a:ln>
+            <a:solidFill>
+              <a:schemeClr val="tx1"/>
+            </a:solidFill>
+            <a:tailEnd type="triangle"/>
+          </a:ln>
+        </p:spPr>
+        <p:style>
+          <a:lnRef idx="2">
+            <a:schemeClr val="accent1"/>
+          </a:lnRef>
+          <a:fillRef idx="0">
+            <a:schemeClr val="accent1"/>
+          </a:fillRef>
+          <a:effectRef idx="1">
+            <a:schemeClr val="accent1"/>
+          </a:effectRef>
+          <a:fontRef idx="minor">
+            <a:schemeClr val="tx1"/>
+          </a:fontRef>
+        </p:style>
+      </p:cxnSp>
+      <p:cxnSp>
+        <p:nvCxnSpPr>
+          <p:cNvPr id="83" name="Straight Arrow Connector 82">
+            <a:extLst>
+              <a:ext uri="{FF2B5EF4-FFF2-40B4-BE49-F238E27FC236}">
+                <a16:creationId xmlns:a16="http://schemas.microsoft.com/office/drawing/2014/main" id="{9AA9BD13-A229-C27F-1A07-2C1E88FE0314}"/>
+              </a:ext>
+            </a:extLst>
+          </p:cNvPr>
+          <p:cNvCxnSpPr>
+            <a:cxnSpLocks/>
+            <a:stCxn id="26" idx="3"/>
+            <a:endCxn id="28" idx="1"/>
+          </p:cNvCxnSpPr>
+          <p:nvPr/>
+        </p:nvCxnSpPr>
+        <p:spPr>
+          <a:xfrm>
+            <a:off x="1392865" y="5033575"/>
+            <a:ext cx="402064" cy="0"/>
+          </a:xfrm>
+          <a:prstGeom prst="straightConnector1">
+            <a:avLst/>
+          </a:prstGeom>
+          <a:ln>
+            <a:solidFill>
+              <a:schemeClr val="tx1"/>
+            </a:solidFill>
+            <a:tailEnd type="triangle"/>
+          </a:ln>
+        </p:spPr>
+        <p:style>
+          <a:lnRef idx="2">
+            <a:schemeClr val="accent1"/>
+          </a:lnRef>
+          <a:fillRef idx="0">
+            <a:schemeClr val="accent1"/>
+          </a:fillRef>
+          <a:effectRef idx="1">
+            <a:schemeClr val="accent1"/>
+          </a:effectRef>
+          <a:fontRef idx="minor">
+            <a:schemeClr val="tx1"/>
+          </a:fontRef>
+        </p:style>
+      </p:cxnSp>
+      <p:cxnSp>
+        <p:nvCxnSpPr>
+          <p:cNvPr id="86" name="Straight Arrow Connector 85">
+            <a:extLst>
+              <a:ext uri="{FF2B5EF4-FFF2-40B4-BE49-F238E27FC236}">
+                <a16:creationId xmlns:a16="http://schemas.microsoft.com/office/drawing/2014/main" id="{8C50D640-4CCD-044B-77C9-FB954D198064}"/>
+              </a:ext>
+            </a:extLst>
+          </p:cNvPr>
+          <p:cNvCxnSpPr>
+            <a:cxnSpLocks/>
+            <a:stCxn id="7" idx="3"/>
+            <a:endCxn id="12" idx="1"/>
+          </p:cNvCxnSpPr>
+          <p:nvPr/>
+        </p:nvCxnSpPr>
+        <p:spPr>
+          <a:xfrm>
+            <a:off x="1392865" y="2119581"/>
+            <a:ext cx="402064" cy="0"/>
+          </a:xfrm>
+          <a:prstGeom prst="straightConnector1">
+            <a:avLst/>
+          </a:prstGeom>
+          <a:ln>
+            <a:solidFill>
+              <a:schemeClr val="tx1"/>
+            </a:solidFill>
+            <a:tailEnd type="triangle"/>
+          </a:ln>
+        </p:spPr>
+        <p:style>
+          <a:lnRef idx="2">
+            <a:schemeClr val="accent1"/>
+          </a:lnRef>
+          <a:fillRef idx="0">
+            <a:schemeClr val="accent1"/>
+          </a:fillRef>
+          <a:effectRef idx="1">
+            <a:schemeClr val="accent1"/>
+          </a:effectRef>
+          <a:fontRef idx="minor">
+            <a:schemeClr val="tx1"/>
+          </a:fontRef>
+        </p:style>
+      </p:cxnSp>
+      <p:cxnSp>
+        <p:nvCxnSpPr>
+          <p:cNvPr id="89" name="Straight Arrow Connector 88">
+            <a:extLst>
+              <a:ext uri="{FF2B5EF4-FFF2-40B4-BE49-F238E27FC236}">
+                <a16:creationId xmlns:a16="http://schemas.microsoft.com/office/drawing/2014/main" id="{193FDCDF-0D29-D243-5523-E239FB9A90FB}"/>
+              </a:ext>
+            </a:extLst>
+          </p:cNvPr>
+          <p:cNvCxnSpPr>
+            <a:cxnSpLocks/>
+            <a:stCxn id="12" idx="3"/>
+            <a:endCxn id="14" idx="1"/>
+          </p:cNvCxnSpPr>
+          <p:nvPr/>
+        </p:nvCxnSpPr>
+        <p:spPr>
+          <a:xfrm>
+            <a:off x="2863702" y="2119581"/>
+            <a:ext cx="402064" cy="0"/>
+          </a:xfrm>
+          <a:prstGeom prst="straightConnector1">
+            <a:avLst/>
+          </a:prstGeom>
+          <a:ln>
+            <a:solidFill>
+              <a:schemeClr val="tx1"/>
+            </a:solidFill>
+            <a:tailEnd type="triangle"/>
+          </a:ln>
+        </p:spPr>
+        <p:style>
+          <a:lnRef idx="2">
+            <a:schemeClr val="accent1"/>
+          </a:lnRef>
+          <a:fillRef idx="0">
+            <a:schemeClr val="accent1"/>
+          </a:fillRef>
+          <a:effectRef idx="1">
+            <a:schemeClr val="accent1"/>
+          </a:effectRef>
+          <a:fontRef idx="minor">
+            <a:schemeClr val="tx1"/>
+          </a:fontRef>
+        </p:style>
+      </p:cxnSp>
+      <p:cxnSp>
+        <p:nvCxnSpPr>
+          <p:cNvPr id="92" name="Straight Arrow Connector 91">
+            <a:extLst>
+              <a:ext uri="{FF2B5EF4-FFF2-40B4-BE49-F238E27FC236}">
+                <a16:creationId xmlns:a16="http://schemas.microsoft.com/office/drawing/2014/main" id="{AC906DF5-25D2-4741-1F9E-1C7210074890}"/>
+              </a:ext>
+            </a:extLst>
+          </p:cNvPr>
+          <p:cNvCxnSpPr>
+            <a:cxnSpLocks/>
+            <a:stCxn id="14" idx="3"/>
+            <a:endCxn id="16" idx="1"/>
+          </p:cNvCxnSpPr>
+          <p:nvPr/>
+        </p:nvCxnSpPr>
+        <p:spPr>
+          <a:xfrm>
+            <a:off x="4688958" y="2119581"/>
+            <a:ext cx="402064" cy="0"/>
+          </a:xfrm>
+          <a:prstGeom prst="straightConnector1">
+            <a:avLst/>
+          </a:prstGeom>
+          <a:ln>
+            <a:solidFill>
+              <a:schemeClr val="tx1"/>
+            </a:solidFill>
+            <a:tailEnd type="triangle"/>
+          </a:ln>
+        </p:spPr>
+        <p:style>
+          <a:lnRef idx="2">
+            <a:schemeClr val="accent1"/>
+          </a:lnRef>
+          <a:fillRef idx="0">
+            <a:schemeClr val="accent1"/>
+          </a:fillRef>
+          <a:effectRef idx="1">
+            <a:schemeClr val="accent1"/>
+          </a:effectRef>
+          <a:fontRef idx="minor">
+            <a:schemeClr val="tx1"/>
+          </a:fontRef>
+        </p:style>
+      </p:cxnSp>
+      <p:cxnSp>
+        <p:nvCxnSpPr>
+          <p:cNvPr id="95" name="Straight Arrow Connector 94">
+            <a:extLst>
+              <a:ext uri="{FF2B5EF4-FFF2-40B4-BE49-F238E27FC236}">
+                <a16:creationId xmlns:a16="http://schemas.microsoft.com/office/drawing/2014/main" id="{53A879BC-5171-3628-05E5-155C343318DA}"/>
+              </a:ext>
+            </a:extLst>
+          </p:cNvPr>
+          <p:cNvCxnSpPr>
+            <a:cxnSpLocks/>
+            <a:stCxn id="16" idx="3"/>
+            <a:endCxn id="22" idx="1"/>
+          </p:cNvCxnSpPr>
+          <p:nvPr/>
+        </p:nvCxnSpPr>
+        <p:spPr>
+          <a:xfrm>
+            <a:off x="6655980" y="2119581"/>
+            <a:ext cx="402063" cy="6461"/>
+          </a:xfrm>
+          <a:prstGeom prst="straightConnector1">
+            <a:avLst/>
+          </a:prstGeom>
+          <a:ln>
+            <a:solidFill>
+              <a:schemeClr val="tx1"/>
+            </a:solidFill>
+            <a:tailEnd type="triangle"/>
+          </a:ln>
+        </p:spPr>
+        <p:style>
+          <a:lnRef idx="2">
+            <a:schemeClr val="accent1"/>
+          </a:lnRef>
+          <a:fillRef idx="0">
+            <a:schemeClr val="accent1"/>
+          </a:fillRef>
+          <a:effectRef idx="1">
+            <a:schemeClr val="accent1"/>
+          </a:effectRef>
+          <a:fontRef idx="minor">
+            <a:schemeClr val="tx1"/>
+          </a:fontRef>
+        </p:style>
+      </p:cxnSp>
+      <p:sp>
+        <p:nvSpPr>
+          <p:cNvPr id="98" name="Rectangle 97">
+            <a:extLst>
+              <a:ext uri="{FF2B5EF4-FFF2-40B4-BE49-F238E27FC236}">
+                <a16:creationId xmlns:a16="http://schemas.microsoft.com/office/drawing/2014/main" id="{0F9B3F62-D90F-03BB-3091-4FEC24DD5285}"/>
+              </a:ext>
+            </a:extLst>
+          </p:cNvPr>
+          <p:cNvSpPr/>
+          <p:nvPr/>
+        </p:nvSpPr>
+        <p:spPr>
+          <a:xfrm>
+            <a:off x="9522963" y="937283"/>
+            <a:ext cx="360000" cy="360000"/>
+          </a:xfrm>
+          <a:prstGeom prst="rect">
+            <a:avLst/>
+          </a:prstGeom>
+          <a:solidFill>
+            <a:schemeClr val="accent1"/>
+          </a:solidFill>
+          <a:ln>
+            <a:noFill/>
+          </a:ln>
+        </p:spPr>
+        <p:style>
+          <a:lnRef idx="0">
+            <a:scrgbClr r="0" g="0" b="0"/>
+          </a:lnRef>
+          <a:fillRef idx="0">
+            <a:scrgbClr r="0" g="0" b="0"/>
+          </a:fillRef>
+          <a:effectRef idx="0">
+            <a:scrgbClr r="0" g="0" b="0"/>
+          </a:effectRef>
+          <a:fontRef idx="minor">
+            <a:schemeClr val="lt1"/>
+          </a:fontRef>
+        </p:style>
+        <p:txBody>
+          <a:bodyPr rtlCol="0" anchor="ctr"/>
+          <a:lstStyle/>
+          <a:p>
+            <a:pPr algn="ctr"/>
+            <a:endParaRPr lang="en-US" dirty="0"/>
+          </a:p>
+        </p:txBody>
+      </p:sp>
+      <p:sp>
+        <p:nvSpPr>
+          <p:cNvPr id="99" name="TextBox 98">
+            <a:extLst>
+              <a:ext uri="{FF2B5EF4-FFF2-40B4-BE49-F238E27FC236}">
+                <a16:creationId xmlns:a16="http://schemas.microsoft.com/office/drawing/2014/main" id="{0C72E31E-455A-FBD2-4BBA-4CF107DEF489}"/>
+              </a:ext>
+            </a:extLst>
+          </p:cNvPr>
+          <p:cNvSpPr txBox="1"/>
+          <p:nvPr/>
+        </p:nvSpPr>
+        <p:spPr>
+          <a:xfrm>
+            <a:off x="9931074" y="917776"/>
+            <a:ext cx="882036" cy="369332"/>
+          </a:xfrm>
+          <a:prstGeom prst="rect">
+            <a:avLst/>
+          </a:prstGeom>
+          <a:noFill/>
+        </p:spPr>
+        <p:txBody>
+          <a:bodyPr wrap="none" rtlCol="0">
+            <a:spAutoFit/>
+          </a:bodyPr>
+          <a:lstStyle/>
+          <a:p>
+            <a:r>
+              <a:rPr lang="en-US" dirty="0">
+                <a:solidFill>
+                  <a:sysClr val="windowText" lastClr="000000"/>
+                </a:solidFill>
+              </a:rPr>
+              <a:t>reduce</a:t>
+            </a:r>
+            <a:endParaRPr lang="en-US" dirty="0"/>
+          </a:p>
+        </p:txBody>
+      </p:sp>
+    </p:spTree>
+    <p:extLst>
+      <p:ext uri="{BB962C8B-B14F-4D97-AF65-F5344CB8AC3E}">
+        <p14:creationId xmlns:p14="http://schemas.microsoft.com/office/powerpoint/2010/main" val="256577611"/>
       </p:ext>
     </p:extLst>
   </p:cSld>

</xml_diff>

<commit_message>
Added a comment about using `scipy.optimize.minimize`, which is not actually feasible for this problem
</commit_message>
<xml_diff>
--- a/presentation.pptx
+++ b/presentation.pptx
@@ -20,6 +20,7 @@
     <p:sldId id="267" r:id="rId14"/>
     <p:sldId id="268" r:id="rId15"/>
     <p:sldId id="270" r:id="rId16"/>
+    <p:sldId id="271" r:id="rId17"/>
   </p:sldIdLst>
   <p:sldSz cx="12192000" cy="6858000"/>
   <p:notesSz cx="6858000" cy="9144000"/>
@@ -129,7 +130,7 @@
 <file path=ppt/revisionInfo.xml><?xml version="1.0" encoding="utf-8"?>
 <p1510:revInfo xmlns:a="http://schemas.openxmlformats.org/drawingml/2006/main" xmlns:r="http://schemas.openxmlformats.org/officeDocument/2006/relationships" xmlns:p1510="http://schemas.microsoft.com/office/powerpoint/2015/10/main">
   <p1510:revLst>
-    <p1510:client id="{92BFB444-7DBC-CA44-A6DD-A4B3F7DBDADB}" v="133" dt="2026-01-20T15:22:39.843"/>
+    <p1510:client id="{92BFB444-7DBC-CA44-A6DD-A4B3F7DBDADB}" v="159" dt="2026-01-22T20:49:06.497"/>
   </p1510:revLst>
 </p1510:revInfo>
 </file>
@@ -139,7 +140,7 @@
   <pc:docChgLst>
     <pc:chgData name="Bart Wolleswinkel" userId="b168cadc-1825-41ce-b9cc-7c7f06f6f31d" providerId="ADAL" clId="{22248CC1-9068-5BCB-B15B-4353FE48F57D}"/>
     <pc:docChg chg="undo custSel addSld modSld">
-      <pc:chgData name="Bart Wolleswinkel" userId="b168cadc-1825-41ce-b9cc-7c7f06f6f31d" providerId="ADAL" clId="{22248CC1-9068-5BCB-B15B-4353FE48F57D}" dt="2026-01-20T15:24:20.557" v="631" actId="20577"/>
+      <pc:chgData name="Bart Wolleswinkel" userId="b168cadc-1825-41ce-b9cc-7c7f06f6f31d" providerId="ADAL" clId="{22248CC1-9068-5BCB-B15B-4353FE48F57D}" dt="2026-01-22T20:52:25.773" v="1096" actId="14100"/>
       <pc:docMkLst>
         <pc:docMk/>
       </pc:docMkLst>
@@ -187,28 +188,12 @@
           <pc:docMk/>
           <pc:sldMk cId="256577611" sldId="270"/>
         </pc:sldMkLst>
-        <pc:spChg chg="del">
-          <ac:chgData name="Bart Wolleswinkel" userId="b168cadc-1825-41ce-b9cc-7c7f06f6f31d" providerId="ADAL" clId="{22248CC1-9068-5BCB-B15B-4353FE48F57D}" dt="2026-01-20T14:55:31.202" v="13" actId="478"/>
-          <ac:spMkLst>
-            <pc:docMk/>
-            <pc:sldMk cId="256577611" sldId="270"/>
-            <ac:spMk id="2" creationId="{A9F52DD2-6334-029F-6513-EA3773107D84}"/>
-          </ac:spMkLst>
-        </pc:spChg>
         <pc:spChg chg="add mod">
           <ac:chgData name="Bart Wolleswinkel" userId="b168cadc-1825-41ce-b9cc-7c7f06f6f31d" providerId="ADAL" clId="{22248CC1-9068-5BCB-B15B-4353FE48F57D}" dt="2026-01-20T15:09:41.260" v="404" actId="14100"/>
           <ac:spMkLst>
             <pc:docMk/>
             <pc:sldMk cId="256577611" sldId="270"/>
             <ac:spMk id="4" creationId="{917348C7-57B9-4E99-AD65-F46BFABB7BDC}"/>
-          </ac:spMkLst>
-        </pc:spChg>
-        <pc:spChg chg="add del mod">
-          <ac:chgData name="Bart Wolleswinkel" userId="b168cadc-1825-41ce-b9cc-7c7f06f6f31d" providerId="ADAL" clId="{22248CC1-9068-5BCB-B15B-4353FE48F57D}" dt="2026-01-20T14:55:49.539" v="29" actId="478"/>
-          <ac:spMkLst>
-            <pc:docMk/>
-            <pc:sldMk cId="256577611" sldId="270"/>
-            <ac:spMk id="6" creationId="{730E3CF9-3180-2298-83B0-D5D46ECE4695}"/>
           </ac:spMkLst>
         </pc:spChg>
         <pc:spChg chg="add mod">
@@ -225,30 +210,6 @@
             <pc:docMk/>
             <pc:sldMk cId="256577611" sldId="270"/>
             <ac:spMk id="8" creationId="{0EA53377-0336-69D4-4C28-8C6B9D672000}"/>
-          </ac:spMkLst>
-        </pc:spChg>
-        <pc:spChg chg="del">
-          <ac:chgData name="Bart Wolleswinkel" userId="b168cadc-1825-41ce-b9cc-7c7f06f6f31d" providerId="ADAL" clId="{22248CC1-9068-5BCB-B15B-4353FE48F57D}" dt="2026-01-20T14:55:31.202" v="13" actId="478"/>
-          <ac:spMkLst>
-            <pc:docMk/>
-            <pc:sldMk cId="256577611" sldId="270"/>
-            <ac:spMk id="9" creationId="{7A081515-89B3-FCA1-F4A9-DB25F489E799}"/>
-          </ac:spMkLst>
-        </pc:spChg>
-        <pc:spChg chg="add del mod">
-          <ac:chgData name="Bart Wolleswinkel" userId="b168cadc-1825-41ce-b9cc-7c7f06f6f31d" providerId="ADAL" clId="{22248CC1-9068-5BCB-B15B-4353FE48F57D}" dt="2026-01-20T14:57:10.416" v="61" actId="478"/>
-          <ac:spMkLst>
-            <pc:docMk/>
-            <pc:sldMk cId="256577611" sldId="270"/>
-            <ac:spMk id="10" creationId="{021DBA5B-5305-F8CE-1A3D-933BA197751A}"/>
-          </ac:spMkLst>
-        </pc:spChg>
-        <pc:spChg chg="add del mod">
-          <ac:chgData name="Bart Wolleswinkel" userId="b168cadc-1825-41ce-b9cc-7c7f06f6f31d" providerId="ADAL" clId="{22248CC1-9068-5BCB-B15B-4353FE48F57D}" dt="2026-01-20T14:57:10.416" v="61" actId="478"/>
-          <ac:spMkLst>
-            <pc:docMk/>
-            <pc:sldMk cId="256577611" sldId="270"/>
-            <ac:spMk id="11" creationId="{1AF747A6-08DB-7564-C36F-31BFCBEA4CFD}"/>
           </ac:spMkLst>
         </pc:spChg>
         <pc:spChg chg="add mod">
@@ -299,36 +260,12 @@
             <ac:spMk id="17" creationId="{2396B369-61AE-2B9B-4AEE-595ADDD9EE00}"/>
           </ac:spMkLst>
         </pc:spChg>
-        <pc:spChg chg="add del mod">
-          <ac:chgData name="Bart Wolleswinkel" userId="b168cadc-1825-41ce-b9cc-7c7f06f6f31d" providerId="ADAL" clId="{22248CC1-9068-5BCB-B15B-4353FE48F57D}" dt="2026-01-20T14:59:17.049" v="142" actId="478"/>
-          <ac:spMkLst>
-            <pc:docMk/>
-            <pc:sldMk cId="256577611" sldId="270"/>
-            <ac:spMk id="18" creationId="{687E1A7D-D4F7-9FFD-2BF3-C9CF626286C2}"/>
-          </ac:spMkLst>
-        </pc:spChg>
-        <pc:spChg chg="add del mod">
-          <ac:chgData name="Bart Wolleswinkel" userId="b168cadc-1825-41ce-b9cc-7c7f06f6f31d" providerId="ADAL" clId="{22248CC1-9068-5BCB-B15B-4353FE48F57D}" dt="2026-01-20T15:00:12.021" v="191" actId="478"/>
-          <ac:spMkLst>
-            <pc:docMk/>
-            <pc:sldMk cId="256577611" sldId="270"/>
-            <ac:spMk id="19" creationId="{AD0D2F7C-5F75-D862-66E0-4527A320ABB4}"/>
-          </ac:spMkLst>
-        </pc:spChg>
         <pc:spChg chg="add mod">
           <ac:chgData name="Bart Wolleswinkel" userId="b168cadc-1825-41ce-b9cc-7c7f06f6f31d" providerId="ADAL" clId="{22248CC1-9068-5BCB-B15B-4353FE48F57D}" dt="2026-01-20T14:59:51.801" v="182" actId="20577"/>
           <ac:spMkLst>
             <pc:docMk/>
             <pc:sldMk cId="256577611" sldId="270"/>
             <ac:spMk id="20" creationId="{9C50A6D5-D08A-0CA2-4FF2-55A38401369A}"/>
-          </ac:spMkLst>
-        </pc:spChg>
-        <pc:spChg chg="add del mod">
-          <ac:chgData name="Bart Wolleswinkel" userId="b168cadc-1825-41ce-b9cc-7c7f06f6f31d" providerId="ADAL" clId="{22248CC1-9068-5BCB-B15B-4353FE48F57D}" dt="2026-01-20T15:00:05.448" v="186" actId="478"/>
-          <ac:spMkLst>
-            <pc:docMk/>
-            <pc:sldMk cId="256577611" sldId="270"/>
-            <ac:spMk id="21" creationId="{09A1D75A-D481-2C49-6C9F-60CA9B03EF27}"/>
           </ac:spMkLst>
         </pc:spChg>
         <pc:spChg chg="add mod">
@@ -345,22 +282,6 @@
             <pc:docMk/>
             <pc:sldMk cId="256577611" sldId="270"/>
             <ac:spMk id="23" creationId="{85F70CB0-92B9-9A17-A77D-C0CCAECAF960}"/>
-          </ac:spMkLst>
-        </pc:spChg>
-        <pc:spChg chg="add del mod">
-          <ac:chgData name="Bart Wolleswinkel" userId="b168cadc-1825-41ce-b9cc-7c7f06f6f31d" providerId="ADAL" clId="{22248CC1-9068-5BCB-B15B-4353FE48F57D}" dt="2026-01-20T15:01:19.751" v="227" actId="478"/>
-          <ac:spMkLst>
-            <pc:docMk/>
-            <pc:sldMk cId="256577611" sldId="270"/>
-            <ac:spMk id="24" creationId="{2817BA75-DE74-5DB9-DF3B-9D97ED4E2509}"/>
-          </ac:spMkLst>
-        </pc:spChg>
-        <pc:spChg chg="add del mod">
-          <ac:chgData name="Bart Wolleswinkel" userId="b168cadc-1825-41ce-b9cc-7c7f06f6f31d" providerId="ADAL" clId="{22248CC1-9068-5BCB-B15B-4353FE48F57D}" dt="2026-01-20T15:01:19.751" v="227" actId="478"/>
-          <ac:spMkLst>
-            <pc:docMk/>
-            <pc:sldMk cId="256577611" sldId="270"/>
-            <ac:spMk id="25" creationId="{D648A48A-D70D-9EC3-60BA-874B51056275}"/>
           </ac:spMkLst>
         </pc:spChg>
         <pc:spChg chg="add mod">
@@ -411,30 +332,6 @@
             <ac:spMk id="31" creationId="{0EF05441-0683-728E-4A34-EF5A24137268}"/>
           </ac:spMkLst>
         </pc:spChg>
-        <pc:spChg chg="add del mod">
-          <ac:chgData name="Bart Wolleswinkel" userId="b168cadc-1825-41ce-b9cc-7c7f06f6f31d" providerId="ADAL" clId="{22248CC1-9068-5BCB-B15B-4353FE48F57D}" dt="2026-01-20T15:07:49.412" v="330" actId="478"/>
-          <ac:spMkLst>
-            <pc:docMk/>
-            <pc:sldMk cId="256577611" sldId="270"/>
-            <ac:spMk id="32" creationId="{FAEA34A4-B51B-B671-B2B0-BFB3E0E43680}"/>
-          </ac:spMkLst>
-        </pc:spChg>
-        <pc:spChg chg="add del mod">
-          <ac:chgData name="Bart Wolleswinkel" userId="b168cadc-1825-41ce-b9cc-7c7f06f6f31d" providerId="ADAL" clId="{22248CC1-9068-5BCB-B15B-4353FE48F57D}" dt="2026-01-20T15:07:49.412" v="330" actId="478"/>
-          <ac:spMkLst>
-            <pc:docMk/>
-            <pc:sldMk cId="256577611" sldId="270"/>
-            <ac:spMk id="33" creationId="{89388601-4361-F62E-8E4D-BF3314E48798}"/>
-          </ac:spMkLst>
-        </pc:spChg>
-        <pc:spChg chg="add mod">
-          <ac:chgData name="Bart Wolleswinkel" userId="b168cadc-1825-41ce-b9cc-7c7f06f6f31d" providerId="ADAL" clId="{22248CC1-9068-5BCB-B15B-4353FE48F57D}" dt="2026-01-20T15:07:46.198" v="329"/>
-          <ac:spMkLst>
-            <pc:docMk/>
-            <pc:sldMk cId="256577611" sldId="270"/>
-            <ac:spMk id="34" creationId="{3137E343-9A00-068D-D906-B5FFA93FCB9A}"/>
-          </ac:spMkLst>
-        </pc:spChg>
         <pc:spChg chg="add mod">
           <ac:chgData name="Bart Wolleswinkel" userId="b168cadc-1825-41ce-b9cc-7c7f06f6f31d" providerId="ADAL" clId="{22248CC1-9068-5BCB-B15B-4353FE48F57D}" dt="2026-01-20T15:08:09.192" v="348" actId="20577"/>
           <ac:spMkLst>
@@ -449,22 +346,6 @@
             <pc:docMk/>
             <pc:sldMk cId="256577611" sldId="270"/>
             <ac:spMk id="36" creationId="{46024753-7B1C-9892-881D-6D08FB44A10F}"/>
-          </ac:spMkLst>
-        </pc:spChg>
-        <pc:spChg chg="add del mod">
-          <ac:chgData name="Bart Wolleswinkel" userId="b168cadc-1825-41ce-b9cc-7c7f06f6f31d" providerId="ADAL" clId="{22248CC1-9068-5BCB-B15B-4353FE48F57D}" dt="2026-01-20T15:08:46.981" v="378" actId="478"/>
-          <ac:spMkLst>
-            <pc:docMk/>
-            <pc:sldMk cId="256577611" sldId="270"/>
-            <ac:spMk id="37" creationId="{7D752475-78A5-A367-50D0-7E44DCCC4F1A}"/>
-          </ac:spMkLst>
-        </pc:spChg>
-        <pc:spChg chg="add del mod">
-          <ac:chgData name="Bart Wolleswinkel" userId="b168cadc-1825-41ce-b9cc-7c7f06f6f31d" providerId="ADAL" clId="{22248CC1-9068-5BCB-B15B-4353FE48F57D}" dt="2026-01-20T15:08:49.972" v="379" actId="478"/>
-          <ac:spMkLst>
-            <pc:docMk/>
-            <pc:sldMk cId="256577611" sldId="270"/>
-            <ac:spMk id="38" creationId="{0EB79B0D-8DF9-72D6-4F56-00B50E4E6268}"/>
           </ac:spMkLst>
         </pc:spChg>
         <pc:spChg chg="add mod">
@@ -483,30 +364,6 @@
             <ac:spMk id="40" creationId="{ECB3A796-49DB-D16F-EBBB-99F407AF1271}"/>
           </ac:spMkLst>
         </pc:spChg>
-        <pc:spChg chg="add del mod">
-          <ac:chgData name="Bart Wolleswinkel" userId="b168cadc-1825-41ce-b9cc-7c7f06f6f31d" providerId="ADAL" clId="{22248CC1-9068-5BCB-B15B-4353FE48F57D}" dt="2026-01-20T15:10:03.829" v="408" actId="478"/>
-          <ac:spMkLst>
-            <pc:docMk/>
-            <pc:sldMk cId="256577611" sldId="270"/>
-            <ac:spMk id="41" creationId="{E0F7A896-0883-EF4B-3673-103760246A48}"/>
-          </ac:spMkLst>
-        </pc:spChg>
-        <pc:spChg chg="add del mod">
-          <ac:chgData name="Bart Wolleswinkel" userId="b168cadc-1825-41ce-b9cc-7c7f06f6f31d" providerId="ADAL" clId="{22248CC1-9068-5BCB-B15B-4353FE48F57D}" dt="2026-01-20T15:10:03.829" v="408" actId="478"/>
-          <ac:spMkLst>
-            <pc:docMk/>
-            <pc:sldMk cId="256577611" sldId="270"/>
-            <ac:spMk id="42" creationId="{88057461-0F00-3C0E-186F-467C70FA8FFA}"/>
-          </ac:spMkLst>
-        </pc:spChg>
-        <pc:spChg chg="add del mod">
-          <ac:chgData name="Bart Wolleswinkel" userId="b168cadc-1825-41ce-b9cc-7c7f06f6f31d" providerId="ADAL" clId="{22248CC1-9068-5BCB-B15B-4353FE48F57D}" dt="2026-01-20T15:10:00.801" v="407" actId="478"/>
-          <ac:spMkLst>
-            <pc:docMk/>
-            <pc:sldMk cId="256577611" sldId="270"/>
-            <ac:spMk id="43" creationId="{21696953-16BD-D715-A970-0CC4344DAF32}"/>
-          </ac:spMkLst>
-        </pc:spChg>
         <pc:spChg chg="add mod">
           <ac:chgData name="Bart Wolleswinkel" userId="b168cadc-1825-41ce-b9cc-7c7f06f6f31d" providerId="ADAL" clId="{22248CC1-9068-5BCB-B15B-4353FE48F57D}" dt="2026-01-20T15:20:18.493" v="546" actId="1036"/>
           <ac:spMkLst>
@@ -523,22 +380,6 @@
             <ac:spMk id="45" creationId="{3694A2FE-299B-3F6D-C53F-980E199F0F86}"/>
           </ac:spMkLst>
         </pc:spChg>
-        <pc:spChg chg="add del mod">
-          <ac:chgData name="Bart Wolleswinkel" userId="b168cadc-1825-41ce-b9cc-7c7f06f6f31d" providerId="ADAL" clId="{22248CC1-9068-5BCB-B15B-4353FE48F57D}" dt="2026-01-20T15:10:25.488" v="413" actId="478"/>
-          <ac:spMkLst>
-            <pc:docMk/>
-            <pc:sldMk cId="256577611" sldId="270"/>
-            <ac:spMk id="46" creationId="{41F7EC1D-4748-4DA5-538A-AE41B3E3D5B4}"/>
-          </ac:spMkLst>
-        </pc:spChg>
-        <pc:spChg chg="add del mod">
-          <ac:chgData name="Bart Wolleswinkel" userId="b168cadc-1825-41ce-b9cc-7c7f06f6f31d" providerId="ADAL" clId="{22248CC1-9068-5BCB-B15B-4353FE48F57D}" dt="2026-01-20T15:10:25.488" v="413" actId="478"/>
-          <ac:spMkLst>
-            <pc:docMk/>
-            <pc:sldMk cId="256577611" sldId="270"/>
-            <ac:spMk id="47" creationId="{EEADC53B-B3E4-2E04-C451-25C75DDC46B0}"/>
-          </ac:spMkLst>
-        </pc:spChg>
         <pc:spChg chg="add mod">
           <ac:chgData name="Bart Wolleswinkel" userId="b168cadc-1825-41ce-b9cc-7c7f06f6f31d" providerId="ADAL" clId="{22248CC1-9068-5BCB-B15B-4353FE48F57D}" dt="2026-01-20T15:24:16.062" v="624" actId="20577"/>
           <ac:spMkLst>
@@ -553,22 +394,6 @@
             <pc:docMk/>
             <pc:sldMk cId="256577611" sldId="270"/>
             <ac:spMk id="49" creationId="{3391296E-C1A0-5DB5-DE1B-A222A4FB3645}"/>
-          </ac:spMkLst>
-        </pc:spChg>
-        <pc:spChg chg="add del mod">
-          <ac:chgData name="Bart Wolleswinkel" userId="b168cadc-1825-41ce-b9cc-7c7f06f6f31d" providerId="ADAL" clId="{22248CC1-9068-5BCB-B15B-4353FE48F57D}" dt="2026-01-20T15:11:02.062" v="431" actId="478"/>
-          <ac:spMkLst>
-            <pc:docMk/>
-            <pc:sldMk cId="256577611" sldId="270"/>
-            <ac:spMk id="50" creationId="{B779F1C6-531E-A7DA-075D-5334DC277C60}"/>
-          </ac:spMkLst>
-        </pc:spChg>
-        <pc:spChg chg="add mod">
-          <ac:chgData name="Bart Wolleswinkel" userId="b168cadc-1825-41ce-b9cc-7c7f06f6f31d" providerId="ADAL" clId="{22248CC1-9068-5BCB-B15B-4353FE48F57D}" dt="2026-01-20T15:11:19.940" v="435" actId="1076"/>
-          <ac:spMkLst>
-            <pc:docMk/>
-            <pc:sldMk cId="256577611" sldId="270"/>
-            <ac:spMk id="51" creationId="{0BBD33D1-B913-2320-31B9-B257A4722736}"/>
           </ac:spMkLst>
         </pc:spChg>
         <pc:spChg chg="add mod">
@@ -748,6 +573,317 @@
           </ac:cxnSpMkLst>
         </pc:cxnChg>
       </pc:sldChg>
+      <pc:sldChg chg="addSp delSp modSp add mod">
+        <pc:chgData name="Bart Wolleswinkel" userId="b168cadc-1825-41ce-b9cc-7c7f06f6f31d" providerId="ADAL" clId="{22248CC1-9068-5BCB-B15B-4353FE48F57D}" dt="2026-01-22T20:52:25.773" v="1096" actId="14100"/>
+        <pc:sldMkLst>
+          <pc:docMk/>
+          <pc:sldMk cId="1347576788" sldId="271"/>
+        </pc:sldMkLst>
+        <pc:spChg chg="add mod">
+          <ac:chgData name="Bart Wolleswinkel" userId="b168cadc-1825-41ce-b9cc-7c7f06f6f31d" providerId="ADAL" clId="{22248CC1-9068-5BCB-B15B-4353FE48F57D}" dt="2026-01-22T19:38:05.319" v="890" actId="1076"/>
+          <ac:spMkLst>
+            <pc:docMk/>
+            <pc:sldMk cId="1347576788" sldId="271"/>
+            <ac:spMk id="2" creationId="{0938DED3-CA50-89A8-C70E-0185566AC265}"/>
+          </ac:spMkLst>
+        </pc:spChg>
+        <pc:spChg chg="add mod">
+          <ac:chgData name="Bart Wolleswinkel" userId="b168cadc-1825-41ce-b9cc-7c7f06f6f31d" providerId="ADAL" clId="{22248CC1-9068-5BCB-B15B-4353FE48F57D}" dt="2026-01-22T19:38:05.028" v="889" actId="1076"/>
+          <ac:spMkLst>
+            <pc:docMk/>
+            <pc:sldMk cId="1347576788" sldId="271"/>
+            <ac:spMk id="3" creationId="{990779B6-0A67-37AE-3B4F-FF66FC092213}"/>
+          </ac:spMkLst>
+        </pc:spChg>
+        <pc:spChg chg="mod">
+          <ac:chgData name="Bart Wolleswinkel" userId="b168cadc-1825-41ce-b9cc-7c7f06f6f31d" providerId="ADAL" clId="{22248CC1-9068-5BCB-B15B-4353FE48F57D}" dt="2026-01-22T19:38:05.647" v="891" actId="1076"/>
+          <ac:spMkLst>
+            <pc:docMk/>
+            <pc:sldMk cId="1347576788" sldId="271"/>
+            <ac:spMk id="4" creationId="{74239BA9-D75B-9AB6-76A4-05F83029DF75}"/>
+          </ac:spMkLst>
+        </pc:spChg>
+        <pc:spChg chg="add mod">
+          <ac:chgData name="Bart Wolleswinkel" userId="b168cadc-1825-41ce-b9cc-7c7f06f6f31d" providerId="ADAL" clId="{22248CC1-9068-5BCB-B15B-4353FE48F57D}" dt="2026-01-22T19:38:15.859" v="893" actId="14100"/>
+          <ac:spMkLst>
+            <pc:docMk/>
+            <pc:sldMk cId="1347576788" sldId="271"/>
+            <ac:spMk id="5" creationId="{355F02D5-6FEE-90CA-7919-6CB6CB9DEA05}"/>
+          </ac:spMkLst>
+        </pc:spChg>
+        <pc:spChg chg="add mod">
+          <ac:chgData name="Bart Wolleswinkel" userId="b168cadc-1825-41ce-b9cc-7c7f06f6f31d" providerId="ADAL" clId="{22248CC1-9068-5BCB-B15B-4353FE48F57D}" dt="2026-01-22T19:08:09.287" v="829" actId="1076"/>
+          <ac:spMkLst>
+            <pc:docMk/>
+            <pc:sldMk cId="1347576788" sldId="271"/>
+            <ac:spMk id="6" creationId="{931BB41D-7A13-B414-C065-73EA6FA1AC70}"/>
+          </ac:spMkLst>
+        </pc:spChg>
+        <pc:spChg chg="del">
+          <ac:chgData name="Bart Wolleswinkel" userId="b168cadc-1825-41ce-b9cc-7c7f06f6f31d" providerId="ADAL" clId="{22248CC1-9068-5BCB-B15B-4353FE48F57D}" dt="2026-01-22T17:46:42.596" v="634" actId="478"/>
+          <ac:spMkLst>
+            <pc:docMk/>
+            <pc:sldMk cId="1347576788" sldId="271"/>
+            <ac:spMk id="7" creationId="{996DF195-E494-A9F3-6634-6D503AC023F5}"/>
+          </ac:spMkLst>
+        </pc:spChg>
+        <pc:spChg chg="add mod">
+          <ac:chgData name="Bart Wolleswinkel" userId="b168cadc-1825-41ce-b9cc-7c7f06f6f31d" providerId="ADAL" clId="{22248CC1-9068-5BCB-B15B-4353FE48F57D}" dt="2026-01-22T19:38:19.575" v="894" actId="1076"/>
+          <ac:spMkLst>
+            <pc:docMk/>
+            <pc:sldMk cId="1347576788" sldId="271"/>
+            <ac:spMk id="11" creationId="{C6ACE020-A259-1934-55F2-4CE79D02C4B4}"/>
+          </ac:spMkLst>
+        </pc:spChg>
+        <pc:spChg chg="del">
+          <ac:chgData name="Bart Wolleswinkel" userId="b168cadc-1825-41ce-b9cc-7c7f06f6f31d" providerId="ADAL" clId="{22248CC1-9068-5BCB-B15B-4353FE48F57D}" dt="2026-01-22T17:46:42.596" v="634" actId="478"/>
+          <ac:spMkLst>
+            <pc:docMk/>
+            <pc:sldMk cId="1347576788" sldId="271"/>
+            <ac:spMk id="13" creationId="{12DE40A8-D6D9-05D6-575C-1222BC0C4E1B}"/>
+          </ac:spMkLst>
+        </pc:spChg>
+        <pc:spChg chg="del">
+          <ac:chgData name="Bart Wolleswinkel" userId="b168cadc-1825-41ce-b9cc-7c7f06f6f31d" providerId="ADAL" clId="{22248CC1-9068-5BCB-B15B-4353FE48F57D}" dt="2026-01-22T17:46:42.596" v="634" actId="478"/>
+          <ac:spMkLst>
+            <pc:docMk/>
+            <pc:sldMk cId="1347576788" sldId="271"/>
+            <ac:spMk id="17" creationId="{7AD746A6-B8F9-9504-9E63-916155DA135A}"/>
+          </ac:spMkLst>
+        </pc:spChg>
+        <pc:spChg chg="add mod">
+          <ac:chgData name="Bart Wolleswinkel" userId="b168cadc-1825-41ce-b9cc-7c7f06f6f31d" providerId="ADAL" clId="{22248CC1-9068-5BCB-B15B-4353FE48F57D}" dt="2026-01-22T19:38:19.575" v="894" actId="1076"/>
+          <ac:spMkLst>
+            <pc:docMk/>
+            <pc:sldMk cId="1347576788" sldId="271"/>
+            <ac:spMk id="18" creationId="{712B5FDE-FD9E-0112-EBBE-142609D7BDE0}"/>
+          </ac:spMkLst>
+        </pc:spChg>
+        <pc:spChg chg="add mod">
+          <ac:chgData name="Bart Wolleswinkel" userId="b168cadc-1825-41ce-b9cc-7c7f06f6f31d" providerId="ADAL" clId="{22248CC1-9068-5BCB-B15B-4353FE48F57D}" dt="2026-01-22T19:08:09.287" v="829" actId="1076"/>
+          <ac:spMkLst>
+            <pc:docMk/>
+            <pc:sldMk cId="1347576788" sldId="271"/>
+            <ac:spMk id="19" creationId="{1F14A250-FE7D-C8C0-82E9-33EF1582A13E}"/>
+          </ac:spMkLst>
+        </pc:spChg>
+        <pc:spChg chg="add mod">
+          <ac:chgData name="Bart Wolleswinkel" userId="b168cadc-1825-41ce-b9cc-7c7f06f6f31d" providerId="ADAL" clId="{22248CC1-9068-5BCB-B15B-4353FE48F57D}" dt="2026-01-22T20:39:26.613" v="1002" actId="1076"/>
+          <ac:spMkLst>
+            <pc:docMk/>
+            <pc:sldMk cId="1347576788" sldId="271"/>
+            <ac:spMk id="21" creationId="{6CAC6041-E093-680D-99E8-F70FAD2F43A0}"/>
+          </ac:spMkLst>
+        </pc:spChg>
+        <pc:spChg chg="del">
+          <ac:chgData name="Bart Wolleswinkel" userId="b168cadc-1825-41ce-b9cc-7c7f06f6f31d" providerId="ADAL" clId="{22248CC1-9068-5BCB-B15B-4353FE48F57D}" dt="2026-01-22T17:46:42.596" v="634" actId="478"/>
+          <ac:spMkLst>
+            <pc:docMk/>
+            <pc:sldMk cId="1347576788" sldId="271"/>
+            <ac:spMk id="22" creationId="{E21BDD93-43AC-1BE7-710D-49AE24081EE4}"/>
+          </ac:spMkLst>
+        </pc:spChg>
+        <pc:spChg chg="del">
+          <ac:chgData name="Bart Wolleswinkel" userId="b168cadc-1825-41ce-b9cc-7c7f06f6f31d" providerId="ADAL" clId="{22248CC1-9068-5BCB-B15B-4353FE48F57D}" dt="2026-01-22T17:46:42.596" v="634" actId="478"/>
+          <ac:spMkLst>
+            <pc:docMk/>
+            <pc:sldMk cId="1347576788" sldId="271"/>
+            <ac:spMk id="23" creationId="{4F549796-B7B2-F503-C150-50CED5B22272}"/>
+          </ac:spMkLst>
+        </pc:spChg>
+        <pc:spChg chg="add del mod">
+          <ac:chgData name="Bart Wolleswinkel" userId="b168cadc-1825-41ce-b9cc-7c7f06f6f31d" providerId="ADAL" clId="{22248CC1-9068-5BCB-B15B-4353FE48F57D}" dt="2026-01-22T19:01:18.558" v="717" actId="478"/>
+          <ac:spMkLst>
+            <pc:docMk/>
+            <pc:sldMk cId="1347576788" sldId="271"/>
+            <ac:spMk id="24" creationId="{E0AB0993-DD12-FF2D-A417-24C16B39BC1A}"/>
+          </ac:spMkLst>
+        </pc:spChg>
+        <pc:spChg chg="del">
+          <ac:chgData name="Bart Wolleswinkel" userId="b168cadc-1825-41ce-b9cc-7c7f06f6f31d" providerId="ADAL" clId="{22248CC1-9068-5BCB-B15B-4353FE48F57D}" dt="2026-01-22T17:46:42.596" v="634" actId="478"/>
+          <ac:spMkLst>
+            <pc:docMk/>
+            <pc:sldMk cId="1347576788" sldId="271"/>
+            <ac:spMk id="28" creationId="{C9B03FD5-6565-3554-AC8E-EDFBD0F5BEF1}"/>
+          </ac:spMkLst>
+        </pc:spChg>
+        <pc:spChg chg="del">
+          <ac:chgData name="Bart Wolleswinkel" userId="b168cadc-1825-41ce-b9cc-7c7f06f6f31d" providerId="ADAL" clId="{22248CC1-9068-5BCB-B15B-4353FE48F57D}" dt="2026-01-22T17:46:42.596" v="634" actId="478"/>
+          <ac:spMkLst>
+            <pc:docMk/>
+            <pc:sldMk cId="1347576788" sldId="271"/>
+            <ac:spMk id="30" creationId="{50CA57B1-10F5-97B7-4428-F52122FDB074}"/>
+          </ac:spMkLst>
+        </pc:spChg>
+        <pc:spChg chg="del">
+          <ac:chgData name="Bart Wolleswinkel" userId="b168cadc-1825-41ce-b9cc-7c7f06f6f31d" providerId="ADAL" clId="{22248CC1-9068-5BCB-B15B-4353FE48F57D}" dt="2026-01-22T17:46:42.596" v="634" actId="478"/>
+          <ac:spMkLst>
+            <pc:docMk/>
+            <pc:sldMk cId="1347576788" sldId="271"/>
+            <ac:spMk id="31" creationId="{E2AF1880-9C60-9771-0076-905347D252ED}"/>
+          </ac:spMkLst>
+        </pc:spChg>
+        <pc:spChg chg="del">
+          <ac:chgData name="Bart Wolleswinkel" userId="b168cadc-1825-41ce-b9cc-7c7f06f6f31d" providerId="ADAL" clId="{22248CC1-9068-5BCB-B15B-4353FE48F57D}" dt="2026-01-22T17:46:42.596" v="634" actId="478"/>
+          <ac:spMkLst>
+            <pc:docMk/>
+            <pc:sldMk cId="1347576788" sldId="271"/>
+            <ac:spMk id="36" creationId="{AEA3F883-7A4D-437A-3438-0668230B6C38}"/>
+          </ac:spMkLst>
+        </pc:spChg>
+        <pc:spChg chg="add del">
+          <ac:chgData name="Bart Wolleswinkel" userId="b168cadc-1825-41ce-b9cc-7c7f06f6f31d" providerId="ADAL" clId="{22248CC1-9068-5BCB-B15B-4353FE48F57D}" dt="2026-01-22T19:38:43.217" v="901" actId="22"/>
+          <ac:spMkLst>
+            <pc:docMk/>
+            <pc:sldMk cId="1347576788" sldId="271"/>
+            <ac:spMk id="37" creationId="{AE2C59CC-AA56-50EC-2642-E3CB32B921FE}"/>
+          </ac:spMkLst>
+        </pc:spChg>
+        <pc:spChg chg="add mod">
+          <ac:chgData name="Bart Wolleswinkel" userId="b168cadc-1825-41ce-b9cc-7c7f06f6f31d" providerId="ADAL" clId="{22248CC1-9068-5BCB-B15B-4353FE48F57D}" dt="2026-01-22T20:44:00.937" v="1013" actId="122"/>
+          <ac:spMkLst>
+            <pc:docMk/>
+            <pc:sldMk cId="1347576788" sldId="271"/>
+            <ac:spMk id="38" creationId="{739A3E2D-E5AF-E4C0-72EC-88CE99C33472}"/>
+          </ac:spMkLst>
+        </pc:spChg>
+        <pc:spChg chg="del">
+          <ac:chgData name="Bart Wolleswinkel" userId="b168cadc-1825-41ce-b9cc-7c7f06f6f31d" providerId="ADAL" clId="{22248CC1-9068-5BCB-B15B-4353FE48F57D}" dt="2026-01-22T17:46:42.596" v="634" actId="478"/>
+          <ac:spMkLst>
+            <pc:docMk/>
+            <pc:sldMk cId="1347576788" sldId="271"/>
+            <ac:spMk id="39" creationId="{E1B7EF88-1CFA-D89E-CAA9-D2EAD8C74BD9}"/>
+          </ac:spMkLst>
+        </pc:spChg>
+        <pc:spChg chg="add del mod">
+          <ac:chgData name="Bart Wolleswinkel" userId="b168cadc-1825-41ce-b9cc-7c7f06f6f31d" providerId="ADAL" clId="{22248CC1-9068-5BCB-B15B-4353FE48F57D}" dt="2026-01-22T19:38:56.094" v="907" actId="478"/>
+          <ac:spMkLst>
+            <pc:docMk/>
+            <pc:sldMk cId="1347576788" sldId="271"/>
+            <ac:spMk id="41" creationId="{3035F274-4EB1-7F7B-462C-DB0216CD0E07}"/>
+          </ac:spMkLst>
+        </pc:spChg>
+        <pc:spChg chg="add mod">
+          <ac:chgData name="Bart Wolleswinkel" userId="b168cadc-1825-41ce-b9cc-7c7f06f6f31d" providerId="ADAL" clId="{22248CC1-9068-5BCB-B15B-4353FE48F57D}" dt="2026-01-22T20:49:05.149" v="1064" actId="1076"/>
+          <ac:spMkLst>
+            <pc:docMk/>
+            <pc:sldMk cId="1347576788" sldId="271"/>
+            <ac:spMk id="42" creationId="{1C971336-8201-3048-7B2C-AEFDF793E926}"/>
+          </ac:spMkLst>
+        </pc:spChg>
+        <pc:spChg chg="add mod">
+          <ac:chgData name="Bart Wolleswinkel" userId="b168cadc-1825-41ce-b9cc-7c7f06f6f31d" providerId="ADAL" clId="{22248CC1-9068-5BCB-B15B-4353FE48F57D}" dt="2026-01-22T20:49:05.149" v="1064" actId="1076"/>
+          <ac:spMkLst>
+            <pc:docMk/>
+            <pc:sldMk cId="1347576788" sldId="271"/>
+            <ac:spMk id="43" creationId="{9CE237E0-7541-4EDD-0214-EF461A5CCCD8}"/>
+          </ac:spMkLst>
+        </pc:spChg>
+        <pc:spChg chg="del">
+          <ac:chgData name="Bart Wolleswinkel" userId="b168cadc-1825-41ce-b9cc-7c7f06f6f31d" providerId="ADAL" clId="{22248CC1-9068-5BCB-B15B-4353FE48F57D}" dt="2026-01-22T17:46:39.566" v="633" actId="478"/>
+          <ac:spMkLst>
+            <pc:docMk/>
+            <pc:sldMk cId="1347576788" sldId="271"/>
+            <ac:spMk id="44" creationId="{85510034-573F-461A-F0B0-41C59B3E3B03}"/>
+          </ac:spMkLst>
+        </pc:spChg>
+        <pc:spChg chg="add mod">
+          <ac:chgData name="Bart Wolleswinkel" userId="b168cadc-1825-41ce-b9cc-7c7f06f6f31d" providerId="ADAL" clId="{22248CC1-9068-5BCB-B15B-4353FE48F57D}" dt="2026-01-22T20:52:25.773" v="1096" actId="14100"/>
+          <ac:spMkLst>
+            <pc:docMk/>
+            <pc:sldMk cId="1347576788" sldId="271"/>
+            <ac:spMk id="46" creationId="{4F51D9F7-C37B-68AE-FB72-B6573F7D35CE}"/>
+          </ac:spMkLst>
+        </pc:spChg>
+        <pc:spChg chg="add mod">
+          <ac:chgData name="Bart Wolleswinkel" userId="b168cadc-1825-41ce-b9cc-7c7f06f6f31d" providerId="ADAL" clId="{22248CC1-9068-5BCB-B15B-4353FE48F57D}" dt="2026-01-22T20:49:23.205" v="1070" actId="20577"/>
+          <ac:spMkLst>
+            <pc:docMk/>
+            <pc:sldMk cId="1347576788" sldId="271"/>
+            <ac:spMk id="47" creationId="{547A3D8A-AF7C-2AEF-6CF5-2CF8CE723787}"/>
+          </ac:spMkLst>
+        </pc:spChg>
+        <pc:spChg chg="del">
+          <ac:chgData name="Bart Wolleswinkel" userId="b168cadc-1825-41ce-b9cc-7c7f06f6f31d" providerId="ADAL" clId="{22248CC1-9068-5BCB-B15B-4353FE48F57D}" dt="2026-01-22T17:46:39.566" v="633" actId="478"/>
+          <ac:spMkLst>
+            <pc:docMk/>
+            <pc:sldMk cId="1347576788" sldId="271"/>
+            <ac:spMk id="48" creationId="{C0ABAE37-F87E-C3E2-5A99-F549A85706FB}"/>
+          </ac:spMkLst>
+        </pc:spChg>
+        <pc:spChg chg="del">
+          <ac:chgData name="Bart Wolleswinkel" userId="b168cadc-1825-41ce-b9cc-7c7f06f6f31d" providerId="ADAL" clId="{22248CC1-9068-5BCB-B15B-4353FE48F57D}" dt="2026-01-22T17:46:39.566" v="633" actId="478"/>
+          <ac:spMkLst>
+            <pc:docMk/>
+            <pc:sldMk cId="1347576788" sldId="271"/>
+            <ac:spMk id="52" creationId="{2FADDAA7-B93B-228C-EDAE-9B6F0570EA41}"/>
+          </ac:spMkLst>
+        </pc:spChg>
+        <pc:spChg chg="del">
+          <ac:chgData name="Bart Wolleswinkel" userId="b168cadc-1825-41ce-b9cc-7c7f06f6f31d" providerId="ADAL" clId="{22248CC1-9068-5BCB-B15B-4353FE48F57D}" dt="2026-01-22T17:46:39.566" v="633" actId="478"/>
+          <ac:spMkLst>
+            <pc:docMk/>
+            <pc:sldMk cId="1347576788" sldId="271"/>
+            <ac:spMk id="53" creationId="{E1A3F323-3475-E317-FC63-00FFC9269D9C}"/>
+          </ac:spMkLst>
+        </pc:spChg>
+        <pc:spChg chg="del">
+          <ac:chgData name="Bart Wolleswinkel" userId="b168cadc-1825-41ce-b9cc-7c7f06f6f31d" providerId="ADAL" clId="{22248CC1-9068-5BCB-B15B-4353FE48F57D}" dt="2026-01-22T17:46:39.566" v="633" actId="478"/>
+          <ac:spMkLst>
+            <pc:docMk/>
+            <pc:sldMk cId="1347576788" sldId="271"/>
+            <ac:spMk id="54" creationId="{025B123F-EA9F-082C-B2B3-8BD8C74DB3F6}"/>
+          </ac:spMkLst>
+        </pc:spChg>
+        <pc:spChg chg="del">
+          <ac:chgData name="Bart Wolleswinkel" userId="b168cadc-1825-41ce-b9cc-7c7f06f6f31d" providerId="ADAL" clId="{22248CC1-9068-5BCB-B15B-4353FE48F57D}" dt="2026-01-22T17:46:39.566" v="633" actId="478"/>
+          <ac:spMkLst>
+            <pc:docMk/>
+            <pc:sldMk cId="1347576788" sldId="271"/>
+            <ac:spMk id="55" creationId="{EF134367-8DB1-859B-AE55-3134BADB0C24}"/>
+          </ac:spMkLst>
+        </pc:spChg>
+        <pc:spChg chg="del">
+          <ac:chgData name="Bart Wolleswinkel" userId="b168cadc-1825-41ce-b9cc-7c7f06f6f31d" providerId="ADAL" clId="{22248CC1-9068-5BCB-B15B-4353FE48F57D}" dt="2026-01-22T17:46:39.566" v="633" actId="478"/>
+          <ac:spMkLst>
+            <pc:docMk/>
+            <pc:sldMk cId="1347576788" sldId="271"/>
+            <ac:spMk id="56" creationId="{C897BE3F-D336-A031-5960-2212D7796533}"/>
+          </ac:spMkLst>
+        </pc:spChg>
+        <pc:spChg chg="del">
+          <ac:chgData name="Bart Wolleswinkel" userId="b168cadc-1825-41ce-b9cc-7c7f06f6f31d" providerId="ADAL" clId="{22248CC1-9068-5BCB-B15B-4353FE48F57D}" dt="2026-01-22T17:46:39.566" v="633" actId="478"/>
+          <ac:spMkLst>
+            <pc:docMk/>
+            <pc:sldMk cId="1347576788" sldId="271"/>
+            <ac:spMk id="60" creationId="{B1B9943F-E181-78AE-B73C-860F4DA9668B}"/>
+          </ac:spMkLst>
+        </pc:spChg>
+        <pc:spChg chg="del">
+          <ac:chgData name="Bart Wolleswinkel" userId="b168cadc-1825-41ce-b9cc-7c7f06f6f31d" providerId="ADAL" clId="{22248CC1-9068-5BCB-B15B-4353FE48F57D}" dt="2026-01-22T17:46:39.566" v="633" actId="478"/>
+          <ac:spMkLst>
+            <pc:docMk/>
+            <pc:sldMk cId="1347576788" sldId="271"/>
+            <ac:spMk id="65" creationId="{68E58784-273F-DBC0-88A2-BB22D94EF3A5}"/>
+          </ac:spMkLst>
+        </pc:spChg>
+        <pc:spChg chg="del">
+          <ac:chgData name="Bart Wolleswinkel" userId="b168cadc-1825-41ce-b9cc-7c7f06f6f31d" providerId="ADAL" clId="{22248CC1-9068-5BCB-B15B-4353FE48F57D}" dt="2026-01-22T17:46:39.566" v="633" actId="478"/>
+          <ac:spMkLst>
+            <pc:docMk/>
+            <pc:sldMk cId="1347576788" sldId="271"/>
+            <ac:spMk id="98" creationId="{8CE92594-479C-86C1-22F5-E7D0FF3E3201}"/>
+          </ac:spMkLst>
+        </pc:spChg>
+        <pc:cxnChg chg="add del mod">
+          <ac:chgData name="Bart Wolleswinkel" userId="b168cadc-1825-41ce-b9cc-7c7f06f6f31d" providerId="ADAL" clId="{22248CC1-9068-5BCB-B15B-4353FE48F57D}" dt="2026-01-22T19:38:15.859" v="893" actId="14100"/>
+          <ac:cxnSpMkLst>
+            <pc:docMk/>
+            <pc:sldMk cId="1347576788" sldId="271"/>
+            <ac:cxnSpMk id="10" creationId="{6AD86F23-68E8-944E-E570-576EF619FD47}"/>
+          </ac:cxnSpMkLst>
+        </pc:cxnChg>
+      </pc:sldChg>
     </pc:docChg>
   </pc:docChgLst>
 </pc:chgInfo>
@@ -902,7 +1038,7 @@
           <a:p>
             <a:fld id="{FB8718F5-1E4A-7D42-8173-5979EE6FBC1A}" type="datetimeFigureOut">
               <a:rPr lang="en-US" smtClean="0"/>
-              <a:t>1/20/26</a:t>
+              <a:t>1/22/26</a:t>
             </a:fld>
             <a:endParaRPr lang="en-US"/>
           </a:p>
@@ -1102,7 +1238,7 @@
           <a:p>
             <a:fld id="{FB8718F5-1E4A-7D42-8173-5979EE6FBC1A}" type="datetimeFigureOut">
               <a:rPr lang="en-US" smtClean="0"/>
-              <a:t>1/20/26</a:t>
+              <a:t>1/22/26</a:t>
             </a:fld>
             <a:endParaRPr lang="en-US"/>
           </a:p>
@@ -1312,7 +1448,7 @@
           <a:p>
             <a:fld id="{FB8718F5-1E4A-7D42-8173-5979EE6FBC1A}" type="datetimeFigureOut">
               <a:rPr lang="en-US" smtClean="0"/>
-              <a:t>1/20/26</a:t>
+              <a:t>1/22/26</a:t>
             </a:fld>
             <a:endParaRPr lang="en-US"/>
           </a:p>
@@ -1512,7 +1648,7 @@
           <a:p>
             <a:fld id="{FB8718F5-1E4A-7D42-8173-5979EE6FBC1A}" type="datetimeFigureOut">
               <a:rPr lang="en-US" smtClean="0"/>
-              <a:t>1/20/26</a:t>
+              <a:t>1/22/26</a:t>
             </a:fld>
             <a:endParaRPr lang="en-US"/>
           </a:p>
@@ -1788,7 +1924,7 @@
           <a:p>
             <a:fld id="{FB8718F5-1E4A-7D42-8173-5979EE6FBC1A}" type="datetimeFigureOut">
               <a:rPr lang="en-US" smtClean="0"/>
-              <a:t>1/20/26</a:t>
+              <a:t>1/22/26</a:t>
             </a:fld>
             <a:endParaRPr lang="en-US"/>
           </a:p>
@@ -2056,7 +2192,7 @@
           <a:p>
             <a:fld id="{FB8718F5-1E4A-7D42-8173-5979EE6FBC1A}" type="datetimeFigureOut">
               <a:rPr lang="en-US" smtClean="0"/>
-              <a:t>1/20/26</a:t>
+              <a:t>1/22/26</a:t>
             </a:fld>
             <a:endParaRPr lang="en-US"/>
           </a:p>
@@ -2471,7 +2607,7 @@
           <a:p>
             <a:fld id="{FB8718F5-1E4A-7D42-8173-5979EE6FBC1A}" type="datetimeFigureOut">
               <a:rPr lang="en-US" smtClean="0"/>
-              <a:t>1/20/26</a:t>
+              <a:t>1/22/26</a:t>
             </a:fld>
             <a:endParaRPr lang="en-US"/>
           </a:p>
@@ -2613,7 +2749,7 @@
           <a:p>
             <a:fld id="{FB8718F5-1E4A-7D42-8173-5979EE6FBC1A}" type="datetimeFigureOut">
               <a:rPr lang="en-US" smtClean="0"/>
-              <a:t>1/20/26</a:t>
+              <a:t>1/22/26</a:t>
             </a:fld>
             <a:endParaRPr lang="en-US"/>
           </a:p>
@@ -2726,7 +2862,7 @@
           <a:p>
             <a:fld id="{FB8718F5-1E4A-7D42-8173-5979EE6FBC1A}" type="datetimeFigureOut">
               <a:rPr lang="en-US" smtClean="0"/>
-              <a:t>1/20/26</a:t>
+              <a:t>1/22/26</a:t>
             </a:fld>
             <a:endParaRPr lang="en-US"/>
           </a:p>
@@ -3039,7 +3175,7 @@
           <a:p>
             <a:fld id="{FB8718F5-1E4A-7D42-8173-5979EE6FBC1A}" type="datetimeFigureOut">
               <a:rPr lang="en-US" smtClean="0"/>
-              <a:t>1/20/26</a:t>
+              <a:t>1/22/26</a:t>
             </a:fld>
             <a:endParaRPr lang="en-US"/>
           </a:p>
@@ -3328,7 +3464,7 @@
           <a:p>
             <a:fld id="{FB8718F5-1E4A-7D42-8173-5979EE6FBC1A}" type="datetimeFigureOut">
               <a:rPr lang="en-US" smtClean="0"/>
-              <a:t>1/20/26</a:t>
+              <a:t>1/22/26</a:t>
             </a:fld>
             <a:endParaRPr lang="en-US"/>
           </a:p>
@@ -3571,7 +3707,7 @@
           <a:p>
             <a:fld id="{FB8718F5-1E4A-7D42-8173-5979EE6FBC1A}" type="datetimeFigureOut">
               <a:rPr lang="en-US" smtClean="0"/>
-              <a:t>1/20/26</a:t>
+              <a:t>1/22/26</a:t>
             </a:fld>
             <a:endParaRPr lang="en-US"/>
           </a:p>
@@ -4671,13 +4807,8 @@
             </a:pPr>
             <a:r>
               <a:rPr lang="en-US" noProof="0" dirty="0"/>
-              <a:t>Added to the list of contributors </a:t>
-            </a:r>
-            <a:r>
-              <a:rPr lang="en-US" noProof="0"/>
-              <a:t>for ….</a:t>
-            </a:r>
-            <a:endParaRPr lang="en-US" noProof="0" dirty="0"/>
+              <a:t>Added to the list of contributors for ….</a:t>
+            </a:r>
           </a:p>
           <a:p>
             <a:pPr marL="514350" indent="-514350">
@@ -7592,6 +7723,982 @@
     <p:extLst>
       <p:ext uri="{BB962C8B-B14F-4D97-AF65-F5344CB8AC3E}">
         <p14:creationId xmlns:p14="http://schemas.microsoft.com/office/powerpoint/2010/main" val="256577611"/>
+      </p:ext>
+    </p:extLst>
+  </p:cSld>
+  <p:clrMapOvr>
+    <a:masterClrMapping/>
+  </p:clrMapOvr>
+</p:sld>
+</file>
+
+<file path=ppt/slides/slide16.xml><?xml version="1.0" encoding="utf-8"?>
+<p:sld xmlns:a="http://schemas.openxmlformats.org/drawingml/2006/main" xmlns:r="http://schemas.openxmlformats.org/officeDocument/2006/relationships" xmlns:p="http://schemas.openxmlformats.org/presentationml/2006/main">
+  <p:cSld>
+    <p:spTree>
+      <p:nvGrpSpPr>
+        <p:cNvPr id="1" name="">
+          <a:extLst>
+            <a:ext uri="{FF2B5EF4-FFF2-40B4-BE49-F238E27FC236}">
+              <a16:creationId xmlns:a16="http://schemas.microsoft.com/office/drawing/2014/main" id="{6ABBA137-64A3-8D72-0F74-BE42FB08ABFB}"/>
+            </a:ext>
+          </a:extLst>
+        </p:cNvPr>
+        <p:cNvGrpSpPr/>
+        <p:nvPr/>
+      </p:nvGrpSpPr>
+      <p:grpSpPr>
+        <a:xfrm>
+          <a:off x="0" y="0"/>
+          <a:ext cx="0" cy="0"/>
+          <a:chOff x="0" y="0"/>
+          <a:chExt cx="0" cy="0"/>
+        </a:xfrm>
+      </p:grpSpPr>
+      <p:sp>
+        <p:nvSpPr>
+          <p:cNvPr id="4" name="Title 3">
+            <a:extLst>
+              <a:ext uri="{FF2B5EF4-FFF2-40B4-BE49-F238E27FC236}">
+                <a16:creationId xmlns:a16="http://schemas.microsoft.com/office/drawing/2014/main" id="{74239BA9-D75B-9AB6-76A4-05F83029DF75}"/>
+              </a:ext>
+            </a:extLst>
+          </p:cNvPr>
+          <p:cNvSpPr>
+            <a:spLocks noGrp="1"/>
+          </p:cNvSpPr>
+          <p:nvPr>
+            <p:ph type="title"/>
+          </p:nvPr>
+        </p:nvSpPr>
+        <p:spPr>
+          <a:xfrm>
+            <a:off x="838200" y="365125"/>
+            <a:ext cx="3496339" cy="1325563"/>
+          </a:xfrm>
+        </p:spPr>
+        <p:txBody>
+          <a:bodyPr/>
+          <a:lstStyle/>
+          <a:p>
+            <a:r>
+              <a:rPr lang="en-US" dirty="0"/>
+              <a:t>Optimization</a:t>
+            </a:r>
+          </a:p>
+        </p:txBody>
+      </p:sp>
+      <p:sp>
+        <p:nvSpPr>
+          <p:cNvPr id="2" name="Rectangle 1">
+            <a:extLst>
+              <a:ext uri="{FF2B5EF4-FFF2-40B4-BE49-F238E27FC236}">
+                <a16:creationId xmlns:a16="http://schemas.microsoft.com/office/drawing/2014/main" id="{0938DED3-CA50-89A8-C70E-0185566AC265}"/>
+              </a:ext>
+            </a:extLst>
+          </p:cNvPr>
+          <p:cNvSpPr/>
+          <p:nvPr/>
+        </p:nvSpPr>
+        <p:spPr>
+          <a:xfrm>
+            <a:off x="838200" y="1527859"/>
+            <a:ext cx="10515600" cy="4965016"/>
+          </a:xfrm>
+          <a:prstGeom prst="rect">
+            <a:avLst/>
+          </a:prstGeom>
+          <a:noFill/>
+          <a:ln w="28575">
+            <a:solidFill>
+              <a:schemeClr val="tx1"/>
+            </a:solidFill>
+            <a:prstDash val="dash"/>
+          </a:ln>
+        </p:spPr>
+        <p:style>
+          <a:lnRef idx="2">
+            <a:schemeClr val="accent1">
+              <a:shade val="15000"/>
+            </a:schemeClr>
+          </a:lnRef>
+          <a:fillRef idx="1">
+            <a:schemeClr val="accent1"/>
+          </a:fillRef>
+          <a:effectRef idx="0">
+            <a:schemeClr val="accent1"/>
+          </a:effectRef>
+          <a:fontRef idx="minor">
+            <a:schemeClr val="lt1"/>
+          </a:fontRef>
+        </p:style>
+        <p:txBody>
+          <a:bodyPr rtlCol="0" anchor="ctr"/>
+          <a:lstStyle/>
+          <a:p>
+            <a:pPr algn="ctr"/>
+            <a:endParaRPr lang="en-US" dirty="0">
+              <a:solidFill>
+                <a:sysClr val="windowText" lastClr="000000"/>
+              </a:solidFill>
+            </a:endParaRPr>
+          </a:p>
+        </p:txBody>
+      </p:sp>
+      <p:sp>
+        <p:nvSpPr>
+          <p:cNvPr id="3" name="TextBox 2">
+            <a:extLst>
+              <a:ext uri="{FF2B5EF4-FFF2-40B4-BE49-F238E27FC236}">
+                <a16:creationId xmlns:a16="http://schemas.microsoft.com/office/drawing/2014/main" id="{990779B6-0A67-37AE-3B4F-FF66FC092213}"/>
+              </a:ext>
+            </a:extLst>
+          </p:cNvPr>
+          <p:cNvSpPr txBox="1"/>
+          <p:nvPr/>
+        </p:nvSpPr>
+        <p:spPr>
+          <a:xfrm>
+            <a:off x="1041722" y="1690688"/>
+            <a:ext cx="857927" cy="369332"/>
+          </a:xfrm>
+          <a:prstGeom prst="rect">
+            <a:avLst/>
+          </a:prstGeom>
+          <a:noFill/>
+        </p:spPr>
+        <p:txBody>
+          <a:bodyPr wrap="none" rtlCol="0">
+            <a:spAutoFit/>
+          </a:bodyPr>
+          <a:lstStyle/>
+          <a:p>
+            <a:r>
+              <a:rPr lang="en-US" dirty="0"/>
+              <a:t>CVXPY</a:t>
+            </a:r>
+          </a:p>
+        </p:txBody>
+      </p:sp>
+      <p:sp>
+        <p:nvSpPr>
+          <p:cNvPr id="5" name="Rectangle 4">
+            <a:extLst>
+              <a:ext uri="{FF2B5EF4-FFF2-40B4-BE49-F238E27FC236}">
+                <a16:creationId xmlns:a16="http://schemas.microsoft.com/office/drawing/2014/main" id="{355F02D5-6FEE-90CA-7919-6CB6CB9DEA05}"/>
+              </a:ext>
+            </a:extLst>
+          </p:cNvPr>
+          <p:cNvSpPr/>
+          <p:nvPr/>
+        </p:nvSpPr>
+        <p:spPr>
+          <a:xfrm>
+            <a:off x="1337840" y="2222849"/>
+            <a:ext cx="9383475" cy="3830710"/>
+          </a:xfrm>
+          <a:prstGeom prst="rect">
+            <a:avLst/>
+          </a:prstGeom>
+          <a:noFill/>
+          <a:ln w="28575">
+            <a:solidFill>
+              <a:schemeClr val="tx1"/>
+            </a:solidFill>
+            <a:prstDash val="dash"/>
+          </a:ln>
+        </p:spPr>
+        <p:style>
+          <a:lnRef idx="2">
+            <a:schemeClr val="accent1">
+              <a:shade val="15000"/>
+            </a:schemeClr>
+          </a:lnRef>
+          <a:fillRef idx="1">
+            <a:schemeClr val="accent1"/>
+          </a:fillRef>
+          <a:effectRef idx="0">
+            <a:schemeClr val="accent1"/>
+          </a:effectRef>
+          <a:fontRef idx="minor">
+            <a:schemeClr val="lt1"/>
+          </a:fontRef>
+        </p:style>
+        <p:txBody>
+          <a:bodyPr rtlCol="0" anchor="ctr"/>
+          <a:lstStyle/>
+          <a:p>
+            <a:pPr algn="ctr"/>
+            <a:endParaRPr lang="en-US" dirty="0">
+              <a:solidFill>
+                <a:sysClr val="windowText" lastClr="000000"/>
+              </a:solidFill>
+            </a:endParaRPr>
+          </a:p>
+        </p:txBody>
+      </p:sp>
+      <p:sp>
+        <p:nvSpPr>
+          <p:cNvPr id="6" name="TextBox 5">
+            <a:extLst>
+              <a:ext uri="{FF2B5EF4-FFF2-40B4-BE49-F238E27FC236}">
+                <a16:creationId xmlns:a16="http://schemas.microsoft.com/office/drawing/2014/main" id="{931BB41D-7A13-B414-C065-73EA6FA1AC70}"/>
+              </a:ext>
+            </a:extLst>
+          </p:cNvPr>
+          <p:cNvSpPr txBox="1"/>
+          <p:nvPr/>
+        </p:nvSpPr>
+        <p:spPr>
+          <a:xfrm>
+            <a:off x="1470685" y="2382685"/>
+            <a:ext cx="728341" cy="369332"/>
+          </a:xfrm>
+          <a:prstGeom prst="rect">
+            <a:avLst/>
+          </a:prstGeom>
+          <a:noFill/>
+        </p:spPr>
+        <p:txBody>
+          <a:bodyPr wrap="none" rtlCol="0">
+            <a:spAutoFit/>
+          </a:bodyPr>
+          <a:lstStyle/>
+          <a:p>
+            <a:r>
+              <a:rPr lang="en-US" dirty="0"/>
+              <a:t>SciPy</a:t>
+            </a:r>
+          </a:p>
+        </p:txBody>
+      </p:sp>
+      <p:cxnSp>
+        <p:nvCxnSpPr>
+          <p:cNvPr id="10" name="Straight Connector 9">
+            <a:extLst>
+              <a:ext uri="{FF2B5EF4-FFF2-40B4-BE49-F238E27FC236}">
+                <a16:creationId xmlns:a16="http://schemas.microsoft.com/office/drawing/2014/main" id="{6AD86F23-68E8-944E-E570-576EF619FD47}"/>
+              </a:ext>
+            </a:extLst>
+          </p:cNvPr>
+          <p:cNvCxnSpPr>
+            <a:cxnSpLocks/>
+            <a:stCxn id="5" idx="0"/>
+            <a:endCxn id="5" idx="2"/>
+          </p:cNvCxnSpPr>
+          <p:nvPr/>
+        </p:nvCxnSpPr>
+        <p:spPr>
+          <a:xfrm>
+            <a:off x="6029578" y="2222849"/>
+            <a:ext cx="0" cy="3830710"/>
+          </a:xfrm>
+          <a:prstGeom prst="line">
+            <a:avLst/>
+          </a:prstGeom>
+          <a:ln w="28575">
+            <a:solidFill>
+              <a:schemeClr val="bg1">
+                <a:lumMod val="65000"/>
+              </a:schemeClr>
+            </a:solidFill>
+          </a:ln>
+        </p:spPr>
+        <p:style>
+          <a:lnRef idx="2">
+            <a:schemeClr val="accent1"/>
+          </a:lnRef>
+          <a:fillRef idx="0">
+            <a:schemeClr val="accent1"/>
+          </a:fillRef>
+          <a:effectRef idx="1">
+            <a:schemeClr val="accent1"/>
+          </a:effectRef>
+          <a:fontRef idx="minor">
+            <a:schemeClr val="tx1"/>
+          </a:fontRef>
+        </p:style>
+      </p:cxnSp>
+      <p:sp>
+        <p:nvSpPr>
+          <p:cNvPr id="11" name="TextBox 10">
+            <a:extLst>
+              <a:ext uri="{FF2B5EF4-FFF2-40B4-BE49-F238E27FC236}">
+                <a16:creationId xmlns:a16="http://schemas.microsoft.com/office/drawing/2014/main" id="{C6ACE020-A259-1934-55F2-4CE79D02C4B4}"/>
+              </a:ext>
+            </a:extLst>
+          </p:cNvPr>
+          <p:cNvSpPr txBox="1"/>
+          <p:nvPr/>
+        </p:nvSpPr>
+        <p:spPr>
+          <a:xfrm>
+            <a:off x="6162423" y="2382685"/>
+            <a:ext cx="1180131" cy="369332"/>
+          </a:xfrm>
+          <a:prstGeom prst="rect">
+            <a:avLst/>
+          </a:prstGeom>
+          <a:noFill/>
+        </p:spPr>
+        <p:txBody>
+          <a:bodyPr wrap="none" rtlCol="0">
+            <a:spAutoFit/>
+          </a:bodyPr>
+          <a:lstStyle/>
+          <a:p>
+            <a:r>
+              <a:rPr lang="en-US" dirty="0">
+                <a:solidFill>
+                  <a:schemeClr val="bg1">
+                    <a:lumMod val="65000"/>
+                  </a:schemeClr>
+                </a:solidFill>
+              </a:rPr>
+              <a:t>inefficient</a:t>
+            </a:r>
+          </a:p>
+        </p:txBody>
+      </p:sp>
+      <p:sp>
+        <p:nvSpPr>
+          <p:cNvPr id="18" name="TextBox 17">
+            <a:extLst>
+              <a:ext uri="{FF2B5EF4-FFF2-40B4-BE49-F238E27FC236}">
+                <a16:creationId xmlns:a16="http://schemas.microsoft.com/office/drawing/2014/main" id="{712B5FDE-FD9E-0112-EBBE-142609D7BDE0}"/>
+              </a:ext>
+            </a:extLst>
+          </p:cNvPr>
+          <p:cNvSpPr txBox="1"/>
+          <p:nvPr/>
+        </p:nvSpPr>
+        <p:spPr>
+          <a:xfrm>
+            <a:off x="6162423" y="2757413"/>
+            <a:ext cx="1221809" cy="369332"/>
+          </a:xfrm>
+          <a:prstGeom prst="rect">
+            <a:avLst/>
+          </a:prstGeom>
+          <a:noFill/>
+        </p:spPr>
+        <p:txBody>
+          <a:bodyPr wrap="none" rtlCol="0">
+            <a:spAutoFit/>
+          </a:bodyPr>
+          <a:lstStyle/>
+          <a:p>
+            <a:r>
+              <a:rPr lang="en-US" dirty="0">
+                <a:solidFill>
+                  <a:schemeClr val="bg1">
+                    <a:lumMod val="65000"/>
+                  </a:schemeClr>
+                </a:solidFill>
+                <a:latin typeface="American Typewriter" panose="02090604020004020304" pitchFamily="18" charset="77"/>
+              </a:rPr>
+              <a:t>minimize</a:t>
+            </a:r>
+          </a:p>
+        </p:txBody>
+      </p:sp>
+      <p:sp>
+        <p:nvSpPr>
+          <p:cNvPr id="19" name="TextBox 18">
+            <a:extLst>
+              <a:ext uri="{FF2B5EF4-FFF2-40B4-BE49-F238E27FC236}">
+                <a16:creationId xmlns:a16="http://schemas.microsoft.com/office/drawing/2014/main" id="{1F14A250-FE7D-C8C0-82E9-33EF1582A13E}"/>
+              </a:ext>
+            </a:extLst>
+          </p:cNvPr>
+          <p:cNvSpPr txBox="1"/>
+          <p:nvPr/>
+        </p:nvSpPr>
+        <p:spPr>
+          <a:xfrm>
+            <a:off x="1470685" y="2752017"/>
+            <a:ext cx="867610" cy="369332"/>
+          </a:xfrm>
+          <a:prstGeom prst="rect">
+            <a:avLst/>
+          </a:prstGeom>
+          <a:noFill/>
+        </p:spPr>
+        <p:txBody>
+          <a:bodyPr wrap="none" rtlCol="0">
+            <a:spAutoFit/>
+          </a:bodyPr>
+          <a:lstStyle/>
+          <a:p>
+            <a:r>
+              <a:rPr lang="en-GB" dirty="0" err="1">
+                <a:solidFill>
+                  <a:schemeClr val="bg1">
+                    <a:lumMod val="65000"/>
+                  </a:schemeClr>
+                </a:solidFill>
+              </a:rPr>
+              <a:t>linprog</a:t>
+            </a:r>
+            <a:endParaRPr lang="en-GB" dirty="0">
+              <a:solidFill>
+                <a:schemeClr val="bg1">
+                  <a:lumMod val="65000"/>
+                </a:schemeClr>
+              </a:solidFill>
+            </a:endParaRPr>
+          </a:p>
+        </p:txBody>
+      </p:sp>
+      <p:sp>
+        <p:nvSpPr>
+          <p:cNvPr id="21" name="Rectangle 20">
+            <a:extLst>
+              <a:ext uri="{FF2B5EF4-FFF2-40B4-BE49-F238E27FC236}">
+                <a16:creationId xmlns:a16="http://schemas.microsoft.com/office/drawing/2014/main" id="{6CAC6041-E093-680D-99E8-F70FAD2F43A0}"/>
+              </a:ext>
+            </a:extLst>
+          </p:cNvPr>
+          <p:cNvSpPr/>
+          <p:nvPr/>
+        </p:nvSpPr>
+        <p:spPr>
+          <a:xfrm>
+            <a:off x="1834855" y="3614083"/>
+            <a:ext cx="2518321" cy="2599312"/>
+          </a:xfrm>
+          <a:prstGeom prst="rect">
+            <a:avLst/>
+          </a:prstGeom>
+          <a:solidFill>
+            <a:schemeClr val="accent2"/>
+          </a:solidFill>
+          <a:ln>
+            <a:noFill/>
+          </a:ln>
+        </p:spPr>
+        <p:style>
+          <a:lnRef idx="2">
+            <a:schemeClr val="accent1">
+              <a:shade val="15000"/>
+            </a:schemeClr>
+          </a:lnRef>
+          <a:fillRef idx="1">
+            <a:schemeClr val="accent1"/>
+          </a:fillRef>
+          <a:effectRef idx="0">
+            <a:schemeClr val="accent1"/>
+          </a:effectRef>
+          <a:fontRef idx="minor">
+            <a:schemeClr val="lt1"/>
+          </a:fontRef>
+        </p:style>
+        <p:txBody>
+          <a:bodyPr numCol="1" rtlCol="0" anchor="t"/>
+          <a:lstStyle/>
+          <a:p>
+            <a:pPr algn="ctr"/>
+            <a:r>
+              <a:rPr lang="en-US" dirty="0">
+                <a:latin typeface="American Typewriter" panose="02090604020004020304" pitchFamily="18" charset="77"/>
+              </a:rPr>
+              <a:t>support(poly)</a:t>
+            </a:r>
+            <a:r>
+              <a:rPr lang="en-US" dirty="0"/>
+              <a:t>*</a:t>
+            </a:r>
+          </a:p>
+          <a:p>
+            <a:pPr algn="ctr"/>
+            <a:r>
+              <a:rPr lang="en-US" sz="1400" dirty="0"/>
+              <a:t>* only for</a:t>
+            </a:r>
+            <a:r>
+              <a:rPr lang="en-US" sz="1400" dirty="0">
+                <a:latin typeface="American Typewriter" panose="02090604020004020304" pitchFamily="18" charset="77"/>
+              </a:rPr>
+              <a:t> </a:t>
+            </a:r>
+            <a:r>
+              <a:rPr lang="en-US" sz="1400" dirty="0" err="1">
+                <a:latin typeface="American Typewriter" panose="02090604020004020304" pitchFamily="18" charset="77"/>
+              </a:rPr>
+              <a:t>hrepr</a:t>
+            </a:r>
+            <a:endParaRPr lang="en-US" sz="1400" dirty="0">
+              <a:latin typeface="American Typewriter" panose="02090604020004020304" pitchFamily="18" charset="77"/>
+            </a:endParaRPr>
+          </a:p>
+          <a:p>
+            <a:pPr algn="ctr"/>
+            <a:endParaRPr lang="en-US" sz="1100" dirty="0"/>
+          </a:p>
+          <a:p>
+            <a:pPr algn="ctr"/>
+            <a:r>
+              <a:rPr lang="en-US" dirty="0" err="1">
+                <a:latin typeface="American Typewriter" panose="02090604020004020304" pitchFamily="18" charset="77"/>
+              </a:rPr>
+              <a:t>is_bounded</a:t>
+            </a:r>
+            <a:r>
+              <a:rPr lang="en-US" dirty="0">
+                <a:latin typeface="American Typewriter" panose="02090604020004020304" pitchFamily="18" charset="77"/>
+              </a:rPr>
+              <a:t>(poly)</a:t>
+            </a:r>
+          </a:p>
+          <a:p>
+            <a:pPr algn="ctr"/>
+            <a:endParaRPr lang="en-US" sz="1100" dirty="0"/>
+          </a:p>
+          <a:p>
+            <a:pPr algn="ctr"/>
+            <a:r>
+              <a:rPr lang="en-US" dirty="0" err="1">
+                <a:latin typeface="American Typewriter" panose="02090604020004020304" pitchFamily="18" charset="77"/>
+              </a:rPr>
+              <a:t>poly.chebc</a:t>
+            </a:r>
+            <a:endParaRPr lang="en-US" dirty="0">
+              <a:latin typeface="American Typewriter" panose="02090604020004020304" pitchFamily="18" charset="77"/>
+            </a:endParaRPr>
+          </a:p>
+          <a:p>
+            <a:pPr algn="ctr"/>
+            <a:endParaRPr lang="en-US" sz="1100" dirty="0"/>
+          </a:p>
+          <a:p>
+            <a:pPr algn="ctr"/>
+            <a:r>
+              <a:rPr lang="en-US" dirty="0" err="1"/>
+              <a:t>poly.__contains</a:t>
+            </a:r>
+            <a:r>
+              <a:rPr lang="en-US" dirty="0"/>
+              <a:t>__*</a:t>
+            </a:r>
+          </a:p>
+          <a:p>
+            <a:pPr lvl="0" algn="ctr">
+              <a:defRPr/>
+            </a:pPr>
+            <a:r>
+              <a:rPr lang="en-US" sz="1400" dirty="0"/>
+              <a:t>* only for </a:t>
+            </a:r>
+            <a:r>
+              <a:rPr lang="en-US" sz="1400" dirty="0" err="1">
+                <a:latin typeface="American Typewriter" panose="02090604020004020304" pitchFamily="18" charset="77"/>
+              </a:rPr>
+              <a:t>vrepr</a:t>
+            </a:r>
+            <a:endParaRPr lang="en-US" dirty="0">
+              <a:solidFill>
+                <a:prstClr val="white"/>
+              </a:solidFill>
+              <a:latin typeface="American Typewriter" panose="02090604020004020304" pitchFamily="18" charset="77"/>
+            </a:endParaRPr>
+          </a:p>
+          <a:p>
+            <a:pPr marL="0" marR="0" lvl="0" indent="0" algn="ctr" defTabSz="914400" rtl="0" eaLnBrk="1" fontAlgn="auto" latinLnBrk="0" hangingPunct="1">
+              <a:lnSpc>
+                <a:spcPct val="100000"/>
+              </a:lnSpc>
+              <a:spcBef>
+                <a:spcPts val="0"/>
+              </a:spcBef>
+              <a:spcAft>
+                <a:spcPts val="0"/>
+              </a:spcAft>
+              <a:buClrTx/>
+              <a:buSzTx/>
+              <a:buFontTx/>
+              <a:buNone/>
+              <a:tabLst/>
+              <a:defRPr/>
+            </a:pPr>
+            <a:endParaRPr kumimoji="0" lang="en-US" sz="1100" b="0" i="0" u="none" strike="noStrike" kern="1200" cap="none" spc="0" normalizeH="0" baseline="0" noProof="0" dirty="0">
+              <a:ln>
+                <a:noFill/>
+              </a:ln>
+              <a:solidFill>
+                <a:prstClr val="white"/>
+              </a:solidFill>
+              <a:effectLst/>
+              <a:uLnTx/>
+              <a:uFillTx/>
+              <a:latin typeface="+mj-lt"/>
+              <a:ea typeface="+mn-ea"/>
+              <a:cs typeface="+mn-cs"/>
+            </a:endParaRPr>
+          </a:p>
+          <a:p>
+            <a:pPr marL="0" marR="0" lvl="0" indent="0" algn="ctr" defTabSz="914400" rtl="0" eaLnBrk="1" fontAlgn="auto" latinLnBrk="0" hangingPunct="1">
+              <a:lnSpc>
+                <a:spcPct val="100000"/>
+              </a:lnSpc>
+              <a:spcBef>
+                <a:spcPts val="0"/>
+              </a:spcBef>
+              <a:spcAft>
+                <a:spcPts val="0"/>
+              </a:spcAft>
+              <a:buClrTx/>
+              <a:buSzTx/>
+              <a:buFontTx/>
+              <a:buNone/>
+              <a:tabLst/>
+              <a:defRPr/>
+            </a:pPr>
+            <a:r>
+              <a:rPr kumimoji="0" lang="en-US" sz="1800" b="0" i="0" u="none" strike="noStrike" kern="1200" cap="none" spc="0" normalizeH="0" baseline="0" noProof="0" dirty="0" err="1">
+                <a:ln>
+                  <a:noFill/>
+                </a:ln>
+                <a:solidFill>
+                  <a:prstClr val="white"/>
+                </a:solidFill>
+                <a:effectLst/>
+                <a:uLnTx/>
+                <a:uFillTx/>
+                <a:latin typeface="American Typewriter" panose="02090604020004020304" pitchFamily="18" charset="77"/>
+              </a:rPr>
+              <a:t>poly.reduce</a:t>
+            </a:r>
+            <a:r>
+              <a:rPr kumimoji="0" lang="en-US" sz="1800" b="0" i="0" u="none" strike="noStrike" kern="1200" cap="none" spc="0" normalizeH="0" baseline="0" noProof="0" dirty="0">
+                <a:ln>
+                  <a:noFill/>
+                </a:ln>
+                <a:solidFill>
+                  <a:prstClr val="white"/>
+                </a:solidFill>
+                <a:effectLst/>
+                <a:uLnTx/>
+                <a:uFillTx/>
+                <a:latin typeface="American Typewriter" panose="02090604020004020304" pitchFamily="18" charset="77"/>
+              </a:rPr>
+              <a:t>(…)</a:t>
+            </a:r>
+          </a:p>
+        </p:txBody>
+      </p:sp>
+      <p:sp>
+        <p:nvSpPr>
+          <p:cNvPr id="38" name="TextBox 37">
+            <a:extLst>
+              <a:ext uri="{FF2B5EF4-FFF2-40B4-BE49-F238E27FC236}">
+                <a16:creationId xmlns:a16="http://schemas.microsoft.com/office/drawing/2014/main" id="{739A3E2D-E5AF-E4C0-72EC-88CE99C33472}"/>
+              </a:ext>
+            </a:extLst>
+          </p:cNvPr>
+          <p:cNvSpPr txBox="1"/>
+          <p:nvPr/>
+        </p:nvSpPr>
+        <p:spPr>
+          <a:xfrm>
+            <a:off x="2872640" y="3244751"/>
+            <a:ext cx="442750" cy="369332"/>
+          </a:xfrm>
+          <a:prstGeom prst="rect">
+            <a:avLst/>
+          </a:prstGeom>
+          <a:noFill/>
+        </p:spPr>
+        <p:txBody>
+          <a:bodyPr wrap="none" rtlCol="0">
+            <a:spAutoFit/>
+          </a:bodyPr>
+          <a:lstStyle/>
+          <a:p>
+            <a:pPr algn="ctr"/>
+            <a:r>
+              <a:rPr lang="en-US" b="1" dirty="0"/>
+              <a:t>LP</a:t>
+            </a:r>
+            <a:endParaRPr lang="en-US" dirty="0"/>
+          </a:p>
+        </p:txBody>
+      </p:sp>
+      <p:sp>
+        <p:nvSpPr>
+          <p:cNvPr id="42" name="Rectangle 41">
+            <a:extLst>
+              <a:ext uri="{FF2B5EF4-FFF2-40B4-BE49-F238E27FC236}">
+                <a16:creationId xmlns:a16="http://schemas.microsoft.com/office/drawing/2014/main" id="{1C971336-8201-3048-7B2C-AEFDF793E926}"/>
+              </a:ext>
+            </a:extLst>
+          </p:cNvPr>
+          <p:cNvSpPr/>
+          <p:nvPr/>
+        </p:nvSpPr>
+        <p:spPr>
+          <a:xfrm>
+            <a:off x="4865911" y="3614083"/>
+            <a:ext cx="2518321" cy="1328307"/>
+          </a:xfrm>
+          <a:prstGeom prst="rect">
+            <a:avLst/>
+          </a:prstGeom>
+          <a:solidFill>
+            <a:schemeClr val="accent2"/>
+          </a:solidFill>
+          <a:ln>
+            <a:noFill/>
+          </a:ln>
+        </p:spPr>
+        <p:style>
+          <a:lnRef idx="2">
+            <a:schemeClr val="accent1">
+              <a:shade val="15000"/>
+            </a:schemeClr>
+          </a:lnRef>
+          <a:fillRef idx="1">
+            <a:schemeClr val="accent1"/>
+          </a:fillRef>
+          <a:effectRef idx="0">
+            <a:schemeClr val="accent1"/>
+          </a:effectRef>
+          <a:fontRef idx="minor">
+            <a:schemeClr val="lt1"/>
+          </a:fontRef>
+        </p:style>
+        <p:txBody>
+          <a:bodyPr numCol="1" rtlCol="0" anchor="t"/>
+          <a:lstStyle/>
+          <a:p>
+            <a:pPr algn="ctr"/>
+            <a:r>
+              <a:rPr lang="en-US" dirty="0" err="1">
+                <a:latin typeface="American Typewriter" panose="02090604020004020304" pitchFamily="18" charset="77"/>
+              </a:rPr>
+              <a:t>ellps</a:t>
+            </a:r>
+            <a:r>
+              <a:rPr lang="en-US" dirty="0">
+                <a:latin typeface="American Typewriter" panose="02090604020004020304" pitchFamily="18" charset="77"/>
+              </a:rPr>
+              <a:t>.__le__</a:t>
+            </a:r>
+          </a:p>
+          <a:p>
+            <a:pPr algn="ctr"/>
+            <a:endParaRPr kumimoji="0" lang="en-US" sz="1100" b="0" i="0" u="none" strike="noStrike" kern="1200" cap="none" spc="0" normalizeH="0" baseline="0" noProof="0" dirty="0">
+              <a:ln>
+                <a:noFill/>
+              </a:ln>
+              <a:solidFill>
+                <a:prstClr val="white"/>
+              </a:solidFill>
+              <a:effectLst/>
+              <a:uLnTx/>
+              <a:uFillTx/>
+              <a:latin typeface="American Typewriter" panose="02090604020004020304" pitchFamily="18" charset="77"/>
+            </a:endParaRPr>
+          </a:p>
+          <a:p>
+            <a:pPr algn="ctr"/>
+            <a:r>
+              <a:rPr lang="en-US" dirty="0" err="1">
+                <a:solidFill>
+                  <a:prstClr val="white"/>
+                </a:solidFill>
+                <a:latin typeface="American Typewriter" panose="02090604020004020304" pitchFamily="18" charset="77"/>
+              </a:rPr>
+              <a:t>min_vol_ellps</a:t>
+            </a:r>
+            <a:r>
+              <a:rPr lang="en-US" dirty="0">
+                <a:solidFill>
+                  <a:prstClr val="white"/>
+                </a:solidFill>
+                <a:latin typeface="American Typewriter" panose="02090604020004020304" pitchFamily="18" charset="77"/>
+              </a:rPr>
+              <a:t>(poly)</a:t>
+            </a:r>
+          </a:p>
+          <a:p>
+            <a:pPr algn="ctr"/>
+            <a:endParaRPr lang="en-US" sz="1100" dirty="0">
+              <a:solidFill>
+                <a:prstClr val="white"/>
+              </a:solidFill>
+              <a:latin typeface="American Typewriter" panose="02090604020004020304" pitchFamily="18" charset="77"/>
+            </a:endParaRPr>
+          </a:p>
+          <a:p>
+            <a:pPr algn="ctr"/>
+            <a:r>
+              <a:rPr lang="en-US" dirty="0" err="1">
+                <a:solidFill>
+                  <a:prstClr val="white"/>
+                </a:solidFill>
+                <a:latin typeface="American Typewriter" panose="02090604020004020304" pitchFamily="18" charset="77"/>
+              </a:rPr>
+              <a:t>max_vol_ellps</a:t>
+            </a:r>
+            <a:r>
+              <a:rPr lang="en-US" dirty="0">
+                <a:solidFill>
+                  <a:prstClr val="white"/>
+                </a:solidFill>
+                <a:latin typeface="American Typewriter" panose="02090604020004020304" pitchFamily="18" charset="77"/>
+              </a:rPr>
+              <a:t>(poly)</a:t>
+            </a:r>
+          </a:p>
+        </p:txBody>
+      </p:sp>
+      <p:sp>
+        <p:nvSpPr>
+          <p:cNvPr id="43" name="TextBox 42">
+            <a:extLst>
+              <a:ext uri="{FF2B5EF4-FFF2-40B4-BE49-F238E27FC236}">
+                <a16:creationId xmlns:a16="http://schemas.microsoft.com/office/drawing/2014/main" id="{9CE237E0-7541-4EDD-0214-EF461A5CCCD8}"/>
+              </a:ext>
+            </a:extLst>
+          </p:cNvPr>
+          <p:cNvSpPr txBox="1"/>
+          <p:nvPr/>
+        </p:nvSpPr>
+        <p:spPr>
+          <a:xfrm>
+            <a:off x="5812325" y="3239355"/>
+            <a:ext cx="625492" cy="369332"/>
+          </a:xfrm>
+          <a:prstGeom prst="rect">
+            <a:avLst/>
+          </a:prstGeom>
+          <a:noFill/>
+        </p:spPr>
+        <p:txBody>
+          <a:bodyPr wrap="none" rtlCol="0">
+            <a:spAutoFit/>
+          </a:bodyPr>
+          <a:lstStyle/>
+          <a:p>
+            <a:pPr algn="ctr"/>
+            <a:r>
+              <a:rPr lang="en-US" b="1" dirty="0"/>
+              <a:t>SDP</a:t>
+            </a:r>
+            <a:endParaRPr lang="en-US" dirty="0"/>
+          </a:p>
+        </p:txBody>
+      </p:sp>
+      <p:sp>
+        <p:nvSpPr>
+          <p:cNvPr id="46" name="Rectangle 45">
+            <a:extLst>
+              <a:ext uri="{FF2B5EF4-FFF2-40B4-BE49-F238E27FC236}">
+                <a16:creationId xmlns:a16="http://schemas.microsoft.com/office/drawing/2014/main" id="{4F51D9F7-C37B-68AE-FB72-B6573F7D35CE}"/>
+              </a:ext>
+            </a:extLst>
+          </p:cNvPr>
+          <p:cNvSpPr/>
+          <p:nvPr/>
+        </p:nvSpPr>
+        <p:spPr>
+          <a:xfrm>
+            <a:off x="7883872" y="3614083"/>
+            <a:ext cx="2518321" cy="369333"/>
+          </a:xfrm>
+          <a:prstGeom prst="rect">
+            <a:avLst/>
+          </a:prstGeom>
+          <a:solidFill>
+            <a:schemeClr val="accent2"/>
+          </a:solidFill>
+          <a:ln>
+            <a:noFill/>
+          </a:ln>
+        </p:spPr>
+        <p:style>
+          <a:lnRef idx="2">
+            <a:schemeClr val="accent1">
+              <a:shade val="15000"/>
+            </a:schemeClr>
+          </a:lnRef>
+          <a:fillRef idx="1">
+            <a:schemeClr val="accent1"/>
+          </a:fillRef>
+          <a:effectRef idx="0">
+            <a:schemeClr val="accent1"/>
+          </a:effectRef>
+          <a:fontRef idx="minor">
+            <a:schemeClr val="lt1"/>
+          </a:fontRef>
+        </p:style>
+        <p:txBody>
+          <a:bodyPr numCol="1" rtlCol="0" anchor="t"/>
+          <a:lstStyle/>
+          <a:p>
+            <a:pPr algn="ctr"/>
+            <a:r>
+              <a:rPr lang="en-US" dirty="0" err="1">
+                <a:latin typeface="American Typewriter" panose="02090604020004020304" pitchFamily="18" charset="77"/>
+              </a:rPr>
+              <a:t>dist</a:t>
+            </a:r>
+            <a:r>
+              <a:rPr lang="en-US" dirty="0">
+                <a:latin typeface="American Typewriter" panose="02090604020004020304" pitchFamily="18" charset="77"/>
+              </a:rPr>
+              <a:t>(ellps_1, ellps_2)</a:t>
+            </a:r>
+            <a:endParaRPr lang="en-US" dirty="0">
+              <a:solidFill>
+                <a:prstClr val="white"/>
+              </a:solidFill>
+              <a:latin typeface="American Typewriter" panose="02090604020004020304" pitchFamily="18" charset="77"/>
+            </a:endParaRPr>
+          </a:p>
+        </p:txBody>
+      </p:sp>
+      <p:sp>
+        <p:nvSpPr>
+          <p:cNvPr id="47" name="TextBox 46">
+            <a:extLst>
+              <a:ext uri="{FF2B5EF4-FFF2-40B4-BE49-F238E27FC236}">
+                <a16:creationId xmlns:a16="http://schemas.microsoft.com/office/drawing/2014/main" id="{547A3D8A-AF7C-2AEF-6CF5-2CF8CE723787}"/>
+              </a:ext>
+            </a:extLst>
+          </p:cNvPr>
+          <p:cNvSpPr txBox="1"/>
+          <p:nvPr/>
+        </p:nvSpPr>
+        <p:spPr>
+          <a:xfrm>
+            <a:off x="8729875" y="3239355"/>
+            <a:ext cx="826316" cy="369332"/>
+          </a:xfrm>
+          <a:prstGeom prst="rect">
+            <a:avLst/>
+          </a:prstGeom>
+          <a:noFill/>
+        </p:spPr>
+        <p:txBody>
+          <a:bodyPr wrap="none" rtlCol="0">
+            <a:spAutoFit/>
+          </a:bodyPr>
+          <a:lstStyle/>
+          <a:p>
+            <a:pPr algn="ctr"/>
+            <a:r>
+              <a:rPr lang="en-US" b="1" dirty="0"/>
+              <a:t>QCQP</a:t>
+            </a:r>
+            <a:endParaRPr lang="en-US" dirty="0"/>
+          </a:p>
+        </p:txBody>
+      </p:sp>
+    </p:spTree>
+    <p:extLst>
+      <p:ext uri="{BB962C8B-B14F-4D97-AF65-F5344CB8AC3E}">
+        <p14:creationId xmlns:p14="http://schemas.microsoft.com/office/powerpoint/2010/main" val="1347576788"/>
       </p:ext>
     </p:extLst>
   </p:cSld>

</xml_diff>

<commit_message>
Added a global config file, actually seems to work pretty well. Also updated the presentation to a slide on how the polytope is represented
</commit_message>
<xml_diff>
--- a/presentation.pptx
+++ b/presentation.pptx
@@ -22,6 +22,7 @@
     <p:sldId id="270" r:id="rId16"/>
     <p:sldId id="271" r:id="rId17"/>
     <p:sldId id="272" r:id="rId18"/>
+    <p:sldId id="273" r:id="rId19"/>
   </p:sldIdLst>
   <p:sldSz cx="12192000" cy="6858000"/>
   <p:notesSz cx="6858000" cy="9144000"/>
@@ -131,7 +132,7 @@
 <file path=ppt/revisionInfo.xml><?xml version="1.0" encoding="utf-8"?>
 <p1510:revInfo xmlns:a="http://schemas.openxmlformats.org/drawingml/2006/main" xmlns:r="http://schemas.openxmlformats.org/officeDocument/2006/relationships" xmlns:p1510="http://schemas.microsoft.com/office/powerpoint/2015/10/main">
   <p1510:revLst>
-    <p1510:client id="{92BFB444-7DBC-CA44-A6DD-A4B3F7DBDADB}" v="252" dt="2026-01-25T21:02:41.459"/>
+    <p1510:client id="{92BFB444-7DBC-CA44-A6DD-A4B3F7DBDADB}" v="290" dt="2026-02-01T23:25:43.920"/>
   </p1510:revLst>
 </p1510:revInfo>
 </file>
@@ -140,8 +141,8 @@
 <pc:chgInfo xmlns:a="http://schemas.openxmlformats.org/drawingml/2006/main" xmlns:r="http://schemas.openxmlformats.org/officeDocument/2006/relationships" xmlns:ac="http://schemas.microsoft.com/office/drawing/2013/main/command" xmlns:pc="http://schemas.microsoft.com/office/powerpoint/2013/main/command">
   <pc:docChgLst>
     <pc:chgData name="Bart Wolleswinkel" userId="b168cadc-1825-41ce-b9cc-7c7f06f6f31d" providerId="ADAL" clId="{22248CC1-9068-5BCB-B15B-4353FE48F57D}"/>
-    <pc:docChg chg="undo custSel addSld modSld">
-      <pc:chgData name="Bart Wolleswinkel" userId="b168cadc-1825-41ce-b9cc-7c7f06f6f31d" providerId="ADAL" clId="{22248CC1-9068-5BCB-B15B-4353FE48F57D}" dt="2026-01-25T21:04:37.088" v="1930" actId="1076"/>
+    <pc:docChg chg="undo custSel addSld modSld sldOrd">
+      <pc:chgData name="Bart Wolleswinkel" userId="b168cadc-1825-41ce-b9cc-7c7f06f6f31d" providerId="ADAL" clId="{22248CC1-9068-5BCB-B15B-4353FE48F57D}" dt="2026-02-01T23:26:34.913" v="2459" actId="1076"/>
       <pc:docMkLst>
         <pc:docMk/>
       </pc:docMkLst>
@@ -701,58 +702,18 @@
           </ac:cxnSpMkLst>
         </pc:cxnChg>
       </pc:sldChg>
-      <pc:sldChg chg="addSp delSp modSp add mod">
-        <pc:chgData name="Bart Wolleswinkel" userId="b168cadc-1825-41ce-b9cc-7c7f06f6f31d" providerId="ADAL" clId="{22248CC1-9068-5BCB-B15B-4353FE48F57D}" dt="2026-01-25T21:04:37.088" v="1930" actId="1076"/>
+      <pc:sldChg chg="addSp delSp modSp add mod ord">
+        <pc:chgData name="Bart Wolleswinkel" userId="b168cadc-1825-41ce-b9cc-7c7f06f6f31d" providerId="ADAL" clId="{22248CC1-9068-5BCB-B15B-4353FE48F57D}" dt="2026-02-01T22:23:25.543" v="1932" actId="20578"/>
         <pc:sldMkLst>
           <pc:docMk/>
           <pc:sldMk cId="3745362789" sldId="272"/>
         </pc:sldMkLst>
-        <pc:spChg chg="del">
-          <ac:chgData name="Bart Wolleswinkel" userId="b168cadc-1825-41ce-b9cc-7c7f06f6f31d" providerId="ADAL" clId="{22248CC1-9068-5BCB-B15B-4353FE48F57D}" dt="2026-01-25T20:03:06.978" v="1100" actId="478"/>
-          <ac:spMkLst>
-            <pc:docMk/>
-            <pc:sldMk cId="3745362789" sldId="272"/>
-            <ac:spMk id="2" creationId="{3B97E6E3-6FE6-6023-C3A6-C5AEDADCE643}"/>
-          </ac:spMkLst>
-        </pc:spChg>
-        <pc:spChg chg="del">
-          <ac:chgData name="Bart Wolleswinkel" userId="b168cadc-1825-41ce-b9cc-7c7f06f6f31d" providerId="ADAL" clId="{22248CC1-9068-5BCB-B15B-4353FE48F57D}" dt="2026-01-25T20:03:06.978" v="1100" actId="478"/>
-          <ac:spMkLst>
-            <pc:docMk/>
-            <pc:sldMk cId="3745362789" sldId="272"/>
-            <ac:spMk id="3" creationId="{F57C6CC6-92D0-F54C-37D9-8B66E2472077}"/>
-          </ac:spMkLst>
-        </pc:spChg>
-        <pc:spChg chg="del">
-          <ac:chgData name="Bart Wolleswinkel" userId="b168cadc-1825-41ce-b9cc-7c7f06f6f31d" providerId="ADAL" clId="{22248CC1-9068-5BCB-B15B-4353FE48F57D}" dt="2026-01-25T20:03:03.195" v="1098" actId="478"/>
-          <ac:spMkLst>
-            <pc:docMk/>
-            <pc:sldMk cId="3745362789" sldId="272"/>
-            <ac:spMk id="4" creationId="{9B623544-58AA-0F9E-ACE8-9AB6D06305CE}"/>
-          </ac:spMkLst>
-        </pc:spChg>
-        <pc:spChg chg="add del mod">
-          <ac:chgData name="Bart Wolleswinkel" userId="b168cadc-1825-41ce-b9cc-7c7f06f6f31d" providerId="ADAL" clId="{22248CC1-9068-5BCB-B15B-4353FE48F57D}" dt="2026-01-25T20:03:04.592" v="1099" actId="478"/>
-          <ac:spMkLst>
-            <pc:docMk/>
-            <pc:sldMk cId="3745362789" sldId="272"/>
-            <ac:spMk id="8" creationId="{DC8B04BC-341D-5AAC-FAA5-F35C4BF6495F}"/>
-          </ac:spMkLst>
-        </pc:spChg>
         <pc:spChg chg="add mod">
           <ac:chgData name="Bart Wolleswinkel" userId="b168cadc-1825-41ce-b9cc-7c7f06f6f31d" providerId="ADAL" clId="{22248CC1-9068-5BCB-B15B-4353FE48F57D}" dt="2026-01-25T20:03:21.389" v="1109" actId="1076"/>
           <ac:spMkLst>
             <pc:docMk/>
             <pc:sldMk cId="3745362789" sldId="272"/>
             <ac:spMk id="9" creationId="{524906FF-91F8-0CB7-9142-1D55E16039A9}"/>
-          </ac:spMkLst>
-        </pc:spChg>
-        <pc:spChg chg="add del mod">
-          <ac:chgData name="Bart Wolleswinkel" userId="b168cadc-1825-41ce-b9cc-7c7f06f6f31d" providerId="ADAL" clId="{22248CC1-9068-5BCB-B15B-4353FE48F57D}" dt="2026-01-25T20:03:27.545" v="1111" actId="478"/>
-          <ac:spMkLst>
-            <pc:docMk/>
-            <pc:sldMk cId="3745362789" sldId="272"/>
-            <ac:spMk id="12" creationId="{77DC837B-D9EE-ED01-D247-E12AEF2C2579}"/>
           </ac:spMkLst>
         </pc:spChg>
         <pc:spChg chg="add mod">
@@ -779,36 +740,12 @@
             <ac:spMk id="17" creationId="{3871CBB6-2271-B98A-30B3-7BF0A14CABC2}"/>
           </ac:spMkLst>
         </pc:spChg>
-        <pc:spChg chg="del">
-          <ac:chgData name="Bart Wolleswinkel" userId="b168cadc-1825-41ce-b9cc-7c7f06f6f31d" providerId="ADAL" clId="{22248CC1-9068-5BCB-B15B-4353FE48F57D}" dt="2026-01-25T20:03:06.978" v="1100" actId="478"/>
-          <ac:spMkLst>
-            <pc:docMk/>
-            <pc:sldMk cId="3745362789" sldId="272"/>
-            <ac:spMk id="18" creationId="{126FD237-5402-80AD-8626-19CCCDAF0E10}"/>
-          </ac:spMkLst>
-        </pc:spChg>
-        <pc:spChg chg="del">
-          <ac:chgData name="Bart Wolleswinkel" userId="b168cadc-1825-41ce-b9cc-7c7f06f6f31d" providerId="ADAL" clId="{22248CC1-9068-5BCB-B15B-4353FE48F57D}" dt="2026-01-25T20:03:06.978" v="1100" actId="478"/>
-          <ac:spMkLst>
-            <pc:docMk/>
-            <pc:sldMk cId="3745362789" sldId="272"/>
-            <ac:spMk id="19" creationId="{F40BA6BE-B14D-08EA-3077-AAF843FB4A69}"/>
-          </ac:spMkLst>
-        </pc:spChg>
         <pc:spChg chg="add mod">
           <ac:chgData name="Bart Wolleswinkel" userId="b168cadc-1825-41ce-b9cc-7c7f06f6f31d" providerId="ADAL" clId="{22248CC1-9068-5BCB-B15B-4353FE48F57D}" dt="2026-01-25T20:38:48.201" v="1686" actId="1076"/>
           <ac:spMkLst>
             <pc:docMk/>
             <pc:sldMk cId="3745362789" sldId="272"/>
             <ac:spMk id="20" creationId="{A186645D-1EDB-D2AF-0036-97FAB8AED13A}"/>
-          </ac:spMkLst>
-        </pc:spChg>
-        <pc:spChg chg="del">
-          <ac:chgData name="Bart Wolleswinkel" userId="b168cadc-1825-41ce-b9cc-7c7f06f6f31d" providerId="ADAL" clId="{22248CC1-9068-5BCB-B15B-4353FE48F57D}" dt="2026-01-25T20:03:06.978" v="1100" actId="478"/>
-          <ac:spMkLst>
-            <pc:docMk/>
-            <pc:sldMk cId="3745362789" sldId="272"/>
-            <ac:spMk id="21" creationId="{42BD5B64-D780-7265-3563-E4AC87F5AB6A}"/>
           </ac:spMkLst>
         </pc:spChg>
         <pc:spChg chg="add mod">
@@ -859,60 +796,12 @@
             <ac:spMk id="31" creationId="{BDBA7F4B-63BF-A032-4E7B-28C33E2B8004}"/>
           </ac:spMkLst>
         </pc:spChg>
-        <pc:spChg chg="del">
-          <ac:chgData name="Bart Wolleswinkel" userId="b168cadc-1825-41ce-b9cc-7c7f06f6f31d" providerId="ADAL" clId="{22248CC1-9068-5BCB-B15B-4353FE48F57D}" dt="2026-01-25T20:03:06.978" v="1100" actId="478"/>
-          <ac:spMkLst>
-            <pc:docMk/>
-            <pc:sldMk cId="3745362789" sldId="272"/>
-            <ac:spMk id="38" creationId="{3B89C261-561F-5058-D01B-43C7641D2380}"/>
-          </ac:spMkLst>
-        </pc:spChg>
-        <pc:spChg chg="del">
-          <ac:chgData name="Bart Wolleswinkel" userId="b168cadc-1825-41ce-b9cc-7c7f06f6f31d" providerId="ADAL" clId="{22248CC1-9068-5BCB-B15B-4353FE48F57D}" dt="2026-01-25T20:03:06.978" v="1100" actId="478"/>
-          <ac:spMkLst>
-            <pc:docMk/>
-            <pc:sldMk cId="3745362789" sldId="272"/>
-            <ac:spMk id="42" creationId="{103C9B4C-C796-1D05-78BD-BB3AB9C65A9D}"/>
-          </ac:spMkLst>
-        </pc:spChg>
-        <pc:spChg chg="del">
-          <ac:chgData name="Bart Wolleswinkel" userId="b168cadc-1825-41ce-b9cc-7c7f06f6f31d" providerId="ADAL" clId="{22248CC1-9068-5BCB-B15B-4353FE48F57D}" dt="2026-01-25T20:03:06.978" v="1100" actId="478"/>
-          <ac:spMkLst>
-            <pc:docMk/>
-            <pc:sldMk cId="3745362789" sldId="272"/>
-            <ac:spMk id="43" creationId="{99FD20BC-E4AA-89FF-4029-8611209FB5D2}"/>
-          </ac:spMkLst>
-        </pc:spChg>
-        <pc:spChg chg="del">
-          <ac:chgData name="Bart Wolleswinkel" userId="b168cadc-1825-41ce-b9cc-7c7f06f6f31d" providerId="ADAL" clId="{22248CC1-9068-5BCB-B15B-4353FE48F57D}" dt="2026-01-25T20:03:06.978" v="1100" actId="478"/>
-          <ac:spMkLst>
-            <pc:docMk/>
-            <pc:sldMk cId="3745362789" sldId="272"/>
-            <ac:spMk id="46" creationId="{0275C84D-9989-EB78-BE00-B12A2ABB702D}"/>
-          </ac:spMkLst>
-        </pc:spChg>
-        <pc:spChg chg="del">
-          <ac:chgData name="Bart Wolleswinkel" userId="b168cadc-1825-41ce-b9cc-7c7f06f6f31d" providerId="ADAL" clId="{22248CC1-9068-5BCB-B15B-4353FE48F57D}" dt="2026-01-25T20:03:06.978" v="1100" actId="478"/>
-          <ac:spMkLst>
-            <pc:docMk/>
-            <pc:sldMk cId="3745362789" sldId="272"/>
-            <ac:spMk id="47" creationId="{9A125434-BB3F-4156-8F50-F4BB63C44303}"/>
-          </ac:spMkLst>
-        </pc:spChg>
         <pc:spChg chg="add mod">
           <ac:chgData name="Bart Wolleswinkel" userId="b168cadc-1825-41ce-b9cc-7c7f06f6f31d" providerId="ADAL" clId="{22248CC1-9068-5BCB-B15B-4353FE48F57D}" dt="2026-01-25T21:00:10.134" v="1877" actId="1076"/>
           <ac:spMkLst>
             <pc:docMk/>
             <pc:sldMk cId="3745362789" sldId="272"/>
             <ac:spMk id="49" creationId="{8CAAB034-CD59-BD1F-1F14-6BE97ED7CC84}"/>
-          </ac:spMkLst>
-        </pc:spChg>
-        <pc:spChg chg="add del mod">
-          <ac:chgData name="Bart Wolleswinkel" userId="b168cadc-1825-41ce-b9cc-7c7f06f6f31d" providerId="ADAL" clId="{22248CC1-9068-5BCB-B15B-4353FE48F57D}" dt="2026-01-25T20:25:51.550" v="1562" actId="478"/>
-          <ac:spMkLst>
-            <pc:docMk/>
-            <pc:sldMk cId="3745362789" sldId="272"/>
-            <ac:spMk id="53" creationId="{430E5523-64E0-D6A0-38AE-67FB9CBEBC5E}"/>
           </ac:spMkLst>
         </pc:spChg>
         <pc:spChg chg="add mod">
@@ -921,14 +810,6 @@
             <pc:docMk/>
             <pc:sldMk cId="3745362789" sldId="272"/>
             <ac:spMk id="54" creationId="{995F679F-2CE4-C2C5-CCA3-6E79752299B6}"/>
-          </ac:spMkLst>
-        </pc:spChg>
-        <pc:spChg chg="add del mod">
-          <ac:chgData name="Bart Wolleswinkel" userId="b168cadc-1825-41ce-b9cc-7c7f06f6f31d" providerId="ADAL" clId="{22248CC1-9068-5BCB-B15B-4353FE48F57D}" dt="2026-01-25T20:16:16.961" v="1332" actId="478"/>
-          <ac:spMkLst>
-            <pc:docMk/>
-            <pc:sldMk cId="3745362789" sldId="272"/>
-            <ac:spMk id="65" creationId="{56E49AA5-F65F-602D-4468-B46E38FFDA97}"/>
           </ac:spMkLst>
         </pc:spChg>
         <pc:spChg chg="add mod">
@@ -947,14 +828,6 @@
             <ac:spMk id="87" creationId="{54C72385-4577-35D6-A30A-FE17378B414A}"/>
           </ac:spMkLst>
         </pc:spChg>
-        <pc:spChg chg="add del mod">
-          <ac:chgData name="Bart Wolleswinkel" userId="b168cadc-1825-41ce-b9cc-7c7f06f6f31d" providerId="ADAL" clId="{22248CC1-9068-5BCB-B15B-4353FE48F57D}" dt="2026-01-25T20:25:45.639" v="1560" actId="478"/>
-          <ac:spMkLst>
-            <pc:docMk/>
-            <pc:sldMk cId="3745362789" sldId="272"/>
-            <ac:spMk id="91" creationId="{B36DFF45-242A-AAD7-B69D-509CE606202C}"/>
-          </ac:spMkLst>
-        </pc:spChg>
         <pc:spChg chg="add mod">
           <ac:chgData name="Bart Wolleswinkel" userId="b168cadc-1825-41ce-b9cc-7c7f06f6f31d" providerId="ADAL" clId="{22248CC1-9068-5BCB-B15B-4353FE48F57D}" dt="2026-01-25T21:04:37.088" v="1930" actId="1076"/>
           <ac:spMkLst>
@@ -971,36 +844,12 @@
             <ac:spMk id="94" creationId="{DD4E7D6A-5A78-81D4-4044-2E8B8E1F4D36}"/>
           </ac:spMkLst>
         </pc:spChg>
-        <pc:spChg chg="add del mod">
-          <ac:chgData name="Bart Wolleswinkel" userId="b168cadc-1825-41ce-b9cc-7c7f06f6f31d" providerId="ADAL" clId="{22248CC1-9068-5BCB-B15B-4353FE48F57D}" dt="2026-01-25T20:19:33.554" v="1431" actId="478"/>
-          <ac:spMkLst>
-            <pc:docMk/>
-            <pc:sldMk cId="3745362789" sldId="272"/>
-            <ac:spMk id="98" creationId="{6930A2E3-20E1-F4CD-D94B-657212EB7810}"/>
-          </ac:spMkLst>
-        </pc:spChg>
-        <pc:spChg chg="add del mod">
-          <ac:chgData name="Bart Wolleswinkel" userId="b168cadc-1825-41ce-b9cc-7c7f06f6f31d" providerId="ADAL" clId="{22248CC1-9068-5BCB-B15B-4353FE48F57D}" dt="2026-01-25T20:20:57.713" v="1466" actId="478"/>
-          <ac:spMkLst>
-            <pc:docMk/>
-            <pc:sldMk cId="3745362789" sldId="272"/>
-            <ac:spMk id="99" creationId="{E166838F-6AE7-FF4C-4A1F-7C4643470B5F}"/>
-          </ac:spMkLst>
-        </pc:spChg>
         <pc:spChg chg="add mod">
           <ac:chgData name="Bart Wolleswinkel" userId="b168cadc-1825-41ce-b9cc-7c7f06f6f31d" providerId="ADAL" clId="{22248CC1-9068-5BCB-B15B-4353FE48F57D}" dt="2026-01-25T20:58:25.311" v="1862" actId="1076"/>
           <ac:spMkLst>
             <pc:docMk/>
             <pc:sldMk cId="3745362789" sldId="272"/>
             <ac:spMk id="100" creationId="{9B1E240F-47B8-4FCB-5AEA-B0F692CB0722}"/>
-          </ac:spMkLst>
-        </pc:spChg>
-        <pc:spChg chg="add del mod">
-          <ac:chgData name="Bart Wolleswinkel" userId="b168cadc-1825-41ce-b9cc-7c7f06f6f31d" providerId="ADAL" clId="{22248CC1-9068-5BCB-B15B-4353FE48F57D}" dt="2026-01-25T20:25:48.609" v="1561" actId="478"/>
-          <ac:spMkLst>
-            <pc:docMk/>
-            <pc:sldMk cId="3745362789" sldId="272"/>
-            <ac:spMk id="104" creationId="{01ED587E-47DA-D7E0-68D6-D8749C5A4DE6}"/>
           </ac:spMkLst>
         </pc:spChg>
         <pc:spChg chg="add mod">
@@ -1009,22 +858,6 @@
             <pc:docMk/>
             <pc:sldMk cId="3745362789" sldId="272"/>
             <ac:spMk id="112" creationId="{C69EB4CF-B624-A337-228B-5633AE4018A1}"/>
-          </ac:spMkLst>
-        </pc:spChg>
-        <pc:spChg chg="add del mod">
-          <ac:chgData name="Bart Wolleswinkel" userId="b168cadc-1825-41ce-b9cc-7c7f06f6f31d" providerId="ADAL" clId="{22248CC1-9068-5BCB-B15B-4353FE48F57D}" dt="2026-01-25T20:25:42.411" v="1559" actId="478"/>
-          <ac:spMkLst>
-            <pc:docMk/>
-            <pc:sldMk cId="3745362789" sldId="272"/>
-            <ac:spMk id="116" creationId="{77B797C6-3304-6C36-5E02-62833367C010}"/>
-          </ac:spMkLst>
-        </pc:spChg>
-        <pc:spChg chg="add del mod">
-          <ac:chgData name="Bart Wolleswinkel" userId="b168cadc-1825-41ce-b9cc-7c7f06f6f31d" providerId="ADAL" clId="{22248CC1-9068-5BCB-B15B-4353FE48F57D}" dt="2026-01-25T20:22:09.683" v="1493" actId="478"/>
-          <ac:spMkLst>
-            <pc:docMk/>
-            <pc:sldMk cId="3745362789" sldId="272"/>
-            <ac:spMk id="117" creationId="{70CAC2B2-B934-974F-EB7E-BB8CBE8E6360}"/>
           </ac:spMkLst>
         </pc:spChg>
         <pc:spChg chg="add mod">
@@ -1043,14 +876,6 @@
             <ac:spMk id="131" creationId="{A840C999-AED7-6C86-6C6C-140E0A8A1602}"/>
           </ac:spMkLst>
         </pc:spChg>
-        <pc:spChg chg="add del mod">
-          <ac:chgData name="Bart Wolleswinkel" userId="b168cadc-1825-41ce-b9cc-7c7f06f6f31d" providerId="ADAL" clId="{22248CC1-9068-5BCB-B15B-4353FE48F57D}" dt="2026-01-25T20:27:26.321" v="1594"/>
-          <ac:spMkLst>
-            <pc:docMk/>
-            <pc:sldMk cId="3745362789" sldId="272"/>
-            <ac:spMk id="149" creationId="{E0D6A31C-9AB9-C980-1DE6-1239C5E64B21}"/>
-          </ac:spMkLst>
-        </pc:spChg>
         <pc:spChg chg="add mod">
           <ac:chgData name="Bart Wolleswinkel" userId="b168cadc-1825-41ce-b9cc-7c7f06f6f31d" providerId="ADAL" clId="{22248CC1-9068-5BCB-B15B-4353FE48F57D}" dt="2026-01-25T21:00:03.356" v="1875" actId="1076"/>
           <ac:spMkLst>
@@ -1092,27 +917,11 @@
           </ac:spMkLst>
         </pc:spChg>
         <pc:spChg chg="add mod">
-          <ac:chgData name="Bart Wolleswinkel" userId="b168cadc-1825-41ce-b9cc-7c7f06f6f31d" providerId="ADAL" clId="{22248CC1-9068-5BCB-B15B-4353FE48F57D}" dt="2026-01-25T20:26:54.143" v="1581"/>
-          <ac:spMkLst>
-            <pc:docMk/>
-            <pc:sldMk cId="3745362789" sldId="272"/>
-            <ac:spMk id="155" creationId="{FDD4D783-7B1D-1D61-CE56-C767031C03ED}"/>
-          </ac:spMkLst>
-        </pc:spChg>
-        <pc:spChg chg="add mod">
           <ac:chgData name="Bart Wolleswinkel" userId="b168cadc-1825-41ce-b9cc-7c7f06f6f31d" providerId="ADAL" clId="{22248CC1-9068-5BCB-B15B-4353FE48F57D}" dt="2026-01-25T20:58:25.311" v="1862" actId="1076"/>
           <ac:spMkLst>
             <pc:docMk/>
             <pc:sldMk cId="3745362789" sldId="272"/>
             <ac:spMk id="156" creationId="{0920FBEE-7032-277C-921E-0B38EC753303}"/>
-          </ac:spMkLst>
-        </pc:spChg>
-        <pc:spChg chg="add del mod">
-          <ac:chgData name="Bart Wolleswinkel" userId="b168cadc-1825-41ce-b9cc-7c7f06f6f31d" providerId="ADAL" clId="{22248CC1-9068-5BCB-B15B-4353FE48F57D}" dt="2026-01-25T20:30:23.152" v="1610" actId="478"/>
-          <ac:spMkLst>
-            <pc:docMk/>
-            <pc:sldMk cId="3745362789" sldId="272"/>
-            <ac:spMk id="159" creationId="{961895CC-EA0F-DC42-C8F3-3A731DD305B0}"/>
           </ac:spMkLst>
         </pc:spChg>
         <pc:spChg chg="add mod">
@@ -1195,28 +1004,12 @@
             <ac:spMk id="223" creationId="{8735A55A-96DC-9AE9-9551-24787B6DF91D}"/>
           </ac:spMkLst>
         </pc:spChg>
-        <pc:spChg chg="add del mod">
-          <ac:chgData name="Bart Wolleswinkel" userId="b168cadc-1825-41ce-b9cc-7c7f06f6f31d" providerId="ADAL" clId="{22248CC1-9068-5BCB-B15B-4353FE48F57D}" dt="2026-01-25T20:57:56.401" v="1844" actId="478"/>
-          <ac:spMkLst>
-            <pc:docMk/>
-            <pc:sldMk cId="3745362789" sldId="272"/>
-            <ac:spMk id="224" creationId="{B430D4D5-B393-FA09-2E83-C9196136408F}"/>
-          </ac:spMkLst>
-        </pc:spChg>
         <pc:spChg chg="add mod">
           <ac:chgData name="Bart Wolleswinkel" userId="b168cadc-1825-41ce-b9cc-7c7f06f6f31d" providerId="ADAL" clId="{22248CC1-9068-5BCB-B15B-4353FE48F57D}" dt="2026-01-25T21:02:12.365" v="1902" actId="1076"/>
           <ac:spMkLst>
             <pc:docMk/>
             <pc:sldMk cId="3745362789" sldId="272"/>
             <ac:spMk id="225" creationId="{D8C4C5CC-C8D0-FEEB-EF4E-F3D6912CE537}"/>
-          </ac:spMkLst>
-        </pc:spChg>
-        <pc:spChg chg="add del mod">
-          <ac:chgData name="Bart Wolleswinkel" userId="b168cadc-1825-41ce-b9cc-7c7f06f6f31d" providerId="ADAL" clId="{22248CC1-9068-5BCB-B15B-4353FE48F57D}" dt="2026-01-25T20:58:38.207" v="1873" actId="478"/>
-          <ac:spMkLst>
-            <pc:docMk/>
-            <pc:sldMk cId="3745362789" sldId="272"/>
-            <ac:spMk id="226" creationId="{94ACB340-DCF7-F237-5DCA-B0C0187E82F0}"/>
           </ac:spMkLst>
         </pc:spChg>
         <pc:spChg chg="add mod">
@@ -1251,14 +1044,6 @@
             <ac:spMk id="249" creationId="{AA29ECC2-FF79-6644-B189-4FB9723AAFC7}"/>
           </ac:spMkLst>
         </pc:spChg>
-        <pc:grpChg chg="add mod">
-          <ac:chgData name="Bart Wolleswinkel" userId="b168cadc-1825-41ce-b9cc-7c7f06f6f31d" providerId="ADAL" clId="{22248CC1-9068-5BCB-B15B-4353FE48F57D}" dt="2026-01-25T20:14:41.169" v="1310" actId="164"/>
-          <ac:grpSpMkLst>
-            <pc:docMk/>
-            <pc:sldMk cId="3745362789" sldId="272"/>
-            <ac:grpSpMk id="60" creationId="{8BD44035-8737-BFD1-2C7B-04C7EA4F8576}"/>
-          </ac:grpSpMkLst>
-        </pc:grpChg>
         <pc:cxnChg chg="add mod">
           <ac:chgData name="Bart Wolleswinkel" userId="b168cadc-1825-41ce-b9cc-7c7f06f6f31d" providerId="ADAL" clId="{22248CC1-9068-5BCB-B15B-4353FE48F57D}" dt="2026-01-25T20:04:20.020" v="1119" actId="208"/>
           <ac:cxnSpMkLst>
@@ -1395,14 +1180,6 @@
             <ac:cxnSpMk id="122" creationId="{C1DFDD90-A6D7-F931-1E2B-DECADAD2D381}"/>
           </ac:cxnSpMkLst>
         </pc:cxnChg>
-        <pc:cxnChg chg="add del mod">
-          <ac:chgData name="Bart Wolleswinkel" userId="b168cadc-1825-41ce-b9cc-7c7f06f6f31d" providerId="ADAL" clId="{22248CC1-9068-5BCB-B15B-4353FE48F57D}" dt="2026-01-25T20:24:41.521" v="1549" actId="478"/>
-          <ac:cxnSpMkLst>
-            <pc:docMk/>
-            <pc:sldMk cId="3745362789" sldId="272"/>
-            <ac:cxnSpMk id="133" creationId="{EDA3F127-B1F7-3185-DC35-5C458196BCFD}"/>
-          </ac:cxnSpMkLst>
-        </pc:cxnChg>
         <pc:cxnChg chg="add mod">
           <ac:chgData name="Bart Wolleswinkel" userId="b168cadc-1825-41ce-b9cc-7c7f06f6f31d" providerId="ADAL" clId="{22248CC1-9068-5BCB-B15B-4353FE48F57D}" dt="2026-01-25T20:52:51.746" v="1698" actId="1076"/>
           <ac:cxnSpMkLst>
@@ -1428,22 +1205,6 @@
           </ac:cxnSpMkLst>
         </pc:cxnChg>
         <pc:cxnChg chg="add mod">
-          <ac:chgData name="Bart Wolleswinkel" userId="b168cadc-1825-41ce-b9cc-7c7f06f6f31d" providerId="ADAL" clId="{22248CC1-9068-5BCB-B15B-4353FE48F57D}" dt="2026-01-25T20:54:23.528" v="1730"/>
-          <ac:cxnSpMkLst>
-            <pc:docMk/>
-            <pc:sldMk cId="3745362789" sldId="272"/>
-            <ac:cxnSpMk id="201" creationId="{0973F26B-2C14-DCE7-0B6F-B615B2A37966}"/>
-          </ac:cxnSpMkLst>
-        </pc:cxnChg>
-        <pc:cxnChg chg="add mod">
-          <ac:chgData name="Bart Wolleswinkel" userId="b168cadc-1825-41ce-b9cc-7c7f06f6f31d" providerId="ADAL" clId="{22248CC1-9068-5BCB-B15B-4353FE48F57D}" dt="2026-01-25T20:54:26.641" v="1731"/>
-          <ac:cxnSpMkLst>
-            <pc:docMk/>
-            <pc:sldMk cId="3745362789" sldId="272"/>
-            <ac:cxnSpMk id="202" creationId="{7C8F50BA-92E2-1D3A-82E0-D7A4F73A64F9}"/>
-          </ac:cxnSpMkLst>
-        </pc:cxnChg>
-        <pc:cxnChg chg="add mod">
           <ac:chgData name="Bart Wolleswinkel" userId="b168cadc-1825-41ce-b9cc-7c7f06f6f31d" providerId="ADAL" clId="{22248CC1-9068-5BCB-B15B-4353FE48F57D}" dt="2026-01-25T20:55:07.305" v="1777" actId="208"/>
           <ac:cxnSpMkLst>
             <pc:docMk/>
@@ -1497,6 +1258,517 @@
             <pc:docMk/>
             <pc:sldMk cId="3745362789" sldId="272"/>
             <ac:cxnSpMk id="242" creationId="{C3B619C8-10A3-798A-4D95-173D9C7228FB}"/>
+          </ac:cxnSpMkLst>
+        </pc:cxnChg>
+      </pc:sldChg>
+      <pc:sldChg chg="addSp delSp modSp add mod">
+        <pc:chgData name="Bart Wolleswinkel" userId="b168cadc-1825-41ce-b9cc-7c7f06f6f31d" providerId="ADAL" clId="{22248CC1-9068-5BCB-B15B-4353FE48F57D}" dt="2026-02-01T23:26:34.913" v="2459" actId="1076"/>
+        <pc:sldMkLst>
+          <pc:docMk/>
+          <pc:sldMk cId="2057737708" sldId="273"/>
+        </pc:sldMkLst>
+        <pc:spChg chg="mod">
+          <ac:chgData name="Bart Wolleswinkel" userId="b168cadc-1825-41ce-b9cc-7c7f06f6f31d" providerId="ADAL" clId="{22248CC1-9068-5BCB-B15B-4353FE48F57D}" dt="2026-02-01T23:24:17.590" v="2408" actId="14100"/>
+          <ac:spMkLst>
+            <pc:docMk/>
+            <pc:sldMk cId="2057737708" sldId="273"/>
+            <ac:spMk id="2" creationId="{6C94E02B-3177-6A8B-77D8-CCE06B0BE7DE}"/>
+          </ac:spMkLst>
+        </pc:spChg>
+        <pc:spChg chg="mod">
+          <ac:chgData name="Bart Wolleswinkel" userId="b168cadc-1825-41ce-b9cc-7c7f06f6f31d" providerId="ADAL" clId="{22248CC1-9068-5BCB-B15B-4353FE48F57D}" dt="2026-02-01T23:24:11.451" v="2406" actId="1076"/>
+          <ac:spMkLst>
+            <pc:docMk/>
+            <pc:sldMk cId="2057737708" sldId="273"/>
+            <ac:spMk id="3" creationId="{8BBE5440-36D3-BB37-9447-F89FCFD791B5}"/>
+          </ac:spMkLst>
+        </pc:spChg>
+        <pc:spChg chg="mod">
+          <ac:chgData name="Bart Wolleswinkel" userId="b168cadc-1825-41ce-b9cc-7c7f06f6f31d" providerId="ADAL" clId="{22248CC1-9068-5BCB-B15B-4353FE48F57D}" dt="2026-02-01T23:24:13.641" v="2407" actId="1076"/>
+          <ac:spMkLst>
+            <pc:docMk/>
+            <pc:sldMk cId="2057737708" sldId="273"/>
+            <ac:spMk id="4" creationId="{60FA50A4-57DF-57D3-200B-9E194D94B0F1}"/>
+          </ac:spMkLst>
+        </pc:spChg>
+        <pc:spChg chg="del">
+          <ac:chgData name="Bart Wolleswinkel" userId="b168cadc-1825-41ce-b9cc-7c7f06f6f31d" providerId="ADAL" clId="{22248CC1-9068-5BCB-B15B-4353FE48F57D}" dt="2026-02-01T22:24:01.440" v="1959" actId="478"/>
+          <ac:spMkLst>
+            <pc:docMk/>
+            <pc:sldMk cId="2057737708" sldId="273"/>
+            <ac:spMk id="5" creationId="{2B93FE91-E622-C2AB-2BB4-20CA54F86A54}"/>
+          </ac:spMkLst>
+        </pc:spChg>
+        <pc:spChg chg="del">
+          <ac:chgData name="Bart Wolleswinkel" userId="b168cadc-1825-41ce-b9cc-7c7f06f6f31d" providerId="ADAL" clId="{22248CC1-9068-5BCB-B15B-4353FE48F57D}" dt="2026-02-01T22:23:52.950" v="1957" actId="478"/>
+          <ac:spMkLst>
+            <pc:docMk/>
+            <pc:sldMk cId="2057737708" sldId="273"/>
+            <ac:spMk id="6" creationId="{1488EF85-0DAA-2295-669E-3DCEFA941250}"/>
+          </ac:spMkLst>
+        </pc:spChg>
+        <pc:spChg chg="add del">
+          <ac:chgData name="Bart Wolleswinkel" userId="b168cadc-1825-41ce-b9cc-7c7f06f6f31d" providerId="ADAL" clId="{22248CC1-9068-5BCB-B15B-4353FE48F57D}" dt="2026-02-01T23:10:03.361" v="1971" actId="478"/>
+          <ac:spMkLst>
+            <pc:docMk/>
+            <pc:sldMk cId="2057737708" sldId="273"/>
+            <ac:spMk id="8" creationId="{700DC9FD-72F8-15FB-2576-FA235494726B}"/>
+          </ac:spMkLst>
+        </pc:spChg>
+        <pc:spChg chg="add mod">
+          <ac:chgData name="Bart Wolleswinkel" userId="b168cadc-1825-41ce-b9cc-7c7f06f6f31d" providerId="ADAL" clId="{22248CC1-9068-5BCB-B15B-4353FE48F57D}" dt="2026-02-01T23:12:29.048" v="2060" actId="1076"/>
+          <ac:spMkLst>
+            <pc:docMk/>
+            <pc:sldMk cId="2057737708" sldId="273"/>
+            <ac:spMk id="9" creationId="{651BFFA2-7068-1DB5-D305-EB810E17CAA8}"/>
+          </ac:spMkLst>
+        </pc:spChg>
+        <pc:spChg chg="del">
+          <ac:chgData name="Bart Wolleswinkel" userId="b168cadc-1825-41ce-b9cc-7c7f06f6f31d" providerId="ADAL" clId="{22248CC1-9068-5BCB-B15B-4353FE48F57D}" dt="2026-02-01T22:24:01.440" v="1959" actId="478"/>
+          <ac:spMkLst>
+            <pc:docMk/>
+            <pc:sldMk cId="2057737708" sldId="273"/>
+            <ac:spMk id="11" creationId="{8A6F2E58-1EBB-A6D7-2339-FE3CC55E01CA}"/>
+          </ac:spMkLst>
+        </pc:spChg>
+        <pc:spChg chg="add mod">
+          <ac:chgData name="Bart Wolleswinkel" userId="b168cadc-1825-41ce-b9cc-7c7f06f6f31d" providerId="ADAL" clId="{22248CC1-9068-5BCB-B15B-4353FE48F57D}" dt="2026-02-01T23:12:29.048" v="2060" actId="1076"/>
+          <ac:spMkLst>
+            <pc:docMk/>
+            <pc:sldMk cId="2057737708" sldId="273"/>
+            <ac:spMk id="12" creationId="{6F4017D5-8481-A93E-E9AE-4DD0F57483D7}"/>
+          </ac:spMkLst>
+        </pc:spChg>
+        <pc:spChg chg="add mod">
+          <ac:chgData name="Bart Wolleswinkel" userId="b168cadc-1825-41ce-b9cc-7c7f06f6f31d" providerId="ADAL" clId="{22248CC1-9068-5BCB-B15B-4353FE48F57D}" dt="2026-02-01T23:12:29.048" v="2060" actId="1076"/>
+          <ac:spMkLst>
+            <pc:docMk/>
+            <pc:sldMk cId="2057737708" sldId="273"/>
+            <ac:spMk id="13" creationId="{5B452667-6DEF-21B4-B642-5FF79F4EF6F0}"/>
+          </ac:spMkLst>
+        </pc:spChg>
+        <pc:spChg chg="add del mod">
+          <ac:chgData name="Bart Wolleswinkel" userId="b168cadc-1825-41ce-b9cc-7c7f06f6f31d" providerId="ADAL" clId="{22248CC1-9068-5BCB-B15B-4353FE48F57D}" dt="2026-02-01T23:12:47.980" v="2071" actId="478"/>
+          <ac:spMkLst>
+            <pc:docMk/>
+            <pc:sldMk cId="2057737708" sldId="273"/>
+            <ac:spMk id="14" creationId="{8C3941E3-39D2-08B5-C2D9-A9B14FBFD8A3}"/>
+          </ac:spMkLst>
+        </pc:spChg>
+        <pc:spChg chg="add mod">
+          <ac:chgData name="Bart Wolleswinkel" userId="b168cadc-1825-41ce-b9cc-7c7f06f6f31d" providerId="ADAL" clId="{22248CC1-9068-5BCB-B15B-4353FE48F57D}" dt="2026-02-01T23:12:29.048" v="2060" actId="1076"/>
+          <ac:spMkLst>
+            <pc:docMk/>
+            <pc:sldMk cId="2057737708" sldId="273"/>
+            <ac:spMk id="15" creationId="{41031022-D74A-227E-D6E4-D8BB6C1CCFBC}"/>
+          </ac:spMkLst>
+        </pc:spChg>
+        <pc:spChg chg="add mod">
+          <ac:chgData name="Bart Wolleswinkel" userId="b168cadc-1825-41ce-b9cc-7c7f06f6f31d" providerId="ADAL" clId="{22248CC1-9068-5BCB-B15B-4353FE48F57D}" dt="2026-02-01T23:24:11.451" v="2406" actId="1076"/>
+          <ac:spMkLst>
+            <pc:docMk/>
+            <pc:sldMk cId="2057737708" sldId="273"/>
+            <ac:spMk id="16" creationId="{7C4F104E-2A60-5095-637A-407528A9FCDA}"/>
+          </ac:spMkLst>
+        </pc:spChg>
+        <pc:spChg chg="add mod">
+          <ac:chgData name="Bart Wolleswinkel" userId="b168cadc-1825-41ce-b9cc-7c7f06f6f31d" providerId="ADAL" clId="{22248CC1-9068-5BCB-B15B-4353FE48F57D}" dt="2026-02-01T23:22:47.734" v="2388" actId="1076"/>
+          <ac:spMkLst>
+            <pc:docMk/>
+            <pc:sldMk cId="2057737708" sldId="273"/>
+            <ac:spMk id="17" creationId="{85AD6974-E7D6-77B6-1641-9771406C97A6}"/>
+          </ac:spMkLst>
+        </pc:spChg>
+        <pc:spChg chg="del">
+          <ac:chgData name="Bart Wolleswinkel" userId="b168cadc-1825-41ce-b9cc-7c7f06f6f31d" providerId="ADAL" clId="{22248CC1-9068-5BCB-B15B-4353FE48F57D}" dt="2026-02-01T22:24:01.440" v="1959" actId="478"/>
+          <ac:spMkLst>
+            <pc:docMk/>
+            <pc:sldMk cId="2057737708" sldId="273"/>
+            <ac:spMk id="18" creationId="{E471D13E-9272-E043-57DA-97BE0FD38FA8}"/>
+          </ac:spMkLst>
+        </pc:spChg>
+        <pc:spChg chg="del">
+          <ac:chgData name="Bart Wolleswinkel" userId="b168cadc-1825-41ce-b9cc-7c7f06f6f31d" providerId="ADAL" clId="{22248CC1-9068-5BCB-B15B-4353FE48F57D}" dt="2026-02-01T22:23:52.950" v="1957" actId="478"/>
+          <ac:spMkLst>
+            <pc:docMk/>
+            <pc:sldMk cId="2057737708" sldId="273"/>
+            <ac:spMk id="19" creationId="{9C848AF1-137A-8B24-8402-B3A7927D5F05}"/>
+          </ac:spMkLst>
+        </pc:spChg>
+        <pc:spChg chg="add del mod">
+          <ac:chgData name="Bart Wolleswinkel" userId="b168cadc-1825-41ce-b9cc-7c7f06f6f31d" providerId="ADAL" clId="{22248CC1-9068-5BCB-B15B-4353FE48F57D}" dt="2026-02-01T23:12:45.724" v="2070" actId="478"/>
+          <ac:spMkLst>
+            <pc:docMk/>
+            <pc:sldMk cId="2057737708" sldId="273"/>
+            <ac:spMk id="20" creationId="{3519ABCE-EC3C-C937-1ECE-0384D192CF96}"/>
+          </ac:spMkLst>
+        </pc:spChg>
+        <pc:spChg chg="mod">
+          <ac:chgData name="Bart Wolleswinkel" userId="b168cadc-1825-41ce-b9cc-7c7f06f6f31d" providerId="ADAL" clId="{22248CC1-9068-5BCB-B15B-4353FE48F57D}" dt="2026-02-01T23:24:11.451" v="2406" actId="1076"/>
+          <ac:spMkLst>
+            <pc:docMk/>
+            <pc:sldMk cId="2057737708" sldId="273"/>
+            <ac:spMk id="21" creationId="{BCEFB855-606C-F36A-671F-B95F9442A656}"/>
+          </ac:spMkLst>
+        </pc:spChg>
+        <pc:spChg chg="add mod">
+          <ac:chgData name="Bart Wolleswinkel" userId="b168cadc-1825-41ce-b9cc-7c7f06f6f31d" providerId="ADAL" clId="{22248CC1-9068-5BCB-B15B-4353FE48F57D}" dt="2026-02-01T23:22:47.734" v="2388" actId="1076"/>
+          <ac:spMkLst>
+            <pc:docMk/>
+            <pc:sldMk cId="2057737708" sldId="273"/>
+            <ac:spMk id="22" creationId="{3363A49F-735C-7A87-6F94-BBB7E0699438}"/>
+          </ac:spMkLst>
+        </pc:spChg>
+        <pc:spChg chg="add mod">
+          <ac:chgData name="Bart Wolleswinkel" userId="b168cadc-1825-41ce-b9cc-7c7f06f6f31d" providerId="ADAL" clId="{22248CC1-9068-5BCB-B15B-4353FE48F57D}" dt="2026-02-01T23:22:47.734" v="2388" actId="1076"/>
+          <ac:spMkLst>
+            <pc:docMk/>
+            <pc:sldMk cId="2057737708" sldId="273"/>
+            <ac:spMk id="23" creationId="{65AA3A78-5033-86E0-31EA-1FA4FDD47D1B}"/>
+          </ac:spMkLst>
+        </pc:spChg>
+        <pc:spChg chg="add mod">
+          <ac:chgData name="Bart Wolleswinkel" userId="b168cadc-1825-41ce-b9cc-7c7f06f6f31d" providerId="ADAL" clId="{22248CC1-9068-5BCB-B15B-4353FE48F57D}" dt="2026-02-01T23:16:57.729" v="2198" actId="1076"/>
+          <ac:spMkLst>
+            <pc:docMk/>
+            <pc:sldMk cId="2057737708" sldId="273"/>
+            <ac:spMk id="24" creationId="{DFB36BFA-7EA6-2B8C-C3F6-395496D6201F}"/>
+          </ac:spMkLst>
+        </pc:spChg>
+        <pc:spChg chg="add mod">
+          <ac:chgData name="Bart Wolleswinkel" userId="b168cadc-1825-41ce-b9cc-7c7f06f6f31d" providerId="ADAL" clId="{22248CC1-9068-5BCB-B15B-4353FE48F57D}" dt="2026-02-01T23:13:31.570" v="2106"/>
+          <ac:spMkLst>
+            <pc:docMk/>
+            <pc:sldMk cId="2057737708" sldId="273"/>
+            <ac:spMk id="25" creationId="{E4AE7038-EF4E-D9C8-222F-E1DC1798461D}"/>
+          </ac:spMkLst>
+        </pc:spChg>
+        <pc:spChg chg="add mod">
+          <ac:chgData name="Bart Wolleswinkel" userId="b168cadc-1825-41ce-b9cc-7c7f06f6f31d" providerId="ADAL" clId="{22248CC1-9068-5BCB-B15B-4353FE48F57D}" dt="2026-02-01T23:16:57.729" v="2198" actId="1076"/>
+          <ac:spMkLst>
+            <pc:docMk/>
+            <pc:sldMk cId="2057737708" sldId="273"/>
+            <ac:spMk id="26" creationId="{C7313D93-EEE1-213D-5D23-3D58D21629CF}"/>
+          </ac:spMkLst>
+        </pc:spChg>
+        <pc:spChg chg="add mod">
+          <ac:chgData name="Bart Wolleswinkel" userId="b168cadc-1825-41ce-b9cc-7c7f06f6f31d" providerId="ADAL" clId="{22248CC1-9068-5BCB-B15B-4353FE48F57D}" dt="2026-02-01T23:20:59.192" v="2361" actId="14100"/>
+          <ac:spMkLst>
+            <pc:docMk/>
+            <pc:sldMk cId="2057737708" sldId="273"/>
+            <ac:spMk id="27" creationId="{BFFC65B2-658C-CC20-9711-785F3BF1411B}"/>
+          </ac:spMkLst>
+        </pc:spChg>
+        <pc:spChg chg="add mod">
+          <ac:chgData name="Bart Wolleswinkel" userId="b168cadc-1825-41ce-b9cc-7c7f06f6f31d" providerId="ADAL" clId="{22248CC1-9068-5BCB-B15B-4353FE48F57D}" dt="2026-02-01T23:16:57.729" v="2198" actId="1076"/>
+          <ac:spMkLst>
+            <pc:docMk/>
+            <pc:sldMk cId="2057737708" sldId="273"/>
+            <ac:spMk id="28" creationId="{3B44DA45-0771-58C6-6035-EF1B5D0453D0}"/>
+          </ac:spMkLst>
+        </pc:spChg>
+        <pc:spChg chg="add mod">
+          <ac:chgData name="Bart Wolleswinkel" userId="b168cadc-1825-41ce-b9cc-7c7f06f6f31d" providerId="ADAL" clId="{22248CC1-9068-5BCB-B15B-4353FE48F57D}" dt="2026-02-01T23:16:57.729" v="2198" actId="1076"/>
+          <ac:spMkLst>
+            <pc:docMk/>
+            <pc:sldMk cId="2057737708" sldId="273"/>
+            <ac:spMk id="29" creationId="{AA6D1758-3FB1-2C90-B080-8FDA222C0EC6}"/>
+          </ac:spMkLst>
+        </pc:spChg>
+        <pc:spChg chg="add mod">
+          <ac:chgData name="Bart Wolleswinkel" userId="b168cadc-1825-41ce-b9cc-7c7f06f6f31d" providerId="ADAL" clId="{22248CC1-9068-5BCB-B15B-4353FE48F57D}" dt="2026-02-01T23:16:57.729" v="2198" actId="1076"/>
+          <ac:spMkLst>
+            <pc:docMk/>
+            <pc:sldMk cId="2057737708" sldId="273"/>
+            <ac:spMk id="30" creationId="{58ED79A0-2BFA-E4E1-224E-CD3A1546A637}"/>
+          </ac:spMkLst>
+        </pc:spChg>
+        <pc:spChg chg="add mod">
+          <ac:chgData name="Bart Wolleswinkel" userId="b168cadc-1825-41ce-b9cc-7c7f06f6f31d" providerId="ADAL" clId="{22248CC1-9068-5BCB-B15B-4353FE48F57D}" dt="2026-02-01T23:16:57.729" v="2198" actId="1076"/>
+          <ac:spMkLst>
+            <pc:docMk/>
+            <pc:sldMk cId="2057737708" sldId="273"/>
+            <ac:spMk id="31" creationId="{101BD96C-FF2C-7E82-31D9-41E9CB64B239}"/>
+          </ac:spMkLst>
+        </pc:spChg>
+        <pc:spChg chg="add mod">
+          <ac:chgData name="Bart Wolleswinkel" userId="b168cadc-1825-41ce-b9cc-7c7f06f6f31d" providerId="ADAL" clId="{22248CC1-9068-5BCB-B15B-4353FE48F57D}" dt="2026-02-01T23:20:50.493" v="2359" actId="1037"/>
+          <ac:spMkLst>
+            <pc:docMk/>
+            <pc:sldMk cId="2057737708" sldId="273"/>
+            <ac:spMk id="32" creationId="{9D731D56-66CA-C45C-FADD-7771175BA830}"/>
+          </ac:spMkLst>
+        </pc:spChg>
+        <pc:spChg chg="add mod">
+          <ac:chgData name="Bart Wolleswinkel" userId="b168cadc-1825-41ce-b9cc-7c7f06f6f31d" providerId="ADAL" clId="{22248CC1-9068-5BCB-B15B-4353FE48F57D}" dt="2026-02-01T23:24:11.451" v="2406" actId="1076"/>
+          <ac:spMkLst>
+            <pc:docMk/>
+            <pc:sldMk cId="2057737708" sldId="273"/>
+            <ac:spMk id="33" creationId="{3268A4B7-8957-AAAA-8C0D-9D42B81B3075}"/>
+          </ac:spMkLst>
+        </pc:spChg>
+        <pc:spChg chg="add mod">
+          <ac:chgData name="Bart Wolleswinkel" userId="b168cadc-1825-41ce-b9cc-7c7f06f6f31d" providerId="ADAL" clId="{22248CC1-9068-5BCB-B15B-4353FE48F57D}" dt="2026-02-01T23:24:11.451" v="2406" actId="1076"/>
+          <ac:spMkLst>
+            <pc:docMk/>
+            <pc:sldMk cId="2057737708" sldId="273"/>
+            <ac:spMk id="34" creationId="{66467385-9FE1-7415-A9BA-BDD1E39E23D7}"/>
+          </ac:spMkLst>
+        </pc:spChg>
+        <pc:spChg chg="add mod">
+          <ac:chgData name="Bart Wolleswinkel" userId="b168cadc-1825-41ce-b9cc-7c7f06f6f31d" providerId="ADAL" clId="{22248CC1-9068-5BCB-B15B-4353FE48F57D}" dt="2026-02-01T23:20:56.534" v="2360" actId="1076"/>
+          <ac:spMkLst>
+            <pc:docMk/>
+            <pc:sldMk cId="2057737708" sldId="273"/>
+            <ac:spMk id="35" creationId="{BFA15793-FBF0-4816-E0FC-13598A5A93CC}"/>
+          </ac:spMkLst>
+        </pc:spChg>
+        <pc:spChg chg="add mod">
+          <ac:chgData name="Bart Wolleswinkel" userId="b168cadc-1825-41ce-b9cc-7c7f06f6f31d" providerId="ADAL" clId="{22248CC1-9068-5BCB-B15B-4353FE48F57D}" dt="2026-02-01T23:20:56.534" v="2360" actId="1076"/>
+          <ac:spMkLst>
+            <pc:docMk/>
+            <pc:sldMk cId="2057737708" sldId="273"/>
+            <ac:spMk id="36" creationId="{7949B69B-5975-EC35-DDEB-FAEBC7D2DF36}"/>
+          </ac:spMkLst>
+        </pc:spChg>
+        <pc:spChg chg="add del mod">
+          <ac:chgData name="Bart Wolleswinkel" userId="b168cadc-1825-41ce-b9cc-7c7f06f6f31d" providerId="ADAL" clId="{22248CC1-9068-5BCB-B15B-4353FE48F57D}" dt="2026-02-01T23:17:36.296" v="2238" actId="478"/>
+          <ac:spMkLst>
+            <pc:docMk/>
+            <pc:sldMk cId="2057737708" sldId="273"/>
+            <ac:spMk id="37" creationId="{ED8A1E53-977D-1818-2FB1-760A507C4BF8}"/>
+          </ac:spMkLst>
+        </pc:spChg>
+        <pc:spChg chg="del">
+          <ac:chgData name="Bart Wolleswinkel" userId="b168cadc-1825-41ce-b9cc-7c7f06f6f31d" providerId="ADAL" clId="{22248CC1-9068-5BCB-B15B-4353FE48F57D}" dt="2026-02-01T22:23:48.691" v="1956" actId="478"/>
+          <ac:spMkLst>
+            <pc:docMk/>
+            <pc:sldMk cId="2057737708" sldId="273"/>
+            <ac:spMk id="38" creationId="{80DF09E0-741A-7746-17B3-1F35A28EC922}"/>
+          </ac:spMkLst>
+        </pc:spChg>
+        <pc:spChg chg="add del mod">
+          <ac:chgData name="Bart Wolleswinkel" userId="b168cadc-1825-41ce-b9cc-7c7f06f6f31d" providerId="ADAL" clId="{22248CC1-9068-5BCB-B15B-4353FE48F57D}" dt="2026-02-01T23:17:36.296" v="2238" actId="478"/>
+          <ac:spMkLst>
+            <pc:docMk/>
+            <pc:sldMk cId="2057737708" sldId="273"/>
+            <ac:spMk id="39" creationId="{1D31A15B-48C2-A7C3-13B4-4B24F725C77D}"/>
+          </ac:spMkLst>
+        </pc:spChg>
+        <pc:spChg chg="add del mod">
+          <ac:chgData name="Bart Wolleswinkel" userId="b168cadc-1825-41ce-b9cc-7c7f06f6f31d" providerId="ADAL" clId="{22248CC1-9068-5BCB-B15B-4353FE48F57D}" dt="2026-02-01T23:17:36.296" v="2238" actId="478"/>
+          <ac:spMkLst>
+            <pc:docMk/>
+            <pc:sldMk cId="2057737708" sldId="273"/>
+            <ac:spMk id="40" creationId="{DBEC63F8-4C64-A828-AE9A-24386DA59CC5}"/>
+          </ac:spMkLst>
+        </pc:spChg>
+        <pc:spChg chg="add del mod">
+          <ac:chgData name="Bart Wolleswinkel" userId="b168cadc-1825-41ce-b9cc-7c7f06f6f31d" providerId="ADAL" clId="{22248CC1-9068-5BCB-B15B-4353FE48F57D}" dt="2026-02-01T23:17:36.296" v="2238" actId="478"/>
+          <ac:spMkLst>
+            <pc:docMk/>
+            <pc:sldMk cId="2057737708" sldId="273"/>
+            <ac:spMk id="41" creationId="{B367C0C4-0847-6024-7976-DBFC3A8EF5B1}"/>
+          </ac:spMkLst>
+        </pc:spChg>
+        <pc:spChg chg="del">
+          <ac:chgData name="Bart Wolleswinkel" userId="b168cadc-1825-41ce-b9cc-7c7f06f6f31d" providerId="ADAL" clId="{22248CC1-9068-5BCB-B15B-4353FE48F57D}" dt="2026-02-01T22:23:58.266" v="1958" actId="478"/>
+          <ac:spMkLst>
+            <pc:docMk/>
+            <pc:sldMk cId="2057737708" sldId="273"/>
+            <ac:spMk id="42" creationId="{A22993F7-11E1-4B67-28A6-B846FCD13705}"/>
+          </ac:spMkLst>
+        </pc:spChg>
+        <pc:spChg chg="del">
+          <ac:chgData name="Bart Wolleswinkel" userId="b168cadc-1825-41ce-b9cc-7c7f06f6f31d" providerId="ADAL" clId="{22248CC1-9068-5BCB-B15B-4353FE48F57D}" dt="2026-02-01T22:23:58.266" v="1958" actId="478"/>
+          <ac:spMkLst>
+            <pc:docMk/>
+            <pc:sldMk cId="2057737708" sldId="273"/>
+            <ac:spMk id="43" creationId="{0C676A3C-2E85-71C2-B883-640B79C6C5E1}"/>
+          </ac:spMkLst>
+        </pc:spChg>
+        <pc:spChg chg="add del mod">
+          <ac:chgData name="Bart Wolleswinkel" userId="b168cadc-1825-41ce-b9cc-7c7f06f6f31d" providerId="ADAL" clId="{22248CC1-9068-5BCB-B15B-4353FE48F57D}" dt="2026-02-01T23:17:36.296" v="2238" actId="478"/>
+          <ac:spMkLst>
+            <pc:docMk/>
+            <pc:sldMk cId="2057737708" sldId="273"/>
+            <ac:spMk id="44" creationId="{014E3219-746A-C2FB-1E97-11490A33B408}"/>
+          </ac:spMkLst>
+        </pc:spChg>
+        <pc:spChg chg="add mod">
+          <ac:chgData name="Bart Wolleswinkel" userId="b168cadc-1825-41ce-b9cc-7c7f06f6f31d" providerId="ADAL" clId="{22248CC1-9068-5BCB-B15B-4353FE48F57D}" dt="2026-02-01T23:20:56.534" v="2360" actId="1076"/>
+          <ac:spMkLst>
+            <pc:docMk/>
+            <pc:sldMk cId="2057737708" sldId="273"/>
+            <ac:spMk id="45" creationId="{51507276-70CA-9BFA-5061-5505788F329A}"/>
+          </ac:spMkLst>
+        </pc:spChg>
+        <pc:spChg chg="del">
+          <ac:chgData name="Bart Wolleswinkel" userId="b168cadc-1825-41ce-b9cc-7c7f06f6f31d" providerId="ADAL" clId="{22248CC1-9068-5BCB-B15B-4353FE48F57D}" dt="2026-02-01T22:23:52.950" v="1957" actId="478"/>
+          <ac:spMkLst>
+            <pc:docMk/>
+            <pc:sldMk cId="2057737708" sldId="273"/>
+            <ac:spMk id="46" creationId="{4B6BEFFE-4335-8DEB-9668-BC69581CDA66}"/>
+          </ac:spMkLst>
+        </pc:spChg>
+        <pc:spChg chg="del">
+          <ac:chgData name="Bart Wolleswinkel" userId="b168cadc-1825-41ce-b9cc-7c7f06f6f31d" providerId="ADAL" clId="{22248CC1-9068-5BCB-B15B-4353FE48F57D}" dt="2026-02-01T23:11:04.482" v="2007" actId="478"/>
+          <ac:spMkLst>
+            <pc:docMk/>
+            <pc:sldMk cId="2057737708" sldId="273"/>
+            <ac:spMk id="47" creationId="{C8B24335-7177-3C13-B26B-C97BC16718EA}"/>
+          </ac:spMkLst>
+        </pc:spChg>
+        <pc:spChg chg="add mod">
+          <ac:chgData name="Bart Wolleswinkel" userId="b168cadc-1825-41ce-b9cc-7c7f06f6f31d" providerId="ADAL" clId="{22248CC1-9068-5BCB-B15B-4353FE48F57D}" dt="2026-02-01T23:20:56.534" v="2360" actId="1076"/>
+          <ac:spMkLst>
+            <pc:docMk/>
+            <pc:sldMk cId="2057737708" sldId="273"/>
+            <ac:spMk id="48" creationId="{67FB07D6-16EE-14AD-4483-30EF2FE0B8ED}"/>
+          </ac:spMkLst>
+        </pc:spChg>
+        <pc:spChg chg="add mod">
+          <ac:chgData name="Bart Wolleswinkel" userId="b168cadc-1825-41ce-b9cc-7c7f06f6f31d" providerId="ADAL" clId="{22248CC1-9068-5BCB-B15B-4353FE48F57D}" dt="2026-02-01T23:18:12.450" v="2271"/>
+          <ac:spMkLst>
+            <pc:docMk/>
+            <pc:sldMk cId="2057737708" sldId="273"/>
+            <ac:spMk id="49" creationId="{D0BFE949-EF07-400B-C1C7-70AE41031449}"/>
+          </ac:spMkLst>
+        </pc:spChg>
+        <pc:spChg chg="add mod">
+          <ac:chgData name="Bart Wolleswinkel" userId="b168cadc-1825-41ce-b9cc-7c7f06f6f31d" providerId="ADAL" clId="{22248CC1-9068-5BCB-B15B-4353FE48F57D}" dt="2026-02-01T23:20:56.534" v="2360" actId="1076"/>
+          <ac:spMkLst>
+            <pc:docMk/>
+            <pc:sldMk cId="2057737708" sldId="273"/>
+            <ac:spMk id="50" creationId="{5E855ACF-96B7-0FF8-3B7C-E7212141FCD3}"/>
+          </ac:spMkLst>
+        </pc:spChg>
+        <pc:spChg chg="add mod">
+          <ac:chgData name="Bart Wolleswinkel" userId="b168cadc-1825-41ce-b9cc-7c7f06f6f31d" providerId="ADAL" clId="{22248CC1-9068-5BCB-B15B-4353FE48F57D}" dt="2026-02-01T23:24:11.451" v="2406" actId="1076"/>
+          <ac:spMkLst>
+            <pc:docMk/>
+            <pc:sldMk cId="2057737708" sldId="273"/>
+            <ac:spMk id="51" creationId="{EA21E40C-9D6A-BA51-FDA1-BA1D20D05BB6}"/>
+          </ac:spMkLst>
+        </pc:spChg>
+        <pc:spChg chg="add del mod">
+          <ac:chgData name="Bart Wolleswinkel" userId="b168cadc-1825-41ce-b9cc-7c7f06f6f31d" providerId="ADAL" clId="{22248CC1-9068-5BCB-B15B-4353FE48F57D}" dt="2026-02-01T23:26:28.324" v="2458" actId="478"/>
+          <ac:spMkLst>
+            <pc:docMk/>
+            <pc:sldMk cId="2057737708" sldId="273"/>
+            <ac:spMk id="52" creationId="{113A40E4-498D-51E4-C9F4-CE34EFBECAF4}"/>
+          </ac:spMkLst>
+        </pc:spChg>
+        <pc:spChg chg="add mod">
+          <ac:chgData name="Bart Wolleswinkel" userId="b168cadc-1825-41ce-b9cc-7c7f06f6f31d" providerId="ADAL" clId="{22248CC1-9068-5BCB-B15B-4353FE48F57D}" dt="2026-02-01T23:20:41.030" v="2332" actId="2711"/>
+          <ac:spMkLst>
+            <pc:docMk/>
+            <pc:sldMk cId="2057737708" sldId="273"/>
+            <ac:spMk id="53" creationId="{30A46D95-71EA-8254-832D-B4F328961B27}"/>
+          </ac:spMkLst>
+        </pc:spChg>
+        <pc:spChg chg="add mod">
+          <ac:chgData name="Bart Wolleswinkel" userId="b168cadc-1825-41ce-b9cc-7c7f06f6f31d" providerId="ADAL" clId="{22248CC1-9068-5BCB-B15B-4353FE48F57D}" dt="2026-02-01T23:24:11.451" v="2406" actId="1076"/>
+          <ac:spMkLst>
+            <pc:docMk/>
+            <pc:sldMk cId="2057737708" sldId="273"/>
+            <ac:spMk id="54" creationId="{647FD90C-F2FA-D876-45E9-F24FCE630DD9}"/>
+          </ac:spMkLst>
+        </pc:spChg>
+        <pc:spChg chg="add mod">
+          <ac:chgData name="Bart Wolleswinkel" userId="b168cadc-1825-41ce-b9cc-7c7f06f6f31d" providerId="ADAL" clId="{22248CC1-9068-5BCB-B15B-4353FE48F57D}" dt="2026-02-01T23:22:34.069" v="2386" actId="14100"/>
+          <ac:spMkLst>
+            <pc:docMk/>
+            <pc:sldMk cId="2057737708" sldId="273"/>
+            <ac:spMk id="55" creationId="{FF631887-50B4-6091-3630-266DF9651A09}"/>
+          </ac:spMkLst>
+        </pc:spChg>
+        <pc:spChg chg="add mod">
+          <ac:chgData name="Bart Wolleswinkel" userId="b168cadc-1825-41ce-b9cc-7c7f06f6f31d" providerId="ADAL" clId="{22248CC1-9068-5BCB-B15B-4353FE48F57D}" dt="2026-02-01T23:22:15.874" v="2374" actId="20577"/>
+          <ac:spMkLst>
+            <pc:docMk/>
+            <pc:sldMk cId="2057737708" sldId="273"/>
+            <ac:spMk id="56" creationId="{32ADC7F9-83BA-2E17-8F60-8CF9696FE40F}"/>
+          </ac:spMkLst>
+        </pc:spChg>
+        <pc:spChg chg="add mod">
+          <ac:chgData name="Bart Wolleswinkel" userId="b168cadc-1825-41ce-b9cc-7c7f06f6f31d" providerId="ADAL" clId="{22248CC1-9068-5BCB-B15B-4353FE48F57D}" dt="2026-02-01T23:22:17.979" v="2377" actId="20577"/>
+          <ac:spMkLst>
+            <pc:docMk/>
+            <pc:sldMk cId="2057737708" sldId="273"/>
+            <ac:spMk id="57" creationId="{E91FB0A1-9BE3-49BF-384C-2390FB7D5498}"/>
+          </ac:spMkLst>
+        </pc:spChg>
+        <pc:spChg chg="add mod">
+          <ac:chgData name="Bart Wolleswinkel" userId="b168cadc-1825-41ce-b9cc-7c7f06f6f31d" providerId="ADAL" clId="{22248CC1-9068-5BCB-B15B-4353FE48F57D}" dt="2026-02-01T23:22:22.763" v="2383" actId="20577"/>
+          <ac:spMkLst>
+            <pc:docMk/>
+            <pc:sldMk cId="2057737708" sldId="273"/>
+            <ac:spMk id="58" creationId="{493615C2-5A50-0A5B-5A19-D6974906E46E}"/>
+          </ac:spMkLst>
+        </pc:spChg>
+        <pc:spChg chg="add mod">
+          <ac:chgData name="Bart Wolleswinkel" userId="b168cadc-1825-41ce-b9cc-7c7f06f6f31d" providerId="ADAL" clId="{22248CC1-9068-5BCB-B15B-4353FE48F57D}" dt="2026-02-01T23:24:11.451" v="2406" actId="1076"/>
+          <ac:spMkLst>
+            <pc:docMk/>
+            <pc:sldMk cId="2057737708" sldId="273"/>
+            <ac:spMk id="59" creationId="{477D4F4B-3ED4-F211-A781-5C8B0266EC8B}"/>
+          </ac:spMkLst>
+        </pc:spChg>
+        <pc:spChg chg="add mod">
+          <ac:chgData name="Bart Wolleswinkel" userId="b168cadc-1825-41ce-b9cc-7c7f06f6f31d" providerId="ADAL" clId="{22248CC1-9068-5BCB-B15B-4353FE48F57D}" dt="2026-02-01T23:23:37.893" v="2399" actId="20577"/>
+          <ac:spMkLst>
+            <pc:docMk/>
+            <pc:sldMk cId="2057737708" sldId="273"/>
+            <ac:spMk id="60" creationId="{42F6EBDB-7F73-DF34-C679-AF302DAFFFF0}"/>
+          </ac:spMkLst>
+        </pc:spChg>
+        <pc:spChg chg="add mod">
+          <ac:chgData name="Bart Wolleswinkel" userId="b168cadc-1825-41ce-b9cc-7c7f06f6f31d" providerId="ADAL" clId="{22248CC1-9068-5BCB-B15B-4353FE48F57D}" dt="2026-02-01T23:24:11.451" v="2406" actId="1076"/>
+          <ac:spMkLst>
+            <pc:docMk/>
+            <pc:sldMk cId="2057737708" sldId="273"/>
+            <ac:spMk id="61" creationId="{B56C31EE-F0FE-A4FC-F6D3-3B805FBF80A9}"/>
+          </ac:spMkLst>
+        </pc:spChg>
+        <pc:spChg chg="add mod">
+          <ac:chgData name="Bart Wolleswinkel" userId="b168cadc-1825-41ce-b9cc-7c7f06f6f31d" providerId="ADAL" clId="{22248CC1-9068-5BCB-B15B-4353FE48F57D}" dt="2026-02-01T23:24:19.832" v="2409" actId="20577"/>
+          <ac:spMkLst>
+            <pc:docMk/>
+            <pc:sldMk cId="2057737708" sldId="273"/>
+            <ac:spMk id="62" creationId="{F0C45318-9FEF-FD3F-9576-8B757B98D009}"/>
+          </ac:spMkLst>
+        </pc:spChg>
+        <pc:spChg chg="add mod">
+          <ac:chgData name="Bart Wolleswinkel" userId="b168cadc-1825-41ce-b9cc-7c7f06f6f31d" providerId="ADAL" clId="{22248CC1-9068-5BCB-B15B-4353FE48F57D}" dt="2026-02-01T23:24:27.999" v="2412" actId="20577"/>
+          <ac:spMkLst>
+            <pc:docMk/>
+            <pc:sldMk cId="2057737708" sldId="273"/>
+            <ac:spMk id="63" creationId="{804E02F5-9EE2-8191-6A36-665187C1566B}"/>
+          </ac:spMkLst>
+        </pc:spChg>
+        <pc:spChg chg="add mod">
+          <ac:chgData name="Bart Wolleswinkel" userId="b168cadc-1825-41ce-b9cc-7c7f06f6f31d" providerId="ADAL" clId="{22248CC1-9068-5BCB-B15B-4353FE48F57D}" dt="2026-02-01T23:26:34.913" v="2459" actId="1076"/>
+          <ac:spMkLst>
+            <pc:docMk/>
+            <pc:sldMk cId="2057737708" sldId="273"/>
+            <ac:spMk id="64" creationId="{56C5E1D9-4DFF-CDE3-EAD4-4457A229FFF0}"/>
+          </ac:spMkLst>
+        </pc:spChg>
+        <pc:spChg chg="add mod">
+          <ac:chgData name="Bart Wolleswinkel" userId="b168cadc-1825-41ce-b9cc-7c7f06f6f31d" providerId="ADAL" clId="{22248CC1-9068-5BCB-B15B-4353FE48F57D}" dt="2026-02-01T23:26:34.913" v="2459" actId="1076"/>
+          <ac:spMkLst>
+            <pc:docMk/>
+            <pc:sldMk cId="2057737708" sldId="273"/>
+            <ac:spMk id="65" creationId="{6065393B-E563-19C2-BC97-ECC93F928548}"/>
+          </ac:spMkLst>
+        </pc:spChg>
+        <pc:cxnChg chg="del mod">
+          <ac:chgData name="Bart Wolleswinkel" userId="b168cadc-1825-41ce-b9cc-7c7f06f6f31d" providerId="ADAL" clId="{22248CC1-9068-5BCB-B15B-4353FE48F57D}" dt="2026-02-01T22:23:58.266" v="1958" actId="478"/>
+          <ac:cxnSpMkLst>
+            <pc:docMk/>
+            <pc:sldMk cId="2057737708" sldId="273"/>
+            <ac:cxnSpMk id="10" creationId="{12884B9A-3FCC-2625-6CA8-6789EBFA6795}"/>
           </ac:cxnSpMkLst>
         </pc:cxnChg>
       </pc:sldChg>
@@ -1654,7 +1926,7 @@
           <a:p>
             <a:fld id="{FB8718F5-1E4A-7D42-8173-5979EE6FBC1A}" type="datetimeFigureOut">
               <a:rPr lang="en-US" smtClean="0"/>
-              <a:t>1/25/26</a:t>
+              <a:t>1/29/26</a:t>
             </a:fld>
             <a:endParaRPr lang="en-US"/>
           </a:p>
@@ -1854,7 +2126,7 @@
           <a:p>
             <a:fld id="{FB8718F5-1E4A-7D42-8173-5979EE6FBC1A}" type="datetimeFigureOut">
               <a:rPr lang="en-US" smtClean="0"/>
-              <a:t>1/25/26</a:t>
+              <a:t>1/29/26</a:t>
             </a:fld>
             <a:endParaRPr lang="en-US"/>
           </a:p>
@@ -2064,7 +2336,7 @@
           <a:p>
             <a:fld id="{FB8718F5-1E4A-7D42-8173-5979EE6FBC1A}" type="datetimeFigureOut">
               <a:rPr lang="en-US" smtClean="0"/>
-              <a:t>1/25/26</a:t>
+              <a:t>1/29/26</a:t>
             </a:fld>
             <a:endParaRPr lang="en-US"/>
           </a:p>
@@ -2264,7 +2536,7 @@
           <a:p>
             <a:fld id="{FB8718F5-1E4A-7D42-8173-5979EE6FBC1A}" type="datetimeFigureOut">
               <a:rPr lang="en-US" smtClean="0"/>
-              <a:t>1/25/26</a:t>
+              <a:t>1/29/26</a:t>
             </a:fld>
             <a:endParaRPr lang="en-US"/>
           </a:p>
@@ -2540,7 +2812,7 @@
           <a:p>
             <a:fld id="{FB8718F5-1E4A-7D42-8173-5979EE6FBC1A}" type="datetimeFigureOut">
               <a:rPr lang="en-US" smtClean="0"/>
-              <a:t>1/25/26</a:t>
+              <a:t>1/29/26</a:t>
             </a:fld>
             <a:endParaRPr lang="en-US"/>
           </a:p>
@@ -2808,7 +3080,7 @@
           <a:p>
             <a:fld id="{FB8718F5-1E4A-7D42-8173-5979EE6FBC1A}" type="datetimeFigureOut">
               <a:rPr lang="en-US" smtClean="0"/>
-              <a:t>1/25/26</a:t>
+              <a:t>1/29/26</a:t>
             </a:fld>
             <a:endParaRPr lang="en-US"/>
           </a:p>
@@ -3223,7 +3495,7 @@
           <a:p>
             <a:fld id="{FB8718F5-1E4A-7D42-8173-5979EE6FBC1A}" type="datetimeFigureOut">
               <a:rPr lang="en-US" smtClean="0"/>
-              <a:t>1/25/26</a:t>
+              <a:t>1/29/26</a:t>
             </a:fld>
             <a:endParaRPr lang="en-US"/>
           </a:p>
@@ -3365,7 +3637,7 @@
           <a:p>
             <a:fld id="{FB8718F5-1E4A-7D42-8173-5979EE6FBC1A}" type="datetimeFigureOut">
               <a:rPr lang="en-US" smtClean="0"/>
-              <a:t>1/25/26</a:t>
+              <a:t>1/29/26</a:t>
             </a:fld>
             <a:endParaRPr lang="en-US"/>
           </a:p>
@@ -3478,7 +3750,7 @@
           <a:p>
             <a:fld id="{FB8718F5-1E4A-7D42-8173-5979EE6FBC1A}" type="datetimeFigureOut">
               <a:rPr lang="en-US" smtClean="0"/>
-              <a:t>1/25/26</a:t>
+              <a:t>1/29/26</a:t>
             </a:fld>
             <a:endParaRPr lang="en-US"/>
           </a:p>
@@ -3791,7 +4063,7 @@
           <a:p>
             <a:fld id="{FB8718F5-1E4A-7D42-8173-5979EE6FBC1A}" type="datetimeFigureOut">
               <a:rPr lang="en-US" smtClean="0"/>
-              <a:t>1/25/26</a:t>
+              <a:t>1/29/26</a:t>
             </a:fld>
             <a:endParaRPr lang="en-US"/>
           </a:p>
@@ -4080,7 +4352,7 @@
           <a:p>
             <a:fld id="{FB8718F5-1E4A-7D42-8173-5979EE6FBC1A}" type="datetimeFigureOut">
               <a:rPr lang="en-US" smtClean="0"/>
-              <a:t>1/25/26</a:t>
+              <a:t>1/29/26</a:t>
             </a:fld>
             <a:endParaRPr lang="en-US"/>
           </a:p>
@@ -4323,7 +4595,7 @@
           <a:p>
             <a:fld id="{FB8718F5-1E4A-7D42-8173-5979EE6FBC1A}" type="datetimeFigureOut">
               <a:rPr lang="en-US" smtClean="0"/>
-              <a:t>1/25/26</a:t>
+              <a:t>1/29/26</a:t>
             </a:fld>
             <a:endParaRPr lang="en-US"/>
           </a:p>
@@ -13234,6 +13506,2123 @@
     <p:extLst>
       <p:ext uri="{BB962C8B-B14F-4D97-AF65-F5344CB8AC3E}">
         <p14:creationId xmlns:p14="http://schemas.microsoft.com/office/powerpoint/2010/main" val="3745362789"/>
+      </p:ext>
+    </p:extLst>
+  </p:cSld>
+  <p:clrMapOvr>
+    <a:masterClrMapping/>
+  </p:clrMapOvr>
+</p:sld>
+</file>
+
+<file path=ppt/slides/slide18.xml><?xml version="1.0" encoding="utf-8"?>
+<p:sld xmlns:a="http://schemas.openxmlformats.org/drawingml/2006/main" xmlns:r="http://schemas.openxmlformats.org/officeDocument/2006/relationships" xmlns:p="http://schemas.openxmlformats.org/presentationml/2006/main">
+  <p:cSld>
+    <p:spTree>
+      <p:nvGrpSpPr>
+        <p:cNvPr id="1" name="">
+          <a:extLst>
+            <a:ext uri="{FF2B5EF4-FFF2-40B4-BE49-F238E27FC236}">
+              <a16:creationId xmlns:a16="http://schemas.microsoft.com/office/drawing/2014/main" id="{CEE784AE-AF1A-CBFA-E326-A80F17FEDF13}"/>
+            </a:ext>
+          </a:extLst>
+        </p:cNvPr>
+        <p:cNvGrpSpPr/>
+        <p:nvPr/>
+      </p:nvGrpSpPr>
+      <p:grpSpPr>
+        <a:xfrm>
+          <a:off x="0" y="0"/>
+          <a:ext cx="0" cy="0"/>
+          <a:chOff x="0" y="0"/>
+          <a:chExt cx="0" cy="0"/>
+        </a:xfrm>
+      </p:grpSpPr>
+      <p:sp>
+        <p:nvSpPr>
+          <p:cNvPr id="4" name="Title 3">
+            <a:extLst>
+              <a:ext uri="{FF2B5EF4-FFF2-40B4-BE49-F238E27FC236}">
+                <a16:creationId xmlns:a16="http://schemas.microsoft.com/office/drawing/2014/main" id="{60FA50A4-57DF-57D3-200B-9E194D94B0F1}"/>
+              </a:ext>
+            </a:extLst>
+          </p:cNvPr>
+          <p:cNvSpPr>
+            <a:spLocks noGrp="1"/>
+          </p:cNvSpPr>
+          <p:nvPr>
+            <p:ph type="title"/>
+          </p:nvPr>
+        </p:nvSpPr>
+        <p:spPr>
+          <a:xfrm>
+            <a:off x="838200" y="-85045"/>
+            <a:ext cx="5990863" cy="1325563"/>
+          </a:xfrm>
+        </p:spPr>
+        <p:txBody>
+          <a:bodyPr/>
+          <a:lstStyle/>
+          <a:p>
+            <a:r>
+              <a:rPr lang="en-US" dirty="0"/>
+              <a:t>Polytope</a:t>
+            </a:r>
+          </a:p>
+        </p:txBody>
+      </p:sp>
+      <p:sp>
+        <p:nvSpPr>
+          <p:cNvPr id="2" name="Rectangle 1">
+            <a:extLst>
+              <a:ext uri="{FF2B5EF4-FFF2-40B4-BE49-F238E27FC236}">
+                <a16:creationId xmlns:a16="http://schemas.microsoft.com/office/drawing/2014/main" id="{6C94E02B-3177-6A8B-77D8-CCE06B0BE7DE}"/>
+              </a:ext>
+            </a:extLst>
+          </p:cNvPr>
+          <p:cNvSpPr/>
+          <p:nvPr/>
+        </p:nvSpPr>
+        <p:spPr>
+          <a:xfrm>
+            <a:off x="327994" y="1690688"/>
+            <a:ext cx="2744989" cy="4947503"/>
+          </a:xfrm>
+          <a:prstGeom prst="rect">
+            <a:avLst/>
+          </a:prstGeom>
+          <a:noFill/>
+          <a:ln w="28575">
+            <a:solidFill>
+              <a:schemeClr val="tx1"/>
+            </a:solidFill>
+            <a:prstDash val="dash"/>
+          </a:ln>
+        </p:spPr>
+        <p:style>
+          <a:lnRef idx="2">
+            <a:schemeClr val="accent1">
+              <a:shade val="15000"/>
+            </a:schemeClr>
+          </a:lnRef>
+          <a:fillRef idx="1">
+            <a:schemeClr val="accent1"/>
+          </a:fillRef>
+          <a:effectRef idx="0">
+            <a:schemeClr val="accent1"/>
+          </a:effectRef>
+          <a:fontRef idx="minor">
+            <a:schemeClr val="lt1"/>
+          </a:fontRef>
+        </p:style>
+        <p:txBody>
+          <a:bodyPr rtlCol="0" anchor="ctr"/>
+          <a:lstStyle/>
+          <a:p>
+            <a:pPr algn="ctr"/>
+            <a:endParaRPr lang="en-US" dirty="0">
+              <a:solidFill>
+                <a:sysClr val="windowText" lastClr="000000"/>
+              </a:solidFill>
+            </a:endParaRPr>
+          </a:p>
+        </p:txBody>
+      </p:sp>
+      <p:sp>
+        <p:nvSpPr>
+          <p:cNvPr id="3" name="TextBox 2">
+            <a:extLst>
+              <a:ext uri="{FF2B5EF4-FFF2-40B4-BE49-F238E27FC236}">
+                <a16:creationId xmlns:a16="http://schemas.microsoft.com/office/drawing/2014/main" id="{8BBE5440-36D3-BB37-9447-F89FCFD791B5}"/>
+              </a:ext>
+            </a:extLst>
+          </p:cNvPr>
+          <p:cNvSpPr txBox="1"/>
+          <p:nvPr/>
+        </p:nvSpPr>
+        <p:spPr>
+          <a:xfrm>
+            <a:off x="327995" y="1321357"/>
+            <a:ext cx="1711046" cy="369332"/>
+          </a:xfrm>
+          <a:prstGeom prst="rect">
+            <a:avLst/>
+          </a:prstGeom>
+          <a:noFill/>
+        </p:spPr>
+        <p:txBody>
+          <a:bodyPr wrap="none" rtlCol="0">
+            <a:spAutoFit/>
+          </a:bodyPr>
+          <a:lstStyle/>
+          <a:p>
+            <a:r>
+              <a:rPr lang="en-US" dirty="0"/>
+              <a:t>Representation</a:t>
+            </a:r>
+          </a:p>
+        </p:txBody>
+      </p:sp>
+      <p:sp>
+        <p:nvSpPr>
+          <p:cNvPr id="21" name="Rectangle 20">
+            <a:extLst>
+              <a:ext uri="{FF2B5EF4-FFF2-40B4-BE49-F238E27FC236}">
+                <a16:creationId xmlns:a16="http://schemas.microsoft.com/office/drawing/2014/main" id="{BCEFB855-606C-F36A-671F-B95F9442A656}"/>
+              </a:ext>
+            </a:extLst>
+          </p:cNvPr>
+          <p:cNvSpPr/>
+          <p:nvPr/>
+        </p:nvSpPr>
+        <p:spPr>
+          <a:xfrm>
+            <a:off x="507520" y="2138941"/>
+            <a:ext cx="2370857" cy="735451"/>
+          </a:xfrm>
+          <a:prstGeom prst="rect">
+            <a:avLst/>
+          </a:prstGeom>
+          <a:noFill/>
+          <a:ln w="28575">
+            <a:solidFill>
+              <a:schemeClr val="accent2"/>
+            </a:solidFill>
+          </a:ln>
+        </p:spPr>
+        <p:style>
+          <a:lnRef idx="2">
+            <a:schemeClr val="accent1">
+              <a:shade val="15000"/>
+            </a:schemeClr>
+          </a:lnRef>
+          <a:fillRef idx="1">
+            <a:schemeClr val="accent1"/>
+          </a:fillRef>
+          <a:effectRef idx="0">
+            <a:schemeClr val="accent1"/>
+          </a:effectRef>
+          <a:fontRef idx="minor">
+            <a:schemeClr val="lt1"/>
+          </a:fontRef>
+        </p:style>
+        <p:txBody>
+          <a:bodyPr numCol="1" rtlCol="0" anchor="t"/>
+          <a:lstStyle/>
+          <a:p>
+            <a:pPr algn="ctr"/>
+            <a:endParaRPr kumimoji="0" lang="en-US" sz="1800" b="0" i="0" u="none" strike="noStrike" kern="1200" cap="none" spc="0" normalizeH="0" baseline="0" noProof="0" dirty="0">
+              <a:ln>
+                <a:noFill/>
+              </a:ln>
+              <a:solidFill>
+                <a:prstClr val="white"/>
+              </a:solidFill>
+              <a:effectLst/>
+              <a:uLnTx/>
+              <a:uFillTx/>
+              <a:latin typeface="American Typewriter" panose="02090604020004020304" pitchFamily="18" charset="77"/>
+            </a:endParaRPr>
+          </a:p>
+        </p:txBody>
+      </p:sp>
+      <p:sp>
+        <p:nvSpPr>
+          <p:cNvPr id="9" name="TextBox 8">
+            <a:extLst>
+              <a:ext uri="{FF2B5EF4-FFF2-40B4-BE49-F238E27FC236}">
+                <a16:creationId xmlns:a16="http://schemas.microsoft.com/office/drawing/2014/main" id="{651BFFA2-7068-1DB5-D305-EB810E17CAA8}"/>
+              </a:ext>
+            </a:extLst>
+          </p:cNvPr>
+          <p:cNvSpPr txBox="1"/>
+          <p:nvPr/>
+        </p:nvSpPr>
+        <p:spPr>
+          <a:xfrm>
+            <a:off x="507520" y="2135728"/>
+            <a:ext cx="805029" cy="369332"/>
+          </a:xfrm>
+          <a:prstGeom prst="rect">
+            <a:avLst/>
+          </a:prstGeom>
+          <a:noFill/>
+        </p:spPr>
+        <p:txBody>
+          <a:bodyPr wrap="none" rtlCol="0">
+            <a:spAutoFit/>
+          </a:bodyPr>
+          <a:lstStyle/>
+          <a:p>
+            <a:r>
+              <a:rPr lang="en-US" dirty="0" err="1">
+                <a:solidFill>
+                  <a:schemeClr val="accent5">
+                    <a:lumMod val="75000"/>
+                  </a:schemeClr>
+                </a:solidFill>
+                <a:latin typeface="American Typewriter" panose="02090604020004020304" pitchFamily="18" charset="77"/>
+              </a:rPr>
+              <a:t>self.A</a:t>
+            </a:r>
+            <a:endParaRPr lang="en-US" dirty="0">
+              <a:solidFill>
+                <a:schemeClr val="accent5">
+                  <a:lumMod val="75000"/>
+                </a:schemeClr>
+              </a:solidFill>
+            </a:endParaRPr>
+          </a:p>
+        </p:txBody>
+      </p:sp>
+      <p:sp>
+        <p:nvSpPr>
+          <p:cNvPr id="12" name="TextBox 11">
+            <a:extLst>
+              <a:ext uri="{FF2B5EF4-FFF2-40B4-BE49-F238E27FC236}">
+                <a16:creationId xmlns:a16="http://schemas.microsoft.com/office/drawing/2014/main" id="{6F4017D5-8481-A93E-E9AE-4DD0F57483D7}"/>
+              </a:ext>
+            </a:extLst>
+          </p:cNvPr>
+          <p:cNvSpPr txBox="1"/>
+          <p:nvPr/>
+        </p:nvSpPr>
+        <p:spPr>
+          <a:xfrm>
+            <a:off x="1747940" y="2135728"/>
+            <a:ext cx="763351" cy="369332"/>
+          </a:xfrm>
+          <a:prstGeom prst="rect">
+            <a:avLst/>
+          </a:prstGeom>
+          <a:noFill/>
+        </p:spPr>
+        <p:txBody>
+          <a:bodyPr wrap="none" rtlCol="0">
+            <a:spAutoFit/>
+          </a:bodyPr>
+          <a:lstStyle/>
+          <a:p>
+            <a:r>
+              <a:rPr lang="en-US" dirty="0" err="1">
+                <a:solidFill>
+                  <a:schemeClr val="accent5">
+                    <a:lumMod val="75000"/>
+                  </a:schemeClr>
+                </a:solidFill>
+                <a:latin typeface="American Typewriter" panose="02090604020004020304" pitchFamily="18" charset="77"/>
+              </a:rPr>
+              <a:t>self.b</a:t>
+            </a:r>
+            <a:endParaRPr lang="en-US" dirty="0">
+              <a:solidFill>
+                <a:schemeClr val="accent5">
+                  <a:lumMod val="75000"/>
+                </a:schemeClr>
+              </a:solidFill>
+            </a:endParaRPr>
+          </a:p>
+        </p:txBody>
+      </p:sp>
+      <p:sp>
+        <p:nvSpPr>
+          <p:cNvPr id="13" name="TextBox 12">
+            <a:extLst>
+              <a:ext uri="{FF2B5EF4-FFF2-40B4-BE49-F238E27FC236}">
+                <a16:creationId xmlns:a16="http://schemas.microsoft.com/office/drawing/2014/main" id="{5B452667-6DEF-21B4-B642-5FF79F4EF6F0}"/>
+              </a:ext>
+            </a:extLst>
+          </p:cNvPr>
+          <p:cNvSpPr txBox="1"/>
+          <p:nvPr/>
+        </p:nvSpPr>
+        <p:spPr>
+          <a:xfrm>
+            <a:off x="507520" y="2505060"/>
+            <a:ext cx="2246128" cy="369332"/>
+          </a:xfrm>
+          <a:prstGeom prst="rect">
+            <a:avLst/>
+          </a:prstGeom>
+          <a:noFill/>
+        </p:spPr>
+        <p:txBody>
+          <a:bodyPr wrap="none" rtlCol="0">
+            <a:spAutoFit/>
+          </a:bodyPr>
+          <a:lstStyle/>
+          <a:p>
+            <a:r>
+              <a:rPr lang="en-US" dirty="0">
+                <a:solidFill>
+                  <a:schemeClr val="bg1">
+                    <a:lumMod val="75000"/>
+                  </a:schemeClr>
+                </a:solidFill>
+                <a:latin typeface="American Typewriter" panose="02090604020004020304" pitchFamily="18" charset="77"/>
+              </a:rPr>
+              <a:t>    </a:t>
+            </a:r>
+            <a:r>
+              <a:rPr lang="en-US" dirty="0" err="1">
+                <a:solidFill>
+                  <a:schemeClr val="bg1">
+                    <a:lumMod val="75000"/>
+                  </a:schemeClr>
+                </a:solidFill>
+                <a:latin typeface="American Typewriter" panose="02090604020004020304" pitchFamily="18" charset="77"/>
+              </a:rPr>
+              <a:t>self._Ab</a:t>
+            </a:r>
+            <a:r>
+              <a:rPr lang="en-US" dirty="0">
+                <a:solidFill>
+                  <a:schemeClr val="bg1">
+                    <a:lumMod val="75000"/>
+                  </a:schemeClr>
+                </a:solidFill>
+                <a:latin typeface="American Typewriter" panose="02090604020004020304" pitchFamily="18" charset="77"/>
+              </a:rPr>
+              <a:t> = [A | b]</a:t>
+            </a:r>
+            <a:endParaRPr lang="en-US" dirty="0">
+              <a:solidFill>
+                <a:schemeClr val="bg1">
+                  <a:lumMod val="75000"/>
+                </a:schemeClr>
+              </a:solidFill>
+            </a:endParaRPr>
+          </a:p>
+        </p:txBody>
+      </p:sp>
+      <p:sp>
+        <p:nvSpPr>
+          <p:cNvPr id="15" name="TextBox 14">
+            <a:extLst>
+              <a:ext uri="{FF2B5EF4-FFF2-40B4-BE49-F238E27FC236}">
+                <a16:creationId xmlns:a16="http://schemas.microsoft.com/office/drawing/2014/main" id="{41031022-D74A-227E-D6E4-D8BB6C1CCFBC}"/>
+              </a:ext>
+            </a:extLst>
+          </p:cNvPr>
+          <p:cNvSpPr txBox="1"/>
+          <p:nvPr/>
+        </p:nvSpPr>
+        <p:spPr>
+          <a:xfrm>
+            <a:off x="507520" y="1766396"/>
+            <a:ext cx="1775614" cy="369332"/>
+          </a:xfrm>
+          <a:prstGeom prst="rect">
+            <a:avLst/>
+          </a:prstGeom>
+          <a:noFill/>
+        </p:spPr>
+        <p:txBody>
+          <a:bodyPr wrap="none" rtlCol="0">
+            <a:spAutoFit/>
+          </a:bodyPr>
+          <a:lstStyle/>
+          <a:p>
+            <a:r>
+              <a:rPr lang="en-US" dirty="0">
+                <a:solidFill>
+                  <a:schemeClr val="accent2"/>
+                </a:solidFill>
+                <a:latin typeface="+mj-lt"/>
+              </a:rPr>
+              <a:t>H-representation</a:t>
+            </a:r>
+          </a:p>
+        </p:txBody>
+      </p:sp>
+      <p:sp>
+        <p:nvSpPr>
+          <p:cNvPr id="16" name="Rectangle 15">
+            <a:extLst>
+              <a:ext uri="{FF2B5EF4-FFF2-40B4-BE49-F238E27FC236}">
+                <a16:creationId xmlns:a16="http://schemas.microsoft.com/office/drawing/2014/main" id="{7C4F104E-2A60-5095-637A-407528A9FCDA}"/>
+              </a:ext>
+            </a:extLst>
+          </p:cNvPr>
+          <p:cNvSpPr/>
+          <p:nvPr/>
+        </p:nvSpPr>
+        <p:spPr>
+          <a:xfrm>
+            <a:off x="507520" y="3983994"/>
+            <a:ext cx="2370855" cy="735451"/>
+          </a:xfrm>
+          <a:prstGeom prst="rect">
+            <a:avLst/>
+          </a:prstGeom>
+          <a:noFill/>
+          <a:ln w="28575">
+            <a:solidFill>
+              <a:schemeClr val="accent2"/>
+            </a:solidFill>
+          </a:ln>
+        </p:spPr>
+        <p:style>
+          <a:lnRef idx="2">
+            <a:schemeClr val="accent1">
+              <a:shade val="15000"/>
+            </a:schemeClr>
+          </a:lnRef>
+          <a:fillRef idx="1">
+            <a:schemeClr val="accent1"/>
+          </a:fillRef>
+          <a:effectRef idx="0">
+            <a:schemeClr val="accent1"/>
+          </a:effectRef>
+          <a:fontRef idx="minor">
+            <a:schemeClr val="lt1"/>
+          </a:fontRef>
+        </p:style>
+        <p:txBody>
+          <a:bodyPr numCol="1" rtlCol="0" anchor="t"/>
+          <a:lstStyle/>
+          <a:p>
+            <a:pPr algn="ctr"/>
+            <a:endParaRPr kumimoji="0" lang="en-US" sz="1800" b="0" i="0" u="none" strike="noStrike" kern="1200" cap="none" spc="0" normalizeH="0" baseline="0" noProof="0" dirty="0">
+              <a:ln>
+                <a:noFill/>
+              </a:ln>
+              <a:solidFill>
+                <a:prstClr val="white"/>
+              </a:solidFill>
+              <a:effectLst/>
+              <a:uLnTx/>
+              <a:uFillTx/>
+              <a:latin typeface="American Typewriter" panose="02090604020004020304" pitchFamily="18" charset="77"/>
+            </a:endParaRPr>
+          </a:p>
+        </p:txBody>
+      </p:sp>
+      <p:sp>
+        <p:nvSpPr>
+          <p:cNvPr id="17" name="TextBox 16">
+            <a:extLst>
+              <a:ext uri="{FF2B5EF4-FFF2-40B4-BE49-F238E27FC236}">
+                <a16:creationId xmlns:a16="http://schemas.microsoft.com/office/drawing/2014/main" id="{85AD6974-E7D6-77B6-1641-9771406C97A6}"/>
+              </a:ext>
+            </a:extLst>
+          </p:cNvPr>
+          <p:cNvSpPr txBox="1"/>
+          <p:nvPr/>
+        </p:nvSpPr>
+        <p:spPr>
+          <a:xfrm>
+            <a:off x="507520" y="3980781"/>
+            <a:ext cx="1216551" cy="369332"/>
+          </a:xfrm>
+          <a:prstGeom prst="rect">
+            <a:avLst/>
+          </a:prstGeom>
+          <a:noFill/>
+        </p:spPr>
+        <p:txBody>
+          <a:bodyPr wrap="none" rtlCol="0">
+            <a:spAutoFit/>
+          </a:bodyPr>
+          <a:lstStyle/>
+          <a:p>
+            <a:r>
+              <a:rPr lang="en-US" dirty="0" err="1">
+                <a:solidFill>
+                  <a:schemeClr val="accent5">
+                    <a:lumMod val="75000"/>
+                  </a:schemeClr>
+                </a:solidFill>
+                <a:latin typeface="American Typewriter" panose="02090604020004020304" pitchFamily="18" charset="77"/>
+              </a:rPr>
+              <a:t>self.verts</a:t>
+            </a:r>
+            <a:endParaRPr lang="en-US" dirty="0">
+              <a:solidFill>
+                <a:schemeClr val="accent5">
+                  <a:lumMod val="75000"/>
+                </a:schemeClr>
+              </a:solidFill>
+            </a:endParaRPr>
+          </a:p>
+        </p:txBody>
+      </p:sp>
+      <p:sp>
+        <p:nvSpPr>
+          <p:cNvPr id="22" name="TextBox 21">
+            <a:extLst>
+              <a:ext uri="{FF2B5EF4-FFF2-40B4-BE49-F238E27FC236}">
+                <a16:creationId xmlns:a16="http://schemas.microsoft.com/office/drawing/2014/main" id="{3363A49F-735C-7A87-6F94-BBB7E0699438}"/>
+              </a:ext>
+            </a:extLst>
+          </p:cNvPr>
+          <p:cNvSpPr txBox="1"/>
+          <p:nvPr/>
+        </p:nvSpPr>
+        <p:spPr>
+          <a:xfrm>
+            <a:off x="507520" y="4350113"/>
+            <a:ext cx="1562800" cy="369332"/>
+          </a:xfrm>
+          <a:prstGeom prst="rect">
+            <a:avLst/>
+          </a:prstGeom>
+          <a:noFill/>
+        </p:spPr>
+        <p:txBody>
+          <a:bodyPr wrap="none" rtlCol="0">
+            <a:spAutoFit/>
+          </a:bodyPr>
+          <a:lstStyle/>
+          <a:p>
+            <a:r>
+              <a:rPr lang="en-US" dirty="0">
+                <a:solidFill>
+                  <a:schemeClr val="bg1">
+                    <a:lumMod val="75000"/>
+                  </a:schemeClr>
+                </a:solidFill>
+                <a:latin typeface="American Typewriter" panose="02090604020004020304" pitchFamily="18" charset="77"/>
+              </a:rPr>
+              <a:t>    </a:t>
+            </a:r>
+            <a:r>
+              <a:rPr lang="en-US" dirty="0" err="1">
+                <a:solidFill>
+                  <a:schemeClr val="bg1">
+                    <a:lumMod val="75000"/>
+                  </a:schemeClr>
+                </a:solidFill>
+                <a:latin typeface="American Typewriter" panose="02090604020004020304" pitchFamily="18" charset="77"/>
+              </a:rPr>
+              <a:t>self._verts</a:t>
+            </a:r>
+            <a:endParaRPr lang="en-US" dirty="0">
+              <a:solidFill>
+                <a:schemeClr val="bg1">
+                  <a:lumMod val="75000"/>
+                </a:schemeClr>
+              </a:solidFill>
+            </a:endParaRPr>
+          </a:p>
+        </p:txBody>
+      </p:sp>
+      <p:sp>
+        <p:nvSpPr>
+          <p:cNvPr id="23" name="TextBox 22">
+            <a:extLst>
+              <a:ext uri="{FF2B5EF4-FFF2-40B4-BE49-F238E27FC236}">
+                <a16:creationId xmlns:a16="http://schemas.microsoft.com/office/drawing/2014/main" id="{65AA3A78-5033-86E0-31EA-1FA4FDD47D1B}"/>
+              </a:ext>
+            </a:extLst>
+          </p:cNvPr>
+          <p:cNvSpPr txBox="1"/>
+          <p:nvPr/>
+        </p:nvSpPr>
+        <p:spPr>
+          <a:xfrm>
+            <a:off x="507520" y="3611449"/>
+            <a:ext cx="1744901" cy="369332"/>
+          </a:xfrm>
+          <a:prstGeom prst="rect">
+            <a:avLst/>
+          </a:prstGeom>
+          <a:noFill/>
+        </p:spPr>
+        <p:txBody>
+          <a:bodyPr wrap="none" rtlCol="0">
+            <a:spAutoFit/>
+          </a:bodyPr>
+          <a:lstStyle/>
+          <a:p>
+            <a:r>
+              <a:rPr lang="en-US" dirty="0">
+                <a:solidFill>
+                  <a:schemeClr val="accent2"/>
+                </a:solidFill>
+                <a:latin typeface="+mj-lt"/>
+              </a:rPr>
+              <a:t>V-representation</a:t>
+            </a:r>
+          </a:p>
+        </p:txBody>
+      </p:sp>
+      <p:sp>
+        <p:nvSpPr>
+          <p:cNvPr id="24" name="TextBox 23">
+            <a:extLst>
+              <a:ext uri="{FF2B5EF4-FFF2-40B4-BE49-F238E27FC236}">
+                <a16:creationId xmlns:a16="http://schemas.microsoft.com/office/drawing/2014/main" id="{DFB36BFA-7EA6-2B8C-C3F6-395496D6201F}"/>
+              </a:ext>
+            </a:extLst>
+          </p:cNvPr>
+          <p:cNvSpPr txBox="1"/>
+          <p:nvPr/>
+        </p:nvSpPr>
+        <p:spPr>
+          <a:xfrm>
+            <a:off x="3631411" y="1766396"/>
+            <a:ext cx="2254143" cy="369332"/>
+          </a:xfrm>
+          <a:prstGeom prst="rect">
+            <a:avLst/>
+          </a:prstGeom>
+          <a:noFill/>
+        </p:spPr>
+        <p:txBody>
+          <a:bodyPr wrap="none" rtlCol="0">
+            <a:spAutoFit/>
+          </a:bodyPr>
+          <a:lstStyle/>
+          <a:p>
+            <a:r>
+              <a:rPr lang="en-US" dirty="0" err="1">
+                <a:latin typeface="American Typewriter" panose="02090604020004020304" pitchFamily="18" charset="77"/>
+              </a:rPr>
+              <a:t>self.is_hrepr</a:t>
+            </a:r>
+            <a:r>
+              <a:rPr lang="en-US" dirty="0">
+                <a:latin typeface="American Typewriter" panose="02090604020004020304" pitchFamily="18" charset="77"/>
+              </a:rPr>
+              <a:t> = bool</a:t>
+            </a:r>
+            <a:endParaRPr lang="en-US" dirty="0"/>
+          </a:p>
+        </p:txBody>
+      </p:sp>
+      <p:sp>
+        <p:nvSpPr>
+          <p:cNvPr id="26" name="TextBox 25">
+            <a:extLst>
+              <a:ext uri="{FF2B5EF4-FFF2-40B4-BE49-F238E27FC236}">
+                <a16:creationId xmlns:a16="http://schemas.microsoft.com/office/drawing/2014/main" id="{C7313D93-EEE1-213D-5D23-3D58D21629CF}"/>
+              </a:ext>
+            </a:extLst>
+          </p:cNvPr>
+          <p:cNvSpPr txBox="1"/>
+          <p:nvPr/>
+        </p:nvSpPr>
+        <p:spPr>
+          <a:xfrm>
+            <a:off x="3387318" y="1321357"/>
+            <a:ext cx="713657" cy="369332"/>
+          </a:xfrm>
+          <a:prstGeom prst="rect">
+            <a:avLst/>
+          </a:prstGeom>
+          <a:noFill/>
+        </p:spPr>
+        <p:txBody>
+          <a:bodyPr wrap="none" rtlCol="0">
+            <a:spAutoFit/>
+          </a:bodyPr>
+          <a:lstStyle/>
+          <a:p>
+            <a:r>
+              <a:rPr lang="en-US" dirty="0"/>
+              <a:t>Flags</a:t>
+            </a:r>
+          </a:p>
+        </p:txBody>
+      </p:sp>
+      <p:sp>
+        <p:nvSpPr>
+          <p:cNvPr id="27" name="Rectangle 26">
+            <a:extLst>
+              <a:ext uri="{FF2B5EF4-FFF2-40B4-BE49-F238E27FC236}">
+                <a16:creationId xmlns:a16="http://schemas.microsoft.com/office/drawing/2014/main" id="{BFFC65B2-658C-CC20-9711-785F3BF1411B}"/>
+              </a:ext>
+            </a:extLst>
+          </p:cNvPr>
+          <p:cNvSpPr/>
+          <p:nvPr/>
+        </p:nvSpPr>
+        <p:spPr>
+          <a:xfrm>
+            <a:off x="3387316" y="1690688"/>
+            <a:ext cx="4304002" cy="3369365"/>
+          </a:xfrm>
+          <a:prstGeom prst="rect">
+            <a:avLst/>
+          </a:prstGeom>
+          <a:noFill/>
+          <a:ln w="28575">
+            <a:solidFill>
+              <a:schemeClr val="tx1"/>
+            </a:solidFill>
+            <a:prstDash val="dash"/>
+          </a:ln>
+        </p:spPr>
+        <p:style>
+          <a:lnRef idx="2">
+            <a:schemeClr val="accent1">
+              <a:shade val="15000"/>
+            </a:schemeClr>
+          </a:lnRef>
+          <a:fillRef idx="1">
+            <a:schemeClr val="accent1"/>
+          </a:fillRef>
+          <a:effectRef idx="0">
+            <a:schemeClr val="accent1"/>
+          </a:effectRef>
+          <a:fontRef idx="minor">
+            <a:schemeClr val="lt1"/>
+          </a:fontRef>
+        </p:style>
+        <p:txBody>
+          <a:bodyPr rtlCol="0" anchor="ctr"/>
+          <a:lstStyle/>
+          <a:p>
+            <a:pPr algn="ctr"/>
+            <a:endParaRPr lang="en-US" dirty="0">
+              <a:solidFill>
+                <a:sysClr val="windowText" lastClr="000000"/>
+              </a:solidFill>
+            </a:endParaRPr>
+          </a:p>
+        </p:txBody>
+      </p:sp>
+      <p:sp>
+        <p:nvSpPr>
+          <p:cNvPr id="28" name="TextBox 27">
+            <a:extLst>
+              <a:ext uri="{FF2B5EF4-FFF2-40B4-BE49-F238E27FC236}">
+                <a16:creationId xmlns:a16="http://schemas.microsoft.com/office/drawing/2014/main" id="{3B44DA45-0771-58C6-6035-EF1B5D0453D0}"/>
+              </a:ext>
+            </a:extLst>
+          </p:cNvPr>
+          <p:cNvSpPr txBox="1"/>
+          <p:nvPr/>
+        </p:nvSpPr>
+        <p:spPr>
+          <a:xfrm>
+            <a:off x="3631411" y="2135728"/>
+            <a:ext cx="2246128" cy="369332"/>
+          </a:xfrm>
+          <a:prstGeom prst="rect">
+            <a:avLst/>
+          </a:prstGeom>
+          <a:noFill/>
+        </p:spPr>
+        <p:txBody>
+          <a:bodyPr wrap="none" rtlCol="0">
+            <a:spAutoFit/>
+          </a:bodyPr>
+          <a:lstStyle/>
+          <a:p>
+            <a:r>
+              <a:rPr lang="en-US" dirty="0" err="1">
+                <a:latin typeface="American Typewriter" panose="02090604020004020304" pitchFamily="18" charset="77"/>
+              </a:rPr>
+              <a:t>self.is_vrepr</a:t>
+            </a:r>
+            <a:r>
+              <a:rPr lang="en-US" dirty="0">
+                <a:latin typeface="American Typewriter" panose="02090604020004020304" pitchFamily="18" charset="77"/>
+              </a:rPr>
+              <a:t> = bool</a:t>
+            </a:r>
+            <a:endParaRPr lang="en-US" dirty="0"/>
+          </a:p>
+        </p:txBody>
+      </p:sp>
+      <p:sp>
+        <p:nvSpPr>
+          <p:cNvPr id="29" name="TextBox 28">
+            <a:extLst>
+              <a:ext uri="{FF2B5EF4-FFF2-40B4-BE49-F238E27FC236}">
+                <a16:creationId xmlns:a16="http://schemas.microsoft.com/office/drawing/2014/main" id="{AA6D1758-3FB1-2C90-B080-8FDA222C0EC6}"/>
+              </a:ext>
+            </a:extLst>
+          </p:cNvPr>
+          <p:cNvSpPr txBox="1"/>
+          <p:nvPr/>
+        </p:nvSpPr>
+        <p:spPr>
+          <a:xfrm>
+            <a:off x="3631411" y="2505060"/>
+            <a:ext cx="3066545" cy="369332"/>
+          </a:xfrm>
+          <a:prstGeom prst="rect">
+            <a:avLst/>
+          </a:prstGeom>
+          <a:noFill/>
+        </p:spPr>
+        <p:txBody>
+          <a:bodyPr wrap="none" rtlCol="0">
+            <a:spAutoFit/>
+          </a:bodyPr>
+          <a:lstStyle/>
+          <a:p>
+            <a:r>
+              <a:rPr lang="en-US" dirty="0" err="1">
+                <a:latin typeface="American Typewriter" panose="02090604020004020304" pitchFamily="18" charset="77"/>
+              </a:rPr>
+              <a:t>self.is_degen</a:t>
+            </a:r>
+            <a:r>
+              <a:rPr lang="en-US" dirty="0">
+                <a:latin typeface="American Typewriter" panose="02090604020004020304" pitchFamily="18" charset="77"/>
+              </a:rPr>
+              <a:t> = bool | None</a:t>
+            </a:r>
+            <a:endParaRPr lang="en-US" dirty="0"/>
+          </a:p>
+        </p:txBody>
+      </p:sp>
+      <p:sp>
+        <p:nvSpPr>
+          <p:cNvPr id="30" name="TextBox 29">
+            <a:extLst>
+              <a:ext uri="{FF2B5EF4-FFF2-40B4-BE49-F238E27FC236}">
+                <a16:creationId xmlns:a16="http://schemas.microsoft.com/office/drawing/2014/main" id="{58ED79A0-2BFA-E4E1-224E-CD3A1546A637}"/>
+              </a:ext>
+            </a:extLst>
+          </p:cNvPr>
+          <p:cNvSpPr txBox="1"/>
+          <p:nvPr/>
+        </p:nvSpPr>
+        <p:spPr>
+          <a:xfrm>
+            <a:off x="3631411" y="2874392"/>
+            <a:ext cx="3476273" cy="369332"/>
+          </a:xfrm>
+          <a:prstGeom prst="rect">
+            <a:avLst/>
+          </a:prstGeom>
+          <a:noFill/>
+        </p:spPr>
+        <p:txBody>
+          <a:bodyPr wrap="none" rtlCol="0">
+            <a:spAutoFit/>
+          </a:bodyPr>
+          <a:lstStyle/>
+          <a:p>
+            <a:r>
+              <a:rPr lang="en-US" dirty="0" err="1">
+                <a:latin typeface="American Typewriter" panose="02090604020004020304" pitchFamily="18" charset="77"/>
+              </a:rPr>
+              <a:t>self.is_bounded</a:t>
+            </a:r>
+            <a:r>
+              <a:rPr lang="en-US" dirty="0">
+                <a:latin typeface="American Typewriter" panose="02090604020004020304" pitchFamily="18" charset="77"/>
+              </a:rPr>
+              <a:t> = bool | None</a:t>
+            </a:r>
+            <a:endParaRPr lang="en-US" dirty="0"/>
+          </a:p>
+        </p:txBody>
+      </p:sp>
+      <p:sp>
+        <p:nvSpPr>
+          <p:cNvPr id="31" name="TextBox 30">
+            <a:extLst>
+              <a:ext uri="{FF2B5EF4-FFF2-40B4-BE49-F238E27FC236}">
+                <a16:creationId xmlns:a16="http://schemas.microsoft.com/office/drawing/2014/main" id="{101BD96C-FF2C-7E82-31D9-41E9CB64B239}"/>
+              </a:ext>
+            </a:extLst>
+          </p:cNvPr>
+          <p:cNvSpPr txBox="1"/>
+          <p:nvPr/>
+        </p:nvSpPr>
+        <p:spPr>
+          <a:xfrm>
+            <a:off x="3631410" y="3243724"/>
+            <a:ext cx="3319178" cy="369332"/>
+          </a:xfrm>
+          <a:prstGeom prst="rect">
+            <a:avLst/>
+          </a:prstGeom>
+          <a:noFill/>
+        </p:spPr>
+        <p:txBody>
+          <a:bodyPr wrap="none" rtlCol="0">
+            <a:spAutoFit/>
+          </a:bodyPr>
+          <a:lstStyle/>
+          <a:p>
+            <a:r>
+              <a:rPr lang="en-US" dirty="0" err="1">
+                <a:latin typeface="American Typewriter" panose="02090604020004020304" pitchFamily="18" charset="77"/>
+              </a:rPr>
+              <a:t>self.is_full_dim</a:t>
+            </a:r>
+            <a:r>
+              <a:rPr lang="en-US" dirty="0">
+                <a:latin typeface="American Typewriter" panose="02090604020004020304" pitchFamily="18" charset="77"/>
+              </a:rPr>
+              <a:t> = bool | None</a:t>
+            </a:r>
+            <a:endParaRPr lang="en-US" dirty="0"/>
+          </a:p>
+        </p:txBody>
+      </p:sp>
+      <p:sp>
+        <p:nvSpPr>
+          <p:cNvPr id="32" name="TextBox 31">
+            <a:extLst>
+              <a:ext uri="{FF2B5EF4-FFF2-40B4-BE49-F238E27FC236}">
+                <a16:creationId xmlns:a16="http://schemas.microsoft.com/office/drawing/2014/main" id="{9D731D56-66CA-C45C-FADD-7771175BA830}"/>
+              </a:ext>
+            </a:extLst>
+          </p:cNvPr>
+          <p:cNvSpPr txBox="1"/>
+          <p:nvPr/>
+        </p:nvSpPr>
+        <p:spPr>
+          <a:xfrm>
+            <a:off x="3631410" y="3616704"/>
+            <a:ext cx="3115981" cy="369332"/>
+          </a:xfrm>
+          <a:prstGeom prst="rect">
+            <a:avLst/>
+          </a:prstGeom>
+          <a:noFill/>
+        </p:spPr>
+        <p:txBody>
+          <a:bodyPr wrap="none" rtlCol="0">
+            <a:spAutoFit/>
+          </a:bodyPr>
+          <a:lstStyle/>
+          <a:p>
+            <a:r>
+              <a:rPr lang="en-US" dirty="0" err="1">
+                <a:latin typeface="American Typewriter" panose="02090604020004020304" pitchFamily="18" charset="77"/>
+              </a:rPr>
+              <a:t>self.is_empty</a:t>
+            </a:r>
+            <a:r>
+              <a:rPr lang="en-US" dirty="0">
+                <a:latin typeface="American Typewriter" panose="02090604020004020304" pitchFamily="18" charset="77"/>
+              </a:rPr>
+              <a:t> = bool | None</a:t>
+            </a:r>
+            <a:endParaRPr lang="en-US" dirty="0"/>
+          </a:p>
+        </p:txBody>
+      </p:sp>
+      <p:sp>
+        <p:nvSpPr>
+          <p:cNvPr id="33" name="TextBox 32">
+            <a:extLst>
+              <a:ext uri="{FF2B5EF4-FFF2-40B4-BE49-F238E27FC236}">
+                <a16:creationId xmlns:a16="http://schemas.microsoft.com/office/drawing/2014/main" id="{3268A4B7-8957-AAAA-8C0D-9D42B81B3075}"/>
+              </a:ext>
+            </a:extLst>
+          </p:cNvPr>
+          <p:cNvSpPr txBox="1"/>
+          <p:nvPr/>
+        </p:nvSpPr>
+        <p:spPr>
+          <a:xfrm>
+            <a:off x="507519" y="5448470"/>
+            <a:ext cx="780983" cy="369332"/>
+          </a:xfrm>
+          <a:prstGeom prst="rect">
+            <a:avLst/>
+          </a:prstGeom>
+          <a:noFill/>
+        </p:spPr>
+        <p:txBody>
+          <a:bodyPr wrap="none" rtlCol="0">
+            <a:spAutoFit/>
+          </a:bodyPr>
+          <a:lstStyle/>
+          <a:p>
+            <a:r>
+              <a:rPr lang="en-US" dirty="0" err="1">
+                <a:solidFill>
+                  <a:schemeClr val="accent5">
+                    <a:lumMod val="75000"/>
+                  </a:schemeClr>
+                </a:solidFill>
+                <a:latin typeface="American Typewriter" panose="02090604020004020304" pitchFamily="18" charset="77"/>
+              </a:rPr>
+              <a:t>self.n</a:t>
+            </a:r>
+            <a:endParaRPr lang="en-US" dirty="0">
+              <a:solidFill>
+                <a:schemeClr val="accent5">
+                  <a:lumMod val="75000"/>
+                </a:schemeClr>
+              </a:solidFill>
+            </a:endParaRPr>
+          </a:p>
+        </p:txBody>
+      </p:sp>
+      <p:sp>
+        <p:nvSpPr>
+          <p:cNvPr id="34" name="TextBox 33">
+            <a:extLst>
+              <a:ext uri="{FF2B5EF4-FFF2-40B4-BE49-F238E27FC236}">
+                <a16:creationId xmlns:a16="http://schemas.microsoft.com/office/drawing/2014/main" id="{66467385-9FE1-7415-A9BA-BDD1E39E23D7}"/>
+              </a:ext>
+            </a:extLst>
+          </p:cNvPr>
+          <p:cNvSpPr txBox="1"/>
+          <p:nvPr/>
+        </p:nvSpPr>
+        <p:spPr>
+          <a:xfrm>
+            <a:off x="8335122" y="1766396"/>
+            <a:ext cx="967573" cy="369332"/>
+          </a:xfrm>
+          <a:prstGeom prst="rect">
+            <a:avLst/>
+          </a:prstGeom>
+          <a:noFill/>
+        </p:spPr>
+        <p:txBody>
+          <a:bodyPr wrap="none" rtlCol="0">
+            <a:spAutoFit/>
+          </a:bodyPr>
+          <a:lstStyle/>
+          <a:p>
+            <a:r>
+              <a:rPr lang="en-US" dirty="0" err="1">
+                <a:solidFill>
+                  <a:schemeClr val="accent5"/>
+                </a:solidFill>
+                <a:latin typeface="American Typewriter" panose="02090604020004020304" pitchFamily="18" charset="77"/>
+              </a:rPr>
+              <a:t>self.vol</a:t>
+            </a:r>
+            <a:endParaRPr lang="en-US" dirty="0">
+              <a:solidFill>
+                <a:schemeClr val="accent5"/>
+              </a:solidFill>
+            </a:endParaRPr>
+          </a:p>
+        </p:txBody>
+      </p:sp>
+      <p:sp>
+        <p:nvSpPr>
+          <p:cNvPr id="35" name="TextBox 34">
+            <a:extLst>
+              <a:ext uri="{FF2B5EF4-FFF2-40B4-BE49-F238E27FC236}">
+                <a16:creationId xmlns:a16="http://schemas.microsoft.com/office/drawing/2014/main" id="{BFA15793-FBF0-4816-E0FC-13598A5A93CC}"/>
+              </a:ext>
+            </a:extLst>
+          </p:cNvPr>
+          <p:cNvSpPr txBox="1"/>
+          <p:nvPr/>
+        </p:nvSpPr>
+        <p:spPr>
+          <a:xfrm>
+            <a:off x="8091029" y="1321357"/>
+            <a:ext cx="1712585" cy="369332"/>
+          </a:xfrm>
+          <a:prstGeom prst="rect">
+            <a:avLst/>
+          </a:prstGeom>
+          <a:noFill/>
+        </p:spPr>
+        <p:txBody>
+          <a:bodyPr wrap="none" rtlCol="0">
+            <a:spAutoFit/>
+          </a:bodyPr>
+          <a:lstStyle/>
+          <a:p>
+            <a:r>
+              <a:rPr lang="en-US" dirty="0"/>
+              <a:t>Characteristics</a:t>
+            </a:r>
+          </a:p>
+        </p:txBody>
+      </p:sp>
+      <p:sp>
+        <p:nvSpPr>
+          <p:cNvPr id="36" name="Rectangle 35">
+            <a:extLst>
+              <a:ext uri="{FF2B5EF4-FFF2-40B4-BE49-F238E27FC236}">
+                <a16:creationId xmlns:a16="http://schemas.microsoft.com/office/drawing/2014/main" id="{7949B69B-5975-EC35-DDEB-FAEBC7D2DF36}"/>
+              </a:ext>
+            </a:extLst>
+          </p:cNvPr>
+          <p:cNvSpPr/>
+          <p:nvPr/>
+        </p:nvSpPr>
+        <p:spPr>
+          <a:xfrm>
+            <a:off x="8091027" y="1690688"/>
+            <a:ext cx="3603347" cy="3369365"/>
+          </a:xfrm>
+          <a:prstGeom prst="rect">
+            <a:avLst/>
+          </a:prstGeom>
+          <a:noFill/>
+          <a:ln w="28575">
+            <a:solidFill>
+              <a:schemeClr val="tx1"/>
+            </a:solidFill>
+            <a:prstDash val="dash"/>
+          </a:ln>
+        </p:spPr>
+        <p:style>
+          <a:lnRef idx="2">
+            <a:schemeClr val="accent1">
+              <a:shade val="15000"/>
+            </a:schemeClr>
+          </a:lnRef>
+          <a:fillRef idx="1">
+            <a:schemeClr val="accent1"/>
+          </a:fillRef>
+          <a:effectRef idx="0">
+            <a:schemeClr val="accent1"/>
+          </a:effectRef>
+          <a:fontRef idx="minor">
+            <a:schemeClr val="lt1"/>
+          </a:fontRef>
+        </p:style>
+        <p:txBody>
+          <a:bodyPr rtlCol="0" anchor="ctr"/>
+          <a:lstStyle/>
+          <a:p>
+            <a:pPr algn="ctr"/>
+            <a:endParaRPr lang="en-US" dirty="0">
+              <a:solidFill>
+                <a:sysClr val="windowText" lastClr="000000"/>
+              </a:solidFill>
+            </a:endParaRPr>
+          </a:p>
+        </p:txBody>
+      </p:sp>
+      <p:sp>
+        <p:nvSpPr>
+          <p:cNvPr id="45" name="TextBox 44">
+            <a:extLst>
+              <a:ext uri="{FF2B5EF4-FFF2-40B4-BE49-F238E27FC236}">
+                <a16:creationId xmlns:a16="http://schemas.microsoft.com/office/drawing/2014/main" id="{51507276-70CA-9BFA-5061-5505788F329A}"/>
+              </a:ext>
+            </a:extLst>
+          </p:cNvPr>
+          <p:cNvSpPr txBox="1"/>
+          <p:nvPr/>
+        </p:nvSpPr>
+        <p:spPr>
+          <a:xfrm>
+            <a:off x="8335122" y="2135728"/>
+            <a:ext cx="2855975" cy="369332"/>
+          </a:xfrm>
+          <a:prstGeom prst="rect">
+            <a:avLst/>
+          </a:prstGeom>
+          <a:noFill/>
+        </p:spPr>
+        <p:txBody>
+          <a:bodyPr wrap="none" rtlCol="0">
+            <a:spAutoFit/>
+          </a:bodyPr>
+          <a:lstStyle/>
+          <a:p>
+            <a:r>
+              <a:rPr lang="en-US" dirty="0">
+                <a:solidFill>
+                  <a:schemeClr val="bg1">
+                    <a:lumMod val="75000"/>
+                  </a:schemeClr>
+                </a:solidFill>
+                <a:latin typeface="American Typewriter" panose="02090604020004020304" pitchFamily="18" charset="77"/>
+              </a:rPr>
+              <a:t>    </a:t>
+            </a:r>
+            <a:r>
+              <a:rPr lang="en-US" dirty="0" err="1">
+                <a:solidFill>
+                  <a:schemeClr val="bg1">
+                    <a:lumMod val="75000"/>
+                  </a:schemeClr>
+                </a:solidFill>
+                <a:latin typeface="American Typewriter" panose="02090604020004020304" pitchFamily="18" charset="77"/>
+              </a:rPr>
+              <a:t>self._vol</a:t>
+            </a:r>
+            <a:r>
+              <a:rPr lang="en-US" dirty="0">
+                <a:solidFill>
+                  <a:schemeClr val="bg1">
+                    <a:lumMod val="75000"/>
+                  </a:schemeClr>
+                </a:solidFill>
+                <a:latin typeface="American Typewriter" panose="02090604020004020304" pitchFamily="18" charset="77"/>
+              </a:rPr>
+              <a:t> = float | None</a:t>
+            </a:r>
+            <a:endParaRPr lang="en-US" dirty="0">
+              <a:solidFill>
+                <a:schemeClr val="bg1">
+                  <a:lumMod val="75000"/>
+                </a:schemeClr>
+              </a:solidFill>
+            </a:endParaRPr>
+          </a:p>
+        </p:txBody>
+      </p:sp>
+      <p:sp>
+        <p:nvSpPr>
+          <p:cNvPr id="48" name="TextBox 47">
+            <a:extLst>
+              <a:ext uri="{FF2B5EF4-FFF2-40B4-BE49-F238E27FC236}">
+                <a16:creationId xmlns:a16="http://schemas.microsoft.com/office/drawing/2014/main" id="{67FB07D6-16EE-14AD-4483-30EF2FE0B8ED}"/>
+              </a:ext>
+            </a:extLst>
+          </p:cNvPr>
+          <p:cNvSpPr txBox="1"/>
+          <p:nvPr/>
+        </p:nvSpPr>
+        <p:spPr>
+          <a:xfrm>
+            <a:off x="8335122" y="2505060"/>
+            <a:ext cx="1263679" cy="369332"/>
+          </a:xfrm>
+          <a:prstGeom prst="rect">
+            <a:avLst/>
+          </a:prstGeom>
+          <a:noFill/>
+        </p:spPr>
+        <p:txBody>
+          <a:bodyPr wrap="none" rtlCol="0">
+            <a:spAutoFit/>
+          </a:bodyPr>
+          <a:lstStyle/>
+          <a:p>
+            <a:r>
+              <a:rPr lang="en-US" dirty="0" err="1">
+                <a:solidFill>
+                  <a:schemeClr val="accent5"/>
+                </a:solidFill>
+                <a:latin typeface="American Typewriter" panose="02090604020004020304" pitchFamily="18" charset="77"/>
+              </a:rPr>
+              <a:t>self.chebc</a:t>
+            </a:r>
+            <a:endParaRPr lang="en-US" dirty="0">
+              <a:solidFill>
+                <a:schemeClr val="accent5"/>
+              </a:solidFill>
+            </a:endParaRPr>
+          </a:p>
+        </p:txBody>
+      </p:sp>
+      <p:sp>
+        <p:nvSpPr>
+          <p:cNvPr id="50" name="TextBox 49">
+            <a:extLst>
+              <a:ext uri="{FF2B5EF4-FFF2-40B4-BE49-F238E27FC236}">
+                <a16:creationId xmlns:a16="http://schemas.microsoft.com/office/drawing/2014/main" id="{5E855ACF-96B7-0FF8-3B7C-E7212141FCD3}"/>
+              </a:ext>
+            </a:extLst>
+          </p:cNvPr>
+          <p:cNvSpPr txBox="1"/>
+          <p:nvPr/>
+        </p:nvSpPr>
+        <p:spPr>
+          <a:xfrm>
+            <a:off x="10034192" y="2505060"/>
+            <a:ext cx="1260473" cy="369332"/>
+          </a:xfrm>
+          <a:prstGeom prst="rect">
+            <a:avLst/>
+          </a:prstGeom>
+          <a:noFill/>
+        </p:spPr>
+        <p:txBody>
+          <a:bodyPr wrap="none" rtlCol="0">
+            <a:spAutoFit/>
+          </a:bodyPr>
+          <a:lstStyle/>
+          <a:p>
+            <a:r>
+              <a:rPr lang="en-US" dirty="0" err="1">
+                <a:solidFill>
+                  <a:schemeClr val="accent5"/>
+                </a:solidFill>
+                <a:latin typeface="American Typewriter" panose="02090604020004020304" pitchFamily="18" charset="77"/>
+              </a:rPr>
+              <a:t>self.chebr</a:t>
+            </a:r>
+            <a:endParaRPr lang="en-US" dirty="0">
+              <a:solidFill>
+                <a:schemeClr val="accent5"/>
+              </a:solidFill>
+            </a:endParaRPr>
+          </a:p>
+        </p:txBody>
+      </p:sp>
+      <p:sp>
+        <p:nvSpPr>
+          <p:cNvPr id="51" name="TextBox 50">
+            <a:extLst>
+              <a:ext uri="{FF2B5EF4-FFF2-40B4-BE49-F238E27FC236}">
+                <a16:creationId xmlns:a16="http://schemas.microsoft.com/office/drawing/2014/main" id="{EA21E40C-9D6A-BA51-FDA1-BA1D20D05BB6}"/>
+              </a:ext>
+            </a:extLst>
+          </p:cNvPr>
+          <p:cNvSpPr txBox="1"/>
+          <p:nvPr/>
+        </p:nvSpPr>
+        <p:spPr>
+          <a:xfrm>
+            <a:off x="8335122" y="2874392"/>
+            <a:ext cx="2881110" cy="369332"/>
+          </a:xfrm>
+          <a:prstGeom prst="rect">
+            <a:avLst/>
+          </a:prstGeom>
+          <a:noFill/>
+        </p:spPr>
+        <p:txBody>
+          <a:bodyPr wrap="none" rtlCol="0">
+            <a:spAutoFit/>
+          </a:bodyPr>
+          <a:lstStyle/>
+          <a:p>
+            <a:r>
+              <a:rPr lang="en-US" dirty="0">
+                <a:solidFill>
+                  <a:schemeClr val="bg1">
+                    <a:lumMod val="75000"/>
+                  </a:schemeClr>
+                </a:solidFill>
+                <a:latin typeface="American Typewriter" panose="02090604020004020304" pitchFamily="18" charset="77"/>
+              </a:rPr>
+              <a:t>    self._</a:t>
+            </a:r>
+            <a:r>
+              <a:rPr lang="en-US" dirty="0" err="1">
+                <a:solidFill>
+                  <a:schemeClr val="bg1">
+                    <a:lumMod val="75000"/>
+                  </a:schemeClr>
+                </a:solidFill>
+                <a:latin typeface="American Typewriter" panose="02090604020004020304" pitchFamily="18" charset="77"/>
+              </a:rPr>
+              <a:t>chebcr</a:t>
+            </a:r>
+            <a:r>
+              <a:rPr lang="en-US" dirty="0">
+                <a:solidFill>
+                  <a:schemeClr val="bg1">
+                    <a:lumMod val="75000"/>
+                  </a:schemeClr>
+                </a:solidFill>
+                <a:latin typeface="American Typewriter" panose="02090604020004020304" pitchFamily="18" charset="77"/>
+              </a:rPr>
+              <a:t> = [</a:t>
+            </a:r>
+            <a:r>
+              <a:rPr lang="en-US" dirty="0" err="1">
+                <a:solidFill>
+                  <a:schemeClr val="bg1">
+                    <a:lumMod val="75000"/>
+                  </a:schemeClr>
+                </a:solidFill>
+                <a:latin typeface="American Typewriter" panose="02090604020004020304" pitchFamily="18" charset="77"/>
+              </a:rPr>
+              <a:t>c^T</a:t>
+            </a:r>
+            <a:r>
+              <a:rPr lang="en-US" dirty="0">
+                <a:solidFill>
+                  <a:schemeClr val="bg1">
+                    <a:lumMod val="75000"/>
+                  </a:schemeClr>
+                </a:solidFill>
+                <a:latin typeface="American Typewriter" panose="02090604020004020304" pitchFamily="18" charset="77"/>
+              </a:rPr>
+              <a:t> | r]</a:t>
+            </a:r>
+            <a:endParaRPr lang="en-US" dirty="0">
+              <a:solidFill>
+                <a:schemeClr val="bg1">
+                  <a:lumMod val="75000"/>
+                </a:schemeClr>
+              </a:solidFill>
+            </a:endParaRPr>
+          </a:p>
+        </p:txBody>
+      </p:sp>
+      <p:sp>
+        <p:nvSpPr>
+          <p:cNvPr id="53" name="TextBox 52">
+            <a:extLst>
+              <a:ext uri="{FF2B5EF4-FFF2-40B4-BE49-F238E27FC236}">
+                <a16:creationId xmlns:a16="http://schemas.microsoft.com/office/drawing/2014/main" id="{30A46D95-71EA-8254-832D-B4F328961B27}"/>
+              </a:ext>
+            </a:extLst>
+          </p:cNvPr>
+          <p:cNvSpPr txBox="1"/>
+          <p:nvPr/>
+        </p:nvSpPr>
+        <p:spPr>
+          <a:xfrm>
+            <a:off x="3631410" y="3982388"/>
+            <a:ext cx="3859390" cy="369332"/>
+          </a:xfrm>
+          <a:prstGeom prst="rect">
+            <a:avLst/>
+          </a:prstGeom>
+          <a:noFill/>
+        </p:spPr>
+        <p:txBody>
+          <a:bodyPr wrap="none" rtlCol="0">
+            <a:spAutoFit/>
+          </a:bodyPr>
+          <a:lstStyle/>
+          <a:p>
+            <a:r>
+              <a:rPr lang="en-US" dirty="0" err="1">
+                <a:latin typeface="American Typewriter" panose="02090604020004020304" pitchFamily="18" charset="77"/>
+              </a:rPr>
+              <a:t>self.is_min_repr</a:t>
+            </a:r>
+            <a:r>
+              <a:rPr lang="en-US" dirty="0">
+                <a:latin typeface="American Typewriter" panose="02090604020004020304" pitchFamily="18" charset="77"/>
+              </a:rPr>
+              <a:t> = bool | None </a:t>
+            </a:r>
+            <a:r>
+              <a:rPr lang="en-US" dirty="0"/>
+              <a:t>(?)</a:t>
+            </a:r>
+          </a:p>
+        </p:txBody>
+      </p:sp>
+      <p:sp>
+        <p:nvSpPr>
+          <p:cNvPr id="54" name="TextBox 53">
+            <a:extLst>
+              <a:ext uri="{FF2B5EF4-FFF2-40B4-BE49-F238E27FC236}">
+                <a16:creationId xmlns:a16="http://schemas.microsoft.com/office/drawing/2014/main" id="{647FD90C-F2FA-D876-45E9-F24FCE630DD9}"/>
+              </a:ext>
+            </a:extLst>
+          </p:cNvPr>
+          <p:cNvSpPr txBox="1"/>
+          <p:nvPr/>
+        </p:nvSpPr>
+        <p:spPr>
+          <a:xfrm>
+            <a:off x="3631409" y="4355368"/>
+            <a:ext cx="3745577" cy="369332"/>
+          </a:xfrm>
+          <a:prstGeom prst="rect">
+            <a:avLst/>
+          </a:prstGeom>
+          <a:noFill/>
+        </p:spPr>
+        <p:txBody>
+          <a:bodyPr wrap="none" rtlCol="0">
+            <a:spAutoFit/>
+          </a:bodyPr>
+          <a:lstStyle/>
+          <a:p>
+            <a:r>
+              <a:rPr lang="en-US" dirty="0" err="1">
+                <a:latin typeface="American Typewriter" panose="02090604020004020304" pitchFamily="18" charset="77"/>
+              </a:rPr>
+              <a:t>self.is_singleton</a:t>
+            </a:r>
+            <a:r>
+              <a:rPr lang="en-US" dirty="0">
+                <a:latin typeface="American Typewriter" panose="02090604020004020304" pitchFamily="18" charset="77"/>
+              </a:rPr>
+              <a:t> = bool | None </a:t>
+            </a:r>
+            <a:r>
+              <a:rPr lang="en-US" dirty="0"/>
+              <a:t>(?)</a:t>
+            </a:r>
+          </a:p>
+        </p:txBody>
+      </p:sp>
+      <p:sp>
+        <p:nvSpPr>
+          <p:cNvPr id="55" name="Rectangle 54">
+            <a:extLst>
+              <a:ext uri="{FF2B5EF4-FFF2-40B4-BE49-F238E27FC236}">
+                <a16:creationId xmlns:a16="http://schemas.microsoft.com/office/drawing/2014/main" id="{FF631887-50B4-6091-3630-266DF9651A09}"/>
+              </a:ext>
+            </a:extLst>
+          </p:cNvPr>
+          <p:cNvSpPr/>
+          <p:nvPr/>
+        </p:nvSpPr>
+        <p:spPr>
+          <a:xfrm>
+            <a:off x="507520" y="2877605"/>
+            <a:ext cx="2370856" cy="735451"/>
+          </a:xfrm>
+          <a:prstGeom prst="rect">
+            <a:avLst/>
+          </a:prstGeom>
+          <a:noFill/>
+          <a:ln w="28575">
+            <a:solidFill>
+              <a:schemeClr val="accent2"/>
+            </a:solidFill>
+            <a:prstDash val="dash"/>
+          </a:ln>
+        </p:spPr>
+        <p:style>
+          <a:lnRef idx="2">
+            <a:schemeClr val="accent1">
+              <a:shade val="15000"/>
+            </a:schemeClr>
+          </a:lnRef>
+          <a:fillRef idx="1">
+            <a:schemeClr val="accent1"/>
+          </a:fillRef>
+          <a:effectRef idx="0">
+            <a:schemeClr val="accent1"/>
+          </a:effectRef>
+          <a:fontRef idx="minor">
+            <a:schemeClr val="lt1"/>
+          </a:fontRef>
+        </p:style>
+        <p:txBody>
+          <a:bodyPr numCol="1" rtlCol="0" anchor="t"/>
+          <a:lstStyle/>
+          <a:p>
+            <a:pPr algn="ctr"/>
+            <a:endParaRPr kumimoji="0" lang="en-US" sz="1800" b="0" i="0" u="none" strike="noStrike" kern="1200" cap="none" spc="0" normalizeH="0" baseline="0" noProof="0" dirty="0">
+              <a:ln>
+                <a:noFill/>
+              </a:ln>
+              <a:solidFill>
+                <a:prstClr val="white"/>
+              </a:solidFill>
+              <a:effectLst/>
+              <a:uLnTx/>
+              <a:uFillTx/>
+              <a:latin typeface="American Typewriter" panose="02090604020004020304" pitchFamily="18" charset="77"/>
+            </a:endParaRPr>
+          </a:p>
+        </p:txBody>
+      </p:sp>
+      <p:sp>
+        <p:nvSpPr>
+          <p:cNvPr id="56" name="TextBox 55">
+            <a:extLst>
+              <a:ext uri="{FF2B5EF4-FFF2-40B4-BE49-F238E27FC236}">
+                <a16:creationId xmlns:a16="http://schemas.microsoft.com/office/drawing/2014/main" id="{32ADC7F9-83BA-2E17-8F60-8CF9696FE40F}"/>
+              </a:ext>
+            </a:extLst>
+          </p:cNvPr>
+          <p:cNvSpPr txBox="1"/>
+          <p:nvPr/>
+        </p:nvSpPr>
+        <p:spPr>
+          <a:xfrm>
+            <a:off x="507520" y="2871042"/>
+            <a:ext cx="1172116" cy="369332"/>
+          </a:xfrm>
+          <a:prstGeom prst="rect">
+            <a:avLst/>
+          </a:prstGeom>
+          <a:noFill/>
+        </p:spPr>
+        <p:txBody>
+          <a:bodyPr wrap="none" rtlCol="0">
+            <a:spAutoFit/>
+          </a:bodyPr>
+          <a:lstStyle/>
+          <a:p>
+            <a:r>
+              <a:rPr lang="en-US" dirty="0" err="1">
+                <a:solidFill>
+                  <a:schemeClr val="accent5">
+                    <a:lumMod val="75000"/>
+                  </a:schemeClr>
+                </a:solidFill>
+                <a:latin typeface="American Typewriter" panose="02090604020004020304" pitchFamily="18" charset="77"/>
+              </a:rPr>
+              <a:t>self.A_eq</a:t>
+            </a:r>
+            <a:endParaRPr lang="en-US" dirty="0">
+              <a:solidFill>
+                <a:schemeClr val="accent5">
+                  <a:lumMod val="75000"/>
+                </a:schemeClr>
+              </a:solidFill>
+            </a:endParaRPr>
+          </a:p>
+        </p:txBody>
+      </p:sp>
+      <p:sp>
+        <p:nvSpPr>
+          <p:cNvPr id="57" name="TextBox 56">
+            <a:extLst>
+              <a:ext uri="{FF2B5EF4-FFF2-40B4-BE49-F238E27FC236}">
+                <a16:creationId xmlns:a16="http://schemas.microsoft.com/office/drawing/2014/main" id="{E91FB0A1-9BE3-49BF-384C-2390FB7D5498}"/>
+              </a:ext>
+            </a:extLst>
+          </p:cNvPr>
+          <p:cNvSpPr txBox="1"/>
+          <p:nvPr/>
+        </p:nvSpPr>
+        <p:spPr>
+          <a:xfrm>
+            <a:off x="1747940" y="2871042"/>
+            <a:ext cx="1130438" cy="369332"/>
+          </a:xfrm>
+          <a:prstGeom prst="rect">
+            <a:avLst/>
+          </a:prstGeom>
+          <a:noFill/>
+        </p:spPr>
+        <p:txBody>
+          <a:bodyPr wrap="none" rtlCol="0">
+            <a:spAutoFit/>
+          </a:bodyPr>
+          <a:lstStyle/>
+          <a:p>
+            <a:r>
+              <a:rPr lang="en-US" dirty="0" err="1">
+                <a:solidFill>
+                  <a:schemeClr val="accent5">
+                    <a:lumMod val="75000"/>
+                  </a:schemeClr>
+                </a:solidFill>
+                <a:latin typeface="American Typewriter" panose="02090604020004020304" pitchFamily="18" charset="77"/>
+              </a:rPr>
+              <a:t>self.b_eq</a:t>
+            </a:r>
+            <a:endParaRPr lang="en-US" dirty="0">
+              <a:solidFill>
+                <a:schemeClr val="accent5">
+                  <a:lumMod val="75000"/>
+                </a:schemeClr>
+              </a:solidFill>
+            </a:endParaRPr>
+          </a:p>
+        </p:txBody>
+      </p:sp>
+      <p:sp>
+        <p:nvSpPr>
+          <p:cNvPr id="58" name="TextBox 57">
+            <a:extLst>
+              <a:ext uri="{FF2B5EF4-FFF2-40B4-BE49-F238E27FC236}">
+                <a16:creationId xmlns:a16="http://schemas.microsoft.com/office/drawing/2014/main" id="{493615C2-5A50-0A5B-5A19-D6974906E46E}"/>
+              </a:ext>
+            </a:extLst>
+          </p:cNvPr>
+          <p:cNvSpPr txBox="1"/>
+          <p:nvPr/>
+        </p:nvSpPr>
+        <p:spPr>
+          <a:xfrm>
+            <a:off x="507520" y="3240374"/>
+            <a:ext cx="1648208" cy="369332"/>
+          </a:xfrm>
+          <a:prstGeom prst="rect">
+            <a:avLst/>
+          </a:prstGeom>
+          <a:noFill/>
+        </p:spPr>
+        <p:txBody>
+          <a:bodyPr wrap="none" rtlCol="0">
+            <a:spAutoFit/>
+          </a:bodyPr>
+          <a:lstStyle/>
+          <a:p>
+            <a:r>
+              <a:rPr lang="en-US" dirty="0">
+                <a:solidFill>
+                  <a:schemeClr val="bg1">
+                    <a:lumMod val="75000"/>
+                  </a:schemeClr>
+                </a:solidFill>
+                <a:latin typeface="American Typewriter" panose="02090604020004020304" pitchFamily="18" charset="77"/>
+              </a:rPr>
+              <a:t>    self._</a:t>
+            </a:r>
+            <a:r>
+              <a:rPr lang="en-US" dirty="0" err="1">
+                <a:solidFill>
+                  <a:schemeClr val="bg1">
+                    <a:lumMod val="75000"/>
+                  </a:schemeClr>
+                </a:solidFill>
+                <a:latin typeface="American Typewriter" panose="02090604020004020304" pitchFamily="18" charset="77"/>
+              </a:rPr>
+              <a:t>Ab_eq</a:t>
+            </a:r>
+            <a:endParaRPr lang="en-US" dirty="0">
+              <a:solidFill>
+                <a:schemeClr val="bg1">
+                  <a:lumMod val="75000"/>
+                </a:schemeClr>
+              </a:solidFill>
+            </a:endParaRPr>
+          </a:p>
+        </p:txBody>
+      </p:sp>
+      <p:sp>
+        <p:nvSpPr>
+          <p:cNvPr id="59" name="Rectangle 58">
+            <a:extLst>
+              <a:ext uri="{FF2B5EF4-FFF2-40B4-BE49-F238E27FC236}">
+                <a16:creationId xmlns:a16="http://schemas.microsoft.com/office/drawing/2014/main" id="{477D4F4B-3ED4-F211-A781-5C8B0266EC8B}"/>
+              </a:ext>
+            </a:extLst>
+          </p:cNvPr>
+          <p:cNvSpPr/>
+          <p:nvPr/>
+        </p:nvSpPr>
+        <p:spPr>
+          <a:xfrm>
+            <a:off x="515060" y="4716232"/>
+            <a:ext cx="2370856" cy="735451"/>
+          </a:xfrm>
+          <a:prstGeom prst="rect">
+            <a:avLst/>
+          </a:prstGeom>
+          <a:noFill/>
+          <a:ln w="28575">
+            <a:solidFill>
+              <a:schemeClr val="accent2"/>
+            </a:solidFill>
+            <a:prstDash val="dash"/>
+          </a:ln>
+        </p:spPr>
+        <p:style>
+          <a:lnRef idx="2">
+            <a:schemeClr val="accent1">
+              <a:shade val="15000"/>
+            </a:schemeClr>
+          </a:lnRef>
+          <a:fillRef idx="1">
+            <a:schemeClr val="accent1"/>
+          </a:fillRef>
+          <a:effectRef idx="0">
+            <a:schemeClr val="accent1"/>
+          </a:effectRef>
+          <a:fontRef idx="minor">
+            <a:schemeClr val="lt1"/>
+          </a:fontRef>
+        </p:style>
+        <p:txBody>
+          <a:bodyPr numCol="1" rtlCol="0" anchor="t"/>
+          <a:lstStyle/>
+          <a:p>
+            <a:pPr algn="ctr"/>
+            <a:endParaRPr kumimoji="0" lang="en-US" sz="1800" b="0" i="0" u="none" strike="noStrike" kern="1200" cap="none" spc="0" normalizeH="0" baseline="0" noProof="0" dirty="0">
+              <a:ln>
+                <a:noFill/>
+              </a:ln>
+              <a:solidFill>
+                <a:prstClr val="white"/>
+              </a:solidFill>
+              <a:effectLst/>
+              <a:uLnTx/>
+              <a:uFillTx/>
+              <a:latin typeface="American Typewriter" panose="02090604020004020304" pitchFamily="18" charset="77"/>
+            </a:endParaRPr>
+          </a:p>
+        </p:txBody>
+      </p:sp>
+      <p:sp>
+        <p:nvSpPr>
+          <p:cNvPr id="60" name="TextBox 59">
+            <a:extLst>
+              <a:ext uri="{FF2B5EF4-FFF2-40B4-BE49-F238E27FC236}">
+                <a16:creationId xmlns:a16="http://schemas.microsoft.com/office/drawing/2014/main" id="{42F6EBDB-7F73-DF34-C679-AF302DAFFFF0}"/>
+              </a:ext>
+            </a:extLst>
+          </p:cNvPr>
+          <p:cNvSpPr txBox="1"/>
+          <p:nvPr/>
+        </p:nvSpPr>
+        <p:spPr>
+          <a:xfrm>
+            <a:off x="524409" y="4712882"/>
+            <a:ext cx="1125565" cy="369332"/>
+          </a:xfrm>
+          <a:prstGeom prst="rect">
+            <a:avLst/>
+          </a:prstGeom>
+          <a:noFill/>
+        </p:spPr>
+        <p:txBody>
+          <a:bodyPr wrap="none" rtlCol="0">
+            <a:spAutoFit/>
+          </a:bodyPr>
+          <a:lstStyle/>
+          <a:p>
+            <a:r>
+              <a:rPr lang="en-US" dirty="0" err="1">
+                <a:solidFill>
+                  <a:schemeClr val="accent5">
+                    <a:lumMod val="75000"/>
+                  </a:schemeClr>
+                </a:solidFill>
+                <a:latin typeface="American Typewriter" panose="02090604020004020304" pitchFamily="18" charset="77"/>
+              </a:rPr>
+              <a:t>self.rays</a:t>
+            </a:r>
+            <a:endParaRPr lang="en-US" dirty="0">
+              <a:solidFill>
+                <a:schemeClr val="accent5">
+                  <a:lumMod val="75000"/>
+                </a:schemeClr>
+              </a:solidFill>
+            </a:endParaRPr>
+          </a:p>
+        </p:txBody>
+      </p:sp>
+      <p:sp>
+        <p:nvSpPr>
+          <p:cNvPr id="61" name="TextBox 60">
+            <a:extLst>
+              <a:ext uri="{FF2B5EF4-FFF2-40B4-BE49-F238E27FC236}">
+                <a16:creationId xmlns:a16="http://schemas.microsoft.com/office/drawing/2014/main" id="{B56C31EE-F0FE-A4FC-F6D3-3B805FBF80A9}"/>
+              </a:ext>
+            </a:extLst>
+          </p:cNvPr>
+          <p:cNvSpPr txBox="1"/>
+          <p:nvPr/>
+        </p:nvSpPr>
+        <p:spPr>
+          <a:xfrm>
+            <a:off x="524409" y="5082214"/>
+            <a:ext cx="1471813" cy="369332"/>
+          </a:xfrm>
+          <a:prstGeom prst="rect">
+            <a:avLst/>
+          </a:prstGeom>
+          <a:noFill/>
+        </p:spPr>
+        <p:txBody>
+          <a:bodyPr wrap="none" rtlCol="0">
+            <a:spAutoFit/>
+          </a:bodyPr>
+          <a:lstStyle/>
+          <a:p>
+            <a:r>
+              <a:rPr lang="en-US" dirty="0">
+                <a:solidFill>
+                  <a:schemeClr val="bg1">
+                    <a:lumMod val="75000"/>
+                  </a:schemeClr>
+                </a:solidFill>
+                <a:latin typeface="American Typewriter" panose="02090604020004020304" pitchFamily="18" charset="77"/>
+              </a:rPr>
+              <a:t>    </a:t>
+            </a:r>
+            <a:r>
+              <a:rPr lang="en-US" dirty="0" err="1">
+                <a:solidFill>
+                  <a:schemeClr val="bg1">
+                    <a:lumMod val="75000"/>
+                  </a:schemeClr>
+                </a:solidFill>
+                <a:latin typeface="American Typewriter" panose="02090604020004020304" pitchFamily="18" charset="77"/>
+              </a:rPr>
+              <a:t>self._rays</a:t>
+            </a:r>
+            <a:endParaRPr lang="en-US" dirty="0">
+              <a:solidFill>
+                <a:schemeClr val="bg1">
+                  <a:lumMod val="75000"/>
+                </a:schemeClr>
+              </a:solidFill>
+            </a:endParaRPr>
+          </a:p>
+        </p:txBody>
+      </p:sp>
+      <p:sp>
+        <p:nvSpPr>
+          <p:cNvPr id="62" name="TextBox 61">
+            <a:extLst>
+              <a:ext uri="{FF2B5EF4-FFF2-40B4-BE49-F238E27FC236}">
+                <a16:creationId xmlns:a16="http://schemas.microsoft.com/office/drawing/2014/main" id="{F0C45318-9FEF-FD3F-9576-8B757B98D009}"/>
+              </a:ext>
+            </a:extLst>
+          </p:cNvPr>
+          <p:cNvSpPr txBox="1"/>
+          <p:nvPr/>
+        </p:nvSpPr>
+        <p:spPr>
+          <a:xfrm>
+            <a:off x="507518" y="5811239"/>
+            <a:ext cx="848309" cy="369332"/>
+          </a:xfrm>
+          <a:prstGeom prst="rect">
+            <a:avLst/>
+          </a:prstGeom>
+          <a:noFill/>
+        </p:spPr>
+        <p:txBody>
+          <a:bodyPr wrap="none" rtlCol="0">
+            <a:spAutoFit/>
+          </a:bodyPr>
+          <a:lstStyle/>
+          <a:p>
+            <a:r>
+              <a:rPr lang="en-US" dirty="0" err="1">
+                <a:solidFill>
+                  <a:schemeClr val="accent5">
+                    <a:lumMod val="75000"/>
+                  </a:schemeClr>
+                </a:solidFill>
+                <a:latin typeface="American Typewriter" panose="02090604020004020304" pitchFamily="18" charset="77"/>
+              </a:rPr>
+              <a:t>self.m</a:t>
+            </a:r>
+            <a:endParaRPr lang="en-US" dirty="0">
+              <a:solidFill>
+                <a:schemeClr val="accent5">
+                  <a:lumMod val="75000"/>
+                </a:schemeClr>
+              </a:solidFill>
+            </a:endParaRPr>
+          </a:p>
+        </p:txBody>
+      </p:sp>
+      <p:sp>
+        <p:nvSpPr>
+          <p:cNvPr id="63" name="TextBox 62">
+            <a:extLst>
+              <a:ext uri="{FF2B5EF4-FFF2-40B4-BE49-F238E27FC236}">
+                <a16:creationId xmlns:a16="http://schemas.microsoft.com/office/drawing/2014/main" id="{804E02F5-9EE2-8191-6A36-665187C1566B}"/>
+              </a:ext>
+            </a:extLst>
+          </p:cNvPr>
+          <p:cNvSpPr txBox="1"/>
+          <p:nvPr/>
+        </p:nvSpPr>
+        <p:spPr>
+          <a:xfrm>
+            <a:off x="507518" y="6170795"/>
+            <a:ext cx="776175" cy="369332"/>
+          </a:xfrm>
+          <a:prstGeom prst="rect">
+            <a:avLst/>
+          </a:prstGeom>
+          <a:noFill/>
+        </p:spPr>
+        <p:txBody>
+          <a:bodyPr wrap="none" rtlCol="0">
+            <a:spAutoFit/>
+          </a:bodyPr>
+          <a:lstStyle/>
+          <a:p>
+            <a:r>
+              <a:rPr lang="en-US" dirty="0" err="1">
+                <a:solidFill>
+                  <a:schemeClr val="accent5">
+                    <a:lumMod val="75000"/>
+                  </a:schemeClr>
+                </a:solidFill>
+                <a:latin typeface="American Typewriter" panose="02090604020004020304" pitchFamily="18" charset="77"/>
+              </a:rPr>
+              <a:t>self.k</a:t>
+            </a:r>
+            <a:endParaRPr lang="en-US" dirty="0">
+              <a:solidFill>
+                <a:schemeClr val="accent5">
+                  <a:lumMod val="75000"/>
+                </a:schemeClr>
+              </a:solidFill>
+            </a:endParaRPr>
+          </a:p>
+        </p:txBody>
+      </p:sp>
+      <p:sp>
+        <p:nvSpPr>
+          <p:cNvPr id="64" name="TextBox 63">
+            <a:extLst>
+              <a:ext uri="{FF2B5EF4-FFF2-40B4-BE49-F238E27FC236}">
+                <a16:creationId xmlns:a16="http://schemas.microsoft.com/office/drawing/2014/main" id="{56C5E1D9-4DFF-CDE3-EAD4-4457A229FFF0}"/>
+              </a:ext>
+            </a:extLst>
+          </p:cNvPr>
+          <p:cNvSpPr txBox="1"/>
+          <p:nvPr/>
+        </p:nvSpPr>
+        <p:spPr>
+          <a:xfrm>
+            <a:off x="8335122" y="3240374"/>
+            <a:ext cx="1058303" cy="369332"/>
+          </a:xfrm>
+          <a:prstGeom prst="rect">
+            <a:avLst/>
+          </a:prstGeom>
+          <a:noFill/>
+        </p:spPr>
+        <p:txBody>
+          <a:bodyPr wrap="none" rtlCol="0">
+            <a:spAutoFit/>
+          </a:bodyPr>
+          <a:lstStyle/>
+          <a:p>
+            <a:r>
+              <a:rPr lang="en-US" dirty="0" err="1">
+                <a:solidFill>
+                  <a:schemeClr val="accent5"/>
+                </a:solidFill>
+                <a:latin typeface="American Typewriter" panose="02090604020004020304" pitchFamily="18" charset="77"/>
+              </a:rPr>
+              <a:t>self.dim</a:t>
+            </a:r>
+            <a:endParaRPr lang="en-US" dirty="0">
+              <a:solidFill>
+                <a:schemeClr val="accent5"/>
+              </a:solidFill>
+            </a:endParaRPr>
+          </a:p>
+        </p:txBody>
+      </p:sp>
+      <p:sp>
+        <p:nvSpPr>
+          <p:cNvPr id="65" name="TextBox 64">
+            <a:extLst>
+              <a:ext uri="{FF2B5EF4-FFF2-40B4-BE49-F238E27FC236}">
+                <a16:creationId xmlns:a16="http://schemas.microsoft.com/office/drawing/2014/main" id="{6065393B-E563-19C2-BC97-ECC93F928548}"/>
+              </a:ext>
+            </a:extLst>
+          </p:cNvPr>
+          <p:cNvSpPr txBox="1"/>
+          <p:nvPr/>
+        </p:nvSpPr>
+        <p:spPr>
+          <a:xfrm>
+            <a:off x="8335122" y="3613354"/>
+            <a:ext cx="1747594" cy="369332"/>
+          </a:xfrm>
+          <a:prstGeom prst="rect">
+            <a:avLst/>
+          </a:prstGeom>
+          <a:noFill/>
+        </p:spPr>
+        <p:txBody>
+          <a:bodyPr wrap="none" rtlCol="0">
+            <a:spAutoFit/>
+          </a:bodyPr>
+          <a:lstStyle/>
+          <a:p>
+            <a:r>
+              <a:rPr lang="en-US" dirty="0" err="1">
+                <a:latin typeface="American Typewriter" panose="02090604020004020304" pitchFamily="18" charset="77"/>
+              </a:rPr>
+              <a:t>self.center</a:t>
+            </a:r>
+            <a:r>
+              <a:rPr lang="en-US" dirty="0">
+                <a:latin typeface="American Typewriter" panose="02090604020004020304" pitchFamily="18" charset="77"/>
+              </a:rPr>
+              <a:t>(…)</a:t>
+            </a:r>
+            <a:endParaRPr lang="en-US" dirty="0"/>
+          </a:p>
+        </p:txBody>
+      </p:sp>
+    </p:spTree>
+    <p:extLst>
+      <p:ext uri="{BB962C8B-B14F-4D97-AF65-F5344CB8AC3E}">
+        <p14:creationId xmlns:p14="http://schemas.microsoft.com/office/powerpoint/2010/main" val="2057737708"/>
       </p:ext>
     </p:extLst>
   </p:cSld>

</xml_diff>

<commit_message>
Added GlobalConfig to presentation, with all fields in there
</commit_message>
<xml_diff>
--- a/presentation.pptx
+++ b/presentation.pptx
@@ -23,6 +23,7 @@
     <p:sldId id="271" r:id="rId17"/>
     <p:sldId id="272" r:id="rId18"/>
     <p:sldId id="273" r:id="rId19"/>
+    <p:sldId id="274" r:id="rId20"/>
   </p:sldIdLst>
   <p:sldSz cx="12192000" cy="6858000"/>
   <p:notesSz cx="6858000" cy="9144000"/>
@@ -132,7 +133,7 @@
 <file path=ppt/revisionInfo.xml><?xml version="1.0" encoding="utf-8"?>
 <p1510:revInfo xmlns:a="http://schemas.openxmlformats.org/drawingml/2006/main" xmlns:r="http://schemas.openxmlformats.org/officeDocument/2006/relationships" xmlns:p1510="http://schemas.microsoft.com/office/powerpoint/2015/10/main">
   <p1510:revLst>
-    <p1510:client id="{92BFB444-7DBC-CA44-A6DD-A4B3F7DBDADB}" v="290" dt="2026-02-01T23:25:43.920"/>
+    <p1510:client id="{92BFB444-7DBC-CA44-A6DD-A4B3F7DBDADB}" v="332" dt="2026-02-04T17:33:10.334"/>
   </p1510:revLst>
 </p1510:revInfo>
 </file>
@@ -141,19 +142,19 @@
 <pc:chgInfo xmlns:a="http://schemas.openxmlformats.org/drawingml/2006/main" xmlns:r="http://schemas.openxmlformats.org/officeDocument/2006/relationships" xmlns:ac="http://schemas.microsoft.com/office/drawing/2013/main/command" xmlns:pc="http://schemas.microsoft.com/office/powerpoint/2013/main/command">
   <pc:docChgLst>
     <pc:chgData name="Bart Wolleswinkel" userId="b168cadc-1825-41ce-b9cc-7c7f06f6f31d" providerId="ADAL" clId="{22248CC1-9068-5BCB-B15B-4353FE48F57D}"/>
-    <pc:docChg chg="undo custSel addSld modSld sldOrd">
-      <pc:chgData name="Bart Wolleswinkel" userId="b168cadc-1825-41ce-b9cc-7c7f06f6f31d" providerId="ADAL" clId="{22248CC1-9068-5BCB-B15B-4353FE48F57D}" dt="2026-02-01T23:26:34.913" v="2459" actId="1076"/>
+    <pc:docChg chg="undo redo custSel addSld modSld sldOrd">
+      <pc:chgData name="Bart Wolleswinkel" userId="b168cadc-1825-41ce-b9cc-7c7f06f6f31d" providerId="ADAL" clId="{22248CC1-9068-5BCB-B15B-4353FE48F57D}" dt="2026-02-04T17:33:17.262" v="3736" actId="1076"/>
       <pc:docMkLst>
         <pc:docMk/>
       </pc:docMkLst>
       <pc:sldChg chg="modSp mod">
-        <pc:chgData name="Bart Wolleswinkel" userId="b168cadc-1825-41ce-b9cc-7c7f06f6f31d" providerId="ADAL" clId="{22248CC1-9068-5BCB-B15B-4353FE48F57D}" dt="2026-01-08T12:43:12.113" v="3" actId="5793"/>
+        <pc:chgData name="Bart Wolleswinkel" userId="b168cadc-1825-41ce-b9cc-7c7f06f6f31d" providerId="ADAL" clId="{22248CC1-9068-5BCB-B15B-4353FE48F57D}" dt="2026-02-04T16:47:04.300" v="2465" actId="20577"/>
         <pc:sldMkLst>
           <pc:docMk/>
           <pc:sldMk cId="2563034518" sldId="256"/>
         </pc:sldMkLst>
         <pc:spChg chg="mod">
-          <ac:chgData name="Bart Wolleswinkel" userId="b168cadc-1825-41ce-b9cc-7c7f06f6f31d" providerId="ADAL" clId="{22248CC1-9068-5BCB-B15B-4353FE48F57D}" dt="2026-01-08T12:43:12.113" v="3" actId="5793"/>
+          <ac:chgData name="Bart Wolleswinkel" userId="b168cadc-1825-41ce-b9cc-7c7f06f6f31d" providerId="ADAL" clId="{22248CC1-9068-5BCB-B15B-4353FE48F57D}" dt="2026-02-04T16:47:04.300" v="2465" actId="20577"/>
           <ac:spMkLst>
             <pc:docMk/>
             <pc:sldMk cId="2563034518" sldId="256"/>
@@ -1291,44 +1292,12 @@
             <ac:spMk id="4" creationId="{60FA50A4-57DF-57D3-200B-9E194D94B0F1}"/>
           </ac:spMkLst>
         </pc:spChg>
-        <pc:spChg chg="del">
-          <ac:chgData name="Bart Wolleswinkel" userId="b168cadc-1825-41ce-b9cc-7c7f06f6f31d" providerId="ADAL" clId="{22248CC1-9068-5BCB-B15B-4353FE48F57D}" dt="2026-02-01T22:24:01.440" v="1959" actId="478"/>
-          <ac:spMkLst>
-            <pc:docMk/>
-            <pc:sldMk cId="2057737708" sldId="273"/>
-            <ac:spMk id="5" creationId="{2B93FE91-E622-C2AB-2BB4-20CA54F86A54}"/>
-          </ac:spMkLst>
-        </pc:spChg>
-        <pc:spChg chg="del">
-          <ac:chgData name="Bart Wolleswinkel" userId="b168cadc-1825-41ce-b9cc-7c7f06f6f31d" providerId="ADAL" clId="{22248CC1-9068-5BCB-B15B-4353FE48F57D}" dt="2026-02-01T22:23:52.950" v="1957" actId="478"/>
-          <ac:spMkLst>
-            <pc:docMk/>
-            <pc:sldMk cId="2057737708" sldId="273"/>
-            <ac:spMk id="6" creationId="{1488EF85-0DAA-2295-669E-3DCEFA941250}"/>
-          </ac:spMkLst>
-        </pc:spChg>
-        <pc:spChg chg="add del">
-          <ac:chgData name="Bart Wolleswinkel" userId="b168cadc-1825-41ce-b9cc-7c7f06f6f31d" providerId="ADAL" clId="{22248CC1-9068-5BCB-B15B-4353FE48F57D}" dt="2026-02-01T23:10:03.361" v="1971" actId="478"/>
-          <ac:spMkLst>
-            <pc:docMk/>
-            <pc:sldMk cId="2057737708" sldId="273"/>
-            <ac:spMk id="8" creationId="{700DC9FD-72F8-15FB-2576-FA235494726B}"/>
-          </ac:spMkLst>
-        </pc:spChg>
         <pc:spChg chg="add mod">
           <ac:chgData name="Bart Wolleswinkel" userId="b168cadc-1825-41ce-b9cc-7c7f06f6f31d" providerId="ADAL" clId="{22248CC1-9068-5BCB-B15B-4353FE48F57D}" dt="2026-02-01T23:12:29.048" v="2060" actId="1076"/>
           <ac:spMkLst>
             <pc:docMk/>
             <pc:sldMk cId="2057737708" sldId="273"/>
             <ac:spMk id="9" creationId="{651BFFA2-7068-1DB5-D305-EB810E17CAA8}"/>
-          </ac:spMkLst>
-        </pc:spChg>
-        <pc:spChg chg="del">
-          <ac:chgData name="Bart Wolleswinkel" userId="b168cadc-1825-41ce-b9cc-7c7f06f6f31d" providerId="ADAL" clId="{22248CC1-9068-5BCB-B15B-4353FE48F57D}" dt="2026-02-01T22:24:01.440" v="1959" actId="478"/>
-          <ac:spMkLst>
-            <pc:docMk/>
-            <pc:sldMk cId="2057737708" sldId="273"/>
-            <ac:spMk id="11" creationId="{8A6F2E58-1EBB-A6D7-2339-FE3CC55E01CA}"/>
           </ac:spMkLst>
         </pc:spChg>
         <pc:spChg chg="add mod">
@@ -1347,14 +1316,6 @@
             <ac:spMk id="13" creationId="{5B452667-6DEF-21B4-B642-5FF79F4EF6F0}"/>
           </ac:spMkLst>
         </pc:spChg>
-        <pc:spChg chg="add del mod">
-          <ac:chgData name="Bart Wolleswinkel" userId="b168cadc-1825-41ce-b9cc-7c7f06f6f31d" providerId="ADAL" clId="{22248CC1-9068-5BCB-B15B-4353FE48F57D}" dt="2026-02-01T23:12:47.980" v="2071" actId="478"/>
-          <ac:spMkLst>
-            <pc:docMk/>
-            <pc:sldMk cId="2057737708" sldId="273"/>
-            <ac:spMk id="14" creationId="{8C3941E3-39D2-08B5-C2D9-A9B14FBFD8A3}"/>
-          </ac:spMkLst>
-        </pc:spChg>
         <pc:spChg chg="add mod">
           <ac:chgData name="Bart Wolleswinkel" userId="b168cadc-1825-41ce-b9cc-7c7f06f6f31d" providerId="ADAL" clId="{22248CC1-9068-5BCB-B15B-4353FE48F57D}" dt="2026-02-01T23:12:29.048" v="2060" actId="1076"/>
           <ac:spMkLst>
@@ -1379,30 +1340,6 @@
             <ac:spMk id="17" creationId="{85AD6974-E7D6-77B6-1641-9771406C97A6}"/>
           </ac:spMkLst>
         </pc:spChg>
-        <pc:spChg chg="del">
-          <ac:chgData name="Bart Wolleswinkel" userId="b168cadc-1825-41ce-b9cc-7c7f06f6f31d" providerId="ADAL" clId="{22248CC1-9068-5BCB-B15B-4353FE48F57D}" dt="2026-02-01T22:24:01.440" v="1959" actId="478"/>
-          <ac:spMkLst>
-            <pc:docMk/>
-            <pc:sldMk cId="2057737708" sldId="273"/>
-            <ac:spMk id="18" creationId="{E471D13E-9272-E043-57DA-97BE0FD38FA8}"/>
-          </ac:spMkLst>
-        </pc:spChg>
-        <pc:spChg chg="del">
-          <ac:chgData name="Bart Wolleswinkel" userId="b168cadc-1825-41ce-b9cc-7c7f06f6f31d" providerId="ADAL" clId="{22248CC1-9068-5BCB-B15B-4353FE48F57D}" dt="2026-02-01T22:23:52.950" v="1957" actId="478"/>
-          <ac:spMkLst>
-            <pc:docMk/>
-            <pc:sldMk cId="2057737708" sldId="273"/>
-            <ac:spMk id="19" creationId="{9C848AF1-137A-8B24-8402-B3A7927D5F05}"/>
-          </ac:spMkLst>
-        </pc:spChg>
-        <pc:spChg chg="add del mod">
-          <ac:chgData name="Bart Wolleswinkel" userId="b168cadc-1825-41ce-b9cc-7c7f06f6f31d" providerId="ADAL" clId="{22248CC1-9068-5BCB-B15B-4353FE48F57D}" dt="2026-02-01T23:12:45.724" v="2070" actId="478"/>
-          <ac:spMkLst>
-            <pc:docMk/>
-            <pc:sldMk cId="2057737708" sldId="273"/>
-            <ac:spMk id="20" creationId="{3519ABCE-EC3C-C937-1ECE-0384D192CF96}"/>
-          </ac:spMkLst>
-        </pc:spChg>
         <pc:spChg chg="mod">
           <ac:chgData name="Bart Wolleswinkel" userId="b168cadc-1825-41ce-b9cc-7c7f06f6f31d" providerId="ADAL" clId="{22248CC1-9068-5BCB-B15B-4353FE48F57D}" dt="2026-02-01T23:24:11.451" v="2406" actId="1076"/>
           <ac:spMkLst>
@@ -1436,14 +1373,6 @@
           </ac:spMkLst>
         </pc:spChg>
         <pc:spChg chg="add mod">
-          <ac:chgData name="Bart Wolleswinkel" userId="b168cadc-1825-41ce-b9cc-7c7f06f6f31d" providerId="ADAL" clId="{22248CC1-9068-5BCB-B15B-4353FE48F57D}" dt="2026-02-01T23:13:31.570" v="2106"/>
-          <ac:spMkLst>
-            <pc:docMk/>
-            <pc:sldMk cId="2057737708" sldId="273"/>
-            <ac:spMk id="25" creationId="{E4AE7038-EF4E-D9C8-222F-E1DC1798461D}"/>
-          </ac:spMkLst>
-        </pc:spChg>
-        <pc:spChg chg="add mod">
           <ac:chgData name="Bart Wolleswinkel" userId="b168cadc-1825-41ce-b9cc-7c7f06f6f31d" providerId="ADAL" clId="{22248CC1-9068-5BCB-B15B-4353FE48F57D}" dt="2026-02-01T23:16:57.729" v="2198" actId="1076"/>
           <ac:spMkLst>
             <pc:docMk/>
@@ -1531,68 +1460,12 @@
             <ac:spMk id="36" creationId="{7949B69B-5975-EC35-DDEB-FAEBC7D2DF36}"/>
           </ac:spMkLst>
         </pc:spChg>
-        <pc:spChg chg="add del mod">
-          <ac:chgData name="Bart Wolleswinkel" userId="b168cadc-1825-41ce-b9cc-7c7f06f6f31d" providerId="ADAL" clId="{22248CC1-9068-5BCB-B15B-4353FE48F57D}" dt="2026-02-01T23:17:36.296" v="2238" actId="478"/>
+        <pc:spChg chg="add mod">
+          <ac:chgData name="Bart Wolleswinkel" userId="b168cadc-1825-41ce-b9cc-7c7f06f6f31d" providerId="ADAL" clId="{22248CC1-9068-5BCB-B15B-4353FE48F57D}" dt="2026-02-01T23:20:56.534" v="2360" actId="1076"/>
           <ac:spMkLst>
             <pc:docMk/>
             <pc:sldMk cId="2057737708" sldId="273"/>
-            <ac:spMk id="37" creationId="{ED8A1E53-977D-1818-2FB1-760A507C4BF8}"/>
-          </ac:spMkLst>
-        </pc:spChg>
-        <pc:spChg chg="del">
-          <ac:chgData name="Bart Wolleswinkel" userId="b168cadc-1825-41ce-b9cc-7c7f06f6f31d" providerId="ADAL" clId="{22248CC1-9068-5BCB-B15B-4353FE48F57D}" dt="2026-02-01T22:23:48.691" v="1956" actId="478"/>
-          <ac:spMkLst>
-            <pc:docMk/>
-            <pc:sldMk cId="2057737708" sldId="273"/>
-            <ac:spMk id="38" creationId="{80DF09E0-741A-7746-17B3-1F35A28EC922}"/>
-          </ac:spMkLst>
-        </pc:spChg>
-        <pc:spChg chg="add del mod">
-          <ac:chgData name="Bart Wolleswinkel" userId="b168cadc-1825-41ce-b9cc-7c7f06f6f31d" providerId="ADAL" clId="{22248CC1-9068-5BCB-B15B-4353FE48F57D}" dt="2026-02-01T23:17:36.296" v="2238" actId="478"/>
-          <ac:spMkLst>
-            <pc:docMk/>
-            <pc:sldMk cId="2057737708" sldId="273"/>
-            <ac:spMk id="39" creationId="{1D31A15B-48C2-A7C3-13B4-4B24F725C77D}"/>
-          </ac:spMkLst>
-        </pc:spChg>
-        <pc:spChg chg="add del mod">
-          <ac:chgData name="Bart Wolleswinkel" userId="b168cadc-1825-41ce-b9cc-7c7f06f6f31d" providerId="ADAL" clId="{22248CC1-9068-5BCB-B15B-4353FE48F57D}" dt="2026-02-01T23:17:36.296" v="2238" actId="478"/>
-          <ac:spMkLst>
-            <pc:docMk/>
-            <pc:sldMk cId="2057737708" sldId="273"/>
-            <ac:spMk id="40" creationId="{DBEC63F8-4C64-A828-AE9A-24386DA59CC5}"/>
-          </ac:spMkLst>
-        </pc:spChg>
-        <pc:spChg chg="add del mod">
-          <ac:chgData name="Bart Wolleswinkel" userId="b168cadc-1825-41ce-b9cc-7c7f06f6f31d" providerId="ADAL" clId="{22248CC1-9068-5BCB-B15B-4353FE48F57D}" dt="2026-02-01T23:17:36.296" v="2238" actId="478"/>
-          <ac:spMkLst>
-            <pc:docMk/>
-            <pc:sldMk cId="2057737708" sldId="273"/>
-            <ac:spMk id="41" creationId="{B367C0C4-0847-6024-7976-DBFC3A8EF5B1}"/>
-          </ac:spMkLst>
-        </pc:spChg>
-        <pc:spChg chg="del">
-          <ac:chgData name="Bart Wolleswinkel" userId="b168cadc-1825-41ce-b9cc-7c7f06f6f31d" providerId="ADAL" clId="{22248CC1-9068-5BCB-B15B-4353FE48F57D}" dt="2026-02-01T22:23:58.266" v="1958" actId="478"/>
-          <ac:spMkLst>
-            <pc:docMk/>
-            <pc:sldMk cId="2057737708" sldId="273"/>
-            <ac:spMk id="42" creationId="{A22993F7-11E1-4B67-28A6-B846FCD13705}"/>
-          </ac:spMkLst>
-        </pc:spChg>
-        <pc:spChg chg="del">
-          <ac:chgData name="Bart Wolleswinkel" userId="b168cadc-1825-41ce-b9cc-7c7f06f6f31d" providerId="ADAL" clId="{22248CC1-9068-5BCB-B15B-4353FE48F57D}" dt="2026-02-01T22:23:58.266" v="1958" actId="478"/>
-          <ac:spMkLst>
-            <pc:docMk/>
-            <pc:sldMk cId="2057737708" sldId="273"/>
-            <ac:spMk id="43" creationId="{0C676A3C-2E85-71C2-B883-640B79C6C5E1}"/>
-          </ac:spMkLst>
-        </pc:spChg>
-        <pc:spChg chg="add del mod">
-          <ac:chgData name="Bart Wolleswinkel" userId="b168cadc-1825-41ce-b9cc-7c7f06f6f31d" providerId="ADAL" clId="{22248CC1-9068-5BCB-B15B-4353FE48F57D}" dt="2026-02-01T23:17:36.296" v="2238" actId="478"/>
-          <ac:spMkLst>
-            <pc:docMk/>
-            <pc:sldMk cId="2057737708" sldId="273"/>
-            <ac:spMk id="44" creationId="{014E3219-746A-C2FB-1E97-11490A33B408}"/>
+            <ac:spMk id="45" creationId="{51507276-70CA-9BFA-5061-5505788F329A}"/>
           </ac:spMkLst>
         </pc:spChg>
         <pc:spChg chg="add mod">
@@ -1600,39 +1473,7 @@
           <ac:spMkLst>
             <pc:docMk/>
             <pc:sldMk cId="2057737708" sldId="273"/>
-            <ac:spMk id="45" creationId="{51507276-70CA-9BFA-5061-5505788F329A}"/>
-          </ac:spMkLst>
-        </pc:spChg>
-        <pc:spChg chg="del">
-          <ac:chgData name="Bart Wolleswinkel" userId="b168cadc-1825-41ce-b9cc-7c7f06f6f31d" providerId="ADAL" clId="{22248CC1-9068-5BCB-B15B-4353FE48F57D}" dt="2026-02-01T22:23:52.950" v="1957" actId="478"/>
-          <ac:spMkLst>
-            <pc:docMk/>
-            <pc:sldMk cId="2057737708" sldId="273"/>
-            <ac:spMk id="46" creationId="{4B6BEFFE-4335-8DEB-9668-BC69581CDA66}"/>
-          </ac:spMkLst>
-        </pc:spChg>
-        <pc:spChg chg="del">
-          <ac:chgData name="Bart Wolleswinkel" userId="b168cadc-1825-41ce-b9cc-7c7f06f6f31d" providerId="ADAL" clId="{22248CC1-9068-5BCB-B15B-4353FE48F57D}" dt="2026-02-01T23:11:04.482" v="2007" actId="478"/>
-          <ac:spMkLst>
-            <pc:docMk/>
-            <pc:sldMk cId="2057737708" sldId="273"/>
-            <ac:spMk id="47" creationId="{C8B24335-7177-3C13-B26B-C97BC16718EA}"/>
-          </ac:spMkLst>
-        </pc:spChg>
-        <pc:spChg chg="add mod">
-          <ac:chgData name="Bart Wolleswinkel" userId="b168cadc-1825-41ce-b9cc-7c7f06f6f31d" providerId="ADAL" clId="{22248CC1-9068-5BCB-B15B-4353FE48F57D}" dt="2026-02-01T23:20:56.534" v="2360" actId="1076"/>
-          <ac:spMkLst>
-            <pc:docMk/>
-            <pc:sldMk cId="2057737708" sldId="273"/>
             <ac:spMk id="48" creationId="{67FB07D6-16EE-14AD-4483-30EF2FE0B8ED}"/>
-          </ac:spMkLst>
-        </pc:spChg>
-        <pc:spChg chg="add mod">
-          <ac:chgData name="Bart Wolleswinkel" userId="b168cadc-1825-41ce-b9cc-7c7f06f6f31d" providerId="ADAL" clId="{22248CC1-9068-5BCB-B15B-4353FE48F57D}" dt="2026-02-01T23:18:12.450" v="2271"/>
-          <ac:spMkLst>
-            <pc:docMk/>
-            <pc:sldMk cId="2057737708" sldId="273"/>
-            <ac:spMk id="49" creationId="{D0BFE949-EF07-400B-C1C7-70AE41031449}"/>
           </ac:spMkLst>
         </pc:spChg>
         <pc:spChg chg="add mod">
@@ -1651,14 +1492,6 @@
             <ac:spMk id="51" creationId="{EA21E40C-9D6A-BA51-FDA1-BA1D20D05BB6}"/>
           </ac:spMkLst>
         </pc:spChg>
-        <pc:spChg chg="add del mod">
-          <ac:chgData name="Bart Wolleswinkel" userId="b168cadc-1825-41ce-b9cc-7c7f06f6f31d" providerId="ADAL" clId="{22248CC1-9068-5BCB-B15B-4353FE48F57D}" dt="2026-02-01T23:26:28.324" v="2458" actId="478"/>
-          <ac:spMkLst>
-            <pc:docMk/>
-            <pc:sldMk cId="2057737708" sldId="273"/>
-            <ac:spMk id="52" creationId="{113A40E4-498D-51E4-C9F4-CE34EFBECAF4}"/>
-          </ac:spMkLst>
-        </pc:spChg>
         <pc:spChg chg="add mod">
           <ac:chgData name="Bart Wolleswinkel" userId="b168cadc-1825-41ce-b9cc-7c7f06f6f31d" providerId="ADAL" clId="{22248CC1-9068-5BCB-B15B-4353FE48F57D}" dt="2026-02-01T23:20:41.030" v="2332" actId="2711"/>
           <ac:spMkLst>
@@ -1763,14 +1596,301 @@
             <ac:spMk id="65" creationId="{6065393B-E563-19C2-BC97-ECC93F928548}"/>
           </ac:spMkLst>
         </pc:spChg>
-        <pc:cxnChg chg="del mod">
-          <ac:chgData name="Bart Wolleswinkel" userId="b168cadc-1825-41ce-b9cc-7c7f06f6f31d" providerId="ADAL" clId="{22248CC1-9068-5BCB-B15B-4353FE48F57D}" dt="2026-02-01T22:23:58.266" v="1958" actId="478"/>
-          <ac:cxnSpMkLst>
-            <pc:docMk/>
-            <pc:sldMk cId="2057737708" sldId="273"/>
-            <ac:cxnSpMk id="10" creationId="{12884B9A-3FCC-2625-6CA8-6789EBFA6795}"/>
-          </ac:cxnSpMkLst>
-        </pc:cxnChg>
+      </pc:sldChg>
+      <pc:sldChg chg="addSp delSp modSp add mod">
+        <pc:chgData name="Bart Wolleswinkel" userId="b168cadc-1825-41ce-b9cc-7c7f06f6f31d" providerId="ADAL" clId="{22248CC1-9068-5BCB-B15B-4353FE48F57D}" dt="2026-02-04T17:33:17.262" v="3736" actId="1076"/>
+        <pc:sldMkLst>
+          <pc:docMk/>
+          <pc:sldMk cId="3278522806" sldId="274"/>
+        </pc:sldMkLst>
+        <pc:spChg chg="del">
+          <ac:chgData name="Bart Wolleswinkel" userId="b168cadc-1825-41ce-b9cc-7c7f06f6f31d" providerId="ADAL" clId="{22248CC1-9068-5BCB-B15B-4353FE48F57D}" dt="2026-02-04T16:47:28.537" v="2479" actId="478"/>
+          <ac:spMkLst>
+            <pc:docMk/>
+            <pc:sldMk cId="3278522806" sldId="274"/>
+            <ac:spMk id="2" creationId="{4622DBC6-AD5C-ED33-A032-CD3F5693EA34}"/>
+          </ac:spMkLst>
+        </pc:spChg>
+        <pc:spChg chg="del">
+          <ac:chgData name="Bart Wolleswinkel" userId="b168cadc-1825-41ce-b9cc-7c7f06f6f31d" providerId="ADAL" clId="{22248CC1-9068-5BCB-B15B-4353FE48F57D}" dt="2026-02-04T16:47:28.537" v="2479" actId="478"/>
+          <ac:spMkLst>
+            <pc:docMk/>
+            <pc:sldMk cId="3278522806" sldId="274"/>
+            <ac:spMk id="3" creationId="{3CFEA692-3A03-5A71-C50C-D6F86B340F4C}"/>
+          </ac:spMkLst>
+        </pc:spChg>
+        <pc:spChg chg="mod">
+          <ac:chgData name="Bart Wolleswinkel" userId="b168cadc-1825-41ce-b9cc-7c7f06f6f31d" providerId="ADAL" clId="{22248CC1-9068-5BCB-B15B-4353FE48F57D}" dt="2026-02-04T17:26:13.108" v="3490" actId="1076"/>
+          <ac:spMkLst>
+            <pc:docMk/>
+            <pc:sldMk cId="3278522806" sldId="274"/>
+            <ac:spMk id="4" creationId="{C01EE82E-05F0-947E-0DEC-B51FF85AC69D}"/>
+          </ac:spMkLst>
+        </pc:spChg>
+        <pc:spChg chg="del">
+          <ac:chgData name="Bart Wolleswinkel" userId="b168cadc-1825-41ce-b9cc-7c7f06f6f31d" providerId="ADAL" clId="{22248CC1-9068-5BCB-B15B-4353FE48F57D}" dt="2026-02-04T16:47:28.537" v="2479" actId="478"/>
+          <ac:spMkLst>
+            <pc:docMk/>
+            <pc:sldMk cId="3278522806" sldId="274"/>
+            <ac:spMk id="5" creationId="{424C4847-6B7D-57C0-D6F1-9B2374C13C5D}"/>
+          </ac:spMkLst>
+        </pc:spChg>
+        <pc:spChg chg="del">
+          <ac:chgData name="Bart Wolleswinkel" userId="b168cadc-1825-41ce-b9cc-7c7f06f6f31d" providerId="ADAL" clId="{22248CC1-9068-5BCB-B15B-4353FE48F57D}" dt="2026-02-04T16:47:28.537" v="2479" actId="478"/>
+          <ac:spMkLst>
+            <pc:docMk/>
+            <pc:sldMk cId="3278522806" sldId="274"/>
+            <ac:spMk id="6" creationId="{FA283498-44F1-9D9C-3018-C0739B720444}"/>
+          </ac:spMkLst>
+        </pc:spChg>
+        <pc:spChg chg="add del mod">
+          <ac:chgData name="Bart Wolleswinkel" userId="b168cadc-1825-41ce-b9cc-7c7f06f6f31d" providerId="ADAL" clId="{22248CC1-9068-5BCB-B15B-4353FE48F57D}" dt="2026-02-04T16:47:49.578" v="2488" actId="478"/>
+          <ac:spMkLst>
+            <pc:docMk/>
+            <pc:sldMk cId="3278522806" sldId="274"/>
+            <ac:spMk id="7" creationId="{1CC699E0-B686-F46C-1DCA-E4FD71289463}"/>
+          </ac:spMkLst>
+        </pc:spChg>
+        <pc:spChg chg="add mod">
+          <ac:chgData name="Bart Wolleswinkel" userId="b168cadc-1825-41ce-b9cc-7c7f06f6f31d" providerId="ADAL" clId="{22248CC1-9068-5BCB-B15B-4353FE48F57D}" dt="2026-02-04T17:22:34.835" v="3452" actId="1076"/>
+          <ac:spMkLst>
+            <pc:docMk/>
+            <pc:sldMk cId="3278522806" sldId="274"/>
+            <ac:spMk id="8" creationId="{DE527D8C-4024-56CB-2B42-CD63436A80A9}"/>
+          </ac:spMkLst>
+        </pc:spChg>
+        <pc:spChg chg="add mod">
+          <ac:chgData name="Bart Wolleswinkel" userId="b168cadc-1825-41ce-b9cc-7c7f06f6f31d" providerId="ADAL" clId="{22248CC1-9068-5BCB-B15B-4353FE48F57D}" dt="2026-02-04T17:22:30.817" v="3451" actId="1076"/>
+          <ac:spMkLst>
+            <pc:docMk/>
+            <pc:sldMk cId="3278522806" sldId="274"/>
+            <ac:spMk id="9" creationId="{C92FB934-DBA7-3F04-0C4A-3C644A1EB631}"/>
+          </ac:spMkLst>
+        </pc:spChg>
+        <pc:spChg chg="del">
+          <ac:chgData name="Bart Wolleswinkel" userId="b168cadc-1825-41ce-b9cc-7c7f06f6f31d" providerId="ADAL" clId="{22248CC1-9068-5BCB-B15B-4353FE48F57D}" dt="2026-02-04T16:47:28.537" v="2479" actId="478"/>
+          <ac:spMkLst>
+            <pc:docMk/>
+            <pc:sldMk cId="3278522806" sldId="274"/>
+            <ac:spMk id="11" creationId="{8502048F-CA36-B609-4E87-DE223C18A47B}"/>
+          </ac:spMkLst>
+        </pc:spChg>
+        <pc:spChg chg="add mod">
+          <ac:chgData name="Bart Wolleswinkel" userId="b168cadc-1825-41ce-b9cc-7c7f06f6f31d" providerId="ADAL" clId="{22248CC1-9068-5BCB-B15B-4353FE48F57D}" dt="2026-02-04T17:22:43.141" v="3453" actId="1076"/>
+          <ac:spMkLst>
+            <pc:docMk/>
+            <pc:sldMk cId="3278522806" sldId="274"/>
+            <ac:spMk id="12" creationId="{B02E82DA-2646-BCC6-FEFE-CE26741B7231}"/>
+          </ac:spMkLst>
+        </pc:spChg>
+        <pc:spChg chg="add mod">
+          <ac:chgData name="Bart Wolleswinkel" userId="b168cadc-1825-41ce-b9cc-7c7f06f6f31d" providerId="ADAL" clId="{22248CC1-9068-5BCB-B15B-4353FE48F57D}" dt="2026-02-04T17:22:49.340" v="3454" actId="1076"/>
+          <ac:spMkLst>
+            <pc:docMk/>
+            <pc:sldMk cId="3278522806" sldId="274"/>
+            <ac:spMk id="13" creationId="{83529C37-ACC4-E6F2-3252-7F372CAE9D81}"/>
+          </ac:spMkLst>
+        </pc:spChg>
+        <pc:spChg chg="add mod">
+          <ac:chgData name="Bart Wolleswinkel" userId="b168cadc-1825-41ce-b9cc-7c7f06f6f31d" providerId="ADAL" clId="{22248CC1-9068-5BCB-B15B-4353FE48F57D}" dt="2026-02-04T17:23:04.829" v="3455" actId="1076"/>
+          <ac:spMkLst>
+            <pc:docMk/>
+            <pc:sldMk cId="3278522806" sldId="274"/>
+            <ac:spMk id="14" creationId="{A1B09A6A-6081-30D4-9E71-AE98464C8E3D}"/>
+          </ac:spMkLst>
+        </pc:spChg>
+        <pc:spChg chg="add mod">
+          <ac:chgData name="Bart Wolleswinkel" userId="b168cadc-1825-41ce-b9cc-7c7f06f6f31d" providerId="ADAL" clId="{22248CC1-9068-5BCB-B15B-4353FE48F57D}" dt="2026-02-04T17:26:07.470" v="3489" actId="1076"/>
+          <ac:spMkLst>
+            <pc:docMk/>
+            <pc:sldMk cId="3278522806" sldId="274"/>
+            <ac:spMk id="15" creationId="{80C2315B-00F0-6C34-E575-7343B9406373}"/>
+          </ac:spMkLst>
+        </pc:spChg>
+        <pc:spChg chg="add del mod">
+          <ac:chgData name="Bart Wolleswinkel" userId="b168cadc-1825-41ce-b9cc-7c7f06f6f31d" providerId="ADAL" clId="{22248CC1-9068-5BCB-B15B-4353FE48F57D}" dt="2026-02-04T16:51:01.772" v="2712" actId="478"/>
+          <ac:spMkLst>
+            <pc:docMk/>
+            <pc:sldMk cId="3278522806" sldId="274"/>
+            <ac:spMk id="16" creationId="{53E59DDA-00EA-AB06-7A97-484302B9630E}"/>
+          </ac:spMkLst>
+        </pc:spChg>
+        <pc:spChg chg="add mod">
+          <ac:chgData name="Bart Wolleswinkel" userId="b168cadc-1825-41ce-b9cc-7c7f06f6f31d" providerId="ADAL" clId="{22248CC1-9068-5BCB-B15B-4353FE48F57D}" dt="2026-02-04T17:26:07.470" v="3489" actId="1076"/>
+          <ac:spMkLst>
+            <pc:docMk/>
+            <pc:sldMk cId="3278522806" sldId="274"/>
+            <ac:spMk id="17" creationId="{F817190F-B5E6-FA1C-E070-C456FA4C90F7}"/>
+          </ac:spMkLst>
+        </pc:spChg>
+        <pc:spChg chg="add mod">
+          <ac:chgData name="Bart Wolleswinkel" userId="b168cadc-1825-41ce-b9cc-7c7f06f6f31d" providerId="ADAL" clId="{22248CC1-9068-5BCB-B15B-4353FE48F57D}" dt="2026-02-04T17:26:07.470" v="3489" actId="1076"/>
+          <ac:spMkLst>
+            <pc:docMk/>
+            <pc:sldMk cId="3278522806" sldId="274"/>
+            <ac:spMk id="20" creationId="{FAFC5392-7C69-D7B8-40A1-A60EFA5EAB96}"/>
+          </ac:spMkLst>
+        </pc:spChg>
+        <pc:spChg chg="del">
+          <ac:chgData name="Bart Wolleswinkel" userId="b168cadc-1825-41ce-b9cc-7c7f06f6f31d" providerId="ADAL" clId="{22248CC1-9068-5BCB-B15B-4353FE48F57D}" dt="2026-02-04T16:47:28.537" v="2479" actId="478"/>
+          <ac:spMkLst>
+            <pc:docMk/>
+            <pc:sldMk cId="3278522806" sldId="274"/>
+            <ac:spMk id="21" creationId="{FEA330D6-2ACA-1826-BBFB-470C7EAC9615}"/>
+          </ac:spMkLst>
+        </pc:spChg>
+        <pc:spChg chg="add mod">
+          <ac:chgData name="Bart Wolleswinkel" userId="b168cadc-1825-41ce-b9cc-7c7f06f6f31d" providerId="ADAL" clId="{22248CC1-9068-5BCB-B15B-4353FE48F57D}" dt="2026-02-04T17:30:52.765" v="3692" actId="1076"/>
+          <ac:spMkLst>
+            <pc:docMk/>
+            <pc:sldMk cId="3278522806" sldId="274"/>
+            <ac:spMk id="22" creationId="{0C7C47C8-D207-82BB-E6A7-323E7B9BB59E}"/>
+          </ac:spMkLst>
+        </pc:spChg>
+        <pc:spChg chg="add mod">
+          <ac:chgData name="Bart Wolleswinkel" userId="b168cadc-1825-41ce-b9cc-7c7f06f6f31d" providerId="ADAL" clId="{22248CC1-9068-5BCB-B15B-4353FE48F57D}" dt="2026-02-04T17:24:08.037" v="3469" actId="1076"/>
+          <ac:spMkLst>
+            <pc:docMk/>
+            <pc:sldMk cId="3278522806" sldId="274"/>
+            <ac:spMk id="23" creationId="{9AEDEFD0-4C42-1823-90CC-3AB9F9FB4947}"/>
+          </ac:spMkLst>
+        </pc:spChg>
+        <pc:spChg chg="add mod">
+          <ac:chgData name="Bart Wolleswinkel" userId="b168cadc-1825-41ce-b9cc-7c7f06f6f31d" providerId="ADAL" clId="{22248CC1-9068-5BCB-B15B-4353FE48F57D}" dt="2026-02-04T17:24:31.565" v="3473" actId="1076"/>
+          <ac:spMkLst>
+            <pc:docMk/>
+            <pc:sldMk cId="3278522806" sldId="274"/>
+            <ac:spMk id="24" creationId="{DAF68DE4-34AB-AB4A-277B-7CCB4A8B9360}"/>
+          </ac:spMkLst>
+        </pc:spChg>
+        <pc:spChg chg="add mod">
+          <ac:chgData name="Bart Wolleswinkel" userId="b168cadc-1825-41ce-b9cc-7c7f06f6f31d" providerId="ADAL" clId="{22248CC1-9068-5BCB-B15B-4353FE48F57D}" dt="2026-02-04T17:26:07.470" v="3489" actId="1076"/>
+          <ac:spMkLst>
+            <pc:docMk/>
+            <pc:sldMk cId="3278522806" sldId="274"/>
+            <ac:spMk id="25" creationId="{F02CB472-9F2B-AD55-A9D9-5F0D09B37A7D}"/>
+          </ac:spMkLst>
+        </pc:spChg>
+        <pc:spChg chg="add del mod">
+          <ac:chgData name="Bart Wolleswinkel" userId="b168cadc-1825-41ce-b9cc-7c7f06f6f31d" providerId="ADAL" clId="{22248CC1-9068-5BCB-B15B-4353FE48F57D}" dt="2026-02-04T17:10:03.414" v="3118" actId="478"/>
+          <ac:spMkLst>
+            <pc:docMk/>
+            <pc:sldMk cId="3278522806" sldId="274"/>
+            <ac:spMk id="26" creationId="{C416DA47-8B8B-C497-4A63-BF07CE4E0139}"/>
+          </ac:spMkLst>
+        </pc:spChg>
+        <pc:spChg chg="add del mod">
+          <ac:chgData name="Bart Wolleswinkel" userId="b168cadc-1825-41ce-b9cc-7c7f06f6f31d" providerId="ADAL" clId="{22248CC1-9068-5BCB-B15B-4353FE48F57D}" dt="2026-02-04T17:16:52.635" v="3335" actId="478"/>
+          <ac:spMkLst>
+            <pc:docMk/>
+            <pc:sldMk cId="3278522806" sldId="274"/>
+            <ac:spMk id="27" creationId="{C326ED92-0C0D-86AA-A388-9435E53E7E26}"/>
+          </ac:spMkLst>
+        </pc:spChg>
+        <pc:spChg chg="add mod">
+          <ac:chgData name="Bart Wolleswinkel" userId="b168cadc-1825-41ce-b9cc-7c7f06f6f31d" providerId="ADAL" clId="{22248CC1-9068-5BCB-B15B-4353FE48F57D}" dt="2026-02-04T17:24:40.868" v="3474" actId="1076"/>
+          <ac:spMkLst>
+            <pc:docMk/>
+            <pc:sldMk cId="3278522806" sldId="274"/>
+            <ac:spMk id="28" creationId="{BC651C4B-A90F-5314-DAF0-35F17A571722}"/>
+          </ac:spMkLst>
+        </pc:spChg>
+        <pc:spChg chg="add mod">
+          <ac:chgData name="Bart Wolleswinkel" userId="b168cadc-1825-41ce-b9cc-7c7f06f6f31d" providerId="ADAL" clId="{22248CC1-9068-5BCB-B15B-4353FE48F57D}" dt="2026-02-04T17:26:07.470" v="3489" actId="1076"/>
+          <ac:spMkLst>
+            <pc:docMk/>
+            <pc:sldMk cId="3278522806" sldId="274"/>
+            <ac:spMk id="29" creationId="{9BD0E8DC-7D2F-AB12-F208-F31987EAC1C5}"/>
+          </ac:spMkLst>
+        </pc:spChg>
+        <pc:spChg chg="add mod">
+          <ac:chgData name="Bart Wolleswinkel" userId="b168cadc-1825-41ce-b9cc-7c7f06f6f31d" providerId="ADAL" clId="{22248CC1-9068-5BCB-B15B-4353FE48F57D}" dt="2026-02-04T17:24:46.200" v="3475" actId="1076"/>
+          <ac:spMkLst>
+            <pc:docMk/>
+            <pc:sldMk cId="3278522806" sldId="274"/>
+            <ac:spMk id="30" creationId="{4D0EA09C-E58D-AA61-D359-11A5EB77EC1A}"/>
+          </ac:spMkLst>
+        </pc:spChg>
+        <pc:spChg chg="add mod">
+          <ac:chgData name="Bart Wolleswinkel" userId="b168cadc-1825-41ce-b9cc-7c7f06f6f31d" providerId="ADAL" clId="{22248CC1-9068-5BCB-B15B-4353FE48F57D}" dt="2026-02-04T17:24:53.765" v="3477" actId="1076"/>
+          <ac:spMkLst>
+            <pc:docMk/>
+            <pc:sldMk cId="3278522806" sldId="274"/>
+            <ac:spMk id="31" creationId="{8E3EBEBA-D950-E882-6E26-F8A861CE1312}"/>
+          </ac:spMkLst>
+        </pc:spChg>
+        <pc:spChg chg="add mod">
+          <ac:chgData name="Bart Wolleswinkel" userId="b168cadc-1825-41ce-b9cc-7c7f06f6f31d" providerId="ADAL" clId="{22248CC1-9068-5BCB-B15B-4353FE48F57D}" dt="2026-02-04T17:25:01.260" v="3479" actId="1076"/>
+          <ac:spMkLst>
+            <pc:docMk/>
+            <pc:sldMk cId="3278522806" sldId="274"/>
+            <ac:spMk id="32" creationId="{FF6604B1-1DF5-8023-64CF-0C5CEB6F6E8E}"/>
+          </ac:spMkLst>
+        </pc:spChg>
+        <pc:spChg chg="add mod">
+          <ac:chgData name="Bart Wolleswinkel" userId="b168cadc-1825-41ce-b9cc-7c7f06f6f31d" providerId="ADAL" clId="{22248CC1-9068-5BCB-B15B-4353FE48F57D}" dt="2026-02-04T17:30:03.627" v="3646"/>
+          <ac:spMkLst>
+            <pc:docMk/>
+            <pc:sldMk cId="3278522806" sldId="274"/>
+            <ac:spMk id="33" creationId="{10A8BB11-5617-E643-C9D6-15B496C75248}"/>
+          </ac:spMkLst>
+        </pc:spChg>
+        <pc:spChg chg="add mod">
+          <ac:chgData name="Bart Wolleswinkel" userId="b168cadc-1825-41ce-b9cc-7c7f06f6f31d" providerId="ADAL" clId="{22248CC1-9068-5BCB-B15B-4353FE48F57D}" dt="2026-02-04T17:31:14.628" v="3712" actId="20577"/>
+          <ac:spMkLst>
+            <pc:docMk/>
+            <pc:sldMk cId="3278522806" sldId="274"/>
+            <ac:spMk id="34" creationId="{37153FB7-AFDC-7D57-C1A5-3109C773CB7E}"/>
+          </ac:spMkLst>
+        </pc:spChg>
+        <pc:spChg chg="add mod">
+          <ac:chgData name="Bart Wolleswinkel" userId="b168cadc-1825-41ce-b9cc-7c7f06f6f31d" providerId="ADAL" clId="{22248CC1-9068-5BCB-B15B-4353FE48F57D}" dt="2026-02-04T17:31:29.510" v="3734" actId="20577"/>
+          <ac:spMkLst>
+            <pc:docMk/>
+            <pc:sldMk cId="3278522806" sldId="274"/>
+            <ac:spMk id="35" creationId="{82E3DFF7-443E-F579-07CA-DAD231AB366A}"/>
+          </ac:spMkLst>
+        </pc:spChg>
+        <pc:spChg chg="add mod">
+          <ac:chgData name="Bart Wolleswinkel" userId="b168cadc-1825-41ce-b9cc-7c7f06f6f31d" providerId="ADAL" clId="{22248CC1-9068-5BCB-B15B-4353FE48F57D}" dt="2026-02-04T17:33:17.262" v="3736" actId="1076"/>
+          <ac:spMkLst>
+            <pc:docMk/>
+            <pc:sldMk cId="3278522806" sldId="274"/>
+            <ac:spMk id="36" creationId="{BCFD76E4-0031-B479-4081-34D14EF9D30C}"/>
+          </ac:spMkLst>
+        </pc:spChg>
+        <pc:spChg chg="del">
+          <ac:chgData name="Bart Wolleswinkel" userId="b168cadc-1825-41ce-b9cc-7c7f06f6f31d" providerId="ADAL" clId="{22248CC1-9068-5BCB-B15B-4353FE48F57D}" dt="2026-02-04T16:47:28.537" v="2479" actId="478"/>
+          <ac:spMkLst>
+            <pc:docMk/>
+            <pc:sldMk cId="3278522806" sldId="274"/>
+            <ac:spMk id="42" creationId="{418BD878-A9EE-0049-2172-DDD6DF2BA973}"/>
+          </ac:spMkLst>
+        </pc:spChg>
+        <pc:spChg chg="del">
+          <ac:chgData name="Bart Wolleswinkel" userId="b168cadc-1825-41ce-b9cc-7c7f06f6f31d" providerId="ADAL" clId="{22248CC1-9068-5BCB-B15B-4353FE48F57D}" dt="2026-02-04T16:47:28.537" v="2479" actId="478"/>
+          <ac:spMkLst>
+            <pc:docMk/>
+            <pc:sldMk cId="3278522806" sldId="274"/>
+            <ac:spMk id="43" creationId="{4DB50B4C-0951-B668-973D-B9A3951B46D9}"/>
+          </ac:spMkLst>
+        </pc:spChg>
+        <pc:spChg chg="del">
+          <ac:chgData name="Bart Wolleswinkel" userId="b168cadc-1825-41ce-b9cc-7c7f06f6f31d" providerId="ADAL" clId="{22248CC1-9068-5BCB-B15B-4353FE48F57D}" dt="2026-02-04T16:47:28.537" v="2479" actId="478"/>
+          <ac:spMkLst>
+            <pc:docMk/>
+            <pc:sldMk cId="3278522806" sldId="274"/>
+            <ac:spMk id="46" creationId="{68023787-9A6F-73D1-21E3-1F8AF906FFFC}"/>
+          </ac:spMkLst>
+        </pc:spChg>
+        <pc:spChg chg="del">
+          <ac:chgData name="Bart Wolleswinkel" userId="b168cadc-1825-41ce-b9cc-7c7f06f6f31d" providerId="ADAL" clId="{22248CC1-9068-5BCB-B15B-4353FE48F57D}" dt="2026-02-04T16:47:28.537" v="2479" actId="478"/>
+          <ac:spMkLst>
+            <pc:docMk/>
+            <pc:sldMk cId="3278522806" sldId="274"/>
+            <ac:spMk id="47" creationId="{A9905D23-2C23-66BE-2505-B4C6B6EC6F49}"/>
+          </ac:spMkLst>
+        </pc:spChg>
       </pc:sldChg>
     </pc:docChg>
   </pc:docChgLst>
@@ -1926,7 +2046,7 @@
           <a:p>
             <a:fld id="{FB8718F5-1E4A-7D42-8173-5979EE6FBC1A}" type="datetimeFigureOut">
               <a:rPr lang="en-US" smtClean="0"/>
-              <a:t>1/29/26</a:t>
+              <a:t>2/4/26</a:t>
             </a:fld>
             <a:endParaRPr lang="en-US"/>
           </a:p>
@@ -2126,7 +2246,7 @@
           <a:p>
             <a:fld id="{FB8718F5-1E4A-7D42-8173-5979EE6FBC1A}" type="datetimeFigureOut">
               <a:rPr lang="en-US" smtClean="0"/>
-              <a:t>1/29/26</a:t>
+              <a:t>2/4/26</a:t>
             </a:fld>
             <a:endParaRPr lang="en-US"/>
           </a:p>
@@ -2336,7 +2456,7 @@
           <a:p>
             <a:fld id="{FB8718F5-1E4A-7D42-8173-5979EE6FBC1A}" type="datetimeFigureOut">
               <a:rPr lang="en-US" smtClean="0"/>
-              <a:t>1/29/26</a:t>
+              <a:t>2/4/26</a:t>
             </a:fld>
             <a:endParaRPr lang="en-US"/>
           </a:p>
@@ -2536,7 +2656,7 @@
           <a:p>
             <a:fld id="{FB8718F5-1E4A-7D42-8173-5979EE6FBC1A}" type="datetimeFigureOut">
               <a:rPr lang="en-US" smtClean="0"/>
-              <a:t>1/29/26</a:t>
+              <a:t>2/4/26</a:t>
             </a:fld>
             <a:endParaRPr lang="en-US"/>
           </a:p>
@@ -2812,7 +2932,7 @@
           <a:p>
             <a:fld id="{FB8718F5-1E4A-7D42-8173-5979EE6FBC1A}" type="datetimeFigureOut">
               <a:rPr lang="en-US" smtClean="0"/>
-              <a:t>1/29/26</a:t>
+              <a:t>2/4/26</a:t>
             </a:fld>
             <a:endParaRPr lang="en-US"/>
           </a:p>
@@ -3080,7 +3200,7 @@
           <a:p>
             <a:fld id="{FB8718F5-1E4A-7D42-8173-5979EE6FBC1A}" type="datetimeFigureOut">
               <a:rPr lang="en-US" smtClean="0"/>
-              <a:t>1/29/26</a:t>
+              <a:t>2/4/26</a:t>
             </a:fld>
             <a:endParaRPr lang="en-US"/>
           </a:p>
@@ -3495,7 +3615,7 @@
           <a:p>
             <a:fld id="{FB8718F5-1E4A-7D42-8173-5979EE6FBC1A}" type="datetimeFigureOut">
               <a:rPr lang="en-US" smtClean="0"/>
-              <a:t>1/29/26</a:t>
+              <a:t>2/4/26</a:t>
             </a:fld>
             <a:endParaRPr lang="en-US"/>
           </a:p>
@@ -3637,7 +3757,7 @@
           <a:p>
             <a:fld id="{FB8718F5-1E4A-7D42-8173-5979EE6FBC1A}" type="datetimeFigureOut">
               <a:rPr lang="en-US" smtClean="0"/>
-              <a:t>1/29/26</a:t>
+              <a:t>2/4/26</a:t>
             </a:fld>
             <a:endParaRPr lang="en-US"/>
           </a:p>
@@ -3750,7 +3870,7 @@
           <a:p>
             <a:fld id="{FB8718F5-1E4A-7D42-8173-5979EE6FBC1A}" type="datetimeFigureOut">
               <a:rPr lang="en-US" smtClean="0"/>
-              <a:t>1/29/26</a:t>
+              <a:t>2/4/26</a:t>
             </a:fld>
             <a:endParaRPr lang="en-US"/>
           </a:p>
@@ -4063,7 +4183,7 @@
           <a:p>
             <a:fld id="{FB8718F5-1E4A-7D42-8173-5979EE6FBC1A}" type="datetimeFigureOut">
               <a:rPr lang="en-US" smtClean="0"/>
-              <a:t>1/29/26</a:t>
+              <a:t>2/4/26</a:t>
             </a:fld>
             <a:endParaRPr lang="en-US"/>
           </a:p>
@@ -4352,7 +4472,7 @@
           <a:p>
             <a:fld id="{FB8718F5-1E4A-7D42-8173-5979EE6FBC1A}" type="datetimeFigureOut">
               <a:rPr lang="en-US" smtClean="0"/>
-              <a:t>1/29/26</a:t>
+              <a:t>2/4/26</a:t>
             </a:fld>
             <a:endParaRPr lang="en-US"/>
           </a:p>
@@ -4595,7 +4715,7 @@
           <a:p>
             <a:fld id="{FB8718F5-1E4A-7D42-8173-5979EE6FBC1A}" type="datetimeFigureOut">
               <a:rPr lang="en-US" smtClean="0"/>
-              <a:t>1/29/26</a:t>
+              <a:t>2/4/26</a:t>
             </a:fld>
             <a:endParaRPr lang="en-US"/>
           </a:p>
@@ -5034,9 +5154,10 @@
           <a:lstStyle/>
           <a:p>
             <a:r>
-              <a:rPr lang="en-US" noProof="0" dirty="0"/>
-              <a:t>…</a:t>
-            </a:r>
+              <a:rPr lang="en-US" noProof="0" dirty="0" err="1"/>
+              <a:t>NumPES</a:t>
+            </a:r>
+            <a:endParaRPr lang="en-US" noProof="0" dirty="0"/>
           </a:p>
         </p:txBody>
       </p:sp>
@@ -15623,6 +15744,1679 @@
     <p:extLst>
       <p:ext uri="{BB962C8B-B14F-4D97-AF65-F5344CB8AC3E}">
         <p14:creationId xmlns:p14="http://schemas.microsoft.com/office/powerpoint/2010/main" val="2057737708"/>
+      </p:ext>
+    </p:extLst>
+  </p:cSld>
+  <p:clrMapOvr>
+    <a:masterClrMapping/>
+  </p:clrMapOvr>
+</p:sld>
+</file>
+
+<file path=ppt/slides/slide19.xml><?xml version="1.0" encoding="utf-8"?>
+<p:sld xmlns:a="http://schemas.openxmlformats.org/drawingml/2006/main" xmlns:r="http://schemas.openxmlformats.org/officeDocument/2006/relationships" xmlns:p="http://schemas.openxmlformats.org/presentationml/2006/main">
+  <p:cSld>
+    <p:spTree>
+      <p:nvGrpSpPr>
+        <p:cNvPr id="1" name="">
+          <a:extLst>
+            <a:ext uri="{FF2B5EF4-FFF2-40B4-BE49-F238E27FC236}">
+              <a16:creationId xmlns:a16="http://schemas.microsoft.com/office/drawing/2014/main" id="{0C536097-38B4-F795-AFDF-A15158D644E9}"/>
+            </a:ext>
+          </a:extLst>
+        </p:cNvPr>
+        <p:cNvGrpSpPr/>
+        <p:nvPr/>
+      </p:nvGrpSpPr>
+      <p:grpSpPr>
+        <a:xfrm>
+          <a:off x="0" y="0"/>
+          <a:ext cx="0" cy="0"/>
+          <a:chOff x="0" y="0"/>
+          <a:chExt cx="0" cy="0"/>
+        </a:xfrm>
+      </p:grpSpPr>
+      <p:sp>
+        <p:nvSpPr>
+          <p:cNvPr id="4" name="Title 3">
+            <a:extLst>
+              <a:ext uri="{FF2B5EF4-FFF2-40B4-BE49-F238E27FC236}">
+                <a16:creationId xmlns:a16="http://schemas.microsoft.com/office/drawing/2014/main" id="{C01EE82E-05F0-947E-0DEC-B51FF85AC69D}"/>
+              </a:ext>
+            </a:extLst>
+          </p:cNvPr>
+          <p:cNvSpPr>
+            <a:spLocks noGrp="1"/>
+          </p:cNvSpPr>
+          <p:nvPr>
+            <p:ph type="title"/>
+          </p:nvPr>
+        </p:nvSpPr>
+        <p:spPr>
+          <a:xfrm>
+            <a:off x="8365245" y="184574"/>
+            <a:ext cx="3496339" cy="1325563"/>
+          </a:xfrm>
+        </p:spPr>
+        <p:txBody>
+          <a:bodyPr/>
+          <a:lstStyle/>
+          <a:p>
+            <a:r>
+              <a:rPr lang="en-US" dirty="0" err="1"/>
+              <a:t>GlobalConfig</a:t>
+            </a:r>
+            <a:endParaRPr lang="en-US" dirty="0"/>
+          </a:p>
+        </p:txBody>
+      </p:sp>
+      <p:sp>
+        <p:nvSpPr>
+          <p:cNvPr id="8" name="TextBox 7">
+            <a:extLst>
+              <a:ext uri="{FF2B5EF4-FFF2-40B4-BE49-F238E27FC236}">
+                <a16:creationId xmlns:a16="http://schemas.microsoft.com/office/drawing/2014/main" id="{DE527D8C-4024-56CB-2B42-CD63436A80A9}"/>
+              </a:ext>
+            </a:extLst>
+          </p:cNvPr>
+          <p:cNvSpPr txBox="1"/>
+          <p:nvPr/>
+        </p:nvSpPr>
+        <p:spPr>
+          <a:xfrm>
+            <a:off x="437061" y="632358"/>
+            <a:ext cx="1993687" cy="307777"/>
+          </a:xfrm>
+          <a:prstGeom prst="rect">
+            <a:avLst/>
+          </a:prstGeom>
+          <a:noFill/>
+        </p:spPr>
+        <p:txBody>
+          <a:bodyPr wrap="none" rtlCol="0">
+            <a:spAutoFit/>
+          </a:bodyPr>
+          <a:lstStyle/>
+          <a:p>
+            <a:r>
+              <a:rPr lang="en-US" sz="1400" dirty="0" err="1">
+                <a:solidFill>
+                  <a:sysClr val="windowText" lastClr="000000"/>
+                </a:solidFill>
+                <a:latin typeface="American Typewriter" panose="02090604020004020304" pitchFamily="18" charset="77"/>
+              </a:rPr>
+              <a:t>CFG.atol</a:t>
+            </a:r>
+            <a:r>
+              <a:rPr lang="en-US" sz="1400" dirty="0">
+                <a:solidFill>
+                  <a:sysClr val="windowText" lastClr="000000"/>
+                </a:solidFill>
+                <a:latin typeface="American Typewriter" panose="02090604020004020304" pitchFamily="18" charset="77"/>
+              </a:rPr>
+              <a:t>: float = 1E-8</a:t>
+            </a:r>
+            <a:endParaRPr lang="en-US" sz="1400" dirty="0"/>
+          </a:p>
+        </p:txBody>
+      </p:sp>
+      <p:sp>
+        <p:nvSpPr>
+          <p:cNvPr id="9" name="TextBox 8">
+            <a:extLst>
+              <a:ext uri="{FF2B5EF4-FFF2-40B4-BE49-F238E27FC236}">
+                <a16:creationId xmlns:a16="http://schemas.microsoft.com/office/drawing/2014/main" id="{C92FB934-DBA7-3F04-0C4A-3C644A1EB631}"/>
+              </a:ext>
+            </a:extLst>
+          </p:cNvPr>
+          <p:cNvSpPr txBox="1"/>
+          <p:nvPr/>
+        </p:nvSpPr>
+        <p:spPr>
+          <a:xfrm>
+            <a:off x="437061" y="328532"/>
+            <a:ext cx="1984261" cy="307777"/>
+          </a:xfrm>
+          <a:prstGeom prst="rect">
+            <a:avLst/>
+          </a:prstGeom>
+          <a:noFill/>
+        </p:spPr>
+        <p:txBody>
+          <a:bodyPr wrap="none" rtlCol="0">
+            <a:spAutoFit/>
+          </a:bodyPr>
+          <a:lstStyle/>
+          <a:p>
+            <a:r>
+              <a:rPr lang="en-US" sz="1400" dirty="0" err="1">
+                <a:solidFill>
+                  <a:sysClr val="windowText" lastClr="000000"/>
+                </a:solidFill>
+                <a:latin typeface="American Typewriter" panose="02090604020004020304" pitchFamily="18" charset="77"/>
+              </a:rPr>
+              <a:t>CFG.rtol</a:t>
+            </a:r>
+            <a:r>
+              <a:rPr lang="en-US" sz="1400" dirty="0">
+                <a:solidFill>
+                  <a:sysClr val="windowText" lastClr="000000"/>
+                </a:solidFill>
+                <a:latin typeface="American Typewriter" panose="02090604020004020304" pitchFamily="18" charset="77"/>
+              </a:rPr>
+              <a:t>: float = 1E-5</a:t>
+            </a:r>
+            <a:endParaRPr lang="en-US" sz="1400" dirty="0"/>
+          </a:p>
+        </p:txBody>
+      </p:sp>
+      <p:sp>
+        <p:nvSpPr>
+          <p:cNvPr id="12" name="TextBox 11">
+            <a:extLst>
+              <a:ext uri="{FF2B5EF4-FFF2-40B4-BE49-F238E27FC236}">
+                <a16:creationId xmlns:a16="http://schemas.microsoft.com/office/drawing/2014/main" id="{B02E82DA-2646-BCC6-FEFE-CE26741B7231}"/>
+              </a:ext>
+            </a:extLst>
+          </p:cNvPr>
+          <p:cNvSpPr txBox="1"/>
+          <p:nvPr/>
+        </p:nvSpPr>
+        <p:spPr>
+          <a:xfrm>
+            <a:off x="437061" y="1000438"/>
+            <a:ext cx="5529399" cy="307777"/>
+          </a:xfrm>
+          <a:prstGeom prst="rect">
+            <a:avLst/>
+          </a:prstGeom>
+          <a:noFill/>
+        </p:spPr>
+        <p:txBody>
+          <a:bodyPr wrap="none" rtlCol="0">
+            <a:spAutoFit/>
+          </a:bodyPr>
+          <a:lstStyle/>
+          <a:p>
+            <a:r>
+              <a:rPr lang="en-US" sz="1400" dirty="0" err="1">
+                <a:solidFill>
+                  <a:sysClr val="windowText" lastClr="000000"/>
+                </a:solidFill>
+                <a:latin typeface="American Typewriter" panose="02090604020004020304" pitchFamily="18" charset="77"/>
+              </a:rPr>
+              <a:t>CFG.on_poly_convert</a:t>
+            </a:r>
+            <a:r>
+              <a:rPr lang="en-US" sz="1400" dirty="0">
+                <a:solidFill>
+                  <a:sysClr val="windowText" lastClr="000000"/>
+                </a:solidFill>
+                <a:latin typeface="American Typewriter" panose="02090604020004020304" pitchFamily="18" charset="77"/>
+              </a:rPr>
+              <a:t>: Literal[‘pass’, ‘warning’, ‘error’] = ‘pass’</a:t>
+            </a:r>
+            <a:endParaRPr lang="en-US" sz="1400" dirty="0"/>
+          </a:p>
+        </p:txBody>
+      </p:sp>
+      <p:sp>
+        <p:nvSpPr>
+          <p:cNvPr id="13" name="TextBox 12">
+            <a:extLst>
+              <a:ext uri="{FF2B5EF4-FFF2-40B4-BE49-F238E27FC236}">
+                <a16:creationId xmlns:a16="http://schemas.microsoft.com/office/drawing/2014/main" id="{83529C37-ACC4-E6F2-3252-7F372CAE9D81}"/>
+              </a:ext>
+            </a:extLst>
+          </p:cNvPr>
+          <p:cNvSpPr txBox="1"/>
+          <p:nvPr/>
+        </p:nvSpPr>
+        <p:spPr>
+          <a:xfrm>
+            <a:off x="437061" y="1307569"/>
+            <a:ext cx="5234318" cy="307777"/>
+          </a:xfrm>
+          <a:prstGeom prst="rect">
+            <a:avLst/>
+          </a:prstGeom>
+          <a:noFill/>
+        </p:spPr>
+        <p:txBody>
+          <a:bodyPr wrap="none" rtlCol="0">
+            <a:spAutoFit/>
+          </a:bodyPr>
+          <a:lstStyle/>
+          <a:p>
+            <a:r>
+              <a:rPr lang="en-US" sz="1400" dirty="0" err="1">
+                <a:solidFill>
+                  <a:sysClr val="windowText" lastClr="000000"/>
+                </a:solidFill>
+                <a:latin typeface="American Typewriter" panose="02090604020004020304" pitchFamily="18" charset="77"/>
+              </a:rPr>
+              <a:t>CFG.on_property_assign</a:t>
+            </a:r>
+            <a:r>
+              <a:rPr lang="en-US" sz="1400" dirty="0">
+                <a:solidFill>
+                  <a:sysClr val="windowText" lastClr="000000"/>
+                </a:solidFill>
+                <a:latin typeface="American Typewriter" panose="02090604020004020304" pitchFamily="18" charset="77"/>
+              </a:rPr>
+              <a:t>: Literal[‘pass’, ‘reduce’] = ‘reduce’</a:t>
+            </a:r>
+            <a:endParaRPr lang="en-US" sz="1400" dirty="0"/>
+          </a:p>
+        </p:txBody>
+      </p:sp>
+      <p:sp>
+        <p:nvSpPr>
+          <p:cNvPr id="14" name="TextBox 13">
+            <a:extLst>
+              <a:ext uri="{FF2B5EF4-FFF2-40B4-BE49-F238E27FC236}">
+                <a16:creationId xmlns:a16="http://schemas.microsoft.com/office/drawing/2014/main" id="{A1B09A6A-6081-30D4-9E71-AE98464C8E3D}"/>
+              </a:ext>
+            </a:extLst>
+          </p:cNvPr>
+          <p:cNvSpPr txBox="1"/>
+          <p:nvPr/>
+        </p:nvSpPr>
+        <p:spPr>
+          <a:xfrm>
+            <a:off x="437061" y="1615346"/>
+            <a:ext cx="8379538" cy="307777"/>
+          </a:xfrm>
+          <a:prstGeom prst="rect">
+            <a:avLst/>
+          </a:prstGeom>
+          <a:noFill/>
+        </p:spPr>
+        <p:txBody>
+          <a:bodyPr wrap="none" rtlCol="0">
+            <a:spAutoFit/>
+          </a:bodyPr>
+          <a:lstStyle/>
+          <a:p>
+            <a:r>
+              <a:rPr lang="en-US" sz="1400" dirty="0" err="1">
+                <a:solidFill>
+                  <a:sysClr val="windowText" lastClr="000000"/>
+                </a:solidFill>
+                <a:latin typeface="American Typewriter" panose="02090604020004020304" pitchFamily="18" charset="77"/>
+              </a:rPr>
+              <a:t>CFG.on_hash_degen</a:t>
+            </a:r>
+            <a:r>
+              <a:rPr lang="en-US" sz="1400" dirty="0">
+                <a:solidFill>
+                  <a:sysClr val="windowText" lastClr="000000"/>
+                </a:solidFill>
+                <a:latin typeface="American Typewriter" panose="02090604020004020304" pitchFamily="18" charset="77"/>
+              </a:rPr>
+              <a:t>: Literal[‘error’, ‘random’] = ‘error’  </a:t>
+            </a:r>
+            <a:r>
+              <a:rPr lang="en-US" sz="1400" i="1" dirty="0">
+                <a:solidFill>
+                  <a:schemeClr val="accent5">
+                    <a:lumMod val="60000"/>
+                    <a:lumOff val="40000"/>
+                  </a:schemeClr>
+                </a:solidFill>
+                <a:latin typeface="American Typewriter" panose="02090604020004020304" pitchFamily="18" charset="77"/>
+              </a:rPr>
+              <a:t># NOTE: ‘Unsafe’, only really for caching</a:t>
+            </a:r>
+            <a:endParaRPr lang="en-US" sz="1400" i="1" dirty="0">
+              <a:solidFill>
+                <a:schemeClr val="accent5">
+                  <a:lumMod val="60000"/>
+                  <a:lumOff val="40000"/>
+                </a:schemeClr>
+              </a:solidFill>
+            </a:endParaRPr>
+          </a:p>
+        </p:txBody>
+      </p:sp>
+      <p:sp>
+        <p:nvSpPr>
+          <p:cNvPr id="15" name="TextBox 14">
+            <a:extLst>
+              <a:ext uri="{FF2B5EF4-FFF2-40B4-BE49-F238E27FC236}">
+                <a16:creationId xmlns:a16="http://schemas.microsoft.com/office/drawing/2014/main" id="{80C2315B-00F0-6C34-E575-7343B9406373}"/>
+              </a:ext>
+            </a:extLst>
+          </p:cNvPr>
+          <p:cNvSpPr txBox="1"/>
+          <p:nvPr/>
+        </p:nvSpPr>
+        <p:spPr>
+          <a:xfrm>
+            <a:off x="437061" y="5550431"/>
+            <a:ext cx="7071551" cy="307777"/>
+          </a:xfrm>
+          <a:prstGeom prst="rect">
+            <a:avLst/>
+          </a:prstGeom>
+          <a:noFill/>
+        </p:spPr>
+        <p:txBody>
+          <a:bodyPr wrap="none" rtlCol="0">
+            <a:spAutoFit/>
+          </a:bodyPr>
+          <a:lstStyle/>
+          <a:p>
+            <a:r>
+              <a:rPr lang="en-US" sz="1400" dirty="0" err="1">
+                <a:solidFill>
+                  <a:sysClr val="windowText" lastClr="000000"/>
+                </a:solidFill>
+                <a:latin typeface="American Typewriter" panose="02090604020004020304" pitchFamily="18" charset="77"/>
+              </a:rPr>
+              <a:t>pes.set_algo_options</a:t>
+            </a:r>
+            <a:r>
+              <a:rPr lang="en-US" sz="1400" dirty="0">
+                <a:solidFill>
+                  <a:sysClr val="windowText" lastClr="000000"/>
+                </a:solidFill>
+                <a:latin typeface="American Typewriter" panose="02090604020004020304" pitchFamily="18" charset="77"/>
+              </a:rPr>
+              <a:t>(opts: </a:t>
+            </a:r>
+            <a:r>
+              <a:rPr lang="en-US" sz="1400" dirty="0" err="1">
+                <a:solidFill>
+                  <a:sysClr val="windowText" lastClr="000000"/>
+                </a:solidFill>
+                <a:latin typeface="American Typewriter" panose="02090604020004020304" pitchFamily="18" charset="77"/>
+              </a:rPr>
+              <a:t>dict</a:t>
+            </a:r>
+            <a:r>
+              <a:rPr lang="en-US" sz="1400" dirty="0">
+                <a:solidFill>
+                  <a:sysClr val="windowText" lastClr="000000"/>
+                </a:solidFill>
+                <a:latin typeface="American Typewriter" panose="02090604020004020304" pitchFamily="18" charset="77"/>
+              </a:rPr>
+              <a:t>[str, Any])  </a:t>
+            </a:r>
+            <a:r>
+              <a:rPr lang="en-US" sz="1400" i="1" dirty="0">
+                <a:solidFill>
+                  <a:schemeClr val="bg2">
+                    <a:lumMod val="75000"/>
+                  </a:schemeClr>
+                </a:solidFill>
+                <a:latin typeface="American Typewriter" panose="02090604020004020304" pitchFamily="18" charset="77"/>
+              </a:rPr>
+              <a:t># </a:t>
+            </a:r>
+            <a:r>
+              <a:rPr lang="en-US" sz="1400" i="1" dirty="0" err="1">
+                <a:solidFill>
+                  <a:schemeClr val="bg2">
+                    <a:lumMod val="75000"/>
+                  </a:schemeClr>
+                </a:solidFill>
+                <a:latin typeface="American Typewriter" panose="02090604020004020304" pitchFamily="18" charset="77"/>
+              </a:rPr>
+              <a:t>Contextmanager</a:t>
+            </a:r>
+            <a:r>
+              <a:rPr lang="en-US" sz="1400" i="1" dirty="0">
+                <a:solidFill>
+                  <a:schemeClr val="bg2">
+                    <a:lumMod val="75000"/>
+                  </a:schemeClr>
+                </a:solidFill>
+                <a:latin typeface="American Typewriter" panose="02090604020004020304" pitchFamily="18" charset="77"/>
+              </a:rPr>
+              <a:t>: `</a:t>
+            </a:r>
+            <a:r>
+              <a:rPr lang="en-US" sz="1400" i="1" dirty="0" err="1">
+                <a:solidFill>
+                  <a:schemeClr val="bg2">
+                    <a:lumMod val="75000"/>
+                  </a:schemeClr>
+                </a:solidFill>
+                <a:latin typeface="American Typewriter" panose="02090604020004020304" pitchFamily="18" charset="77"/>
+              </a:rPr>
+              <a:t>algo_options</a:t>
+            </a:r>
+            <a:r>
+              <a:rPr lang="en-US" sz="1400" i="1" dirty="0">
+                <a:solidFill>
+                  <a:schemeClr val="bg2">
+                    <a:lumMod val="75000"/>
+                  </a:schemeClr>
+                </a:solidFill>
+                <a:latin typeface="American Typewriter" panose="02090604020004020304" pitchFamily="18" charset="77"/>
+              </a:rPr>
+              <a:t>(...)`</a:t>
+            </a:r>
+            <a:endParaRPr lang="en-US" sz="1400" i="1" dirty="0">
+              <a:solidFill>
+                <a:schemeClr val="bg2">
+                  <a:lumMod val="75000"/>
+                </a:schemeClr>
+              </a:solidFill>
+            </a:endParaRPr>
+          </a:p>
+        </p:txBody>
+      </p:sp>
+      <p:sp>
+        <p:nvSpPr>
+          <p:cNvPr id="17" name="TextBox 16">
+            <a:extLst>
+              <a:ext uri="{FF2B5EF4-FFF2-40B4-BE49-F238E27FC236}">
+                <a16:creationId xmlns:a16="http://schemas.microsoft.com/office/drawing/2014/main" id="{F817190F-B5E6-FA1C-E070-C456FA4C90F7}"/>
+              </a:ext>
+            </a:extLst>
+          </p:cNvPr>
+          <p:cNvSpPr txBox="1"/>
+          <p:nvPr/>
+        </p:nvSpPr>
+        <p:spPr>
+          <a:xfrm>
+            <a:off x="437061" y="6161826"/>
+            <a:ext cx="6175537" cy="307777"/>
+          </a:xfrm>
+          <a:prstGeom prst="rect">
+            <a:avLst/>
+          </a:prstGeom>
+          <a:noFill/>
+        </p:spPr>
+        <p:txBody>
+          <a:bodyPr wrap="none" rtlCol="0">
+            <a:spAutoFit/>
+          </a:bodyPr>
+          <a:lstStyle/>
+          <a:p>
+            <a:r>
+              <a:rPr lang="en-US" sz="1400" dirty="0" err="1">
+                <a:solidFill>
+                  <a:sysClr val="windowText" lastClr="000000"/>
+                </a:solidFill>
+                <a:latin typeface="American Typewriter" panose="02090604020004020304" pitchFamily="18" charset="77"/>
+              </a:rPr>
+              <a:t>pes.set_display_options</a:t>
+            </a:r>
+            <a:r>
+              <a:rPr lang="en-US" sz="1400" dirty="0">
+                <a:solidFill>
+                  <a:sysClr val="windowText" lastClr="000000"/>
+                </a:solidFill>
+                <a:latin typeface="American Typewriter" panose="02090604020004020304" pitchFamily="18" charset="77"/>
+              </a:rPr>
+              <a:t>(...)  </a:t>
+            </a:r>
+            <a:r>
+              <a:rPr lang="en-US" sz="1400" i="1" dirty="0">
+                <a:solidFill>
+                  <a:schemeClr val="bg2">
+                    <a:lumMod val="75000"/>
+                  </a:schemeClr>
+                </a:solidFill>
+                <a:latin typeface="American Typewriter" panose="02090604020004020304" pitchFamily="18" charset="77"/>
+              </a:rPr>
+              <a:t># </a:t>
+            </a:r>
+            <a:r>
+              <a:rPr lang="en-US" sz="1400" i="1" dirty="0" err="1">
+                <a:solidFill>
+                  <a:schemeClr val="bg2">
+                    <a:lumMod val="75000"/>
+                  </a:schemeClr>
+                </a:solidFill>
+                <a:latin typeface="American Typewriter" panose="02090604020004020304" pitchFamily="18" charset="77"/>
+              </a:rPr>
+              <a:t>Contextmanager</a:t>
+            </a:r>
+            <a:r>
+              <a:rPr lang="en-US" sz="1400" i="1" dirty="0">
+                <a:solidFill>
+                  <a:schemeClr val="bg2">
+                    <a:lumMod val="75000"/>
+                  </a:schemeClr>
+                </a:solidFill>
+                <a:latin typeface="American Typewriter" panose="02090604020004020304" pitchFamily="18" charset="77"/>
+              </a:rPr>
+              <a:t>: ` </a:t>
+            </a:r>
+            <a:r>
+              <a:rPr lang="en-US" sz="1400" i="1" dirty="0" err="1">
+                <a:solidFill>
+                  <a:schemeClr val="bg2">
+                    <a:lumMod val="75000"/>
+                  </a:schemeClr>
+                </a:solidFill>
+                <a:latin typeface="American Typewriter" panose="02090604020004020304" pitchFamily="18" charset="77"/>
+              </a:rPr>
+              <a:t>display_options</a:t>
+            </a:r>
+            <a:r>
+              <a:rPr lang="en-US" sz="1400" i="1" dirty="0">
+                <a:solidFill>
+                  <a:schemeClr val="bg2">
+                    <a:lumMod val="75000"/>
+                  </a:schemeClr>
+                </a:solidFill>
+                <a:latin typeface="American Typewriter" panose="02090604020004020304" pitchFamily="18" charset="77"/>
+              </a:rPr>
+              <a:t>(...)`</a:t>
+            </a:r>
+            <a:endParaRPr lang="en-US" sz="1400" i="1" dirty="0">
+              <a:solidFill>
+                <a:schemeClr val="bg2">
+                  <a:lumMod val="75000"/>
+                </a:schemeClr>
+              </a:solidFill>
+            </a:endParaRPr>
+          </a:p>
+        </p:txBody>
+      </p:sp>
+      <p:sp>
+        <p:nvSpPr>
+          <p:cNvPr id="20" name="TextBox 19">
+            <a:extLst>
+              <a:ext uri="{FF2B5EF4-FFF2-40B4-BE49-F238E27FC236}">
+                <a16:creationId xmlns:a16="http://schemas.microsoft.com/office/drawing/2014/main" id="{FAFC5392-7C69-D7B8-40A1-A60EFA5EAB96}"/>
+              </a:ext>
+            </a:extLst>
+          </p:cNvPr>
+          <p:cNvSpPr txBox="1"/>
+          <p:nvPr/>
+        </p:nvSpPr>
+        <p:spPr>
+          <a:xfrm>
+            <a:off x="437061" y="5854049"/>
+            <a:ext cx="6786410" cy="307777"/>
+          </a:xfrm>
+          <a:prstGeom prst="rect">
+            <a:avLst/>
+          </a:prstGeom>
+          <a:noFill/>
+        </p:spPr>
+        <p:txBody>
+          <a:bodyPr wrap="none" rtlCol="0">
+            <a:spAutoFit/>
+          </a:bodyPr>
+          <a:lstStyle/>
+          <a:p>
+            <a:r>
+              <a:rPr lang="en-US" sz="1400" i="1" dirty="0">
+                <a:solidFill>
+                  <a:schemeClr val="accent5">
+                    <a:lumMod val="60000"/>
+                    <a:lumOff val="40000"/>
+                  </a:schemeClr>
+                </a:solidFill>
+                <a:latin typeface="American Typewriter" panose="02090604020004020304" pitchFamily="18" charset="77"/>
+              </a:rPr>
+              <a:t># NOTE: Most print/display-options need to be changed by NumPy/</a:t>
+            </a:r>
+            <a:r>
+              <a:rPr lang="en-US" sz="1400" i="1" dirty="0" err="1">
+                <a:solidFill>
+                  <a:schemeClr val="accent5">
+                    <a:lumMod val="60000"/>
+                    <a:lumOff val="40000"/>
+                  </a:schemeClr>
+                </a:solidFill>
+                <a:latin typeface="American Typewriter" panose="02090604020004020304" pitchFamily="18" charset="77"/>
+              </a:rPr>
+              <a:t>Matplolib</a:t>
+            </a:r>
+            <a:r>
+              <a:rPr lang="en-US" sz="1400" i="1" dirty="0">
+                <a:solidFill>
+                  <a:schemeClr val="accent5">
+                    <a:lumMod val="60000"/>
+                    <a:lumOff val="40000"/>
+                  </a:schemeClr>
+                </a:solidFill>
+                <a:latin typeface="American Typewriter" panose="02090604020004020304" pitchFamily="18" charset="77"/>
+              </a:rPr>
+              <a:t>  </a:t>
+            </a:r>
+            <a:endParaRPr lang="en-US" sz="1400" dirty="0"/>
+          </a:p>
+        </p:txBody>
+      </p:sp>
+      <p:sp>
+        <p:nvSpPr>
+          <p:cNvPr id="22" name="TextBox 21">
+            <a:extLst>
+              <a:ext uri="{FF2B5EF4-FFF2-40B4-BE49-F238E27FC236}">
+                <a16:creationId xmlns:a16="http://schemas.microsoft.com/office/drawing/2014/main" id="{0C7C47C8-D207-82BB-E6A7-323E7B9BB59E}"/>
+              </a:ext>
+            </a:extLst>
+          </p:cNvPr>
+          <p:cNvSpPr txBox="1"/>
+          <p:nvPr/>
+        </p:nvSpPr>
+        <p:spPr>
+          <a:xfrm>
+            <a:off x="437061" y="3880182"/>
+            <a:ext cx="2309543" cy="307777"/>
+          </a:xfrm>
+          <a:prstGeom prst="rect">
+            <a:avLst/>
+          </a:prstGeom>
+          <a:noFill/>
+        </p:spPr>
+        <p:txBody>
+          <a:bodyPr wrap="none" rtlCol="0">
+            <a:spAutoFit/>
+          </a:bodyPr>
+          <a:lstStyle/>
+          <a:p>
+            <a:r>
+              <a:rPr lang="en-US" sz="1400" dirty="0" err="1">
+                <a:solidFill>
+                  <a:sysClr val="windowText" lastClr="000000"/>
+                </a:solidFill>
+                <a:latin typeface="American Typewriter" panose="02090604020004020304" pitchFamily="18" charset="77"/>
+              </a:rPr>
+              <a:t>CFG.print_nverts</a:t>
+            </a:r>
+            <a:r>
+              <a:rPr lang="en-US" sz="1400" dirty="0">
+                <a:solidFill>
+                  <a:sysClr val="windowText" lastClr="000000"/>
+                </a:solidFill>
+                <a:latin typeface="American Typewriter" panose="02090604020004020304" pitchFamily="18" charset="77"/>
+              </a:rPr>
+              <a:t>: int = 4</a:t>
+            </a:r>
+            <a:endParaRPr lang="en-US" sz="1400" i="1" dirty="0">
+              <a:solidFill>
+                <a:schemeClr val="accent5">
+                  <a:lumMod val="60000"/>
+                  <a:lumOff val="40000"/>
+                </a:schemeClr>
+              </a:solidFill>
+            </a:endParaRPr>
+          </a:p>
+        </p:txBody>
+      </p:sp>
+      <p:sp>
+        <p:nvSpPr>
+          <p:cNvPr id="23" name="TextBox 22">
+            <a:extLst>
+              <a:ext uri="{FF2B5EF4-FFF2-40B4-BE49-F238E27FC236}">
+                <a16:creationId xmlns:a16="http://schemas.microsoft.com/office/drawing/2014/main" id="{9AEDEFD0-4C42-1823-90CC-3AB9F9FB4947}"/>
+              </a:ext>
+            </a:extLst>
+          </p:cNvPr>
+          <p:cNvSpPr txBox="1"/>
+          <p:nvPr/>
+        </p:nvSpPr>
+        <p:spPr>
+          <a:xfrm>
+            <a:off x="437061" y="1974032"/>
+            <a:ext cx="9177384" cy="307777"/>
+          </a:xfrm>
+          <a:prstGeom prst="rect">
+            <a:avLst/>
+          </a:prstGeom>
+          <a:noFill/>
+        </p:spPr>
+        <p:txBody>
+          <a:bodyPr wrap="none" rtlCol="0">
+            <a:spAutoFit/>
+          </a:bodyPr>
+          <a:lstStyle/>
+          <a:p>
+            <a:r>
+              <a:rPr lang="en-US" sz="1400" dirty="0" err="1">
+                <a:solidFill>
+                  <a:sysClr val="windowText" lastClr="000000"/>
+                </a:solidFill>
+                <a:latin typeface="American Typewriter" panose="02090604020004020304" pitchFamily="18" charset="77"/>
+              </a:rPr>
+              <a:t>CFG.lp_backend</a:t>
+            </a:r>
+            <a:r>
+              <a:rPr lang="en-US" sz="1400" dirty="0">
+                <a:solidFill>
+                  <a:sysClr val="windowText" lastClr="000000"/>
+                </a:solidFill>
+                <a:latin typeface="American Typewriter" panose="02090604020004020304" pitchFamily="18" charset="77"/>
+              </a:rPr>
+              <a:t>: Literal[‘auto’, ‘</a:t>
+            </a:r>
+            <a:r>
+              <a:rPr lang="en-US" sz="1400" dirty="0" err="1">
+                <a:solidFill>
+                  <a:sysClr val="windowText" lastClr="000000"/>
+                </a:solidFill>
+                <a:latin typeface="American Typewriter" panose="02090604020004020304" pitchFamily="18" charset="77"/>
+              </a:rPr>
+              <a:t>scipy</a:t>
+            </a:r>
+            <a:r>
+              <a:rPr lang="en-US" sz="1400" dirty="0">
+                <a:solidFill>
+                  <a:sysClr val="windowText" lastClr="000000"/>
+                </a:solidFill>
+                <a:latin typeface="American Typewriter" panose="02090604020004020304" pitchFamily="18" charset="77"/>
+              </a:rPr>
+              <a:t>’, ‘</a:t>
+            </a:r>
+            <a:r>
+              <a:rPr lang="en-US" sz="1400" dirty="0" err="1">
+                <a:solidFill>
+                  <a:sysClr val="windowText" lastClr="000000"/>
+                </a:solidFill>
+                <a:latin typeface="American Typewriter" panose="02090604020004020304" pitchFamily="18" charset="77"/>
+              </a:rPr>
+              <a:t>cvxpy</a:t>
+            </a:r>
+            <a:r>
+              <a:rPr lang="en-US" sz="1400" dirty="0">
+                <a:solidFill>
+                  <a:sysClr val="windowText" lastClr="000000"/>
+                </a:solidFill>
+                <a:latin typeface="American Typewriter" panose="02090604020004020304" pitchFamily="18" charset="77"/>
+              </a:rPr>
+              <a:t>’] = ‘auto’  </a:t>
+            </a:r>
+            <a:r>
+              <a:rPr lang="en-US" sz="1400" i="1" dirty="0">
+                <a:solidFill>
+                  <a:schemeClr val="bg2">
+                    <a:lumMod val="75000"/>
+                  </a:schemeClr>
+                </a:solidFill>
+                <a:latin typeface="American Typewriter" panose="02090604020004020304" pitchFamily="18" charset="77"/>
+              </a:rPr>
+              <a:t># ‘auto’ -&gt; `</a:t>
+            </a:r>
+            <a:r>
+              <a:rPr lang="en-US" sz="1400" i="1" dirty="0" err="1">
+                <a:solidFill>
+                  <a:schemeClr val="bg2">
+                    <a:lumMod val="75000"/>
+                  </a:schemeClr>
+                </a:solidFill>
+                <a:latin typeface="American Typewriter" panose="02090604020004020304" pitchFamily="18" charset="77"/>
+              </a:rPr>
+              <a:t>cvxpy</a:t>
+            </a:r>
+            <a:r>
+              <a:rPr lang="en-US" sz="1400" i="1" dirty="0">
+                <a:solidFill>
+                  <a:schemeClr val="bg2">
+                    <a:lumMod val="75000"/>
+                  </a:schemeClr>
+                </a:solidFill>
+                <a:latin typeface="American Typewriter" panose="02090604020004020304" pitchFamily="18" charset="77"/>
+              </a:rPr>
+              <a:t>` if available, `</a:t>
+            </a:r>
+            <a:r>
+              <a:rPr lang="en-US" sz="1400" i="1" dirty="0" err="1">
+                <a:solidFill>
+                  <a:schemeClr val="bg2">
+                    <a:lumMod val="75000"/>
+                  </a:schemeClr>
+                </a:solidFill>
+                <a:latin typeface="American Typewriter" panose="02090604020004020304" pitchFamily="18" charset="77"/>
+              </a:rPr>
+              <a:t>scipy</a:t>
+            </a:r>
+            <a:r>
+              <a:rPr lang="en-US" sz="1400" i="1" dirty="0">
+                <a:solidFill>
+                  <a:schemeClr val="bg2">
+                    <a:lumMod val="75000"/>
+                  </a:schemeClr>
+                </a:solidFill>
+                <a:latin typeface="American Typewriter" panose="02090604020004020304" pitchFamily="18" charset="77"/>
+              </a:rPr>
+              <a:t>` as fallback</a:t>
+            </a:r>
+            <a:endParaRPr lang="en-US" sz="1400" i="1" dirty="0">
+              <a:solidFill>
+                <a:schemeClr val="bg2">
+                  <a:lumMod val="75000"/>
+                </a:schemeClr>
+              </a:solidFill>
+            </a:endParaRPr>
+          </a:p>
+        </p:txBody>
+      </p:sp>
+      <p:sp>
+        <p:nvSpPr>
+          <p:cNvPr id="24" name="TextBox 23">
+            <a:extLst>
+              <a:ext uri="{FF2B5EF4-FFF2-40B4-BE49-F238E27FC236}">
+                <a16:creationId xmlns:a16="http://schemas.microsoft.com/office/drawing/2014/main" id="{DAF68DE4-34AB-AB4A-277B-7CCB4A8B9360}"/>
+              </a:ext>
+            </a:extLst>
+          </p:cNvPr>
+          <p:cNvSpPr txBox="1"/>
+          <p:nvPr/>
+        </p:nvSpPr>
+        <p:spPr>
+          <a:xfrm>
+            <a:off x="437061" y="2277651"/>
+            <a:ext cx="3993016" cy="307777"/>
+          </a:xfrm>
+          <a:prstGeom prst="rect">
+            <a:avLst/>
+          </a:prstGeom>
+          <a:noFill/>
+        </p:spPr>
+        <p:txBody>
+          <a:bodyPr wrap="none" rtlCol="0">
+            <a:spAutoFit/>
+          </a:bodyPr>
+          <a:lstStyle/>
+          <a:p>
+            <a:r>
+              <a:rPr lang="en-US" sz="1400" dirty="0" err="1">
+                <a:solidFill>
+                  <a:sysClr val="windowText" lastClr="000000"/>
+                </a:solidFill>
+                <a:latin typeface="American Typewriter" panose="02090604020004020304" pitchFamily="18" charset="77"/>
+              </a:rPr>
+              <a:t>CFG.sdp_backend</a:t>
+            </a:r>
+            <a:r>
+              <a:rPr lang="en-US" sz="1400" dirty="0">
+                <a:solidFill>
+                  <a:sysClr val="windowText" lastClr="000000"/>
+                </a:solidFill>
+                <a:latin typeface="American Typewriter" panose="02090604020004020304" pitchFamily="18" charset="77"/>
+              </a:rPr>
+              <a:t>: Literal [‘</a:t>
+            </a:r>
+            <a:r>
+              <a:rPr lang="en-US" sz="1400" dirty="0" err="1">
+                <a:solidFill>
+                  <a:sysClr val="windowText" lastClr="000000"/>
+                </a:solidFill>
+                <a:latin typeface="American Typewriter" panose="02090604020004020304" pitchFamily="18" charset="77"/>
+              </a:rPr>
+              <a:t>cvxpy</a:t>
+            </a:r>
+            <a:r>
+              <a:rPr lang="en-US" sz="1400" dirty="0">
+                <a:solidFill>
+                  <a:sysClr val="windowText" lastClr="000000"/>
+                </a:solidFill>
+                <a:latin typeface="American Typewriter" panose="02090604020004020304" pitchFamily="18" charset="77"/>
+              </a:rPr>
+              <a:t>’] = ‘</a:t>
+            </a:r>
+            <a:r>
+              <a:rPr lang="en-US" sz="1400" dirty="0" err="1">
+                <a:solidFill>
+                  <a:sysClr val="windowText" lastClr="000000"/>
+                </a:solidFill>
+                <a:latin typeface="American Typewriter" panose="02090604020004020304" pitchFamily="18" charset="77"/>
+              </a:rPr>
+              <a:t>cvxpy</a:t>
+            </a:r>
+            <a:r>
+              <a:rPr lang="en-US" sz="1400" dirty="0">
+                <a:solidFill>
+                  <a:sysClr val="windowText" lastClr="000000"/>
+                </a:solidFill>
+                <a:latin typeface="American Typewriter" panose="02090604020004020304" pitchFamily="18" charset="77"/>
+              </a:rPr>
+              <a:t>’</a:t>
+            </a:r>
+            <a:endParaRPr lang="en-US" sz="1400" i="1" dirty="0">
+              <a:solidFill>
+                <a:schemeClr val="accent5">
+                  <a:lumMod val="60000"/>
+                  <a:lumOff val="40000"/>
+                </a:schemeClr>
+              </a:solidFill>
+            </a:endParaRPr>
+          </a:p>
+        </p:txBody>
+      </p:sp>
+      <p:sp>
+        <p:nvSpPr>
+          <p:cNvPr id="25" name="TextBox 24">
+            <a:extLst>
+              <a:ext uri="{FF2B5EF4-FFF2-40B4-BE49-F238E27FC236}">
+                <a16:creationId xmlns:a16="http://schemas.microsoft.com/office/drawing/2014/main" id="{F02CB472-9F2B-AD55-A9D9-5F0D09B37A7D}"/>
+              </a:ext>
+            </a:extLst>
+          </p:cNvPr>
+          <p:cNvSpPr txBox="1"/>
+          <p:nvPr/>
+        </p:nvSpPr>
+        <p:spPr>
+          <a:xfrm>
+            <a:off x="7125479" y="5848157"/>
+            <a:ext cx="2414524" cy="523220"/>
+          </a:xfrm>
+          <a:prstGeom prst="rect">
+            <a:avLst/>
+          </a:prstGeom>
+          <a:noFill/>
+        </p:spPr>
+        <p:txBody>
+          <a:bodyPr wrap="square" rtlCol="0">
+            <a:spAutoFit/>
+          </a:bodyPr>
+          <a:lstStyle/>
+          <a:p>
+            <a:r>
+              <a:rPr lang="en-US" sz="1400" b="1" dirty="0">
+                <a:solidFill>
+                  <a:srgbClr val="FF0000"/>
+                </a:solidFill>
+              </a:rPr>
+              <a:t>FIXME: Which display options to actually set?</a:t>
+            </a:r>
+          </a:p>
+        </p:txBody>
+      </p:sp>
+      <p:sp>
+        <p:nvSpPr>
+          <p:cNvPr id="28" name="TextBox 27">
+            <a:extLst>
+              <a:ext uri="{FF2B5EF4-FFF2-40B4-BE49-F238E27FC236}">
+                <a16:creationId xmlns:a16="http://schemas.microsoft.com/office/drawing/2014/main" id="{BC651C4B-A90F-5314-DAF0-35F17A571722}"/>
+              </a:ext>
+            </a:extLst>
+          </p:cNvPr>
+          <p:cNvSpPr txBox="1"/>
+          <p:nvPr/>
+        </p:nvSpPr>
+        <p:spPr>
+          <a:xfrm>
+            <a:off x="437061" y="2581270"/>
+            <a:ext cx="6320641" cy="307777"/>
+          </a:xfrm>
+          <a:prstGeom prst="rect">
+            <a:avLst/>
+          </a:prstGeom>
+          <a:noFill/>
+        </p:spPr>
+        <p:txBody>
+          <a:bodyPr wrap="none" rtlCol="0">
+            <a:spAutoFit/>
+          </a:bodyPr>
+          <a:lstStyle/>
+          <a:p>
+            <a:r>
+              <a:rPr lang="en-US" sz="1400" dirty="0" err="1">
+                <a:solidFill>
+                  <a:sysClr val="windowText" lastClr="000000"/>
+                </a:solidFill>
+                <a:latin typeface="American Typewriter" panose="02090604020004020304" pitchFamily="18" charset="77"/>
+              </a:rPr>
+              <a:t>CFG.scipy_method</a:t>
+            </a:r>
+            <a:r>
+              <a:rPr lang="en-US" sz="1400" dirty="0">
+                <a:solidFill>
+                  <a:sysClr val="windowText" lastClr="000000"/>
+                </a:solidFill>
+                <a:latin typeface="American Typewriter" panose="02090604020004020304" pitchFamily="18" charset="77"/>
+              </a:rPr>
+              <a:t>: Literal [‘highs’, ‘high-ds’, ‘highs-</a:t>
+            </a:r>
+            <a:r>
+              <a:rPr lang="en-US" sz="1400" dirty="0" err="1">
+                <a:solidFill>
+                  <a:sysClr val="windowText" lastClr="000000"/>
+                </a:solidFill>
+                <a:latin typeface="American Typewriter" panose="02090604020004020304" pitchFamily="18" charset="77"/>
+              </a:rPr>
+              <a:t>ipm</a:t>
+            </a:r>
+            <a:r>
+              <a:rPr lang="en-US" sz="1400" dirty="0">
+                <a:solidFill>
+                  <a:sysClr val="windowText" lastClr="000000"/>
+                </a:solidFill>
+                <a:latin typeface="American Typewriter" panose="02090604020004020304" pitchFamily="18" charset="77"/>
+              </a:rPr>
+              <a:t>’] | None = None</a:t>
+            </a:r>
+            <a:endParaRPr lang="en-US" sz="1400" i="1" dirty="0">
+              <a:solidFill>
+                <a:schemeClr val="accent5">
+                  <a:lumMod val="60000"/>
+                  <a:lumOff val="40000"/>
+                </a:schemeClr>
+              </a:solidFill>
+            </a:endParaRPr>
+          </a:p>
+        </p:txBody>
+      </p:sp>
+      <p:sp>
+        <p:nvSpPr>
+          <p:cNvPr id="29" name="TextBox 28">
+            <a:extLst>
+              <a:ext uri="{FF2B5EF4-FFF2-40B4-BE49-F238E27FC236}">
+                <a16:creationId xmlns:a16="http://schemas.microsoft.com/office/drawing/2014/main" id="{9BD0E8DC-7D2F-AB12-F208-F31987EAC1C5}"/>
+              </a:ext>
+            </a:extLst>
+          </p:cNvPr>
+          <p:cNvSpPr txBox="1"/>
+          <p:nvPr/>
+        </p:nvSpPr>
+        <p:spPr>
+          <a:xfrm>
+            <a:off x="437061" y="6465444"/>
+            <a:ext cx="1739772" cy="307777"/>
+          </a:xfrm>
+          <a:prstGeom prst="rect">
+            <a:avLst/>
+          </a:prstGeom>
+          <a:noFill/>
+        </p:spPr>
+        <p:txBody>
+          <a:bodyPr wrap="none" rtlCol="0">
+            <a:spAutoFit/>
+          </a:bodyPr>
+          <a:lstStyle/>
+          <a:p>
+            <a:r>
+              <a:rPr lang="en-US" sz="1400" dirty="0" err="1">
+                <a:solidFill>
+                  <a:sysClr val="windowText" lastClr="000000"/>
+                </a:solidFill>
+                <a:latin typeface="American Typewriter" panose="02090604020004020304" pitchFamily="18" charset="77"/>
+              </a:rPr>
+              <a:t>pes.reset_config</a:t>
+            </a:r>
+            <a:r>
+              <a:rPr lang="en-US" sz="1400" dirty="0">
+                <a:solidFill>
+                  <a:sysClr val="windowText" lastClr="000000"/>
+                </a:solidFill>
+                <a:latin typeface="American Typewriter" panose="02090604020004020304" pitchFamily="18" charset="77"/>
+              </a:rPr>
+              <a:t>()</a:t>
+            </a:r>
+            <a:endParaRPr lang="en-US" sz="1400" i="1" dirty="0">
+              <a:solidFill>
+                <a:schemeClr val="bg2">
+                  <a:lumMod val="75000"/>
+                </a:schemeClr>
+              </a:solidFill>
+            </a:endParaRPr>
+          </a:p>
+        </p:txBody>
+      </p:sp>
+      <p:sp>
+        <p:nvSpPr>
+          <p:cNvPr id="30" name="TextBox 29">
+            <a:extLst>
+              <a:ext uri="{FF2B5EF4-FFF2-40B4-BE49-F238E27FC236}">
+                <a16:creationId xmlns:a16="http://schemas.microsoft.com/office/drawing/2014/main" id="{4D0EA09C-E58D-AA61-D359-11A5EB77EC1A}"/>
+              </a:ext>
+            </a:extLst>
+          </p:cNvPr>
+          <p:cNvSpPr txBox="1"/>
+          <p:nvPr/>
+        </p:nvSpPr>
+        <p:spPr>
+          <a:xfrm>
+            <a:off x="437061" y="2884889"/>
+            <a:ext cx="8324779" cy="307777"/>
+          </a:xfrm>
+          <a:prstGeom prst="rect">
+            <a:avLst/>
+          </a:prstGeom>
+          <a:noFill/>
+        </p:spPr>
+        <p:txBody>
+          <a:bodyPr wrap="none" rtlCol="0">
+            <a:spAutoFit/>
+          </a:bodyPr>
+          <a:lstStyle/>
+          <a:p>
+            <a:r>
+              <a:rPr lang="en-US" sz="1400" dirty="0" err="1">
+                <a:solidFill>
+                  <a:sysClr val="windowText" lastClr="000000"/>
+                </a:solidFill>
+                <a:latin typeface="American Typewriter" panose="02090604020004020304" pitchFamily="18" charset="77"/>
+              </a:rPr>
+              <a:t>CFG.cvxpy_solver</a:t>
+            </a:r>
+            <a:r>
+              <a:rPr lang="en-US" sz="1400" dirty="0">
+                <a:solidFill>
+                  <a:sysClr val="windowText" lastClr="000000"/>
+                </a:solidFill>
+                <a:latin typeface="American Typewriter" panose="02090604020004020304" pitchFamily="18" charset="77"/>
+              </a:rPr>
+              <a:t>: Literal [‘CBC’, ‘CLARABEL’, ...] | None = None  </a:t>
+            </a:r>
+            <a:r>
+              <a:rPr lang="en-US" sz="1400" i="1" dirty="0">
+                <a:solidFill>
+                  <a:schemeClr val="bg2">
+                    <a:lumMod val="75000"/>
+                  </a:schemeClr>
+                </a:solidFill>
+                <a:latin typeface="American Typewriter" panose="02090604020004020304" pitchFamily="18" charset="77"/>
+              </a:rPr>
+              <a:t># Raises Error if not installed</a:t>
+            </a:r>
+            <a:endParaRPr lang="en-US" sz="1400" i="1" dirty="0">
+              <a:solidFill>
+                <a:schemeClr val="bg2">
+                  <a:lumMod val="75000"/>
+                </a:schemeClr>
+              </a:solidFill>
+            </a:endParaRPr>
+          </a:p>
+        </p:txBody>
+      </p:sp>
+      <p:sp>
+        <p:nvSpPr>
+          <p:cNvPr id="31" name="TextBox 30">
+            <a:extLst>
+              <a:ext uri="{FF2B5EF4-FFF2-40B4-BE49-F238E27FC236}">
+                <a16:creationId xmlns:a16="http://schemas.microsoft.com/office/drawing/2014/main" id="{8E3EBEBA-D950-E882-6E26-F8A861CE1312}"/>
+              </a:ext>
+            </a:extLst>
+          </p:cNvPr>
+          <p:cNvSpPr txBox="1"/>
+          <p:nvPr/>
+        </p:nvSpPr>
+        <p:spPr>
+          <a:xfrm>
+            <a:off x="437061" y="3188508"/>
+            <a:ext cx="3166251" cy="307777"/>
+          </a:xfrm>
+          <a:prstGeom prst="rect">
+            <a:avLst/>
+          </a:prstGeom>
+          <a:noFill/>
+        </p:spPr>
+        <p:txBody>
+          <a:bodyPr wrap="none" rtlCol="0">
+            <a:spAutoFit/>
+          </a:bodyPr>
+          <a:lstStyle/>
+          <a:p>
+            <a:r>
+              <a:rPr lang="en-US" sz="1400" dirty="0" err="1">
+                <a:solidFill>
+                  <a:sysClr val="windowText" lastClr="000000"/>
+                </a:solidFill>
+                <a:latin typeface="American Typewriter" panose="02090604020004020304" pitchFamily="18" charset="77"/>
+              </a:rPr>
+              <a:t>CFG.optimize_verbose</a:t>
+            </a:r>
+            <a:r>
+              <a:rPr lang="en-US" sz="1400" dirty="0">
+                <a:solidFill>
+                  <a:sysClr val="windowText" lastClr="000000"/>
+                </a:solidFill>
+                <a:latin typeface="American Typewriter" panose="02090604020004020304" pitchFamily="18" charset="77"/>
+              </a:rPr>
+              <a:t>: bool = False</a:t>
+            </a:r>
+            <a:endParaRPr lang="en-US" sz="1400" i="1" dirty="0">
+              <a:solidFill>
+                <a:schemeClr val="bg2">
+                  <a:lumMod val="75000"/>
+                </a:schemeClr>
+              </a:solidFill>
+            </a:endParaRPr>
+          </a:p>
+        </p:txBody>
+      </p:sp>
+      <p:sp>
+        <p:nvSpPr>
+          <p:cNvPr id="32" name="TextBox 31">
+            <a:extLst>
+              <a:ext uri="{FF2B5EF4-FFF2-40B4-BE49-F238E27FC236}">
+                <a16:creationId xmlns:a16="http://schemas.microsoft.com/office/drawing/2014/main" id="{FF6604B1-1DF5-8023-64CF-0C5CEB6F6E8E}"/>
+              </a:ext>
+            </a:extLst>
+          </p:cNvPr>
+          <p:cNvSpPr txBox="1"/>
+          <p:nvPr/>
+        </p:nvSpPr>
+        <p:spPr>
+          <a:xfrm>
+            <a:off x="437061" y="3496285"/>
+            <a:ext cx="6354625" cy="307777"/>
+          </a:xfrm>
+          <a:prstGeom prst="rect">
+            <a:avLst/>
+          </a:prstGeom>
+          <a:noFill/>
+        </p:spPr>
+        <p:txBody>
+          <a:bodyPr wrap="none" rtlCol="0">
+            <a:spAutoFit/>
+          </a:bodyPr>
+          <a:lstStyle/>
+          <a:p>
+            <a:r>
+              <a:rPr lang="en-US" sz="1400" dirty="0" err="1">
+                <a:solidFill>
+                  <a:sysClr val="windowText" lastClr="000000"/>
+                </a:solidFill>
+                <a:latin typeface="American Typewriter" panose="02090604020004020304" pitchFamily="18" charset="77"/>
+              </a:rPr>
+              <a:t>CFG.optimize_succes</a:t>
+            </a:r>
+            <a:r>
+              <a:rPr lang="en-US" sz="1400" dirty="0">
+                <a:solidFill>
+                  <a:sysClr val="windowText" lastClr="000000"/>
+                </a:solidFill>
+                <a:latin typeface="American Typewriter" panose="02090604020004020304" pitchFamily="18" charset="77"/>
+              </a:rPr>
+              <a:t>: Literal[‘optimal’, ‘</a:t>
+            </a:r>
+            <a:r>
+              <a:rPr lang="en-US" sz="1400" dirty="0" err="1">
+                <a:solidFill>
+                  <a:sysClr val="windowText" lastClr="000000"/>
+                </a:solidFill>
+                <a:latin typeface="American Typewriter" panose="02090604020004020304" pitchFamily="18" charset="77"/>
+              </a:rPr>
+              <a:t>optimal_inaccurate</a:t>
+            </a:r>
+            <a:r>
+              <a:rPr lang="en-US" sz="1400" dirty="0">
+                <a:solidFill>
+                  <a:sysClr val="windowText" lastClr="000000"/>
+                </a:solidFill>
+                <a:latin typeface="American Typewriter" panose="02090604020004020304" pitchFamily="18" charset="77"/>
+              </a:rPr>
+              <a:t>’] = ‘optimal’</a:t>
+            </a:r>
+            <a:endParaRPr lang="en-US" sz="1400" i="1" dirty="0">
+              <a:solidFill>
+                <a:schemeClr val="bg2">
+                  <a:lumMod val="75000"/>
+                </a:schemeClr>
+              </a:solidFill>
+            </a:endParaRPr>
+          </a:p>
+        </p:txBody>
+      </p:sp>
+      <p:sp>
+        <p:nvSpPr>
+          <p:cNvPr id="33" name="TextBox 32">
+            <a:extLst>
+              <a:ext uri="{FF2B5EF4-FFF2-40B4-BE49-F238E27FC236}">
+                <a16:creationId xmlns:a16="http://schemas.microsoft.com/office/drawing/2014/main" id="{10A8BB11-5617-E643-C9D6-15B496C75248}"/>
+              </a:ext>
+            </a:extLst>
+          </p:cNvPr>
+          <p:cNvSpPr txBox="1"/>
+          <p:nvPr/>
+        </p:nvSpPr>
+        <p:spPr>
+          <a:xfrm>
+            <a:off x="437060" y="4173749"/>
+            <a:ext cx="9363845" cy="307777"/>
+          </a:xfrm>
+          <a:prstGeom prst="rect">
+            <a:avLst/>
+          </a:prstGeom>
+          <a:noFill/>
+        </p:spPr>
+        <p:txBody>
+          <a:bodyPr wrap="none" rtlCol="0">
+            <a:spAutoFit/>
+          </a:bodyPr>
+          <a:lstStyle/>
+          <a:p>
+            <a:r>
+              <a:rPr lang="en-US" sz="1400" dirty="0" err="1">
+                <a:solidFill>
+                  <a:sysClr val="windowText" lastClr="000000"/>
+                </a:solidFill>
+                <a:latin typeface="American Typewriter" panose="02090604020004020304" pitchFamily="18" charset="77"/>
+              </a:rPr>
+              <a:t>CFG.print_format_poly</a:t>
+            </a:r>
+            <a:r>
+              <a:rPr lang="en-US" sz="1400" dirty="0">
+                <a:solidFill>
+                  <a:sysClr val="windowText" lastClr="000000"/>
+                </a:solidFill>
+                <a:latin typeface="American Typewriter" panose="02090604020004020304" pitchFamily="18" charset="77"/>
+              </a:rPr>
+              <a:t>: str = ‘</a:t>
+            </a:r>
+            <a:r>
+              <a:rPr lang="en-US" sz="1400" dirty="0" err="1">
+                <a:solidFill>
+                  <a:sysClr val="windowText" lastClr="000000"/>
+                </a:solidFill>
+                <a:latin typeface="American Typewriter" panose="02090604020004020304" pitchFamily="18" charset="77"/>
+              </a:rPr>
+              <a:t>desc+auto</a:t>
+            </a:r>
+            <a:r>
+              <a:rPr lang="en-US" sz="1400" dirty="0">
+                <a:solidFill>
+                  <a:sysClr val="windowText" lastClr="000000"/>
+                </a:solidFill>
+                <a:latin typeface="American Typewriter" panose="02090604020004020304" pitchFamily="18" charset="77"/>
+              </a:rPr>
+              <a:t>’  </a:t>
+            </a:r>
+            <a:r>
+              <a:rPr lang="en-US" sz="1400" i="1" dirty="0">
+                <a:solidFill>
+                  <a:schemeClr val="bg2">
+                    <a:lumMod val="75000"/>
+                  </a:schemeClr>
+                </a:solidFill>
+                <a:latin typeface="American Typewriter" panose="02090604020004020304" pitchFamily="18" charset="77"/>
+              </a:rPr>
+              <a:t># ‘desc’ for “Polytope in …”, “auto” for auto H-rep or V-rep printing</a:t>
+            </a:r>
+            <a:endParaRPr lang="en-US" sz="1400" i="1" dirty="0">
+              <a:solidFill>
+                <a:schemeClr val="bg2">
+                  <a:lumMod val="75000"/>
+                </a:schemeClr>
+              </a:solidFill>
+            </a:endParaRPr>
+          </a:p>
+        </p:txBody>
+      </p:sp>
+      <p:sp>
+        <p:nvSpPr>
+          <p:cNvPr id="34" name="TextBox 33">
+            <a:extLst>
+              <a:ext uri="{FF2B5EF4-FFF2-40B4-BE49-F238E27FC236}">
+                <a16:creationId xmlns:a16="http://schemas.microsoft.com/office/drawing/2014/main" id="{37153FB7-AFDC-7D57-C1A5-3109C773CB7E}"/>
+              </a:ext>
+            </a:extLst>
+          </p:cNvPr>
+          <p:cNvSpPr txBox="1"/>
+          <p:nvPr/>
+        </p:nvSpPr>
+        <p:spPr>
+          <a:xfrm>
+            <a:off x="437059" y="4471475"/>
+            <a:ext cx="9831346" cy="307777"/>
+          </a:xfrm>
+          <a:prstGeom prst="rect">
+            <a:avLst/>
+          </a:prstGeom>
+          <a:noFill/>
+        </p:spPr>
+        <p:txBody>
+          <a:bodyPr wrap="none" rtlCol="0">
+            <a:spAutoFit/>
+          </a:bodyPr>
+          <a:lstStyle/>
+          <a:p>
+            <a:r>
+              <a:rPr lang="en-US" sz="1400" dirty="0" err="1">
+                <a:solidFill>
+                  <a:sysClr val="windowText" lastClr="000000"/>
+                </a:solidFill>
+                <a:latin typeface="American Typewriter" panose="02090604020004020304" pitchFamily="18" charset="77"/>
+              </a:rPr>
+              <a:t>CFG.print_format_ellps</a:t>
+            </a:r>
+            <a:r>
+              <a:rPr lang="en-US" sz="1400" dirty="0">
+                <a:solidFill>
+                  <a:sysClr val="windowText" lastClr="000000"/>
+                </a:solidFill>
+                <a:latin typeface="American Typewriter" panose="02090604020004020304" pitchFamily="18" charset="77"/>
+              </a:rPr>
+              <a:t>: str = ‘</a:t>
+            </a:r>
+            <a:r>
+              <a:rPr lang="en-US" sz="1400" dirty="0" err="1">
+                <a:solidFill>
+                  <a:sysClr val="windowText" lastClr="000000"/>
+                </a:solidFill>
+                <a:latin typeface="American Typewriter" panose="02090604020004020304" pitchFamily="18" charset="77"/>
+              </a:rPr>
+              <a:t>desc+cQ</a:t>
+            </a:r>
+            <a:r>
+              <a:rPr lang="en-US" sz="1400" dirty="0">
+                <a:solidFill>
+                  <a:sysClr val="windowText" lastClr="000000"/>
+                </a:solidFill>
+                <a:latin typeface="American Typewriter" panose="02090604020004020304" pitchFamily="18" charset="77"/>
+              </a:rPr>
+              <a:t>’  </a:t>
+            </a:r>
+            <a:r>
+              <a:rPr lang="en-US" sz="1400" i="1" dirty="0">
+                <a:solidFill>
+                  <a:schemeClr val="bg2">
+                    <a:lumMod val="75000"/>
+                  </a:schemeClr>
+                </a:solidFill>
+                <a:latin typeface="American Typewriter" panose="02090604020004020304" pitchFamily="18" charset="77"/>
+              </a:rPr>
+              <a:t># ‘desc’ for “Ellipsoid in …”, “</a:t>
+            </a:r>
+            <a:r>
+              <a:rPr lang="en-US" sz="1400" i="1" dirty="0" err="1">
+                <a:solidFill>
+                  <a:schemeClr val="bg2">
+                    <a:lumMod val="75000"/>
+                  </a:schemeClr>
+                </a:solidFill>
+                <a:latin typeface="American Typewriter" panose="02090604020004020304" pitchFamily="18" charset="77"/>
+              </a:rPr>
+              <a:t>cQ</a:t>
+            </a:r>
+            <a:r>
+              <a:rPr lang="en-US" sz="1400" i="1" dirty="0">
+                <a:solidFill>
+                  <a:schemeClr val="bg2">
+                    <a:lumMod val="75000"/>
+                  </a:schemeClr>
+                </a:solidFill>
+                <a:latin typeface="American Typewriter" panose="02090604020004020304" pitchFamily="18" charset="77"/>
+              </a:rPr>
+              <a:t>” for center plus Q (could also be R + radii)</a:t>
+            </a:r>
+            <a:endParaRPr lang="en-US" sz="1400" i="1" dirty="0">
+              <a:solidFill>
+                <a:schemeClr val="bg2">
+                  <a:lumMod val="75000"/>
+                </a:schemeClr>
+              </a:solidFill>
+            </a:endParaRPr>
+          </a:p>
+        </p:txBody>
+      </p:sp>
+      <p:sp>
+        <p:nvSpPr>
+          <p:cNvPr id="35" name="TextBox 34">
+            <a:extLst>
+              <a:ext uri="{FF2B5EF4-FFF2-40B4-BE49-F238E27FC236}">
+                <a16:creationId xmlns:a16="http://schemas.microsoft.com/office/drawing/2014/main" id="{82E3DFF7-443E-F579-07CA-DAD231AB366A}"/>
+              </a:ext>
+            </a:extLst>
+          </p:cNvPr>
+          <p:cNvSpPr txBox="1"/>
+          <p:nvPr/>
+        </p:nvSpPr>
+        <p:spPr>
+          <a:xfrm>
+            <a:off x="437059" y="4765042"/>
+            <a:ext cx="7628820" cy="307777"/>
+          </a:xfrm>
+          <a:prstGeom prst="rect">
+            <a:avLst/>
+          </a:prstGeom>
+          <a:noFill/>
+        </p:spPr>
+        <p:txBody>
+          <a:bodyPr wrap="none" rtlCol="0">
+            <a:spAutoFit/>
+          </a:bodyPr>
+          <a:lstStyle/>
+          <a:p>
+            <a:r>
+              <a:rPr lang="en-US" sz="1400" dirty="0" err="1">
+                <a:solidFill>
+                  <a:sysClr val="windowText" lastClr="000000"/>
+                </a:solidFill>
+                <a:latin typeface="American Typewriter" panose="02090604020004020304" pitchFamily="18" charset="77"/>
+              </a:rPr>
+              <a:t>CFG.print_format_subs</a:t>
+            </a:r>
+            <a:r>
+              <a:rPr lang="en-US" sz="1400" dirty="0">
+                <a:solidFill>
+                  <a:sysClr val="windowText" lastClr="000000"/>
+                </a:solidFill>
+                <a:latin typeface="American Typewriter" panose="02090604020004020304" pitchFamily="18" charset="77"/>
+              </a:rPr>
+              <a:t>: str = ‘</a:t>
+            </a:r>
+            <a:r>
+              <a:rPr lang="en-US" sz="1400" dirty="0" err="1">
+                <a:solidFill>
+                  <a:sysClr val="windowText" lastClr="000000"/>
+                </a:solidFill>
+                <a:latin typeface="American Typewriter" panose="02090604020004020304" pitchFamily="18" charset="77"/>
+              </a:rPr>
+              <a:t>desc+basis</a:t>
+            </a:r>
+            <a:r>
+              <a:rPr lang="en-US" sz="1400" dirty="0">
+                <a:solidFill>
+                  <a:sysClr val="windowText" lastClr="000000"/>
+                </a:solidFill>
+                <a:latin typeface="American Typewriter" panose="02090604020004020304" pitchFamily="18" charset="77"/>
+              </a:rPr>
+              <a:t>’  </a:t>
+            </a:r>
+            <a:r>
+              <a:rPr lang="en-US" sz="1400" i="1" dirty="0">
+                <a:solidFill>
+                  <a:schemeClr val="bg2">
+                    <a:lumMod val="75000"/>
+                  </a:schemeClr>
+                </a:solidFill>
+                <a:latin typeface="American Typewriter" panose="02090604020004020304" pitchFamily="18" charset="77"/>
+              </a:rPr>
+              <a:t># ‘desc’ for “Subspace in …”, “basis” for basis</a:t>
+            </a:r>
+            <a:endParaRPr lang="en-US" sz="1400" i="1" dirty="0">
+              <a:solidFill>
+                <a:schemeClr val="bg2">
+                  <a:lumMod val="75000"/>
+                </a:schemeClr>
+              </a:solidFill>
+            </a:endParaRPr>
+          </a:p>
+        </p:txBody>
+      </p:sp>
+      <p:sp>
+        <p:nvSpPr>
+          <p:cNvPr id="36" name="TextBox 35">
+            <a:extLst>
+              <a:ext uri="{FF2B5EF4-FFF2-40B4-BE49-F238E27FC236}">
+                <a16:creationId xmlns:a16="http://schemas.microsoft.com/office/drawing/2014/main" id="{BCFD76E4-0031-B479-4081-34D14EF9D30C}"/>
+              </a:ext>
+            </a:extLst>
+          </p:cNvPr>
+          <p:cNvSpPr txBox="1"/>
+          <p:nvPr/>
+        </p:nvSpPr>
+        <p:spPr>
+          <a:xfrm>
+            <a:off x="437059" y="5062768"/>
+            <a:ext cx="7628820" cy="307777"/>
+          </a:xfrm>
+          <a:prstGeom prst="rect">
+            <a:avLst/>
+          </a:prstGeom>
+          <a:noFill/>
+        </p:spPr>
+        <p:txBody>
+          <a:bodyPr wrap="none" rtlCol="0">
+            <a:spAutoFit/>
+          </a:bodyPr>
+          <a:lstStyle/>
+          <a:p>
+            <a:r>
+              <a:rPr lang="en-US" sz="1400" dirty="0" err="1">
+                <a:solidFill>
+                  <a:sysClr val="windowText" lastClr="000000"/>
+                </a:solidFill>
+                <a:latin typeface="American Typewriter" panose="02090604020004020304" pitchFamily="18" charset="77"/>
+              </a:rPr>
+              <a:t>CFG.print_format_subs</a:t>
+            </a:r>
+            <a:r>
+              <a:rPr lang="en-US" sz="1400" dirty="0">
+                <a:solidFill>
+                  <a:sysClr val="windowText" lastClr="000000"/>
+                </a:solidFill>
+                <a:latin typeface="American Typewriter" panose="02090604020004020304" pitchFamily="18" charset="77"/>
+              </a:rPr>
+              <a:t>: str = ‘</a:t>
+            </a:r>
+            <a:r>
+              <a:rPr lang="en-US" sz="1400" dirty="0" err="1">
+                <a:solidFill>
+                  <a:sysClr val="windowText" lastClr="000000"/>
+                </a:solidFill>
+                <a:latin typeface="American Typewriter" panose="02090604020004020304" pitchFamily="18" charset="77"/>
+              </a:rPr>
+              <a:t>desc+basis</a:t>
+            </a:r>
+            <a:r>
+              <a:rPr lang="en-US" sz="1400" dirty="0">
+                <a:solidFill>
+                  <a:sysClr val="windowText" lastClr="000000"/>
+                </a:solidFill>
+                <a:latin typeface="American Typewriter" panose="02090604020004020304" pitchFamily="18" charset="77"/>
+              </a:rPr>
+              <a:t>’  </a:t>
+            </a:r>
+            <a:r>
+              <a:rPr lang="en-US" sz="1400" i="1" dirty="0">
+                <a:solidFill>
+                  <a:schemeClr val="bg2">
+                    <a:lumMod val="75000"/>
+                  </a:schemeClr>
+                </a:solidFill>
+                <a:latin typeface="American Typewriter" panose="02090604020004020304" pitchFamily="18" charset="77"/>
+              </a:rPr>
+              <a:t># ‘desc’ for “Subspace in …”, “basis” for basis</a:t>
+            </a:r>
+            <a:endParaRPr lang="en-US" sz="1400" i="1" dirty="0">
+              <a:solidFill>
+                <a:schemeClr val="bg2">
+                  <a:lumMod val="75000"/>
+                </a:schemeClr>
+              </a:solidFill>
+            </a:endParaRPr>
+          </a:p>
+        </p:txBody>
+      </p:sp>
+    </p:spTree>
+    <p:extLst>
+      <p:ext uri="{BB962C8B-B14F-4D97-AF65-F5344CB8AC3E}">
+        <p14:creationId xmlns:p14="http://schemas.microsoft.com/office/powerpoint/2010/main" val="3278522806"/>
       </p:ext>
     </p:extLst>
   </p:cSld>

</xml_diff>

<commit_message>
Updated the presentation with several archetype and generator test cases; also added the file conftest.py
</commit_message>
<xml_diff>
--- a/presentation.pptx
+++ b/presentation.pptx
@@ -24,6 +24,8 @@
     <p:sldId id="272" r:id="rId18"/>
     <p:sldId id="273" r:id="rId19"/>
     <p:sldId id="274" r:id="rId20"/>
+    <p:sldId id="275" r:id="rId21"/>
+    <p:sldId id="276" r:id="rId22"/>
   </p:sldIdLst>
   <p:sldSz cx="12192000" cy="6858000"/>
   <p:notesSz cx="6858000" cy="9144000"/>
@@ -133,7 +135,7 @@
 <file path=ppt/revisionInfo.xml><?xml version="1.0" encoding="utf-8"?>
 <p1510:revInfo xmlns:a="http://schemas.openxmlformats.org/drawingml/2006/main" xmlns:r="http://schemas.openxmlformats.org/officeDocument/2006/relationships" xmlns:p1510="http://schemas.microsoft.com/office/powerpoint/2015/10/main">
   <p1510:revLst>
-    <p1510:client id="{92BFB444-7DBC-CA44-A6DD-A4B3F7DBDADB}" v="332" dt="2026-02-04T17:33:10.334"/>
+    <p1510:client id="{92BFB444-7DBC-CA44-A6DD-A4B3F7DBDADB}" v="356" dt="2026-02-05T16:04:19.765"/>
   </p1510:revLst>
 </p1510:revInfo>
 </file>
@@ -143,7 +145,7 @@
   <pc:docChgLst>
     <pc:chgData name="Bart Wolleswinkel" userId="b168cadc-1825-41ce-b9cc-7c7f06f6f31d" providerId="ADAL" clId="{22248CC1-9068-5BCB-B15B-4353FE48F57D}"/>
     <pc:docChg chg="undo redo custSel addSld modSld sldOrd">
-      <pc:chgData name="Bart Wolleswinkel" userId="b168cadc-1825-41ce-b9cc-7c7f06f6f31d" providerId="ADAL" clId="{22248CC1-9068-5BCB-B15B-4353FE48F57D}" dt="2026-02-04T17:33:17.262" v="3736" actId="1076"/>
+      <pc:chgData name="Bart Wolleswinkel" userId="b168cadc-1825-41ce-b9cc-7c7f06f6f31d" providerId="ADAL" clId="{22248CC1-9068-5BCB-B15B-4353FE48F57D}" dt="2026-02-05T16:05:05.072" v="4977" actId="1076"/>
       <pc:docMkLst>
         <pc:docMk/>
       </pc:docMkLst>
@@ -1597,8 +1599,8 @@
           </ac:spMkLst>
         </pc:spChg>
       </pc:sldChg>
-      <pc:sldChg chg="addSp delSp modSp add mod">
-        <pc:chgData name="Bart Wolleswinkel" userId="b168cadc-1825-41ce-b9cc-7c7f06f6f31d" providerId="ADAL" clId="{22248CC1-9068-5BCB-B15B-4353FE48F57D}" dt="2026-02-04T17:33:17.262" v="3736" actId="1076"/>
+      <pc:sldChg chg="addSp delSp modSp add mod ord">
+        <pc:chgData name="Bart Wolleswinkel" userId="b168cadc-1825-41ce-b9cc-7c7f06f6f31d" providerId="ADAL" clId="{22248CC1-9068-5BCB-B15B-4353FE48F57D}" dt="2026-02-04T19:53:35.606" v="3738" actId="20578"/>
         <pc:sldMkLst>
           <pc:docMk/>
           <pc:sldMk cId="3278522806" sldId="274"/>
@@ -1889,6 +1891,188 @@
             <pc:docMk/>
             <pc:sldMk cId="3278522806" sldId="274"/>
             <ac:spMk id="47" creationId="{A9905D23-2C23-66BE-2505-B4C6B6EC6F49}"/>
+          </ac:spMkLst>
+        </pc:spChg>
+      </pc:sldChg>
+      <pc:sldChg chg="addSp delSp modSp add mod">
+        <pc:chgData name="Bart Wolleswinkel" userId="b168cadc-1825-41ce-b9cc-7c7f06f6f31d" providerId="ADAL" clId="{22248CC1-9068-5BCB-B15B-4353FE48F57D}" dt="2026-02-05T16:03:37.881" v="4923" actId="20577"/>
+        <pc:sldMkLst>
+          <pc:docMk/>
+          <pc:sldMk cId="1723360047" sldId="275"/>
+        </pc:sldMkLst>
+        <pc:spChg chg="mod">
+          <ac:chgData name="Bart Wolleswinkel" userId="b168cadc-1825-41ce-b9cc-7c7f06f6f31d" providerId="ADAL" clId="{22248CC1-9068-5BCB-B15B-4353FE48F57D}" dt="2026-02-04T19:53:42.014" v="3759" actId="20577"/>
+          <ac:spMkLst>
+            <pc:docMk/>
+            <pc:sldMk cId="1723360047" sldId="275"/>
+            <ac:spMk id="4" creationId="{646E6BB9-DCEE-E1C5-B31A-07525E1D4FC2}"/>
+          </ac:spMkLst>
+        </pc:spChg>
+        <pc:spChg chg="add mod">
+          <ac:chgData name="Bart Wolleswinkel" userId="b168cadc-1825-41ce-b9cc-7c7f06f6f31d" providerId="ADAL" clId="{22248CC1-9068-5BCB-B15B-4353FE48F57D}" dt="2026-02-05T16:03:37.881" v="4923" actId="20577"/>
+          <ac:spMkLst>
+            <pc:docMk/>
+            <pc:sldMk cId="1723360047" sldId="275"/>
+            <ac:spMk id="5" creationId="{7A3702CD-77F5-DA62-B831-B2BF98365A29}"/>
+          </ac:spMkLst>
+        </pc:spChg>
+        <pc:spChg chg="add del mod">
+          <ac:chgData name="Bart Wolleswinkel" userId="b168cadc-1825-41ce-b9cc-7c7f06f6f31d" providerId="ADAL" clId="{22248CC1-9068-5BCB-B15B-4353FE48F57D}" dt="2026-02-05T16:02:48.537" v="4881" actId="478"/>
+          <ac:spMkLst>
+            <pc:docMk/>
+            <pc:sldMk cId="1723360047" sldId="275"/>
+            <ac:spMk id="6" creationId="{0D0EE6DB-9631-4E68-81DE-BE7807E9B9D3}"/>
+          </ac:spMkLst>
+        </pc:spChg>
+        <pc:spChg chg="add">
+          <ac:chgData name="Bart Wolleswinkel" userId="b168cadc-1825-41ce-b9cc-7c7f06f6f31d" providerId="ADAL" clId="{22248CC1-9068-5BCB-B15B-4353FE48F57D}" dt="2026-02-05T15:44:35.989" v="4004"/>
+          <ac:spMkLst>
+            <pc:docMk/>
+            <pc:sldMk cId="1723360047" sldId="275"/>
+            <ac:spMk id="7" creationId="{BE6D3065-ADD3-9EAE-3EB9-47BEBA5F9C80}"/>
+          </ac:spMkLst>
+        </pc:spChg>
+        <pc:spChg chg="add mod">
+          <ac:chgData name="Bart Wolleswinkel" userId="b168cadc-1825-41ce-b9cc-7c7f06f6f31d" providerId="ADAL" clId="{22248CC1-9068-5BCB-B15B-4353FE48F57D}" dt="2026-02-05T15:44:37.506" v="4006"/>
+          <ac:spMkLst>
+            <pc:docMk/>
+            <pc:sldMk cId="1723360047" sldId="275"/>
+            <ac:spMk id="8" creationId="{928E3FE0-FB67-F5CA-36E7-7D08FDBC2981}"/>
+          </ac:spMkLst>
+        </pc:spChg>
+        <pc:spChg chg="del">
+          <ac:chgData name="Bart Wolleswinkel" userId="b168cadc-1825-41ce-b9cc-7c7f06f6f31d" providerId="ADAL" clId="{22248CC1-9068-5BCB-B15B-4353FE48F57D}" dt="2026-02-05T15:23:10.547" v="3760" actId="478"/>
+          <ac:spMkLst>
+            <pc:docMk/>
+            <pc:sldMk cId="1723360047" sldId="275"/>
+            <ac:spMk id="9" creationId="{8B79C93F-AD46-7105-DE30-B341F23E8C1C}"/>
+          </ac:spMkLst>
+        </pc:spChg>
+        <pc:spChg chg="add mod">
+          <ac:chgData name="Bart Wolleswinkel" userId="b168cadc-1825-41ce-b9cc-7c7f06f6f31d" providerId="ADAL" clId="{22248CC1-9068-5BCB-B15B-4353FE48F57D}" dt="2026-02-05T15:44:41.987" v="4009" actId="767"/>
+          <ac:spMkLst>
+            <pc:docMk/>
+            <pc:sldMk cId="1723360047" sldId="275"/>
+            <ac:spMk id="10" creationId="{40545389-AC5F-9A38-75C4-FC31F15092B9}"/>
+          </ac:spMkLst>
+        </pc:spChg>
+        <pc:spChg chg="add">
+          <ac:chgData name="Bart Wolleswinkel" userId="b168cadc-1825-41ce-b9cc-7c7f06f6f31d" providerId="ADAL" clId="{22248CC1-9068-5BCB-B15B-4353FE48F57D}" dt="2026-02-05T15:44:40.121" v="4008"/>
+          <ac:spMkLst>
+            <pc:docMk/>
+            <pc:sldMk cId="1723360047" sldId="275"/>
+            <ac:spMk id="11" creationId="{C6307932-FEEF-9F50-C999-01A28E8376AE}"/>
+          </ac:spMkLst>
+        </pc:spChg>
+        <pc:spChg chg="add">
+          <ac:chgData name="Bart Wolleswinkel" userId="b168cadc-1825-41ce-b9cc-7c7f06f6f31d" providerId="ADAL" clId="{22248CC1-9068-5BCB-B15B-4353FE48F57D}" dt="2026-02-05T15:45:58.191" v="4034"/>
+          <ac:spMkLst>
+            <pc:docMk/>
+            <pc:sldMk cId="1723360047" sldId="275"/>
+            <ac:spMk id="14" creationId="{795B13CE-A01E-A116-37C8-9C9DC694B21D}"/>
+          </ac:spMkLst>
+        </pc:spChg>
+        <pc:spChg chg="del">
+          <ac:chgData name="Bart Wolleswinkel" userId="b168cadc-1825-41ce-b9cc-7c7f06f6f31d" providerId="ADAL" clId="{22248CC1-9068-5BCB-B15B-4353FE48F57D}" dt="2026-02-05T15:23:10.547" v="3760" actId="478"/>
+          <ac:spMkLst>
+            <pc:docMk/>
+            <pc:sldMk cId="1723360047" sldId="275"/>
+            <ac:spMk id="22" creationId="{622FBB6E-DB3E-E13E-CE24-EC7466055E4D}"/>
+          </ac:spMkLst>
+        </pc:spChg>
+        <pc:spChg chg="del">
+          <ac:chgData name="Bart Wolleswinkel" userId="b168cadc-1825-41ce-b9cc-7c7f06f6f31d" providerId="ADAL" clId="{22248CC1-9068-5BCB-B15B-4353FE48F57D}" dt="2026-02-05T15:23:10.547" v="3760" actId="478"/>
+          <ac:spMkLst>
+            <pc:docMk/>
+            <pc:sldMk cId="1723360047" sldId="275"/>
+            <ac:spMk id="23" creationId="{FF1FBE20-9DFF-0C70-29EE-D8F447770A6F}"/>
+          </ac:spMkLst>
+        </pc:spChg>
+        <pc:spChg chg="del">
+          <ac:chgData name="Bart Wolleswinkel" userId="b168cadc-1825-41ce-b9cc-7c7f06f6f31d" providerId="ADAL" clId="{22248CC1-9068-5BCB-B15B-4353FE48F57D}" dt="2026-02-05T15:23:10.547" v="3760" actId="478"/>
+          <ac:spMkLst>
+            <pc:docMk/>
+            <pc:sldMk cId="1723360047" sldId="275"/>
+            <ac:spMk id="27" creationId="{F4299E87-DD61-9350-7CC7-52447E462957}"/>
+          </ac:spMkLst>
+        </pc:spChg>
+        <pc:spChg chg="del">
+          <ac:chgData name="Bart Wolleswinkel" userId="b168cadc-1825-41ce-b9cc-7c7f06f6f31d" providerId="ADAL" clId="{22248CC1-9068-5BCB-B15B-4353FE48F57D}" dt="2026-02-05T15:23:10.547" v="3760" actId="478"/>
+          <ac:spMkLst>
+            <pc:docMk/>
+            <pc:sldMk cId="1723360047" sldId="275"/>
+            <ac:spMk id="32" creationId="{6153B7D3-E420-1F02-7199-2DA543095125}"/>
+          </ac:spMkLst>
+        </pc:spChg>
+        <pc:spChg chg="del">
+          <ac:chgData name="Bart Wolleswinkel" userId="b168cadc-1825-41ce-b9cc-7c7f06f6f31d" providerId="ADAL" clId="{22248CC1-9068-5BCB-B15B-4353FE48F57D}" dt="2026-02-05T15:23:10.547" v="3760" actId="478"/>
+          <ac:spMkLst>
+            <pc:docMk/>
+            <pc:sldMk cId="1723360047" sldId="275"/>
+            <ac:spMk id="36" creationId="{051BC489-F81A-0372-1479-F0484E4142AA}"/>
+          </ac:spMkLst>
+        </pc:spChg>
+        <pc:spChg chg="del">
+          <ac:chgData name="Bart Wolleswinkel" userId="b168cadc-1825-41ce-b9cc-7c7f06f6f31d" providerId="ADAL" clId="{22248CC1-9068-5BCB-B15B-4353FE48F57D}" dt="2026-02-05T15:23:10.547" v="3760" actId="478"/>
+          <ac:spMkLst>
+            <pc:docMk/>
+            <pc:sldMk cId="1723360047" sldId="275"/>
+            <ac:spMk id="48" creationId="{7759F4AF-7ED6-D71E-4630-9BE362F23C93}"/>
+          </ac:spMkLst>
+        </pc:spChg>
+        <pc:spChg chg="del">
+          <ac:chgData name="Bart Wolleswinkel" userId="b168cadc-1825-41ce-b9cc-7c7f06f6f31d" providerId="ADAL" clId="{22248CC1-9068-5BCB-B15B-4353FE48F57D}" dt="2026-02-05T15:23:10.547" v="3760" actId="478"/>
+          <ac:spMkLst>
+            <pc:docMk/>
+            <pc:sldMk cId="1723360047" sldId="275"/>
+            <ac:spMk id="50" creationId="{11A43BFD-5B45-B756-2DC1-4EF7F531B05E}"/>
+          </ac:spMkLst>
+        </pc:spChg>
+        <pc:spChg chg="del">
+          <ac:chgData name="Bart Wolleswinkel" userId="b168cadc-1825-41ce-b9cc-7c7f06f6f31d" providerId="ADAL" clId="{22248CC1-9068-5BCB-B15B-4353FE48F57D}" dt="2026-02-05T15:23:10.547" v="3760" actId="478"/>
+          <ac:spMkLst>
+            <pc:docMk/>
+            <pc:sldMk cId="1723360047" sldId="275"/>
+            <ac:spMk id="58" creationId="{ABFDE76B-4FA9-5C06-90C6-E843D887B281}"/>
+          </ac:spMkLst>
+        </pc:spChg>
+        <pc:spChg chg="del">
+          <ac:chgData name="Bart Wolleswinkel" userId="b168cadc-1825-41ce-b9cc-7c7f06f6f31d" providerId="ADAL" clId="{22248CC1-9068-5BCB-B15B-4353FE48F57D}" dt="2026-02-05T15:23:10.547" v="3760" actId="478"/>
+          <ac:spMkLst>
+            <pc:docMk/>
+            <pc:sldMk cId="1723360047" sldId="275"/>
+            <ac:spMk id="64" creationId="{EF9553D9-C737-F9F0-2862-E0C3A30F23BC}"/>
+          </ac:spMkLst>
+        </pc:spChg>
+      </pc:sldChg>
+      <pc:sldChg chg="addSp modSp add mod">
+        <pc:chgData name="Bart Wolleswinkel" userId="b168cadc-1825-41ce-b9cc-7c7f06f6f31d" providerId="ADAL" clId="{22248CC1-9068-5BCB-B15B-4353FE48F57D}" dt="2026-02-05T16:05:05.072" v="4977" actId="1076"/>
+        <pc:sldMkLst>
+          <pc:docMk/>
+          <pc:sldMk cId="1197219407" sldId="276"/>
+        </pc:sldMkLst>
+        <pc:spChg chg="add mod">
+          <ac:chgData name="Bart Wolleswinkel" userId="b168cadc-1825-41ce-b9cc-7c7f06f6f31d" providerId="ADAL" clId="{22248CC1-9068-5BCB-B15B-4353FE48F57D}" dt="2026-02-05T16:05:05.072" v="4977" actId="1076"/>
+          <ac:spMkLst>
+            <pc:docMk/>
+            <pc:sldMk cId="1197219407" sldId="276"/>
+            <ac:spMk id="2" creationId="{836DDBC9-B3B2-6A1B-5F71-5ED82D0FD791}"/>
+          </ac:spMkLst>
+        </pc:spChg>
+        <pc:spChg chg="mod">
+          <ac:chgData name="Bart Wolleswinkel" userId="b168cadc-1825-41ce-b9cc-7c7f06f6f31d" providerId="ADAL" clId="{22248CC1-9068-5BCB-B15B-4353FE48F57D}" dt="2026-02-05T15:57:50.430" v="4776" actId="20577"/>
+          <ac:spMkLst>
+            <pc:docMk/>
+            <pc:sldMk cId="1197219407" sldId="276"/>
+            <ac:spMk id="5" creationId="{6635E2B7-F193-39A8-1EA5-FBC92B6E25E7}"/>
+          </ac:spMkLst>
+        </pc:spChg>
+        <pc:spChg chg="mod">
+          <ac:chgData name="Bart Wolleswinkel" userId="b168cadc-1825-41ce-b9cc-7c7f06f6f31d" providerId="ADAL" clId="{22248CC1-9068-5BCB-B15B-4353FE48F57D}" dt="2026-02-05T16:05:05.072" v="4977" actId="1076"/>
+          <ac:spMkLst>
+            <pc:docMk/>
+            <pc:sldMk cId="1197219407" sldId="276"/>
+            <ac:spMk id="6" creationId="{2574CA64-EE70-7E50-0875-2C2123059D26}"/>
           </ac:spMkLst>
         </pc:spChg>
       </pc:sldChg>
@@ -2046,7 +2230,7 @@
           <a:p>
             <a:fld id="{FB8718F5-1E4A-7D42-8173-5979EE6FBC1A}" type="datetimeFigureOut">
               <a:rPr lang="en-US" smtClean="0"/>
-              <a:t>2/4/26</a:t>
+              <a:t>2/5/26</a:t>
             </a:fld>
             <a:endParaRPr lang="en-US"/>
           </a:p>
@@ -2246,7 +2430,7 @@
           <a:p>
             <a:fld id="{FB8718F5-1E4A-7D42-8173-5979EE6FBC1A}" type="datetimeFigureOut">
               <a:rPr lang="en-US" smtClean="0"/>
-              <a:t>2/4/26</a:t>
+              <a:t>2/5/26</a:t>
             </a:fld>
             <a:endParaRPr lang="en-US"/>
           </a:p>
@@ -2456,7 +2640,7 @@
           <a:p>
             <a:fld id="{FB8718F5-1E4A-7D42-8173-5979EE6FBC1A}" type="datetimeFigureOut">
               <a:rPr lang="en-US" smtClean="0"/>
-              <a:t>2/4/26</a:t>
+              <a:t>2/5/26</a:t>
             </a:fld>
             <a:endParaRPr lang="en-US"/>
           </a:p>
@@ -2656,7 +2840,7 @@
           <a:p>
             <a:fld id="{FB8718F5-1E4A-7D42-8173-5979EE6FBC1A}" type="datetimeFigureOut">
               <a:rPr lang="en-US" smtClean="0"/>
-              <a:t>2/4/26</a:t>
+              <a:t>2/5/26</a:t>
             </a:fld>
             <a:endParaRPr lang="en-US"/>
           </a:p>
@@ -2932,7 +3116,7 @@
           <a:p>
             <a:fld id="{FB8718F5-1E4A-7D42-8173-5979EE6FBC1A}" type="datetimeFigureOut">
               <a:rPr lang="en-US" smtClean="0"/>
-              <a:t>2/4/26</a:t>
+              <a:t>2/5/26</a:t>
             </a:fld>
             <a:endParaRPr lang="en-US"/>
           </a:p>
@@ -3200,7 +3384,7 @@
           <a:p>
             <a:fld id="{FB8718F5-1E4A-7D42-8173-5979EE6FBC1A}" type="datetimeFigureOut">
               <a:rPr lang="en-US" smtClean="0"/>
-              <a:t>2/4/26</a:t>
+              <a:t>2/5/26</a:t>
             </a:fld>
             <a:endParaRPr lang="en-US"/>
           </a:p>
@@ -3615,7 +3799,7 @@
           <a:p>
             <a:fld id="{FB8718F5-1E4A-7D42-8173-5979EE6FBC1A}" type="datetimeFigureOut">
               <a:rPr lang="en-US" smtClean="0"/>
-              <a:t>2/4/26</a:t>
+              <a:t>2/5/26</a:t>
             </a:fld>
             <a:endParaRPr lang="en-US"/>
           </a:p>
@@ -3757,7 +3941,7 @@
           <a:p>
             <a:fld id="{FB8718F5-1E4A-7D42-8173-5979EE6FBC1A}" type="datetimeFigureOut">
               <a:rPr lang="en-US" smtClean="0"/>
-              <a:t>2/4/26</a:t>
+              <a:t>2/5/26</a:t>
             </a:fld>
             <a:endParaRPr lang="en-US"/>
           </a:p>
@@ -3870,7 +4054,7 @@
           <a:p>
             <a:fld id="{FB8718F5-1E4A-7D42-8173-5979EE6FBC1A}" type="datetimeFigureOut">
               <a:rPr lang="en-US" smtClean="0"/>
-              <a:t>2/4/26</a:t>
+              <a:t>2/5/26</a:t>
             </a:fld>
             <a:endParaRPr lang="en-US"/>
           </a:p>
@@ -4183,7 +4367,7 @@
           <a:p>
             <a:fld id="{FB8718F5-1E4A-7D42-8173-5979EE6FBC1A}" type="datetimeFigureOut">
               <a:rPr lang="en-US" smtClean="0"/>
-              <a:t>2/4/26</a:t>
+              <a:t>2/5/26</a:t>
             </a:fld>
             <a:endParaRPr lang="en-US"/>
           </a:p>
@@ -4472,7 +4656,7 @@
           <a:p>
             <a:fld id="{FB8718F5-1E4A-7D42-8173-5979EE6FBC1A}" type="datetimeFigureOut">
               <a:rPr lang="en-US" smtClean="0"/>
-              <a:t>2/4/26</a:t>
+              <a:t>2/5/26</a:t>
             </a:fld>
             <a:endParaRPr lang="en-US"/>
           </a:p>
@@ -4715,7 +4899,7 @@
           <a:p>
             <a:fld id="{FB8718F5-1E4A-7D42-8173-5979EE6FBC1A}" type="datetimeFigureOut">
               <a:rPr lang="en-US" smtClean="0"/>
-              <a:t>2/4/26</a:t>
+              <a:t>2/5/26</a:t>
             </a:fld>
             <a:endParaRPr lang="en-US"/>
           </a:p>
@@ -17596,6 +17780,761 @@
     <p:extLst>
       <p:ext uri="{BB962C8B-B14F-4D97-AF65-F5344CB8AC3E}">
         <p14:creationId xmlns:p14="http://schemas.microsoft.com/office/powerpoint/2010/main" val="4048731806"/>
+      </p:ext>
+    </p:extLst>
+  </p:cSld>
+  <p:clrMapOvr>
+    <a:masterClrMapping/>
+  </p:clrMapOvr>
+</p:sld>
+</file>
+
+<file path=ppt/slides/slide20.xml><?xml version="1.0" encoding="utf-8"?>
+<p:sld xmlns:a="http://schemas.openxmlformats.org/drawingml/2006/main" xmlns:r="http://schemas.openxmlformats.org/officeDocument/2006/relationships" xmlns:p="http://schemas.openxmlformats.org/presentationml/2006/main">
+  <p:cSld>
+    <p:spTree>
+      <p:nvGrpSpPr>
+        <p:cNvPr id="1" name="">
+          <a:extLst>
+            <a:ext uri="{FF2B5EF4-FFF2-40B4-BE49-F238E27FC236}">
+              <a16:creationId xmlns:a16="http://schemas.microsoft.com/office/drawing/2014/main" id="{E9457417-5AC9-011C-E3C3-EBE560869D8C}"/>
+            </a:ext>
+          </a:extLst>
+        </p:cNvPr>
+        <p:cNvGrpSpPr/>
+        <p:nvPr/>
+      </p:nvGrpSpPr>
+      <p:grpSpPr>
+        <a:xfrm>
+          <a:off x="0" y="0"/>
+          <a:ext cx="0" cy="0"/>
+          <a:chOff x="0" y="0"/>
+          <a:chExt cx="0" cy="0"/>
+        </a:xfrm>
+      </p:grpSpPr>
+      <p:sp>
+        <p:nvSpPr>
+          <p:cNvPr id="4" name="Title 3">
+            <a:extLst>
+              <a:ext uri="{FF2B5EF4-FFF2-40B4-BE49-F238E27FC236}">
+                <a16:creationId xmlns:a16="http://schemas.microsoft.com/office/drawing/2014/main" id="{646E6BB9-DCEE-E1C5-B31A-07525E1D4FC2}"/>
+              </a:ext>
+            </a:extLst>
+          </p:cNvPr>
+          <p:cNvSpPr>
+            <a:spLocks noGrp="1"/>
+          </p:cNvSpPr>
+          <p:nvPr>
+            <p:ph type="title"/>
+          </p:nvPr>
+        </p:nvSpPr>
+        <p:spPr>
+          <a:xfrm>
+            <a:off x="838200" y="-85045"/>
+            <a:ext cx="5990863" cy="1325563"/>
+          </a:xfrm>
+        </p:spPr>
+        <p:txBody>
+          <a:bodyPr/>
+          <a:lstStyle/>
+          <a:p>
+            <a:r>
+              <a:rPr lang="en-US" dirty="0"/>
+              <a:t>Test Cases </a:t>
+            </a:r>
+            <a:r>
+              <a:rPr lang="en-US"/>
+              <a:t>| Polytope</a:t>
+            </a:r>
+            <a:endParaRPr lang="en-US" dirty="0"/>
+          </a:p>
+        </p:txBody>
+      </p:sp>
+      <p:sp>
+        <p:nvSpPr>
+          <p:cNvPr id="5" name="TextBox 4">
+            <a:extLst>
+              <a:ext uri="{FF2B5EF4-FFF2-40B4-BE49-F238E27FC236}">
+                <a16:creationId xmlns:a16="http://schemas.microsoft.com/office/drawing/2014/main" id="{7A3702CD-77F5-DA62-B831-B2BF98365A29}"/>
+              </a:ext>
+            </a:extLst>
+          </p:cNvPr>
+          <p:cNvSpPr txBox="1"/>
+          <p:nvPr/>
+        </p:nvSpPr>
+        <p:spPr>
+          <a:xfrm>
+            <a:off x="838200" y="1240518"/>
+            <a:ext cx="9163855" cy="5355312"/>
+          </a:xfrm>
+          <a:prstGeom prst="rect">
+            <a:avLst/>
+          </a:prstGeom>
+          <a:noFill/>
+        </p:spPr>
+        <p:txBody>
+          <a:bodyPr wrap="none" rtlCol="0">
+            <a:spAutoFit/>
+          </a:bodyPr>
+          <a:lstStyle/>
+          <a:p>
+            <a:r>
+              <a:rPr lang="en-US" dirty="0"/>
+              <a:t>Archetypes		</a:t>
+            </a:r>
+            <a:r>
+              <a:rPr lang="en-US" dirty="0" err="1"/>
+              <a:t>Descr</a:t>
+            </a:r>
+            <a:r>
+              <a:rPr lang="en-US" dirty="0"/>
+              <a:t>		Origin		Props</a:t>
+            </a:r>
+          </a:p>
+          <a:p>
+            <a:r>
+              <a:rPr lang="en-US" dirty="0"/>
+              <a:t>1D</a:t>
+            </a:r>
+          </a:p>
+          <a:p>
+            <a:pPr marL="285750" indent="-285750">
+              <a:buFontTx/>
+              <a:buChar char="-"/>
+            </a:pPr>
+            <a:r>
+              <a:rPr lang="en-US" dirty="0"/>
+              <a:t>Line segment</a:t>
+            </a:r>
+          </a:p>
+          <a:p>
+            <a:pPr marL="285750" indent="-285750">
+              <a:buFontTx/>
+              <a:buChar char="-"/>
+            </a:pPr>
+            <a:r>
+              <a:rPr lang="en-US" dirty="0"/>
+              <a:t>Offset line segment</a:t>
+            </a:r>
+          </a:p>
+          <a:p>
+            <a:pPr marL="285750" indent="-285750">
+              <a:buFontTx/>
+              <a:buChar char="-"/>
+            </a:pPr>
+            <a:r>
+              <a:rPr lang="en-US" dirty="0"/>
+              <a:t>Long line segment</a:t>
+            </a:r>
+          </a:p>
+          <a:p>
+            <a:pPr marL="285750" indent="-285750">
+              <a:buFontTx/>
+              <a:buChar char="-"/>
+            </a:pPr>
+            <a:r>
+              <a:rPr lang="en-US" dirty="0"/>
+              <a:t>Small line segment</a:t>
+            </a:r>
+          </a:p>
+          <a:p>
+            <a:r>
+              <a:rPr lang="en-US" dirty="0"/>
+              <a:t>2D</a:t>
+            </a:r>
+          </a:p>
+          <a:p>
+            <a:pPr marL="285750" indent="-285750">
+              <a:buFontTx/>
+              <a:buChar char="-"/>
+            </a:pPr>
+            <a:r>
+              <a:rPr lang="en-US" dirty="0"/>
+              <a:t>Triangle		Simplex		Vertex		Least num of verts/facets</a:t>
+            </a:r>
+          </a:p>
+          <a:p>
+            <a:pPr marL="285750" indent="-285750">
+              <a:buFontTx/>
+              <a:buChar char="-"/>
+            </a:pPr>
+            <a:r>
+              <a:rPr lang="en-US" dirty="0"/>
+              <a:t>Unit cube		Hypercube	Vertex		Axis-aligned</a:t>
+            </a:r>
+          </a:p>
+          <a:p>
+            <a:pPr marL="285750" indent="-285750">
+              <a:buFontTx/>
+              <a:buChar char="-"/>
+            </a:pPr>
+            <a:r>
+              <a:rPr lang="en-US" dirty="0"/>
+              <a:t>Scaled unit cube	Verts x 2		Vertex		4 x Volume</a:t>
+            </a:r>
+          </a:p>
+          <a:p>
+            <a:pPr marL="285750" indent="-285750">
+              <a:buFontTx/>
+              <a:buChar char="-"/>
+            </a:pPr>
+            <a:r>
+              <a:rPr lang="en-US" dirty="0"/>
+              <a:t>Huge cube		Verts * 1E6	Vertex		Very, very large</a:t>
+            </a:r>
+          </a:p>
+          <a:p>
+            <a:pPr marL="285750" indent="-285750">
+              <a:buFontTx/>
+              <a:buChar char="-"/>
+            </a:pPr>
+            <a:r>
+              <a:rPr lang="en-US" dirty="0"/>
+              <a:t>Offset unit cube	Offset [1, 1]	Outside</a:t>
+            </a:r>
+          </a:p>
+          <a:p>
+            <a:pPr marL="285750" indent="-285750">
+              <a:buFontTx/>
+              <a:buChar char="-"/>
+            </a:pPr>
+            <a:r>
+              <a:rPr lang="en-US" dirty="0"/>
+              <a:t>“Long cigar”		x-coords * 1E6	Vertex		Super small aspect ratio</a:t>
+            </a:r>
+          </a:p>
+          <a:p>
+            <a:pPr marL="285750" indent="-285750">
+              <a:buFontTx/>
+              <a:buChar char="-"/>
+            </a:pPr>
+            <a:r>
+              <a:rPr lang="en-US" dirty="0"/>
+              <a:t>Diamond		Cross poly	Center</a:t>
+            </a:r>
+          </a:p>
+          <a:p>
+            <a:pPr marL="285750" indent="-285750">
+              <a:buFontTx/>
+              <a:buChar char="-"/>
+            </a:pPr>
+            <a:r>
+              <a:rPr lang="en-US" dirty="0"/>
+              <a:t>Rotated diamond			Center		Rotated 45 deg	</a:t>
+            </a:r>
+          </a:p>
+          <a:p>
+            <a:pPr marL="285750" indent="-285750">
+              <a:buFontTx/>
+              <a:buChar char="-"/>
+            </a:pPr>
+            <a:r>
+              <a:rPr lang="en-US" dirty="0"/>
+              <a:t>Octant-specific</a:t>
+            </a:r>
+          </a:p>
+          <a:p>
+            <a:pPr marL="285750" indent="-285750">
+              <a:buFontTx/>
+              <a:buChar char="-"/>
+            </a:pPr>
+            <a:r>
+              <a:rPr lang="en-US" dirty="0"/>
+              <a:t>Origin-hugger</a:t>
+            </a:r>
+          </a:p>
+          <a:p>
+            <a:pPr marL="285750" indent="-285750">
+              <a:buFontTx/>
+              <a:buChar char="-"/>
+            </a:pPr>
+            <a:r>
+              <a:rPr lang="en-US" dirty="0"/>
+              <a:t>Almost flat		Vert [0, 1E-5]	Outside		Volume ~= 0</a:t>
+            </a:r>
+          </a:p>
+          <a:p>
+            <a:pPr marL="285750" indent="-285750">
+              <a:buFontTx/>
+              <a:buChar char="-"/>
+            </a:pPr>
+            <a:r>
+              <a:rPr lang="en-US" dirty="0"/>
+              <a:t>Many verts		~unit circle	</a:t>
+            </a:r>
+          </a:p>
+        </p:txBody>
+      </p:sp>
+    </p:spTree>
+    <p:extLst>
+      <p:ext uri="{BB962C8B-B14F-4D97-AF65-F5344CB8AC3E}">
+        <p14:creationId xmlns:p14="http://schemas.microsoft.com/office/powerpoint/2010/main" val="1723360047"/>
+      </p:ext>
+    </p:extLst>
+  </p:cSld>
+  <p:clrMapOvr>
+    <a:masterClrMapping/>
+  </p:clrMapOvr>
+</p:sld>
+</file>
+
+<file path=ppt/slides/slide21.xml><?xml version="1.0" encoding="utf-8"?>
+<p:sld xmlns:a="http://schemas.openxmlformats.org/drawingml/2006/main" xmlns:r="http://schemas.openxmlformats.org/officeDocument/2006/relationships" xmlns:p="http://schemas.openxmlformats.org/presentationml/2006/main">
+  <p:cSld>
+    <p:spTree>
+      <p:nvGrpSpPr>
+        <p:cNvPr id="1" name="">
+          <a:extLst>
+            <a:ext uri="{FF2B5EF4-FFF2-40B4-BE49-F238E27FC236}">
+              <a16:creationId xmlns:a16="http://schemas.microsoft.com/office/drawing/2014/main" id="{868B08EB-BAB1-C238-88C7-CE4E8A422CF8}"/>
+            </a:ext>
+          </a:extLst>
+        </p:cNvPr>
+        <p:cNvGrpSpPr/>
+        <p:nvPr/>
+      </p:nvGrpSpPr>
+      <p:grpSpPr>
+        <a:xfrm>
+          <a:off x="0" y="0"/>
+          <a:ext cx="0" cy="0"/>
+          <a:chOff x="0" y="0"/>
+          <a:chExt cx="0" cy="0"/>
+        </a:xfrm>
+      </p:grpSpPr>
+      <p:sp>
+        <p:nvSpPr>
+          <p:cNvPr id="4" name="Title 3">
+            <a:extLst>
+              <a:ext uri="{FF2B5EF4-FFF2-40B4-BE49-F238E27FC236}">
+                <a16:creationId xmlns:a16="http://schemas.microsoft.com/office/drawing/2014/main" id="{54199459-25FE-42CC-BBD8-A838FE6810A1}"/>
+              </a:ext>
+            </a:extLst>
+          </p:cNvPr>
+          <p:cNvSpPr>
+            <a:spLocks noGrp="1"/>
+          </p:cNvSpPr>
+          <p:nvPr>
+            <p:ph type="title"/>
+          </p:nvPr>
+        </p:nvSpPr>
+        <p:spPr>
+          <a:xfrm>
+            <a:off x="838200" y="-85045"/>
+            <a:ext cx="5990863" cy="1325563"/>
+          </a:xfrm>
+        </p:spPr>
+        <p:txBody>
+          <a:bodyPr/>
+          <a:lstStyle/>
+          <a:p>
+            <a:r>
+              <a:rPr lang="en-US" dirty="0"/>
+              <a:t>Test Cases </a:t>
+            </a:r>
+            <a:r>
+              <a:rPr lang="en-US"/>
+              <a:t>| Polytope</a:t>
+            </a:r>
+            <a:endParaRPr lang="en-US" dirty="0"/>
+          </a:p>
+        </p:txBody>
+      </p:sp>
+      <p:sp>
+        <p:nvSpPr>
+          <p:cNvPr id="5" name="TextBox 4">
+            <a:extLst>
+              <a:ext uri="{FF2B5EF4-FFF2-40B4-BE49-F238E27FC236}">
+                <a16:creationId xmlns:a16="http://schemas.microsoft.com/office/drawing/2014/main" id="{6635E2B7-F193-39A8-1EA5-FBC92B6E25E7}"/>
+              </a:ext>
+            </a:extLst>
+          </p:cNvPr>
+          <p:cNvSpPr txBox="1"/>
+          <p:nvPr/>
+        </p:nvSpPr>
+        <p:spPr>
+          <a:xfrm>
+            <a:off x="838200" y="1240518"/>
+            <a:ext cx="7221272" cy="1200329"/>
+          </a:xfrm>
+          <a:prstGeom prst="rect">
+            <a:avLst/>
+          </a:prstGeom>
+          <a:noFill/>
+        </p:spPr>
+        <p:txBody>
+          <a:bodyPr wrap="none" rtlCol="0">
+            <a:spAutoFit/>
+          </a:bodyPr>
+          <a:lstStyle/>
+          <a:p>
+            <a:r>
+              <a:rPr lang="en-US" dirty="0"/>
+              <a:t>Archetypes		</a:t>
+            </a:r>
+            <a:r>
+              <a:rPr lang="en-US" dirty="0" err="1"/>
+              <a:t>Descr</a:t>
+            </a:r>
+            <a:r>
+              <a:rPr lang="en-US" dirty="0"/>
+              <a:t>		Origin		Props</a:t>
+            </a:r>
+          </a:p>
+          <a:p>
+            <a:r>
+              <a:rPr lang="en-US" dirty="0"/>
+              <a:t>3D</a:t>
+            </a:r>
+          </a:p>
+          <a:p>
+            <a:pPr marL="285750" indent="-285750">
+              <a:buFontTx/>
+              <a:buChar char="-"/>
+            </a:pPr>
+            <a:r>
+              <a:rPr lang="en-GB" dirty="0"/>
+              <a:t>Tetrahedron</a:t>
+            </a:r>
+          </a:p>
+          <a:p>
+            <a:pPr marL="285750" indent="-285750">
+              <a:buFontTx/>
+              <a:buChar char="-"/>
+            </a:pPr>
+            <a:r>
+              <a:rPr lang="en-GB" dirty="0"/>
+              <a:t>Octahedron</a:t>
+            </a:r>
+          </a:p>
+        </p:txBody>
+      </p:sp>
+      <p:sp>
+        <p:nvSpPr>
+          <p:cNvPr id="6" name="TextBox 5">
+            <a:extLst>
+              <a:ext uri="{FF2B5EF4-FFF2-40B4-BE49-F238E27FC236}">
+                <a16:creationId xmlns:a16="http://schemas.microsoft.com/office/drawing/2014/main" id="{2574CA64-EE70-7E50-0875-2C2123059D26}"/>
+              </a:ext>
+            </a:extLst>
+          </p:cNvPr>
+          <p:cNvSpPr txBox="1"/>
+          <p:nvPr/>
+        </p:nvSpPr>
+        <p:spPr>
+          <a:xfrm>
+            <a:off x="838200" y="4417154"/>
+            <a:ext cx="6898683" cy="1477328"/>
+          </a:xfrm>
+          <a:prstGeom prst="rect">
+            <a:avLst/>
+          </a:prstGeom>
+          <a:noFill/>
+        </p:spPr>
+        <p:txBody>
+          <a:bodyPr wrap="none" rtlCol="0">
+            <a:spAutoFit/>
+          </a:bodyPr>
+          <a:lstStyle/>
+          <a:p>
+            <a:r>
+              <a:rPr lang="en-US" i="1" dirty="0"/>
+              <a:t>n</a:t>
+            </a:r>
+            <a:r>
+              <a:rPr lang="en-US" dirty="0"/>
+              <a:t>-d Generators			V-</a:t>
+            </a:r>
+            <a:r>
+              <a:rPr lang="en-US" dirty="0" err="1"/>
+              <a:t>repr</a:t>
+            </a:r>
+            <a:r>
+              <a:rPr lang="en-US" dirty="0"/>
+              <a:t>		H-</a:t>
+            </a:r>
+            <a:r>
+              <a:rPr lang="en-US" dirty="0" err="1"/>
+              <a:t>repr</a:t>
+            </a:r>
+            <a:endParaRPr lang="en-US" dirty="0"/>
+          </a:p>
+          <a:p>
+            <a:pPr marL="285750" indent="-285750">
+              <a:buFontTx/>
+              <a:buChar char="-"/>
+            </a:pPr>
+            <a:r>
+              <a:rPr lang="en-US" dirty="0"/>
+              <a:t>Unit hypercube [0, 1]</a:t>
+            </a:r>
+            <a:r>
+              <a:rPr lang="en-US" i="1" baseline="30000" dirty="0"/>
+              <a:t>n</a:t>
+            </a:r>
+            <a:r>
+              <a:rPr lang="en-US" baseline="30000" dirty="0"/>
+              <a:t>		</a:t>
+            </a:r>
+            <a:r>
+              <a:rPr lang="en-US" dirty="0"/>
+              <a:t>2</a:t>
+            </a:r>
+            <a:r>
+              <a:rPr lang="en-US" i="1" baseline="30000" dirty="0"/>
+              <a:t>n</a:t>
+            </a:r>
+            <a:r>
+              <a:rPr lang="en-US" dirty="0"/>
+              <a:t> verts {0, 1}	2</a:t>
+            </a:r>
+            <a:r>
+              <a:rPr lang="en-US" i="1" dirty="0"/>
+              <a:t>n</a:t>
+            </a:r>
+            <a:r>
+              <a:rPr lang="en-US" dirty="0"/>
+              <a:t> facets</a:t>
+            </a:r>
+          </a:p>
+          <a:p>
+            <a:pPr marL="285750" indent="-285750">
+              <a:buFontTx/>
+              <a:buChar char="-"/>
+            </a:pPr>
+            <a:r>
+              <a:rPr lang="en-US" dirty="0"/>
+              <a:t>Centered “</a:t>
+            </a:r>
+            <a:r>
+              <a:rPr lang="en-US" dirty="0" err="1"/>
+              <a:t>hyper”cube</a:t>
+            </a:r>
+            <a:r>
+              <a:rPr lang="en-US" dirty="0"/>
+              <a:t> [-1, 1]</a:t>
+            </a:r>
+            <a:r>
+              <a:rPr lang="en-US" i="1" baseline="30000" dirty="0"/>
+              <a:t>n</a:t>
+            </a:r>
+            <a:r>
+              <a:rPr lang="en-US" baseline="30000" dirty="0"/>
+              <a:t>	</a:t>
+            </a:r>
+            <a:r>
+              <a:rPr lang="en-US" dirty="0"/>
+              <a:t>2</a:t>
+            </a:r>
+            <a:r>
+              <a:rPr lang="en-US" i="1" baseline="30000" dirty="0"/>
+              <a:t>n</a:t>
+            </a:r>
+            <a:r>
+              <a:rPr lang="en-US" dirty="0"/>
+              <a:t> verts {-1, 1}	2</a:t>
+            </a:r>
+            <a:r>
+              <a:rPr lang="en-US" i="1" dirty="0"/>
+              <a:t>n</a:t>
+            </a:r>
+            <a:r>
+              <a:rPr lang="en-US" dirty="0"/>
+              <a:t> facets</a:t>
+            </a:r>
+            <a:endParaRPr lang="en-US" baseline="30000" dirty="0"/>
+          </a:p>
+          <a:p>
+            <a:pPr marL="285750" indent="-285750">
+              <a:buFontTx/>
+              <a:buChar char="-"/>
+            </a:pPr>
+            <a:r>
+              <a:rPr lang="en-US" dirty="0"/>
+              <a:t>Cross polytope (</a:t>
+            </a:r>
+            <a:r>
+              <a:rPr lang="en-US" i="1" dirty="0"/>
+              <a:t>L</a:t>
+            </a:r>
+            <a:r>
+              <a:rPr lang="en-US" baseline="-25000" dirty="0"/>
+              <a:t>1</a:t>
+            </a:r>
+            <a:r>
+              <a:rPr lang="en-US" dirty="0"/>
+              <a:t>-norm)	2</a:t>
+            </a:r>
+            <a:r>
+              <a:rPr lang="en-US" i="1" dirty="0"/>
+              <a:t>n</a:t>
+            </a:r>
+            <a:r>
+              <a:rPr lang="en-US" dirty="0"/>
+              <a:t> verts </a:t>
+            </a:r>
+            <a:r>
+              <a:rPr lang="en-NL" dirty="0"/>
+              <a:t>±</a:t>
+            </a:r>
+            <a:r>
+              <a:rPr lang="en-US" b="1" i="1" dirty="0" err="1"/>
+              <a:t>e</a:t>
+            </a:r>
+            <a:r>
+              <a:rPr lang="en-US" i="1" baseline="-25000" dirty="0" err="1"/>
+              <a:t>i</a:t>
+            </a:r>
+            <a:r>
+              <a:rPr lang="en-US" i="1" baseline="30000" dirty="0"/>
+              <a:t>	</a:t>
+            </a:r>
+            <a:r>
+              <a:rPr lang="en-US" dirty="0"/>
+              <a:t>2</a:t>
+            </a:r>
+            <a:r>
+              <a:rPr lang="en-US" i="1" baseline="30000" dirty="0"/>
+              <a:t>n</a:t>
+            </a:r>
+            <a:r>
+              <a:rPr lang="en-US" baseline="30000" dirty="0"/>
+              <a:t> </a:t>
+            </a:r>
+            <a:r>
+              <a:rPr lang="en-US" dirty="0"/>
+              <a:t>facets</a:t>
+            </a:r>
+            <a:r>
+              <a:rPr lang="en-US" i="1" dirty="0"/>
+              <a:t>	</a:t>
+            </a:r>
+          </a:p>
+          <a:p>
+            <a:pPr marL="285750" indent="-285750">
+              <a:buFontTx/>
+              <a:buChar char="-"/>
+            </a:pPr>
+            <a:r>
+              <a:rPr lang="en-US" dirty="0"/>
+              <a:t>Standard simplex (“triangle”)	</a:t>
+            </a:r>
+            <a:r>
+              <a:rPr lang="en-US" i="1" dirty="0"/>
+              <a:t>n </a:t>
+            </a:r>
+            <a:r>
+              <a:rPr lang="en-US" dirty="0"/>
+              <a:t>+ 1 verts </a:t>
+            </a:r>
+            <a:r>
+              <a:rPr lang="en-US" b="1" i="1" dirty="0" err="1"/>
+              <a:t>e</a:t>
+            </a:r>
+            <a:r>
+              <a:rPr lang="en-US" i="1" baseline="-25000" dirty="0" err="1"/>
+              <a:t>i</a:t>
+            </a:r>
+            <a:r>
+              <a:rPr lang="en-US" dirty="0"/>
+              <a:t> ∪ </a:t>
+            </a:r>
+            <a:r>
+              <a:rPr lang="en-US" b="1" dirty="0"/>
+              <a:t>0	</a:t>
+            </a:r>
+            <a:r>
+              <a:rPr lang="en-US" i="1" dirty="0"/>
+              <a:t>n</a:t>
+            </a:r>
+            <a:r>
+              <a:rPr lang="en-US" dirty="0"/>
+              <a:t> + 1 facets</a:t>
+            </a:r>
+          </a:p>
+        </p:txBody>
+      </p:sp>
+      <p:sp>
+        <p:nvSpPr>
+          <p:cNvPr id="2" name="TextBox 1">
+            <a:extLst>
+              <a:ext uri="{FF2B5EF4-FFF2-40B4-BE49-F238E27FC236}">
+                <a16:creationId xmlns:a16="http://schemas.microsoft.com/office/drawing/2014/main" id="{836DDBC9-B3B2-6A1B-5F71-5ED82D0FD791}"/>
+              </a:ext>
+            </a:extLst>
+          </p:cNvPr>
+          <p:cNvSpPr txBox="1"/>
+          <p:nvPr/>
+        </p:nvSpPr>
+        <p:spPr>
+          <a:xfrm>
+            <a:off x="838199" y="5894482"/>
+            <a:ext cx="6369116" cy="646331"/>
+          </a:xfrm>
+          <a:prstGeom prst="rect">
+            <a:avLst/>
+          </a:prstGeom>
+          <a:noFill/>
+        </p:spPr>
+        <p:txBody>
+          <a:bodyPr wrap="none" rtlCol="0">
+            <a:spAutoFit/>
+          </a:bodyPr>
+          <a:lstStyle/>
+          <a:p>
+            <a:r>
+              <a:rPr lang="en-US" i="1" dirty="0"/>
+              <a:t>2/3</a:t>
+            </a:r>
+            <a:r>
+              <a:rPr lang="en-US" dirty="0"/>
+              <a:t>-d Generators			V-</a:t>
+            </a:r>
+            <a:r>
+              <a:rPr lang="en-US" dirty="0" err="1"/>
+              <a:t>repr</a:t>
+            </a:r>
+            <a:r>
+              <a:rPr lang="en-US" dirty="0"/>
+              <a:t>		H-</a:t>
+            </a:r>
+            <a:r>
+              <a:rPr lang="en-US" dirty="0" err="1"/>
+              <a:t>repr</a:t>
+            </a:r>
+            <a:endParaRPr lang="en-US" dirty="0"/>
+          </a:p>
+          <a:p>
+            <a:pPr marL="285750" indent="-285750">
+              <a:buFontTx/>
+              <a:buChar char="-"/>
+            </a:pPr>
+            <a:r>
+              <a:rPr lang="en-US" dirty="0"/>
+              <a:t>Unit circ/sphere </a:t>
+            </a:r>
+            <a:r>
+              <a:rPr lang="en-US" dirty="0" err="1"/>
+              <a:t>approx</a:t>
+            </a:r>
+            <a:r>
+              <a:rPr lang="en-US" dirty="0"/>
+              <a:t> (k)</a:t>
+            </a:r>
+            <a:r>
+              <a:rPr lang="en-US" baseline="30000" dirty="0"/>
+              <a:t>	</a:t>
+            </a:r>
+            <a:r>
+              <a:rPr lang="en-US" dirty="0"/>
+              <a:t>k &gt;= 4</a:t>
+            </a:r>
+          </a:p>
+        </p:txBody>
+      </p:sp>
+    </p:spTree>
+    <p:extLst>
+      <p:ext uri="{BB962C8B-B14F-4D97-AF65-F5344CB8AC3E}">
+        <p14:creationId xmlns:p14="http://schemas.microsoft.com/office/powerpoint/2010/main" val="1197219407"/>
       </p:ext>
     </p:extLst>
   </p:cSld>

</xml_diff>

<commit_message>
Updated presentation with attributes `self.m_eq` and `self.k_rays`; Also replaced type-hinting of deault value with `Optional[...] = None`
</commit_message>
<xml_diff>
--- a/presentation.pptx
+++ b/presentation.pptx
@@ -135,7 +135,7 @@
 <file path=ppt/revisionInfo.xml><?xml version="1.0" encoding="utf-8"?>
 <p1510:revInfo xmlns:a="http://schemas.openxmlformats.org/drawingml/2006/main" xmlns:r="http://schemas.openxmlformats.org/officeDocument/2006/relationships" xmlns:p1510="http://schemas.microsoft.com/office/powerpoint/2015/10/main">
   <p1510:revLst>
-    <p1510:client id="{92BFB444-7DBC-CA44-A6DD-A4B3F7DBDADB}" v="356" dt="2026-02-05T16:04:19.765"/>
+    <p1510:client id="{92BFB444-7DBC-CA44-A6DD-A4B3F7DBDADB}" v="358" dt="2026-02-06T09:12:11.111"/>
   </p1510:revLst>
 </p1510:revInfo>
 </file>
@@ -145,7 +145,7 @@
   <pc:docChgLst>
     <pc:chgData name="Bart Wolleswinkel" userId="b168cadc-1825-41ce-b9cc-7c7f06f6f31d" providerId="ADAL" clId="{22248CC1-9068-5BCB-B15B-4353FE48F57D}"/>
     <pc:docChg chg="undo redo custSel addSld modSld sldOrd">
-      <pc:chgData name="Bart Wolleswinkel" userId="b168cadc-1825-41ce-b9cc-7c7f06f6f31d" providerId="ADAL" clId="{22248CC1-9068-5BCB-B15B-4353FE48F57D}" dt="2026-02-05T16:05:05.072" v="4977" actId="1076"/>
+      <pc:chgData name="Bart Wolleswinkel" userId="b168cadc-1825-41ce-b9cc-7c7f06f6f31d" providerId="ADAL" clId="{22248CC1-9068-5BCB-B15B-4353FE48F57D}" dt="2026-02-06T09:12:21.904" v="4990" actId="1076"/>
       <pc:docMkLst>
         <pc:docMk/>
       </pc:docMkLst>
@@ -1265,7 +1265,7 @@
         </pc:cxnChg>
       </pc:sldChg>
       <pc:sldChg chg="addSp delSp modSp add mod">
-        <pc:chgData name="Bart Wolleswinkel" userId="b168cadc-1825-41ce-b9cc-7c7f06f6f31d" providerId="ADAL" clId="{22248CC1-9068-5BCB-B15B-4353FE48F57D}" dt="2026-02-01T23:26:34.913" v="2459" actId="1076"/>
+        <pc:chgData name="Bart Wolleswinkel" userId="b168cadc-1825-41ce-b9cc-7c7f06f6f31d" providerId="ADAL" clId="{22248CC1-9068-5BCB-B15B-4353FE48F57D}" dt="2026-02-06T09:12:21.904" v="4990" actId="1076"/>
         <pc:sldMkLst>
           <pc:docMk/>
           <pc:sldMk cId="2057737708" sldId="273"/>
@@ -1292,6 +1292,22 @@
             <pc:docMk/>
             <pc:sldMk cId="2057737708" sldId="273"/>
             <ac:spMk id="4" creationId="{60FA50A4-57DF-57D3-200B-9E194D94B0F1}"/>
+          </ac:spMkLst>
+        </pc:spChg>
+        <pc:spChg chg="add mod">
+          <ac:chgData name="Bart Wolleswinkel" userId="b168cadc-1825-41ce-b9cc-7c7f06f6f31d" providerId="ADAL" clId="{22248CC1-9068-5BCB-B15B-4353FE48F57D}" dt="2026-02-06T09:12:21.904" v="4990" actId="1076"/>
+          <ac:spMkLst>
+            <pc:docMk/>
+            <pc:sldMk cId="2057737708" sldId="273"/>
+            <ac:spMk id="5" creationId="{9B4B8F92-543D-9622-3CDD-9FEC5BDA6C20}"/>
+          </ac:spMkLst>
+        </pc:spChg>
+        <pc:spChg chg="add mod">
+          <ac:chgData name="Bart Wolleswinkel" userId="b168cadc-1825-41ce-b9cc-7c7f06f6f31d" providerId="ADAL" clId="{22248CC1-9068-5BCB-B15B-4353FE48F57D}" dt="2026-02-06T09:12:21.904" v="4990" actId="1076"/>
+          <ac:spMkLst>
+            <pc:docMk/>
+            <pc:sldMk cId="2057737708" sldId="273"/>
+            <ac:spMk id="6" creationId="{D20FCBC6-1213-633A-2ABA-9479A2DE9E3D}"/>
           </ac:spMkLst>
         </pc:spChg>
         <pc:spChg chg="add mod">
@@ -1605,52 +1621,12 @@
           <pc:docMk/>
           <pc:sldMk cId="3278522806" sldId="274"/>
         </pc:sldMkLst>
-        <pc:spChg chg="del">
-          <ac:chgData name="Bart Wolleswinkel" userId="b168cadc-1825-41ce-b9cc-7c7f06f6f31d" providerId="ADAL" clId="{22248CC1-9068-5BCB-B15B-4353FE48F57D}" dt="2026-02-04T16:47:28.537" v="2479" actId="478"/>
-          <ac:spMkLst>
-            <pc:docMk/>
-            <pc:sldMk cId="3278522806" sldId="274"/>
-            <ac:spMk id="2" creationId="{4622DBC6-AD5C-ED33-A032-CD3F5693EA34}"/>
-          </ac:spMkLst>
-        </pc:spChg>
-        <pc:spChg chg="del">
-          <ac:chgData name="Bart Wolleswinkel" userId="b168cadc-1825-41ce-b9cc-7c7f06f6f31d" providerId="ADAL" clId="{22248CC1-9068-5BCB-B15B-4353FE48F57D}" dt="2026-02-04T16:47:28.537" v="2479" actId="478"/>
-          <ac:spMkLst>
-            <pc:docMk/>
-            <pc:sldMk cId="3278522806" sldId="274"/>
-            <ac:spMk id="3" creationId="{3CFEA692-3A03-5A71-C50C-D6F86B340F4C}"/>
-          </ac:spMkLst>
-        </pc:spChg>
         <pc:spChg chg="mod">
           <ac:chgData name="Bart Wolleswinkel" userId="b168cadc-1825-41ce-b9cc-7c7f06f6f31d" providerId="ADAL" clId="{22248CC1-9068-5BCB-B15B-4353FE48F57D}" dt="2026-02-04T17:26:13.108" v="3490" actId="1076"/>
           <ac:spMkLst>
             <pc:docMk/>
             <pc:sldMk cId="3278522806" sldId="274"/>
             <ac:spMk id="4" creationId="{C01EE82E-05F0-947E-0DEC-B51FF85AC69D}"/>
-          </ac:spMkLst>
-        </pc:spChg>
-        <pc:spChg chg="del">
-          <ac:chgData name="Bart Wolleswinkel" userId="b168cadc-1825-41ce-b9cc-7c7f06f6f31d" providerId="ADAL" clId="{22248CC1-9068-5BCB-B15B-4353FE48F57D}" dt="2026-02-04T16:47:28.537" v="2479" actId="478"/>
-          <ac:spMkLst>
-            <pc:docMk/>
-            <pc:sldMk cId="3278522806" sldId="274"/>
-            <ac:spMk id="5" creationId="{424C4847-6B7D-57C0-D6F1-9B2374C13C5D}"/>
-          </ac:spMkLst>
-        </pc:spChg>
-        <pc:spChg chg="del">
-          <ac:chgData name="Bart Wolleswinkel" userId="b168cadc-1825-41ce-b9cc-7c7f06f6f31d" providerId="ADAL" clId="{22248CC1-9068-5BCB-B15B-4353FE48F57D}" dt="2026-02-04T16:47:28.537" v="2479" actId="478"/>
-          <ac:spMkLst>
-            <pc:docMk/>
-            <pc:sldMk cId="3278522806" sldId="274"/>
-            <ac:spMk id="6" creationId="{FA283498-44F1-9D9C-3018-C0739B720444}"/>
-          </ac:spMkLst>
-        </pc:spChg>
-        <pc:spChg chg="add del mod">
-          <ac:chgData name="Bart Wolleswinkel" userId="b168cadc-1825-41ce-b9cc-7c7f06f6f31d" providerId="ADAL" clId="{22248CC1-9068-5BCB-B15B-4353FE48F57D}" dt="2026-02-04T16:47:49.578" v="2488" actId="478"/>
-          <ac:spMkLst>
-            <pc:docMk/>
-            <pc:sldMk cId="3278522806" sldId="274"/>
-            <ac:spMk id="7" creationId="{1CC699E0-B686-F46C-1DCA-E4FD71289463}"/>
           </ac:spMkLst>
         </pc:spChg>
         <pc:spChg chg="add mod">
@@ -1669,14 +1645,6 @@
             <ac:spMk id="9" creationId="{C92FB934-DBA7-3F04-0C4A-3C644A1EB631}"/>
           </ac:spMkLst>
         </pc:spChg>
-        <pc:spChg chg="del">
-          <ac:chgData name="Bart Wolleswinkel" userId="b168cadc-1825-41ce-b9cc-7c7f06f6f31d" providerId="ADAL" clId="{22248CC1-9068-5BCB-B15B-4353FE48F57D}" dt="2026-02-04T16:47:28.537" v="2479" actId="478"/>
-          <ac:spMkLst>
-            <pc:docMk/>
-            <pc:sldMk cId="3278522806" sldId="274"/>
-            <ac:spMk id="11" creationId="{8502048F-CA36-B609-4E87-DE223C18A47B}"/>
-          </ac:spMkLst>
-        </pc:spChg>
         <pc:spChg chg="add mod">
           <ac:chgData name="Bart Wolleswinkel" userId="b168cadc-1825-41ce-b9cc-7c7f06f6f31d" providerId="ADAL" clId="{22248CC1-9068-5BCB-B15B-4353FE48F57D}" dt="2026-02-04T17:22:43.141" v="3453" actId="1076"/>
           <ac:spMkLst>
@@ -1709,14 +1677,6 @@
             <ac:spMk id="15" creationId="{80C2315B-00F0-6C34-E575-7343B9406373}"/>
           </ac:spMkLst>
         </pc:spChg>
-        <pc:spChg chg="add del mod">
-          <ac:chgData name="Bart Wolleswinkel" userId="b168cadc-1825-41ce-b9cc-7c7f06f6f31d" providerId="ADAL" clId="{22248CC1-9068-5BCB-B15B-4353FE48F57D}" dt="2026-02-04T16:51:01.772" v="2712" actId="478"/>
-          <ac:spMkLst>
-            <pc:docMk/>
-            <pc:sldMk cId="3278522806" sldId="274"/>
-            <ac:spMk id="16" creationId="{53E59DDA-00EA-AB06-7A97-484302B9630E}"/>
-          </ac:spMkLst>
-        </pc:spChg>
         <pc:spChg chg="add mod">
           <ac:chgData name="Bart Wolleswinkel" userId="b168cadc-1825-41ce-b9cc-7c7f06f6f31d" providerId="ADAL" clId="{22248CC1-9068-5BCB-B15B-4353FE48F57D}" dt="2026-02-04T17:26:07.470" v="3489" actId="1076"/>
           <ac:spMkLst>
@@ -1733,14 +1693,6 @@
             <ac:spMk id="20" creationId="{FAFC5392-7C69-D7B8-40A1-A60EFA5EAB96}"/>
           </ac:spMkLst>
         </pc:spChg>
-        <pc:spChg chg="del">
-          <ac:chgData name="Bart Wolleswinkel" userId="b168cadc-1825-41ce-b9cc-7c7f06f6f31d" providerId="ADAL" clId="{22248CC1-9068-5BCB-B15B-4353FE48F57D}" dt="2026-02-04T16:47:28.537" v="2479" actId="478"/>
-          <ac:spMkLst>
-            <pc:docMk/>
-            <pc:sldMk cId="3278522806" sldId="274"/>
-            <ac:spMk id="21" creationId="{FEA330D6-2ACA-1826-BBFB-470C7EAC9615}"/>
-          </ac:spMkLst>
-        </pc:spChg>
         <pc:spChg chg="add mod">
           <ac:chgData name="Bart Wolleswinkel" userId="b168cadc-1825-41ce-b9cc-7c7f06f6f31d" providerId="ADAL" clId="{22248CC1-9068-5BCB-B15B-4353FE48F57D}" dt="2026-02-04T17:30:52.765" v="3692" actId="1076"/>
           <ac:spMkLst>
@@ -1773,22 +1725,6 @@
             <ac:spMk id="25" creationId="{F02CB472-9F2B-AD55-A9D9-5F0D09B37A7D}"/>
           </ac:spMkLst>
         </pc:spChg>
-        <pc:spChg chg="add del mod">
-          <ac:chgData name="Bart Wolleswinkel" userId="b168cadc-1825-41ce-b9cc-7c7f06f6f31d" providerId="ADAL" clId="{22248CC1-9068-5BCB-B15B-4353FE48F57D}" dt="2026-02-04T17:10:03.414" v="3118" actId="478"/>
-          <ac:spMkLst>
-            <pc:docMk/>
-            <pc:sldMk cId="3278522806" sldId="274"/>
-            <ac:spMk id="26" creationId="{C416DA47-8B8B-C497-4A63-BF07CE4E0139}"/>
-          </ac:spMkLst>
-        </pc:spChg>
-        <pc:spChg chg="add del mod">
-          <ac:chgData name="Bart Wolleswinkel" userId="b168cadc-1825-41ce-b9cc-7c7f06f6f31d" providerId="ADAL" clId="{22248CC1-9068-5BCB-B15B-4353FE48F57D}" dt="2026-02-04T17:16:52.635" v="3335" actId="478"/>
-          <ac:spMkLst>
-            <pc:docMk/>
-            <pc:sldMk cId="3278522806" sldId="274"/>
-            <ac:spMk id="27" creationId="{C326ED92-0C0D-86AA-A388-9435E53E7E26}"/>
-          </ac:spMkLst>
-        </pc:spChg>
         <pc:spChg chg="add mod">
           <ac:chgData name="Bart Wolleswinkel" userId="b168cadc-1825-41ce-b9cc-7c7f06f6f31d" providerId="ADAL" clId="{22248CC1-9068-5BCB-B15B-4353FE48F57D}" dt="2026-02-04T17:24:40.868" v="3474" actId="1076"/>
           <ac:spMkLst>
@@ -1859,38 +1795,6 @@
             <pc:docMk/>
             <pc:sldMk cId="3278522806" sldId="274"/>
             <ac:spMk id="36" creationId="{BCFD76E4-0031-B479-4081-34D14EF9D30C}"/>
-          </ac:spMkLst>
-        </pc:spChg>
-        <pc:spChg chg="del">
-          <ac:chgData name="Bart Wolleswinkel" userId="b168cadc-1825-41ce-b9cc-7c7f06f6f31d" providerId="ADAL" clId="{22248CC1-9068-5BCB-B15B-4353FE48F57D}" dt="2026-02-04T16:47:28.537" v="2479" actId="478"/>
-          <ac:spMkLst>
-            <pc:docMk/>
-            <pc:sldMk cId="3278522806" sldId="274"/>
-            <ac:spMk id="42" creationId="{418BD878-A9EE-0049-2172-DDD6DF2BA973}"/>
-          </ac:spMkLst>
-        </pc:spChg>
-        <pc:spChg chg="del">
-          <ac:chgData name="Bart Wolleswinkel" userId="b168cadc-1825-41ce-b9cc-7c7f06f6f31d" providerId="ADAL" clId="{22248CC1-9068-5BCB-B15B-4353FE48F57D}" dt="2026-02-04T16:47:28.537" v="2479" actId="478"/>
-          <ac:spMkLst>
-            <pc:docMk/>
-            <pc:sldMk cId="3278522806" sldId="274"/>
-            <ac:spMk id="43" creationId="{4DB50B4C-0951-B668-973D-B9A3951B46D9}"/>
-          </ac:spMkLst>
-        </pc:spChg>
-        <pc:spChg chg="del">
-          <ac:chgData name="Bart Wolleswinkel" userId="b168cadc-1825-41ce-b9cc-7c7f06f6f31d" providerId="ADAL" clId="{22248CC1-9068-5BCB-B15B-4353FE48F57D}" dt="2026-02-04T16:47:28.537" v="2479" actId="478"/>
-          <ac:spMkLst>
-            <pc:docMk/>
-            <pc:sldMk cId="3278522806" sldId="274"/>
-            <ac:spMk id="46" creationId="{68023787-9A6F-73D1-21E3-1F8AF906FFFC}"/>
-          </ac:spMkLst>
-        </pc:spChg>
-        <pc:spChg chg="del">
-          <ac:chgData name="Bart Wolleswinkel" userId="b168cadc-1825-41ce-b9cc-7c7f06f6f31d" providerId="ADAL" clId="{22248CC1-9068-5BCB-B15B-4353FE48F57D}" dt="2026-02-04T16:47:28.537" v="2479" actId="478"/>
-          <ac:spMkLst>
-            <pc:docMk/>
-            <pc:sldMk cId="3278522806" sldId="274"/>
-            <ac:spMk id="47" creationId="{A9905D23-2C23-66BE-2505-B4C6B6EC6F49}"/>
           </ac:spMkLst>
         </pc:spChg>
       </pc:sldChg>
@@ -15921,6 +15825,104 @@
               <a:t>(…)</a:t>
             </a:r>
             <a:endParaRPr lang="en-US" dirty="0"/>
+          </a:p>
+        </p:txBody>
+      </p:sp>
+      <p:sp>
+        <p:nvSpPr>
+          <p:cNvPr id="5" name="TextBox 4">
+            <a:extLst>
+              <a:ext uri="{FF2B5EF4-FFF2-40B4-BE49-F238E27FC236}">
+                <a16:creationId xmlns:a16="http://schemas.microsoft.com/office/drawing/2014/main" id="{9B4B8F92-543D-9622-3CDD-9FEC5BDA6C20}"/>
+              </a:ext>
+            </a:extLst>
+          </p:cNvPr>
+          <p:cNvSpPr txBox="1"/>
+          <p:nvPr/>
+        </p:nvSpPr>
+        <p:spPr>
+          <a:xfrm>
+            <a:off x="1558141" y="5811239"/>
+            <a:ext cx="1215397" cy="369332"/>
+          </a:xfrm>
+          <a:prstGeom prst="rect">
+            <a:avLst/>
+          </a:prstGeom>
+          <a:noFill/>
+        </p:spPr>
+        <p:txBody>
+          <a:bodyPr wrap="none" rtlCol="0">
+            <a:spAutoFit/>
+          </a:bodyPr>
+          <a:lstStyle/>
+          <a:p>
+            <a:r>
+              <a:rPr lang="en-US" dirty="0" err="1">
+                <a:solidFill>
+                  <a:schemeClr val="accent5">
+                    <a:lumMod val="75000"/>
+                  </a:schemeClr>
+                </a:solidFill>
+                <a:latin typeface="American Typewriter" panose="02090604020004020304" pitchFamily="18" charset="77"/>
+              </a:rPr>
+              <a:t>self.m_eq</a:t>
+            </a:r>
+            <a:endParaRPr lang="en-US" dirty="0">
+              <a:solidFill>
+                <a:schemeClr val="accent5">
+                  <a:lumMod val="75000"/>
+                </a:schemeClr>
+              </a:solidFill>
+            </a:endParaRPr>
+          </a:p>
+        </p:txBody>
+      </p:sp>
+      <p:sp>
+        <p:nvSpPr>
+          <p:cNvPr id="6" name="TextBox 5">
+            <a:extLst>
+              <a:ext uri="{FF2B5EF4-FFF2-40B4-BE49-F238E27FC236}">
+                <a16:creationId xmlns:a16="http://schemas.microsoft.com/office/drawing/2014/main" id="{D20FCBC6-1213-633A-2ABA-9479A2DE9E3D}"/>
+              </a:ext>
+            </a:extLst>
+          </p:cNvPr>
+          <p:cNvSpPr txBox="1"/>
+          <p:nvPr/>
+        </p:nvSpPr>
+        <p:spPr>
+          <a:xfrm>
+            <a:off x="1558140" y="6165118"/>
+            <a:ext cx="1383649" cy="369332"/>
+          </a:xfrm>
+          <a:prstGeom prst="rect">
+            <a:avLst/>
+          </a:prstGeom>
+          <a:noFill/>
+        </p:spPr>
+        <p:txBody>
+          <a:bodyPr wrap="none" rtlCol="0">
+            <a:spAutoFit/>
+          </a:bodyPr>
+          <a:lstStyle/>
+          <a:p>
+            <a:r>
+              <a:rPr lang="en-US" dirty="0" err="1">
+                <a:solidFill>
+                  <a:schemeClr val="accent5">
+                    <a:lumMod val="75000"/>
+                  </a:schemeClr>
+                </a:solidFill>
+                <a:latin typeface="American Typewriter" panose="02090604020004020304" pitchFamily="18" charset="77"/>
+              </a:rPr>
+              <a:t>self.k_rays</a:t>
+            </a:r>
+            <a:endParaRPr lang="en-US" dirty="0">
+              <a:solidFill>
+                <a:schemeClr val="accent5">
+                  <a:lumMod val="75000"/>
+                </a:schemeClr>
+              </a:solidFill>
+            </a:endParaRPr>
           </a:p>
         </p:txBody>
       </p:sp>

</xml_diff>

<commit_message>
Added `self.is_pointed` and `CFG.on_poly_assign = 'both'` to the presentation
</commit_message>
<xml_diff>
--- a/presentation.pptx
+++ b/presentation.pptx
@@ -135,7 +135,7 @@
 <file path=ppt/revisionInfo.xml><?xml version="1.0" encoding="utf-8"?>
 <p1510:revInfo xmlns:a="http://schemas.openxmlformats.org/drawingml/2006/main" xmlns:r="http://schemas.openxmlformats.org/officeDocument/2006/relationships" xmlns:p1510="http://schemas.microsoft.com/office/powerpoint/2015/10/main">
   <p1510:revLst>
-    <p1510:client id="{92BFB444-7DBC-CA44-A6DD-A4B3F7DBDADB}" v="358" dt="2026-02-06T09:12:11.111"/>
+    <p1510:client id="{92BFB444-7DBC-CA44-A6DD-A4B3F7DBDADB}" v="362" dt="2026-02-08T15:26:18.450"/>
   </p1510:revLst>
 </p1510:revInfo>
 </file>
@@ -145,7 +145,7 @@
   <pc:docChgLst>
     <pc:chgData name="Bart Wolleswinkel" userId="b168cadc-1825-41ce-b9cc-7c7f06f6f31d" providerId="ADAL" clId="{22248CC1-9068-5BCB-B15B-4353FE48F57D}"/>
     <pc:docChg chg="undo redo custSel addSld modSld sldOrd">
-      <pc:chgData name="Bart Wolleswinkel" userId="b168cadc-1825-41ce-b9cc-7c7f06f6f31d" providerId="ADAL" clId="{22248CC1-9068-5BCB-B15B-4353FE48F57D}" dt="2026-02-06T09:12:21.904" v="4990" actId="1076"/>
+      <pc:chgData name="Bart Wolleswinkel" userId="b168cadc-1825-41ce-b9cc-7c7f06f6f31d" providerId="ADAL" clId="{22248CC1-9068-5BCB-B15B-4353FE48F57D}" dt="2026-02-08T15:26:43.930" v="5071" actId="20577"/>
       <pc:docMkLst>
         <pc:docMk/>
       </pc:docMkLst>
@@ -161,29 +161,6 @@
             <pc:docMk/>
             <pc:sldMk cId="2563034518" sldId="256"/>
             <ac:spMk id="2" creationId="{11592D63-90DE-8FC5-4122-5EC6AA7A9F3D}"/>
-          </ac:spMkLst>
-        </pc:spChg>
-      </pc:sldChg>
-      <pc:sldChg chg="modSp mod">
-        <pc:chgData name="Bart Wolleswinkel" userId="b168cadc-1825-41ce-b9cc-7c7f06f6f31d" providerId="ADAL" clId="{22248CC1-9068-5BCB-B15B-4353FE48F57D}" dt="2026-01-08T13:29:15.403" v="11" actId="5793"/>
-        <pc:sldMkLst>
-          <pc:docMk/>
-          <pc:sldMk cId="74253125" sldId="267"/>
-        </pc:sldMkLst>
-        <pc:spChg chg="mod">
-          <ac:chgData name="Bart Wolleswinkel" userId="b168cadc-1825-41ce-b9cc-7c7f06f6f31d" providerId="ADAL" clId="{22248CC1-9068-5BCB-B15B-4353FE48F57D}" dt="2026-01-08T13:28:12.162" v="7" actId="20577"/>
-          <ac:spMkLst>
-            <pc:docMk/>
-            <pc:sldMk cId="74253125" sldId="267"/>
-            <ac:spMk id="2" creationId="{41AAC7F8-4717-800F-1167-E97B7F5FBEBE}"/>
-          </ac:spMkLst>
-        </pc:spChg>
-        <pc:spChg chg="mod">
-          <ac:chgData name="Bart Wolleswinkel" userId="b168cadc-1825-41ce-b9cc-7c7f06f6f31d" providerId="ADAL" clId="{22248CC1-9068-5BCB-B15B-4353FE48F57D}" dt="2026-01-08T13:29:15.403" v="11" actId="5793"/>
-          <ac:spMkLst>
-            <pc:docMk/>
-            <pc:sldMk cId="74253125" sldId="267"/>
-            <ac:spMk id="9" creationId="{A8F04E1F-D9F7-6017-DA7A-5C0C6EBEDBF5}"/>
           </ac:spMkLst>
         </pc:spChg>
       </pc:sldChg>
@@ -1265,7 +1242,7 @@
         </pc:cxnChg>
       </pc:sldChg>
       <pc:sldChg chg="addSp delSp modSp add mod">
-        <pc:chgData name="Bart Wolleswinkel" userId="b168cadc-1825-41ce-b9cc-7c7f06f6f31d" providerId="ADAL" clId="{22248CC1-9068-5BCB-B15B-4353FE48F57D}" dt="2026-02-06T09:12:21.904" v="4990" actId="1076"/>
+        <pc:chgData name="Bart Wolleswinkel" userId="b168cadc-1825-41ce-b9cc-7c7f06f6f31d" providerId="ADAL" clId="{22248CC1-9068-5BCB-B15B-4353FE48F57D}" dt="2026-02-08T15:25:24.372" v="5008" actId="20577"/>
         <pc:sldMkLst>
           <pc:docMk/>
           <pc:sldMk cId="2057737708" sldId="273"/>
@@ -1308,6 +1285,22 @@
             <pc:docMk/>
             <pc:sldMk cId="2057737708" sldId="273"/>
             <ac:spMk id="6" creationId="{D20FCBC6-1213-633A-2ABA-9479A2DE9E3D}"/>
+          </ac:spMkLst>
+        </pc:spChg>
+        <pc:spChg chg="add mod">
+          <ac:chgData name="Bart Wolleswinkel" userId="b168cadc-1825-41ce-b9cc-7c7f06f6f31d" providerId="ADAL" clId="{22248CC1-9068-5BCB-B15B-4353FE48F57D}" dt="2026-02-08T15:25:07.033" v="5000" actId="20577"/>
+          <ac:spMkLst>
+            <pc:docMk/>
+            <pc:sldMk cId="2057737708" sldId="273"/>
+            <ac:spMk id="7" creationId="{AD43E3EC-AA57-AAA5-A2DB-9BF8E207DA2A}"/>
+          </ac:spMkLst>
+        </pc:spChg>
+        <pc:spChg chg="add mod">
+          <ac:chgData name="Bart Wolleswinkel" userId="b168cadc-1825-41ce-b9cc-7c7f06f6f31d" providerId="ADAL" clId="{22248CC1-9068-5BCB-B15B-4353FE48F57D}" dt="2026-02-08T15:25:24.372" v="5008" actId="20577"/>
+          <ac:spMkLst>
+            <pc:docMk/>
+            <pc:sldMk cId="2057737708" sldId="273"/>
+            <ac:spMk id="8" creationId="{AC8B8372-9273-9547-9B60-64A1290ACE88}"/>
           </ac:spMkLst>
         </pc:spChg>
         <pc:spChg chg="add mod">
@@ -1399,7 +1392,7 @@
           </ac:spMkLst>
         </pc:spChg>
         <pc:spChg chg="add mod">
-          <ac:chgData name="Bart Wolleswinkel" userId="b168cadc-1825-41ce-b9cc-7c7f06f6f31d" providerId="ADAL" clId="{22248CC1-9068-5BCB-B15B-4353FE48F57D}" dt="2026-02-01T23:20:59.192" v="2361" actId="14100"/>
+          <ac:chgData name="Bart Wolleswinkel" userId="b168cadc-1825-41ce-b9cc-7c7f06f6f31d" providerId="ADAL" clId="{22248CC1-9068-5BCB-B15B-4353FE48F57D}" dt="2026-02-08T15:24:57.970" v="4991" actId="14100"/>
           <ac:spMkLst>
             <pc:docMk/>
             <pc:sldMk cId="2057737708" sldId="273"/>
@@ -1616,11 +1609,27 @@
         </pc:spChg>
       </pc:sldChg>
       <pc:sldChg chg="addSp delSp modSp add mod ord">
-        <pc:chgData name="Bart Wolleswinkel" userId="b168cadc-1825-41ce-b9cc-7c7f06f6f31d" providerId="ADAL" clId="{22248CC1-9068-5BCB-B15B-4353FE48F57D}" dt="2026-02-04T19:53:35.606" v="3738" actId="20578"/>
+        <pc:chgData name="Bart Wolleswinkel" userId="b168cadc-1825-41ce-b9cc-7c7f06f6f31d" providerId="ADAL" clId="{22248CC1-9068-5BCB-B15B-4353FE48F57D}" dt="2026-02-08T15:26:43.930" v="5071" actId="20577"/>
         <pc:sldMkLst>
           <pc:docMk/>
           <pc:sldMk cId="3278522806" sldId="274"/>
         </pc:sldMkLst>
+        <pc:spChg chg="add mod">
+          <ac:chgData name="Bart Wolleswinkel" userId="b168cadc-1825-41ce-b9cc-7c7f06f6f31d" providerId="ADAL" clId="{22248CC1-9068-5BCB-B15B-4353FE48F57D}" dt="2026-02-08T15:26:15.149" v="5036" actId="20577"/>
+          <ac:spMkLst>
+            <pc:docMk/>
+            <pc:sldMk cId="3278522806" sldId="274"/>
+            <ac:spMk id="2" creationId="{714000DB-2377-FB47-5A05-C219ED9AFB6F}"/>
+          </ac:spMkLst>
+        </pc:spChg>
+        <pc:spChg chg="add mod">
+          <ac:chgData name="Bart Wolleswinkel" userId="b168cadc-1825-41ce-b9cc-7c7f06f6f31d" providerId="ADAL" clId="{22248CC1-9068-5BCB-B15B-4353FE48F57D}" dt="2026-02-08T15:26:43.930" v="5071" actId="20577"/>
+          <ac:spMkLst>
+            <pc:docMk/>
+            <pc:sldMk cId="3278522806" sldId="274"/>
+            <ac:spMk id="3" creationId="{D8724FCD-F500-0A9F-71DF-1E1B1AD80A4A}"/>
+          </ac:spMkLst>
+        </pc:spChg>
         <pc:spChg chg="mod">
           <ac:chgData name="Bart Wolleswinkel" userId="b168cadc-1825-41ce-b9cc-7c7f06f6f31d" providerId="ADAL" clId="{22248CC1-9068-5BCB-B15B-4353FE48F57D}" dt="2026-02-04T17:26:13.108" v="3490" actId="1076"/>
           <ac:spMkLst>
@@ -1654,7 +1663,7 @@
           </ac:spMkLst>
         </pc:spChg>
         <pc:spChg chg="add mod">
-          <ac:chgData name="Bart Wolleswinkel" userId="b168cadc-1825-41ce-b9cc-7c7f06f6f31d" providerId="ADAL" clId="{22248CC1-9068-5BCB-B15B-4353FE48F57D}" dt="2026-02-04T17:22:49.340" v="3454" actId="1076"/>
+          <ac:chgData name="Bart Wolleswinkel" userId="b168cadc-1825-41ce-b9cc-7c7f06f6f31d" providerId="ADAL" clId="{22248CC1-9068-5BCB-B15B-4353FE48F57D}" dt="2026-02-08T15:25:44.807" v="5010" actId="20577"/>
           <ac:spMkLst>
             <pc:docMk/>
             <pc:sldMk cId="3278522806" sldId="274"/>
@@ -1818,134 +1827,6 @@
             <pc:docMk/>
             <pc:sldMk cId="1723360047" sldId="275"/>
             <ac:spMk id="5" creationId="{7A3702CD-77F5-DA62-B831-B2BF98365A29}"/>
-          </ac:spMkLst>
-        </pc:spChg>
-        <pc:spChg chg="add del mod">
-          <ac:chgData name="Bart Wolleswinkel" userId="b168cadc-1825-41ce-b9cc-7c7f06f6f31d" providerId="ADAL" clId="{22248CC1-9068-5BCB-B15B-4353FE48F57D}" dt="2026-02-05T16:02:48.537" v="4881" actId="478"/>
-          <ac:spMkLst>
-            <pc:docMk/>
-            <pc:sldMk cId="1723360047" sldId="275"/>
-            <ac:spMk id="6" creationId="{0D0EE6DB-9631-4E68-81DE-BE7807E9B9D3}"/>
-          </ac:spMkLst>
-        </pc:spChg>
-        <pc:spChg chg="add">
-          <ac:chgData name="Bart Wolleswinkel" userId="b168cadc-1825-41ce-b9cc-7c7f06f6f31d" providerId="ADAL" clId="{22248CC1-9068-5BCB-B15B-4353FE48F57D}" dt="2026-02-05T15:44:35.989" v="4004"/>
-          <ac:spMkLst>
-            <pc:docMk/>
-            <pc:sldMk cId="1723360047" sldId="275"/>
-            <ac:spMk id="7" creationId="{BE6D3065-ADD3-9EAE-3EB9-47BEBA5F9C80}"/>
-          </ac:spMkLst>
-        </pc:spChg>
-        <pc:spChg chg="add mod">
-          <ac:chgData name="Bart Wolleswinkel" userId="b168cadc-1825-41ce-b9cc-7c7f06f6f31d" providerId="ADAL" clId="{22248CC1-9068-5BCB-B15B-4353FE48F57D}" dt="2026-02-05T15:44:37.506" v="4006"/>
-          <ac:spMkLst>
-            <pc:docMk/>
-            <pc:sldMk cId="1723360047" sldId="275"/>
-            <ac:spMk id="8" creationId="{928E3FE0-FB67-F5CA-36E7-7D08FDBC2981}"/>
-          </ac:spMkLst>
-        </pc:spChg>
-        <pc:spChg chg="del">
-          <ac:chgData name="Bart Wolleswinkel" userId="b168cadc-1825-41ce-b9cc-7c7f06f6f31d" providerId="ADAL" clId="{22248CC1-9068-5BCB-B15B-4353FE48F57D}" dt="2026-02-05T15:23:10.547" v="3760" actId="478"/>
-          <ac:spMkLst>
-            <pc:docMk/>
-            <pc:sldMk cId="1723360047" sldId="275"/>
-            <ac:spMk id="9" creationId="{8B79C93F-AD46-7105-DE30-B341F23E8C1C}"/>
-          </ac:spMkLst>
-        </pc:spChg>
-        <pc:spChg chg="add mod">
-          <ac:chgData name="Bart Wolleswinkel" userId="b168cadc-1825-41ce-b9cc-7c7f06f6f31d" providerId="ADAL" clId="{22248CC1-9068-5BCB-B15B-4353FE48F57D}" dt="2026-02-05T15:44:41.987" v="4009" actId="767"/>
-          <ac:spMkLst>
-            <pc:docMk/>
-            <pc:sldMk cId="1723360047" sldId="275"/>
-            <ac:spMk id="10" creationId="{40545389-AC5F-9A38-75C4-FC31F15092B9}"/>
-          </ac:spMkLst>
-        </pc:spChg>
-        <pc:spChg chg="add">
-          <ac:chgData name="Bart Wolleswinkel" userId="b168cadc-1825-41ce-b9cc-7c7f06f6f31d" providerId="ADAL" clId="{22248CC1-9068-5BCB-B15B-4353FE48F57D}" dt="2026-02-05T15:44:40.121" v="4008"/>
-          <ac:spMkLst>
-            <pc:docMk/>
-            <pc:sldMk cId="1723360047" sldId="275"/>
-            <ac:spMk id="11" creationId="{C6307932-FEEF-9F50-C999-01A28E8376AE}"/>
-          </ac:spMkLst>
-        </pc:spChg>
-        <pc:spChg chg="add">
-          <ac:chgData name="Bart Wolleswinkel" userId="b168cadc-1825-41ce-b9cc-7c7f06f6f31d" providerId="ADAL" clId="{22248CC1-9068-5BCB-B15B-4353FE48F57D}" dt="2026-02-05T15:45:58.191" v="4034"/>
-          <ac:spMkLst>
-            <pc:docMk/>
-            <pc:sldMk cId="1723360047" sldId="275"/>
-            <ac:spMk id="14" creationId="{795B13CE-A01E-A116-37C8-9C9DC694B21D}"/>
-          </ac:spMkLst>
-        </pc:spChg>
-        <pc:spChg chg="del">
-          <ac:chgData name="Bart Wolleswinkel" userId="b168cadc-1825-41ce-b9cc-7c7f06f6f31d" providerId="ADAL" clId="{22248CC1-9068-5BCB-B15B-4353FE48F57D}" dt="2026-02-05T15:23:10.547" v="3760" actId="478"/>
-          <ac:spMkLst>
-            <pc:docMk/>
-            <pc:sldMk cId="1723360047" sldId="275"/>
-            <ac:spMk id="22" creationId="{622FBB6E-DB3E-E13E-CE24-EC7466055E4D}"/>
-          </ac:spMkLst>
-        </pc:spChg>
-        <pc:spChg chg="del">
-          <ac:chgData name="Bart Wolleswinkel" userId="b168cadc-1825-41ce-b9cc-7c7f06f6f31d" providerId="ADAL" clId="{22248CC1-9068-5BCB-B15B-4353FE48F57D}" dt="2026-02-05T15:23:10.547" v="3760" actId="478"/>
-          <ac:spMkLst>
-            <pc:docMk/>
-            <pc:sldMk cId="1723360047" sldId="275"/>
-            <ac:spMk id="23" creationId="{FF1FBE20-9DFF-0C70-29EE-D8F447770A6F}"/>
-          </ac:spMkLst>
-        </pc:spChg>
-        <pc:spChg chg="del">
-          <ac:chgData name="Bart Wolleswinkel" userId="b168cadc-1825-41ce-b9cc-7c7f06f6f31d" providerId="ADAL" clId="{22248CC1-9068-5BCB-B15B-4353FE48F57D}" dt="2026-02-05T15:23:10.547" v="3760" actId="478"/>
-          <ac:spMkLst>
-            <pc:docMk/>
-            <pc:sldMk cId="1723360047" sldId="275"/>
-            <ac:spMk id="27" creationId="{F4299E87-DD61-9350-7CC7-52447E462957}"/>
-          </ac:spMkLst>
-        </pc:spChg>
-        <pc:spChg chg="del">
-          <ac:chgData name="Bart Wolleswinkel" userId="b168cadc-1825-41ce-b9cc-7c7f06f6f31d" providerId="ADAL" clId="{22248CC1-9068-5BCB-B15B-4353FE48F57D}" dt="2026-02-05T15:23:10.547" v="3760" actId="478"/>
-          <ac:spMkLst>
-            <pc:docMk/>
-            <pc:sldMk cId="1723360047" sldId="275"/>
-            <ac:spMk id="32" creationId="{6153B7D3-E420-1F02-7199-2DA543095125}"/>
-          </ac:spMkLst>
-        </pc:spChg>
-        <pc:spChg chg="del">
-          <ac:chgData name="Bart Wolleswinkel" userId="b168cadc-1825-41ce-b9cc-7c7f06f6f31d" providerId="ADAL" clId="{22248CC1-9068-5BCB-B15B-4353FE48F57D}" dt="2026-02-05T15:23:10.547" v="3760" actId="478"/>
-          <ac:spMkLst>
-            <pc:docMk/>
-            <pc:sldMk cId="1723360047" sldId="275"/>
-            <ac:spMk id="36" creationId="{051BC489-F81A-0372-1479-F0484E4142AA}"/>
-          </ac:spMkLst>
-        </pc:spChg>
-        <pc:spChg chg="del">
-          <ac:chgData name="Bart Wolleswinkel" userId="b168cadc-1825-41ce-b9cc-7c7f06f6f31d" providerId="ADAL" clId="{22248CC1-9068-5BCB-B15B-4353FE48F57D}" dt="2026-02-05T15:23:10.547" v="3760" actId="478"/>
-          <ac:spMkLst>
-            <pc:docMk/>
-            <pc:sldMk cId="1723360047" sldId="275"/>
-            <ac:spMk id="48" creationId="{7759F4AF-7ED6-D71E-4630-9BE362F23C93}"/>
-          </ac:spMkLst>
-        </pc:spChg>
-        <pc:spChg chg="del">
-          <ac:chgData name="Bart Wolleswinkel" userId="b168cadc-1825-41ce-b9cc-7c7f06f6f31d" providerId="ADAL" clId="{22248CC1-9068-5BCB-B15B-4353FE48F57D}" dt="2026-02-05T15:23:10.547" v="3760" actId="478"/>
-          <ac:spMkLst>
-            <pc:docMk/>
-            <pc:sldMk cId="1723360047" sldId="275"/>
-            <ac:spMk id="50" creationId="{11A43BFD-5B45-B756-2DC1-4EF7F531B05E}"/>
-          </ac:spMkLst>
-        </pc:spChg>
-        <pc:spChg chg="del">
-          <ac:chgData name="Bart Wolleswinkel" userId="b168cadc-1825-41ce-b9cc-7c7f06f6f31d" providerId="ADAL" clId="{22248CC1-9068-5BCB-B15B-4353FE48F57D}" dt="2026-02-05T15:23:10.547" v="3760" actId="478"/>
-          <ac:spMkLst>
-            <pc:docMk/>
-            <pc:sldMk cId="1723360047" sldId="275"/>
-            <ac:spMk id="58" creationId="{ABFDE76B-4FA9-5C06-90C6-E843D887B281}"/>
-          </ac:spMkLst>
-        </pc:spChg>
-        <pc:spChg chg="del">
-          <ac:chgData name="Bart Wolleswinkel" userId="b168cadc-1825-41ce-b9cc-7c7f06f6f31d" providerId="ADAL" clId="{22248CC1-9068-5BCB-B15B-4353FE48F57D}" dt="2026-02-05T15:23:10.547" v="3760" actId="478"/>
-          <ac:spMkLst>
-            <pc:docMk/>
-            <pc:sldMk cId="1723360047" sldId="275"/>
-            <ac:spMk id="64" creationId="{EF9553D9-C737-F9F0-2862-E0C3A30F23BC}"/>
           </ac:spMkLst>
         </pc:spChg>
       </pc:sldChg>
@@ -14450,7 +14331,7 @@
         <p:spPr>
           <a:xfrm>
             <a:off x="3387316" y="1690688"/>
-            <a:ext cx="4304002" cy="3369365"/>
+            <a:ext cx="4304002" cy="3541069"/>
           </a:xfrm>
           <a:prstGeom prst="rect">
             <a:avLst/>
@@ -15923,6 +15804,97 @@
                 </a:schemeClr>
               </a:solidFill>
             </a:endParaRPr>
+          </a:p>
+        </p:txBody>
+      </p:sp>
+      <p:sp>
+        <p:nvSpPr>
+          <p:cNvPr id="7" name="TextBox 6">
+            <a:extLst>
+              <a:ext uri="{FF2B5EF4-FFF2-40B4-BE49-F238E27FC236}">
+                <a16:creationId xmlns:a16="http://schemas.microsoft.com/office/drawing/2014/main" id="{AD43E3EC-AA57-AAA5-A2DB-9BF8E207DA2A}"/>
+              </a:ext>
+            </a:extLst>
+          </p:cNvPr>
+          <p:cNvSpPr txBox="1"/>
+          <p:nvPr/>
+        </p:nvSpPr>
+        <p:spPr>
+          <a:xfrm>
+            <a:off x="3631408" y="4728348"/>
+            <a:ext cx="3559629" cy="369332"/>
+          </a:xfrm>
+          <a:prstGeom prst="rect">
+            <a:avLst/>
+          </a:prstGeom>
+          <a:noFill/>
+        </p:spPr>
+        <p:txBody>
+          <a:bodyPr wrap="none" rtlCol="0">
+            <a:spAutoFit/>
+          </a:bodyPr>
+          <a:lstStyle/>
+          <a:p>
+            <a:r>
+              <a:rPr lang="en-US" dirty="0" err="1">
+                <a:latin typeface="American Typewriter" panose="02090604020004020304" pitchFamily="18" charset="77"/>
+              </a:rPr>
+              <a:t>self.is_pointed</a:t>
+            </a:r>
+            <a:r>
+              <a:rPr lang="en-US" dirty="0">
+                <a:latin typeface="American Typewriter" panose="02090604020004020304" pitchFamily="18" charset="77"/>
+              </a:rPr>
+              <a:t> = bool | None </a:t>
+            </a:r>
+            <a:r>
+              <a:rPr lang="en-US" dirty="0"/>
+              <a:t>(?)</a:t>
+            </a:r>
+          </a:p>
+        </p:txBody>
+      </p:sp>
+      <p:sp>
+        <p:nvSpPr>
+          <p:cNvPr id="8" name="TextBox 7">
+            <a:extLst>
+              <a:ext uri="{FF2B5EF4-FFF2-40B4-BE49-F238E27FC236}">
+                <a16:creationId xmlns:a16="http://schemas.microsoft.com/office/drawing/2014/main" id="{AC8B8372-9273-9547-9B60-64A1290ACE88}"/>
+              </a:ext>
+            </a:extLst>
+          </p:cNvPr>
+          <p:cNvSpPr txBox="1"/>
+          <p:nvPr/>
+        </p:nvSpPr>
+        <p:spPr>
+          <a:xfrm>
+            <a:off x="8335122" y="3975688"/>
+            <a:ext cx="1847622" cy="369332"/>
+          </a:xfrm>
+          <a:prstGeom prst="rect">
+            <a:avLst/>
+          </a:prstGeom>
+          <a:noFill/>
+        </p:spPr>
+        <p:txBody>
+          <a:bodyPr wrap="none" rtlCol="0">
+            <a:spAutoFit/>
+          </a:bodyPr>
+          <a:lstStyle/>
+          <a:p>
+            <a:r>
+              <a:rPr lang="en-US" dirty="0" err="1">
+                <a:latin typeface="American Typewriter" panose="02090604020004020304" pitchFamily="18" charset="77"/>
+              </a:rPr>
+              <a:t>self.volume</a:t>
+            </a:r>
+            <a:r>
+              <a:rPr lang="en-US" dirty="0">
+                <a:latin typeface="American Typewriter" panose="02090604020004020304" pitchFamily="18" charset="77"/>
+              </a:rPr>
+              <a:t>(…)</a:t>
+            </a:r>
+            <a:endParaRPr lang="en-US" dirty="0"/>
           </a:p>
         </p:txBody>
       </p:sp>
@@ -17594,6 +17566,108 @@
                 <a:schemeClr val="bg2">
                   <a:lumMod val="75000"/>
                 </a:schemeClr>
+              </a:solidFill>
+            </a:endParaRPr>
+          </a:p>
+        </p:txBody>
+      </p:sp>
+      <p:sp>
+        <p:nvSpPr>
+          <p:cNvPr id="2" name="TextBox 1">
+            <a:extLst>
+              <a:ext uri="{FF2B5EF4-FFF2-40B4-BE49-F238E27FC236}">
+                <a16:creationId xmlns:a16="http://schemas.microsoft.com/office/drawing/2014/main" id="{714000DB-2377-FB47-5A05-C219ED9AFB6F}"/>
+              </a:ext>
+            </a:extLst>
+          </p:cNvPr>
+          <p:cNvSpPr txBox="1"/>
+          <p:nvPr/>
+        </p:nvSpPr>
+        <p:spPr>
+          <a:xfrm>
+            <a:off x="6043167" y="1307569"/>
+            <a:ext cx="4863511" cy="307777"/>
+          </a:xfrm>
+          <a:prstGeom prst="rect">
+            <a:avLst/>
+          </a:prstGeom>
+          <a:noFill/>
+        </p:spPr>
+        <p:txBody>
+          <a:bodyPr wrap="none" rtlCol="0">
+            <a:spAutoFit/>
+          </a:bodyPr>
+          <a:lstStyle/>
+          <a:p>
+            <a:r>
+              <a:rPr lang="en-US" sz="1400" dirty="0" err="1">
+                <a:solidFill>
+                  <a:sysClr val="windowText" lastClr="000000"/>
+                </a:solidFill>
+                <a:latin typeface="American Typewriter" panose="02090604020004020304" pitchFamily="18" charset="77"/>
+              </a:rPr>
+              <a:t>CFG.on_poly_assign</a:t>
+            </a:r>
+            <a:r>
+              <a:rPr lang="en-US" sz="1400" dirty="0">
+                <a:solidFill>
+                  <a:sysClr val="windowText" lastClr="000000"/>
+                </a:solidFill>
+                <a:latin typeface="American Typewriter" panose="02090604020004020304" pitchFamily="18" charset="77"/>
+              </a:rPr>
+              <a:t>: Literal[‘default’, ‘both’] = ‘default’</a:t>
+            </a:r>
+            <a:endParaRPr lang="en-US" sz="1400" dirty="0"/>
+          </a:p>
+        </p:txBody>
+      </p:sp>
+      <p:sp>
+        <p:nvSpPr>
+          <p:cNvPr id="3" name="TextBox 2">
+            <a:extLst>
+              <a:ext uri="{FF2B5EF4-FFF2-40B4-BE49-F238E27FC236}">
+                <a16:creationId xmlns:a16="http://schemas.microsoft.com/office/drawing/2014/main" id="{D8724FCD-F500-0A9F-71DF-1E1B1AD80A4A}"/>
+              </a:ext>
+            </a:extLst>
+          </p:cNvPr>
+          <p:cNvSpPr txBox="1"/>
+          <p:nvPr/>
+        </p:nvSpPr>
+        <p:spPr>
+          <a:xfrm>
+            <a:off x="9699416" y="1615346"/>
+            <a:ext cx="2414524" cy="523220"/>
+          </a:xfrm>
+          <a:prstGeom prst="rect">
+            <a:avLst/>
+          </a:prstGeom>
+          <a:noFill/>
+        </p:spPr>
+        <p:txBody>
+          <a:bodyPr wrap="square" rtlCol="0">
+            <a:spAutoFit/>
+          </a:bodyPr>
+          <a:lstStyle/>
+          <a:p>
+            <a:r>
+              <a:rPr lang="en-US" sz="1400" b="1" dirty="0">
+                <a:solidFill>
+                  <a:srgbClr val="FF0000"/>
+                </a:solidFill>
+              </a:rPr>
+              <a:t>This is to satisfy </a:t>
+            </a:r>
+            <a:r>
+              <a:rPr lang="en-US" sz="1400" b="1">
+                <a:solidFill>
+                  <a:srgbClr val="FF0000"/>
+                </a:solidFill>
+              </a:rPr>
+              <a:t>Sam’s request</a:t>
+            </a:r>
+            <a:endParaRPr lang="en-US" sz="1400" b="1" dirty="0">
+              <a:solidFill>
+                <a:srgbClr val="FF0000"/>
               </a:solidFill>
             </a:endParaRPr>
           </a:p>

</xml_diff>